<commit_message>
nf ff regions figur opdateret
</commit_message>
<xml_diff>
--- a/Figures/TechnicalAnalysis/NFFF/nfFfRegions.pptx
+++ b/Figures/TechnicalAnalysis/NFFF/nfFfRegions.pptx
@@ -272,7 +272,7 @@
           <a:p>
             <a:fld id="{BBDDD7C6-91AD-42FF-A4E7-6A9F81605F96}" type="datetimeFigureOut">
               <a:rPr lang="en-DK" smtClean="0"/>
-              <a:t>17/10/2024</a:t>
+              <a:t>17/12/2024</a:t>
             </a:fld>
             <a:endParaRPr lang="en-DK"/>
           </a:p>
@@ -472,7 +472,7 @@
           <a:p>
             <a:fld id="{BBDDD7C6-91AD-42FF-A4E7-6A9F81605F96}" type="datetimeFigureOut">
               <a:rPr lang="en-DK" smtClean="0"/>
-              <a:t>17/10/2024</a:t>
+              <a:t>17/12/2024</a:t>
             </a:fld>
             <a:endParaRPr lang="en-DK"/>
           </a:p>
@@ -682,7 +682,7 @@
           <a:p>
             <a:fld id="{BBDDD7C6-91AD-42FF-A4E7-6A9F81605F96}" type="datetimeFigureOut">
               <a:rPr lang="en-DK" smtClean="0"/>
-              <a:t>17/10/2024</a:t>
+              <a:t>17/12/2024</a:t>
             </a:fld>
             <a:endParaRPr lang="en-DK"/>
           </a:p>
@@ -882,7 +882,7 @@
           <a:p>
             <a:fld id="{BBDDD7C6-91AD-42FF-A4E7-6A9F81605F96}" type="datetimeFigureOut">
               <a:rPr lang="en-DK" smtClean="0"/>
-              <a:t>17/10/2024</a:t>
+              <a:t>17/12/2024</a:t>
             </a:fld>
             <a:endParaRPr lang="en-DK"/>
           </a:p>
@@ -1158,7 +1158,7 @@
           <a:p>
             <a:fld id="{BBDDD7C6-91AD-42FF-A4E7-6A9F81605F96}" type="datetimeFigureOut">
               <a:rPr lang="en-DK" smtClean="0"/>
-              <a:t>17/10/2024</a:t>
+              <a:t>17/12/2024</a:t>
             </a:fld>
             <a:endParaRPr lang="en-DK"/>
           </a:p>
@@ -1426,7 +1426,7 @@
           <a:p>
             <a:fld id="{BBDDD7C6-91AD-42FF-A4E7-6A9F81605F96}" type="datetimeFigureOut">
               <a:rPr lang="en-DK" smtClean="0"/>
-              <a:t>17/10/2024</a:t>
+              <a:t>17/12/2024</a:t>
             </a:fld>
             <a:endParaRPr lang="en-DK"/>
           </a:p>
@@ -1841,7 +1841,7 @@
           <a:p>
             <a:fld id="{BBDDD7C6-91AD-42FF-A4E7-6A9F81605F96}" type="datetimeFigureOut">
               <a:rPr lang="en-DK" smtClean="0"/>
-              <a:t>17/10/2024</a:t>
+              <a:t>17/12/2024</a:t>
             </a:fld>
             <a:endParaRPr lang="en-DK"/>
           </a:p>
@@ -1983,7 +1983,7 @@
           <a:p>
             <a:fld id="{BBDDD7C6-91AD-42FF-A4E7-6A9F81605F96}" type="datetimeFigureOut">
               <a:rPr lang="en-DK" smtClean="0"/>
-              <a:t>17/10/2024</a:t>
+              <a:t>17/12/2024</a:t>
             </a:fld>
             <a:endParaRPr lang="en-DK"/>
           </a:p>
@@ -2096,7 +2096,7 @@
           <a:p>
             <a:fld id="{BBDDD7C6-91AD-42FF-A4E7-6A9F81605F96}" type="datetimeFigureOut">
               <a:rPr lang="en-DK" smtClean="0"/>
-              <a:t>17/10/2024</a:t>
+              <a:t>17/12/2024</a:t>
             </a:fld>
             <a:endParaRPr lang="en-DK"/>
           </a:p>
@@ -2409,7 +2409,7 @@
           <a:p>
             <a:fld id="{BBDDD7C6-91AD-42FF-A4E7-6A9F81605F96}" type="datetimeFigureOut">
               <a:rPr lang="en-DK" smtClean="0"/>
-              <a:t>17/10/2024</a:t>
+              <a:t>17/12/2024</a:t>
             </a:fld>
             <a:endParaRPr lang="en-DK"/>
           </a:p>
@@ -2698,7 +2698,7 @@
           <a:p>
             <a:fld id="{BBDDD7C6-91AD-42FF-A4E7-6A9F81605F96}" type="datetimeFigureOut">
               <a:rPr lang="en-DK" smtClean="0"/>
-              <a:t>17/10/2024</a:t>
+              <a:t>17/12/2024</a:t>
             </a:fld>
             <a:endParaRPr lang="en-DK"/>
           </a:p>
@@ -2941,7 +2941,7 @@
           <a:p>
             <a:fld id="{BBDDD7C6-91AD-42FF-A4E7-6A9F81605F96}" type="datetimeFigureOut">
               <a:rPr lang="en-DK" smtClean="0"/>
-              <a:t>17/10/2024</a:t>
+              <a:t>17/12/2024</a:t>
             </a:fld>
             <a:endParaRPr lang="en-DK"/>
           </a:p>
@@ -3358,2130 +3358,2181 @@
           <a:chExt cx="0" cy="0"/>
         </a:xfrm>
       </p:grpSpPr>
-      <p:grpSp>
-        <p:nvGrpSpPr>
-          <p:cNvPr id="94" name="Group 93">
-            <a:extLst>
-              <a:ext uri="{FF2B5EF4-FFF2-40B4-BE49-F238E27FC236}">
-                <a16:creationId xmlns:a16="http://schemas.microsoft.com/office/drawing/2014/main" id="{5F73B6CD-6A35-DE7B-F52B-9F615D19B768}"/>
-              </a:ext>
-            </a:extLst>
-          </p:cNvPr>
-          <p:cNvGrpSpPr/>
+      <p:cxnSp>
+        <p:nvCxnSpPr>
+          <p:cNvPr id="5" name="Straight Connector 4">
+            <a:extLst>
+              <a:ext uri="{FF2B5EF4-FFF2-40B4-BE49-F238E27FC236}">
+                <a16:creationId xmlns:a16="http://schemas.microsoft.com/office/drawing/2014/main" id="{B2F1B983-8386-5A53-ECC5-C24E086FF52F}"/>
+              </a:ext>
+            </a:extLst>
+          </p:cNvPr>
+          <p:cNvCxnSpPr>
+            <a:cxnSpLocks/>
+          </p:cNvCxnSpPr>
           <p:nvPr/>
-        </p:nvGrpSpPr>
-        <p:grpSpPr>
+        </p:nvCxnSpPr>
+        <p:spPr>
           <a:xfrm>
-            <a:off x="733652" y="817679"/>
-            <a:ext cx="10229623" cy="4887796"/>
-            <a:chOff x="314780" y="463782"/>
-            <a:chExt cx="10610395" cy="5736993"/>
-          </a:xfrm>
-        </p:grpSpPr>
-        <p:sp>
-          <p:nvSpPr>
-            <p:cNvPr id="56" name="Arc 55">
-              <a:extLst>
-                <a:ext uri="{FF2B5EF4-FFF2-40B4-BE49-F238E27FC236}">
-                  <a16:creationId xmlns:a16="http://schemas.microsoft.com/office/drawing/2014/main" id="{D4A511AB-EEBD-2117-1067-5D37F207B61D}"/>
-                </a:ext>
-              </a:extLst>
-            </p:cNvPr>
-            <p:cNvSpPr/>
-            <p:nvPr/>
-          </p:nvSpPr>
-          <p:spPr>
-            <a:xfrm rot="2586438">
-              <a:off x="6368773" y="1755372"/>
-              <a:ext cx="4289913" cy="4445403"/>
-            </a:xfrm>
-            <a:prstGeom prst="arc">
-              <a:avLst/>
-            </a:prstGeom>
-            <a:ln>
-              <a:solidFill>
-                <a:schemeClr val="tx1"/>
-              </a:solidFill>
-            </a:ln>
-          </p:spPr>
-          <p:style>
-            <a:lnRef idx="2">
-              <a:schemeClr val="accent1"/>
-            </a:lnRef>
-            <a:fillRef idx="0">
-              <a:schemeClr val="accent1"/>
-            </a:fillRef>
-            <a:effectRef idx="1">
-              <a:schemeClr val="accent1"/>
-            </a:effectRef>
-            <a:fontRef idx="minor">
+            <a:off x="514916" y="3316043"/>
+            <a:ext cx="0" cy="1239002"/>
+          </a:xfrm>
+          <a:prstGeom prst="line">
+            <a:avLst/>
+          </a:prstGeom>
+          <a:ln>
+            <a:solidFill>
               <a:schemeClr val="tx1"/>
-            </a:fontRef>
-          </p:style>
-          <p:txBody>
-            <a:bodyPr rtlCol="0" anchor="ctr"/>
-            <a:lstStyle/>
-            <a:p>
-              <a:pPr algn="ctr"/>
-              <a:endParaRPr lang="en-DK"/>
-            </a:p>
-          </p:txBody>
-        </p:sp>
-        <p:cxnSp>
-          <p:nvCxnSpPr>
-            <p:cNvPr id="5" name="Straight Connector 4">
-              <a:extLst>
-                <a:ext uri="{FF2B5EF4-FFF2-40B4-BE49-F238E27FC236}">
-                  <a16:creationId xmlns:a16="http://schemas.microsoft.com/office/drawing/2014/main" id="{B2F1B983-8386-5A53-ECC5-C24E086FF52F}"/>
-                </a:ext>
-              </a:extLst>
-            </p:cNvPr>
-            <p:cNvCxnSpPr>
-              <a:cxnSpLocks/>
-            </p:cNvCxnSpPr>
-            <p:nvPr/>
-          </p:nvCxnSpPr>
-          <p:spPr>
-            <a:xfrm>
-              <a:off x="773878" y="3490708"/>
-              <a:ext cx="0" cy="1454264"/>
-            </a:xfrm>
-            <a:prstGeom prst="line">
-              <a:avLst/>
-            </a:prstGeom>
-            <a:ln>
-              <a:solidFill>
-                <a:schemeClr val="tx1"/>
-              </a:solidFill>
-            </a:ln>
-          </p:spPr>
-          <p:style>
-            <a:lnRef idx="2">
-              <a:schemeClr val="accent1"/>
-            </a:lnRef>
-            <a:fillRef idx="0">
-              <a:schemeClr val="accent1"/>
-            </a:fillRef>
-            <a:effectRef idx="1">
-              <a:schemeClr val="accent1"/>
-            </a:effectRef>
-            <a:fontRef idx="minor">
+            </a:solidFill>
+          </a:ln>
+        </p:spPr>
+        <p:style>
+          <a:lnRef idx="2">
+            <a:schemeClr val="accent1"/>
+          </a:lnRef>
+          <a:fillRef idx="0">
+            <a:schemeClr val="accent1"/>
+          </a:fillRef>
+          <a:effectRef idx="1">
+            <a:schemeClr val="accent1"/>
+          </a:effectRef>
+          <a:fontRef idx="minor">
+            <a:schemeClr val="tx1"/>
+          </a:fontRef>
+        </p:style>
+      </p:cxnSp>
+      <p:cxnSp>
+        <p:nvCxnSpPr>
+          <p:cNvPr id="6" name="Straight Connector 5">
+            <a:extLst>
+              <a:ext uri="{FF2B5EF4-FFF2-40B4-BE49-F238E27FC236}">
+                <a16:creationId xmlns:a16="http://schemas.microsoft.com/office/drawing/2014/main" id="{8AD556DB-C6E7-0637-2956-76E39E6A1DC6}"/>
+              </a:ext>
+            </a:extLst>
+          </p:cNvPr>
+          <p:cNvCxnSpPr>
+            <a:cxnSpLocks/>
+          </p:cNvCxnSpPr>
+          <p:nvPr/>
+        </p:nvCxnSpPr>
+        <p:spPr>
+          <a:xfrm>
+            <a:off x="189656" y="3050905"/>
+            <a:ext cx="325261" cy="287795"/>
+          </a:xfrm>
+          <a:prstGeom prst="line">
+            <a:avLst/>
+          </a:prstGeom>
+          <a:ln>
+            <a:solidFill>
               <a:schemeClr val="tx1"/>
-            </a:fontRef>
-          </p:style>
-        </p:cxnSp>
-        <p:cxnSp>
-          <p:nvCxnSpPr>
-            <p:cNvPr id="6" name="Straight Connector 5">
-              <a:extLst>
-                <a:ext uri="{FF2B5EF4-FFF2-40B4-BE49-F238E27FC236}">
-                  <a16:creationId xmlns:a16="http://schemas.microsoft.com/office/drawing/2014/main" id="{8AD556DB-C6E7-0637-2956-76E39E6A1DC6}"/>
-                </a:ext>
-              </a:extLst>
-            </p:cNvPr>
-            <p:cNvCxnSpPr>
-              <a:cxnSpLocks/>
-            </p:cNvCxnSpPr>
-            <p:nvPr/>
-          </p:nvCxnSpPr>
-          <p:spPr>
-            <a:xfrm>
-              <a:off x="436510" y="3179506"/>
-              <a:ext cx="337368" cy="337796"/>
-            </a:xfrm>
-            <a:prstGeom prst="line">
-              <a:avLst/>
-            </a:prstGeom>
-            <a:ln>
-              <a:solidFill>
-                <a:schemeClr val="tx1"/>
-              </a:solidFill>
-            </a:ln>
-          </p:spPr>
-          <p:style>
-            <a:lnRef idx="2">
-              <a:schemeClr val="accent1"/>
-            </a:lnRef>
-            <a:fillRef idx="0">
-              <a:schemeClr val="accent1"/>
-            </a:fillRef>
-            <a:effectRef idx="1">
-              <a:schemeClr val="accent1"/>
-            </a:effectRef>
-            <a:fontRef idx="minor">
+            </a:solidFill>
+          </a:ln>
+        </p:spPr>
+        <p:style>
+          <a:lnRef idx="2">
+            <a:schemeClr val="accent1"/>
+          </a:lnRef>
+          <a:fillRef idx="0">
+            <a:schemeClr val="accent1"/>
+          </a:fillRef>
+          <a:effectRef idx="1">
+            <a:schemeClr val="accent1"/>
+          </a:effectRef>
+          <a:fontRef idx="minor">
+            <a:schemeClr val="tx1"/>
+          </a:fontRef>
+        </p:style>
+      </p:cxnSp>
+      <p:cxnSp>
+        <p:nvCxnSpPr>
+          <p:cNvPr id="8" name="Straight Connector 7">
+            <a:extLst>
+              <a:ext uri="{FF2B5EF4-FFF2-40B4-BE49-F238E27FC236}">
+                <a16:creationId xmlns:a16="http://schemas.microsoft.com/office/drawing/2014/main" id="{A9B7FD76-1232-62CF-C696-8DE1A19EA93E}"/>
+              </a:ext>
+            </a:extLst>
+          </p:cNvPr>
+          <p:cNvCxnSpPr>
+            <a:cxnSpLocks/>
+          </p:cNvCxnSpPr>
+          <p:nvPr/>
+        </p:nvCxnSpPr>
+        <p:spPr>
+          <a:xfrm flipH="1">
+            <a:off x="514915" y="3050907"/>
+            <a:ext cx="325269" cy="287792"/>
+          </a:xfrm>
+          <a:prstGeom prst="line">
+            <a:avLst/>
+          </a:prstGeom>
+          <a:ln>
+            <a:solidFill>
               <a:schemeClr val="tx1"/>
-            </a:fontRef>
-          </p:style>
-        </p:cxnSp>
-        <p:cxnSp>
-          <p:nvCxnSpPr>
-            <p:cNvPr id="8" name="Straight Connector 7">
-              <a:extLst>
-                <a:ext uri="{FF2B5EF4-FFF2-40B4-BE49-F238E27FC236}">
-                  <a16:creationId xmlns:a16="http://schemas.microsoft.com/office/drawing/2014/main" id="{A9B7FD76-1232-62CF-C696-8DE1A19EA93E}"/>
-                </a:ext>
-              </a:extLst>
-            </p:cNvPr>
-            <p:cNvCxnSpPr>
-              <a:cxnSpLocks/>
-            </p:cNvCxnSpPr>
-            <p:nvPr/>
-          </p:nvCxnSpPr>
-          <p:spPr>
-            <a:xfrm flipH="1">
-              <a:off x="773876" y="3179508"/>
-              <a:ext cx="337376" cy="337792"/>
-            </a:xfrm>
-            <a:prstGeom prst="line">
-              <a:avLst/>
-            </a:prstGeom>
-            <a:ln>
-              <a:solidFill>
-                <a:schemeClr val="tx1"/>
-              </a:solidFill>
-            </a:ln>
-          </p:spPr>
-          <p:style>
-            <a:lnRef idx="2">
-              <a:schemeClr val="accent1"/>
-            </a:lnRef>
-            <a:fillRef idx="0">
-              <a:schemeClr val="accent1"/>
-            </a:fillRef>
-            <a:effectRef idx="1">
-              <a:schemeClr val="accent1"/>
-            </a:effectRef>
-            <a:fontRef idx="minor">
+            </a:solidFill>
+          </a:ln>
+        </p:spPr>
+        <p:style>
+          <a:lnRef idx="2">
+            <a:schemeClr val="accent1"/>
+          </a:lnRef>
+          <a:fillRef idx="0">
+            <a:schemeClr val="accent1"/>
+          </a:fillRef>
+          <a:effectRef idx="1">
+            <a:schemeClr val="accent1"/>
+          </a:effectRef>
+          <a:fontRef idx="minor">
+            <a:schemeClr val="tx1"/>
+          </a:fontRef>
+        </p:style>
+      </p:cxnSp>
+      <p:cxnSp>
+        <p:nvCxnSpPr>
+          <p:cNvPr id="10" name="Straight Connector 9">
+            <a:extLst>
+              <a:ext uri="{FF2B5EF4-FFF2-40B4-BE49-F238E27FC236}">
+                <a16:creationId xmlns:a16="http://schemas.microsoft.com/office/drawing/2014/main" id="{5283AC98-9BBA-AE52-B169-230B59E86ABC}"/>
+              </a:ext>
+            </a:extLst>
+          </p:cNvPr>
+          <p:cNvCxnSpPr>
+            <a:cxnSpLocks/>
+          </p:cNvCxnSpPr>
+          <p:nvPr/>
+        </p:nvCxnSpPr>
+        <p:spPr>
+          <a:xfrm>
+            <a:off x="514915" y="3012843"/>
+            <a:ext cx="10" cy="325857"/>
+          </a:xfrm>
+          <a:prstGeom prst="line">
+            <a:avLst/>
+          </a:prstGeom>
+          <a:ln>
+            <a:solidFill>
               <a:schemeClr val="tx1"/>
-            </a:fontRef>
-          </p:style>
-        </p:cxnSp>
-        <p:cxnSp>
-          <p:nvCxnSpPr>
-            <p:cNvPr id="10" name="Straight Connector 9">
-              <a:extLst>
-                <a:ext uri="{FF2B5EF4-FFF2-40B4-BE49-F238E27FC236}">
-                  <a16:creationId xmlns:a16="http://schemas.microsoft.com/office/drawing/2014/main" id="{5283AC98-9BBA-AE52-B169-230B59E86ABC}"/>
-                </a:ext>
-              </a:extLst>
-            </p:cNvPr>
-            <p:cNvCxnSpPr>
-              <a:cxnSpLocks/>
-            </p:cNvCxnSpPr>
-            <p:nvPr/>
-          </p:nvCxnSpPr>
-          <p:spPr>
-            <a:xfrm>
-              <a:off x="773876" y="3134831"/>
-              <a:ext cx="10" cy="382471"/>
-            </a:xfrm>
-            <a:prstGeom prst="line">
-              <a:avLst/>
-            </a:prstGeom>
-            <a:ln>
-              <a:solidFill>
-                <a:schemeClr val="tx1"/>
-              </a:solidFill>
-            </a:ln>
-          </p:spPr>
-          <p:style>
-            <a:lnRef idx="2">
-              <a:schemeClr val="accent1"/>
-            </a:lnRef>
-            <a:fillRef idx="0">
-              <a:schemeClr val="accent1"/>
-            </a:fillRef>
-            <a:effectRef idx="1">
-              <a:schemeClr val="accent1"/>
-            </a:effectRef>
-            <a:fontRef idx="minor">
+            </a:solidFill>
+          </a:ln>
+        </p:spPr>
+        <p:style>
+          <a:lnRef idx="2">
+            <a:schemeClr val="accent1"/>
+          </a:lnRef>
+          <a:fillRef idx="0">
+            <a:schemeClr val="accent1"/>
+          </a:fillRef>
+          <a:effectRef idx="1">
+            <a:schemeClr val="accent1"/>
+          </a:effectRef>
+          <a:fontRef idx="minor">
+            <a:schemeClr val="tx1"/>
+          </a:fontRef>
+        </p:style>
+      </p:cxnSp>
+      <p:sp>
+        <p:nvSpPr>
+          <p:cNvPr id="15" name="Arc 14">
+            <a:extLst>
+              <a:ext uri="{FF2B5EF4-FFF2-40B4-BE49-F238E27FC236}">
+                <a16:creationId xmlns:a16="http://schemas.microsoft.com/office/drawing/2014/main" id="{10AC830A-C004-7540-2E1B-FB97FB53C2B7}"/>
+              </a:ext>
+            </a:extLst>
+          </p:cNvPr>
+          <p:cNvSpPr/>
+          <p:nvPr/>
+        </p:nvSpPr>
+        <p:spPr>
+          <a:xfrm rot="2405634">
+            <a:off x="-144952" y="2478052"/>
+            <a:ext cx="1392469" cy="1612984"/>
+          </a:xfrm>
+          <a:prstGeom prst="arc">
+            <a:avLst/>
+          </a:prstGeom>
+          <a:ln>
+            <a:solidFill>
               <a:schemeClr val="tx1"/>
-            </a:fontRef>
-          </p:style>
-        </p:cxnSp>
-        <p:sp>
-          <p:nvSpPr>
-            <p:cNvPr id="15" name="Arc 14">
-              <a:extLst>
-                <a:ext uri="{FF2B5EF4-FFF2-40B4-BE49-F238E27FC236}">
-                  <a16:creationId xmlns:a16="http://schemas.microsoft.com/office/drawing/2014/main" id="{10AC830A-C004-7540-2E1B-FB97FB53C2B7}"/>
-                </a:ext>
-              </a:extLst>
-            </p:cNvPr>
-            <p:cNvSpPr/>
-            <p:nvPr/>
-          </p:nvSpPr>
-          <p:spPr>
-            <a:xfrm rot="2405634">
-              <a:off x="670366" y="2504860"/>
-              <a:ext cx="1444300" cy="1893221"/>
-            </a:xfrm>
-            <a:prstGeom prst="arc">
-              <a:avLst/>
-            </a:prstGeom>
-            <a:ln>
-              <a:solidFill>
-                <a:schemeClr val="tx1"/>
-              </a:solidFill>
-            </a:ln>
-          </p:spPr>
-          <p:style>
-            <a:lnRef idx="2">
-              <a:schemeClr val="accent1"/>
-            </a:lnRef>
-            <a:fillRef idx="0">
-              <a:schemeClr val="accent1"/>
-            </a:fillRef>
-            <a:effectRef idx="1">
-              <a:schemeClr val="accent1"/>
-            </a:effectRef>
-            <a:fontRef idx="minor">
+            </a:solidFill>
+          </a:ln>
+        </p:spPr>
+        <p:style>
+          <a:lnRef idx="2">
+            <a:schemeClr val="accent1"/>
+          </a:lnRef>
+          <a:fillRef idx="0">
+            <a:schemeClr val="accent1"/>
+          </a:fillRef>
+          <a:effectRef idx="1">
+            <a:schemeClr val="accent1"/>
+          </a:effectRef>
+          <a:fontRef idx="minor">
+            <a:schemeClr val="tx1"/>
+          </a:fontRef>
+        </p:style>
+        <p:txBody>
+          <a:bodyPr rtlCol="0" anchor="ctr"/>
+          <a:lstStyle/>
+          <a:p>
+            <a:pPr algn="ctr"/>
+            <a:endParaRPr lang="en-DK"/>
+          </a:p>
+        </p:txBody>
+      </p:sp>
+      <p:sp>
+        <p:nvSpPr>
+          <p:cNvPr id="16" name="Arc 15">
+            <a:extLst>
+              <a:ext uri="{FF2B5EF4-FFF2-40B4-BE49-F238E27FC236}">
+                <a16:creationId xmlns:a16="http://schemas.microsoft.com/office/drawing/2014/main" id="{440D4BFA-2E8A-5A1C-5F11-EECC0D215557}"/>
+              </a:ext>
+            </a:extLst>
+          </p:cNvPr>
+          <p:cNvSpPr/>
+          <p:nvPr/>
+        </p:nvSpPr>
+        <p:spPr>
+          <a:xfrm rot="2405634">
+            <a:off x="-144950" y="3763182"/>
+            <a:ext cx="1392469" cy="1612984"/>
+          </a:xfrm>
+          <a:prstGeom prst="arc">
+            <a:avLst/>
+          </a:prstGeom>
+          <a:ln>
+            <a:solidFill>
               <a:schemeClr val="tx1"/>
-            </a:fontRef>
-          </p:style>
-          <p:txBody>
-            <a:bodyPr rtlCol="0" anchor="ctr"/>
-            <a:lstStyle/>
-            <a:p>
-              <a:pPr algn="ctr"/>
-              <a:endParaRPr lang="en-DK"/>
-            </a:p>
-          </p:txBody>
-        </p:sp>
-        <p:sp>
-          <p:nvSpPr>
-            <p:cNvPr id="16" name="Arc 15">
-              <a:extLst>
-                <a:ext uri="{FF2B5EF4-FFF2-40B4-BE49-F238E27FC236}">
-                  <a16:creationId xmlns:a16="http://schemas.microsoft.com/office/drawing/2014/main" id="{440D4BFA-2E8A-5A1C-5F11-EECC0D215557}"/>
-                </a:ext>
-              </a:extLst>
-            </p:cNvPr>
-            <p:cNvSpPr/>
-            <p:nvPr/>
-          </p:nvSpPr>
-          <p:spPr>
-            <a:xfrm rot="2405634">
-              <a:off x="670368" y="4013266"/>
-              <a:ext cx="1444300" cy="1893221"/>
-            </a:xfrm>
-            <a:prstGeom prst="arc">
-              <a:avLst/>
-            </a:prstGeom>
-            <a:ln>
-              <a:solidFill>
-                <a:schemeClr val="tx1"/>
-              </a:solidFill>
-            </a:ln>
-          </p:spPr>
-          <p:style>
-            <a:lnRef idx="2">
-              <a:schemeClr val="accent1"/>
-            </a:lnRef>
-            <a:fillRef idx="0">
-              <a:schemeClr val="accent1"/>
-            </a:fillRef>
-            <a:effectRef idx="1">
-              <a:schemeClr val="accent1"/>
-            </a:effectRef>
-            <a:fontRef idx="minor">
+            </a:solidFill>
+          </a:ln>
+        </p:spPr>
+        <p:style>
+          <a:lnRef idx="2">
+            <a:schemeClr val="accent1"/>
+          </a:lnRef>
+          <a:fillRef idx="0">
+            <a:schemeClr val="accent1"/>
+          </a:fillRef>
+          <a:effectRef idx="1">
+            <a:schemeClr val="accent1"/>
+          </a:effectRef>
+          <a:fontRef idx="minor">
+            <a:schemeClr val="tx1"/>
+          </a:fontRef>
+        </p:style>
+        <p:txBody>
+          <a:bodyPr rtlCol="0" anchor="ctr"/>
+          <a:lstStyle/>
+          <a:p>
+            <a:pPr algn="ctr"/>
+            <a:endParaRPr lang="en-DK"/>
+          </a:p>
+        </p:txBody>
+      </p:sp>
+      <p:sp>
+        <p:nvSpPr>
+          <p:cNvPr id="22" name="Arc 21">
+            <a:extLst>
+              <a:ext uri="{FF2B5EF4-FFF2-40B4-BE49-F238E27FC236}">
+                <a16:creationId xmlns:a16="http://schemas.microsoft.com/office/drawing/2014/main" id="{5FC36D34-789E-D2C1-6AD7-396EC10669DD}"/>
+              </a:ext>
+            </a:extLst>
+          </p:cNvPr>
+          <p:cNvSpPr/>
+          <p:nvPr/>
+        </p:nvSpPr>
+        <p:spPr>
+          <a:xfrm rot="13294408">
+            <a:off x="1222881" y="2317586"/>
+            <a:ext cx="1392469" cy="1612984"/>
+          </a:xfrm>
+          <a:prstGeom prst="arc">
+            <a:avLst/>
+          </a:prstGeom>
+          <a:ln>
+            <a:solidFill>
               <a:schemeClr val="tx1"/>
-            </a:fontRef>
-          </p:style>
-          <p:txBody>
-            <a:bodyPr rtlCol="0" anchor="ctr"/>
-            <a:lstStyle/>
-            <a:p>
-              <a:pPr algn="ctr"/>
-              <a:endParaRPr lang="en-DK"/>
-            </a:p>
-          </p:txBody>
-        </p:sp>
-        <p:sp>
-          <p:nvSpPr>
-            <p:cNvPr id="22" name="Arc 21">
-              <a:extLst>
-                <a:ext uri="{FF2B5EF4-FFF2-40B4-BE49-F238E27FC236}">
-                  <a16:creationId xmlns:a16="http://schemas.microsoft.com/office/drawing/2014/main" id="{5FC36D34-789E-D2C1-6AD7-396EC10669DD}"/>
-                </a:ext>
-              </a:extLst>
-            </p:cNvPr>
-            <p:cNvSpPr/>
-            <p:nvPr/>
-          </p:nvSpPr>
-          <p:spPr>
-            <a:xfrm rot="13294408">
-              <a:off x="2089113" y="2316515"/>
-              <a:ext cx="1444300" cy="1893221"/>
-            </a:xfrm>
-            <a:prstGeom prst="arc">
-              <a:avLst/>
-            </a:prstGeom>
-            <a:ln>
-              <a:solidFill>
-                <a:schemeClr val="tx1"/>
-              </a:solidFill>
-            </a:ln>
-          </p:spPr>
-          <p:style>
-            <a:lnRef idx="2">
-              <a:schemeClr val="accent1"/>
-            </a:lnRef>
-            <a:fillRef idx="0">
-              <a:schemeClr val="accent1"/>
-            </a:fillRef>
-            <a:effectRef idx="1">
-              <a:schemeClr val="accent1"/>
-            </a:effectRef>
-            <a:fontRef idx="minor">
+            </a:solidFill>
+          </a:ln>
+        </p:spPr>
+        <p:style>
+          <a:lnRef idx="2">
+            <a:schemeClr val="accent1"/>
+          </a:lnRef>
+          <a:fillRef idx="0">
+            <a:schemeClr val="accent1"/>
+          </a:fillRef>
+          <a:effectRef idx="1">
+            <a:schemeClr val="accent1"/>
+          </a:effectRef>
+          <a:fontRef idx="minor">
+            <a:schemeClr val="tx1"/>
+          </a:fontRef>
+        </p:style>
+        <p:txBody>
+          <a:bodyPr rtlCol="0" anchor="ctr"/>
+          <a:lstStyle/>
+          <a:p>
+            <a:pPr algn="ctr"/>
+            <a:endParaRPr lang="en-DK"/>
+          </a:p>
+        </p:txBody>
+      </p:sp>
+      <p:sp>
+        <p:nvSpPr>
+          <p:cNvPr id="23" name="Arc 22">
+            <a:extLst>
+              <a:ext uri="{FF2B5EF4-FFF2-40B4-BE49-F238E27FC236}">
+                <a16:creationId xmlns:a16="http://schemas.microsoft.com/office/drawing/2014/main" id="{83568669-0066-4A9D-44FF-3B6C2C2E2647}"/>
+              </a:ext>
+            </a:extLst>
+          </p:cNvPr>
+          <p:cNvSpPr/>
+          <p:nvPr/>
+        </p:nvSpPr>
+        <p:spPr>
+          <a:xfrm rot="13294408">
+            <a:off x="1222882" y="3602715"/>
+            <a:ext cx="1392469" cy="1612984"/>
+          </a:xfrm>
+          <a:prstGeom prst="arc">
+            <a:avLst/>
+          </a:prstGeom>
+          <a:ln>
+            <a:solidFill>
               <a:schemeClr val="tx1"/>
-            </a:fontRef>
-          </p:style>
-          <p:txBody>
-            <a:bodyPr rtlCol="0" anchor="ctr"/>
-            <a:lstStyle/>
-            <a:p>
-              <a:pPr algn="ctr"/>
-              <a:endParaRPr lang="en-DK"/>
-            </a:p>
-          </p:txBody>
-        </p:sp>
-        <p:sp>
-          <p:nvSpPr>
-            <p:cNvPr id="23" name="Arc 22">
-              <a:extLst>
-                <a:ext uri="{FF2B5EF4-FFF2-40B4-BE49-F238E27FC236}">
-                  <a16:creationId xmlns:a16="http://schemas.microsoft.com/office/drawing/2014/main" id="{83568669-0066-4A9D-44FF-3B6C2C2E2647}"/>
-                </a:ext>
-              </a:extLst>
-            </p:cNvPr>
-            <p:cNvSpPr/>
-            <p:nvPr/>
-          </p:nvSpPr>
-          <p:spPr>
-            <a:xfrm rot="13294408">
-              <a:off x="2089114" y="3824920"/>
-              <a:ext cx="1444300" cy="1893221"/>
-            </a:xfrm>
-            <a:prstGeom prst="arc">
-              <a:avLst/>
-            </a:prstGeom>
-            <a:ln>
-              <a:solidFill>
-                <a:schemeClr val="tx1"/>
-              </a:solidFill>
-            </a:ln>
-          </p:spPr>
-          <p:style>
-            <a:lnRef idx="2">
-              <a:schemeClr val="accent1"/>
-            </a:lnRef>
-            <a:fillRef idx="0">
-              <a:schemeClr val="accent1"/>
-            </a:fillRef>
-            <a:effectRef idx="1">
-              <a:schemeClr val="accent1"/>
-            </a:effectRef>
-            <a:fontRef idx="minor">
+            </a:solidFill>
+          </a:ln>
+        </p:spPr>
+        <p:style>
+          <a:lnRef idx="2">
+            <a:schemeClr val="accent1"/>
+          </a:lnRef>
+          <a:fillRef idx="0">
+            <a:schemeClr val="accent1"/>
+          </a:fillRef>
+          <a:effectRef idx="1">
+            <a:schemeClr val="accent1"/>
+          </a:effectRef>
+          <a:fontRef idx="minor">
+            <a:schemeClr val="tx1"/>
+          </a:fontRef>
+        </p:style>
+        <p:txBody>
+          <a:bodyPr rtlCol="0" anchor="ctr"/>
+          <a:lstStyle/>
+          <a:p>
+            <a:pPr algn="ctr"/>
+            <a:endParaRPr lang="en-DK"/>
+          </a:p>
+        </p:txBody>
+      </p:sp>
+      <p:sp>
+        <p:nvSpPr>
+          <p:cNvPr id="24" name="Arc 23">
+            <a:extLst>
+              <a:ext uri="{FF2B5EF4-FFF2-40B4-BE49-F238E27FC236}">
+                <a16:creationId xmlns:a16="http://schemas.microsoft.com/office/drawing/2014/main" id="{F4994089-2EAE-A04F-0C6F-141770861363}"/>
+              </a:ext>
+            </a:extLst>
+          </p:cNvPr>
+          <p:cNvSpPr/>
+          <p:nvPr/>
+        </p:nvSpPr>
+        <p:spPr>
+          <a:xfrm rot="2405634">
+            <a:off x="532801" y="2487281"/>
+            <a:ext cx="1392469" cy="1612984"/>
+          </a:xfrm>
+          <a:prstGeom prst="arc">
+            <a:avLst/>
+          </a:prstGeom>
+          <a:ln>
+            <a:solidFill>
               <a:schemeClr val="tx1"/>
-            </a:fontRef>
-          </p:style>
-          <p:txBody>
-            <a:bodyPr rtlCol="0" anchor="ctr"/>
-            <a:lstStyle/>
-            <a:p>
-              <a:pPr algn="ctr"/>
-              <a:endParaRPr lang="en-DK"/>
-            </a:p>
-          </p:txBody>
-        </p:sp>
-        <p:sp>
-          <p:nvSpPr>
-            <p:cNvPr id="24" name="Arc 23">
-              <a:extLst>
-                <a:ext uri="{FF2B5EF4-FFF2-40B4-BE49-F238E27FC236}">
-                  <a16:creationId xmlns:a16="http://schemas.microsoft.com/office/drawing/2014/main" id="{F4994089-2EAE-A04F-0C6F-141770861363}"/>
-                </a:ext>
-              </a:extLst>
-            </p:cNvPr>
-            <p:cNvSpPr/>
-            <p:nvPr/>
-          </p:nvSpPr>
-          <p:spPr>
-            <a:xfrm rot="2405634">
-              <a:off x="1373349" y="2504862"/>
-              <a:ext cx="1444300" cy="1893221"/>
-            </a:xfrm>
-            <a:prstGeom prst="arc">
-              <a:avLst/>
-            </a:prstGeom>
-            <a:ln>
-              <a:solidFill>
-                <a:schemeClr val="tx1"/>
-              </a:solidFill>
-            </a:ln>
-          </p:spPr>
-          <p:style>
-            <a:lnRef idx="2">
-              <a:schemeClr val="accent1"/>
-            </a:lnRef>
-            <a:fillRef idx="0">
-              <a:schemeClr val="accent1"/>
-            </a:fillRef>
-            <a:effectRef idx="1">
-              <a:schemeClr val="accent1"/>
-            </a:effectRef>
-            <a:fontRef idx="minor">
+            </a:solidFill>
+          </a:ln>
+        </p:spPr>
+        <p:style>
+          <a:lnRef idx="2">
+            <a:schemeClr val="accent1"/>
+          </a:lnRef>
+          <a:fillRef idx="0">
+            <a:schemeClr val="accent1"/>
+          </a:fillRef>
+          <a:effectRef idx="1">
+            <a:schemeClr val="accent1"/>
+          </a:effectRef>
+          <a:fontRef idx="minor">
+            <a:schemeClr val="tx1"/>
+          </a:fontRef>
+        </p:style>
+        <p:txBody>
+          <a:bodyPr rtlCol="0" anchor="ctr"/>
+          <a:lstStyle/>
+          <a:p>
+            <a:pPr algn="ctr"/>
+            <a:endParaRPr lang="en-DK"/>
+          </a:p>
+        </p:txBody>
+      </p:sp>
+      <p:sp>
+        <p:nvSpPr>
+          <p:cNvPr id="25" name="Arc 24">
+            <a:extLst>
+              <a:ext uri="{FF2B5EF4-FFF2-40B4-BE49-F238E27FC236}">
+                <a16:creationId xmlns:a16="http://schemas.microsoft.com/office/drawing/2014/main" id="{E482A656-A53E-87D9-998D-F635E7DD2DC3}"/>
+              </a:ext>
+            </a:extLst>
+          </p:cNvPr>
+          <p:cNvSpPr/>
+          <p:nvPr/>
+        </p:nvSpPr>
+        <p:spPr>
+          <a:xfrm rot="2405634">
+            <a:off x="544598" y="3772411"/>
+            <a:ext cx="1392469" cy="1612984"/>
+          </a:xfrm>
+          <a:prstGeom prst="arc">
+            <a:avLst/>
+          </a:prstGeom>
+          <a:ln>
+            <a:solidFill>
               <a:schemeClr val="tx1"/>
-            </a:fontRef>
-          </p:style>
-          <p:txBody>
-            <a:bodyPr rtlCol="0" anchor="ctr"/>
-            <a:lstStyle/>
-            <a:p>
-              <a:pPr algn="ctr"/>
-              <a:endParaRPr lang="en-DK"/>
-            </a:p>
-          </p:txBody>
-        </p:sp>
-        <p:sp>
-          <p:nvSpPr>
-            <p:cNvPr id="25" name="Arc 24">
-              <a:extLst>
-                <a:ext uri="{FF2B5EF4-FFF2-40B4-BE49-F238E27FC236}">
-                  <a16:creationId xmlns:a16="http://schemas.microsoft.com/office/drawing/2014/main" id="{E482A656-A53E-87D9-998D-F635E7DD2DC3}"/>
-                </a:ext>
-              </a:extLst>
-            </p:cNvPr>
-            <p:cNvSpPr/>
-            <p:nvPr/>
-          </p:nvSpPr>
-          <p:spPr>
-            <a:xfrm rot="2405634">
-              <a:off x="1373350" y="4013268"/>
-              <a:ext cx="1444300" cy="1893221"/>
-            </a:xfrm>
-            <a:prstGeom prst="arc">
-              <a:avLst/>
-            </a:prstGeom>
-            <a:ln>
-              <a:solidFill>
-                <a:schemeClr val="tx1"/>
-              </a:solidFill>
-            </a:ln>
-          </p:spPr>
-          <p:style>
-            <a:lnRef idx="2">
-              <a:schemeClr val="accent1"/>
-            </a:lnRef>
-            <a:fillRef idx="0">
-              <a:schemeClr val="accent1"/>
-            </a:fillRef>
-            <a:effectRef idx="1">
-              <a:schemeClr val="accent1"/>
-            </a:effectRef>
-            <a:fontRef idx="minor">
+            </a:solidFill>
+          </a:ln>
+        </p:spPr>
+        <p:style>
+          <a:lnRef idx="2">
+            <a:schemeClr val="accent1"/>
+          </a:lnRef>
+          <a:fillRef idx="0">
+            <a:schemeClr val="accent1"/>
+          </a:fillRef>
+          <a:effectRef idx="1">
+            <a:schemeClr val="accent1"/>
+          </a:effectRef>
+          <a:fontRef idx="minor">
+            <a:schemeClr val="tx1"/>
+          </a:fontRef>
+        </p:style>
+        <p:txBody>
+          <a:bodyPr rtlCol="0" anchor="ctr"/>
+          <a:lstStyle/>
+          <a:p>
+            <a:pPr algn="ctr"/>
+            <a:endParaRPr lang="en-DK"/>
+          </a:p>
+        </p:txBody>
+      </p:sp>
+      <p:sp>
+        <p:nvSpPr>
+          <p:cNvPr id="26" name="Arc 25">
+            <a:extLst>
+              <a:ext uri="{FF2B5EF4-FFF2-40B4-BE49-F238E27FC236}">
+                <a16:creationId xmlns:a16="http://schemas.microsoft.com/office/drawing/2014/main" id="{6DA7E47E-817B-E0A5-9C63-BAC316CC52FB}"/>
+              </a:ext>
+            </a:extLst>
+          </p:cNvPr>
+          <p:cNvSpPr/>
+          <p:nvPr/>
+        </p:nvSpPr>
+        <p:spPr>
+          <a:xfrm rot="13294408">
+            <a:off x="1900635" y="2317588"/>
+            <a:ext cx="1392469" cy="1612984"/>
+          </a:xfrm>
+          <a:prstGeom prst="arc">
+            <a:avLst/>
+          </a:prstGeom>
+          <a:ln>
+            <a:solidFill>
               <a:schemeClr val="tx1"/>
-            </a:fontRef>
-          </p:style>
-          <p:txBody>
-            <a:bodyPr rtlCol="0" anchor="ctr"/>
-            <a:lstStyle/>
-            <a:p>
-              <a:pPr algn="ctr"/>
-              <a:endParaRPr lang="en-DK"/>
-            </a:p>
-          </p:txBody>
-        </p:sp>
-        <p:sp>
-          <p:nvSpPr>
-            <p:cNvPr id="26" name="Arc 25">
-              <a:extLst>
-                <a:ext uri="{FF2B5EF4-FFF2-40B4-BE49-F238E27FC236}">
-                  <a16:creationId xmlns:a16="http://schemas.microsoft.com/office/drawing/2014/main" id="{6DA7E47E-817B-E0A5-9C63-BAC316CC52FB}"/>
-                </a:ext>
-              </a:extLst>
-            </p:cNvPr>
-            <p:cNvSpPr/>
-            <p:nvPr/>
-          </p:nvSpPr>
-          <p:spPr>
-            <a:xfrm rot="13294408">
-              <a:off x="2792095" y="2316517"/>
-              <a:ext cx="1444300" cy="1893221"/>
-            </a:xfrm>
-            <a:prstGeom prst="arc">
-              <a:avLst/>
-            </a:prstGeom>
-            <a:ln>
-              <a:solidFill>
-                <a:schemeClr val="tx1"/>
-              </a:solidFill>
-            </a:ln>
-          </p:spPr>
-          <p:style>
-            <a:lnRef idx="2">
-              <a:schemeClr val="accent1"/>
-            </a:lnRef>
-            <a:fillRef idx="0">
-              <a:schemeClr val="accent1"/>
-            </a:fillRef>
-            <a:effectRef idx="1">
-              <a:schemeClr val="accent1"/>
-            </a:effectRef>
-            <a:fontRef idx="minor">
+            </a:solidFill>
+          </a:ln>
+        </p:spPr>
+        <p:style>
+          <a:lnRef idx="2">
+            <a:schemeClr val="accent1"/>
+          </a:lnRef>
+          <a:fillRef idx="0">
+            <a:schemeClr val="accent1"/>
+          </a:fillRef>
+          <a:effectRef idx="1">
+            <a:schemeClr val="accent1"/>
+          </a:effectRef>
+          <a:fontRef idx="minor">
+            <a:schemeClr val="tx1"/>
+          </a:fontRef>
+        </p:style>
+        <p:txBody>
+          <a:bodyPr rtlCol="0" anchor="ctr"/>
+          <a:lstStyle/>
+          <a:p>
+            <a:pPr algn="ctr"/>
+            <a:endParaRPr lang="en-DK"/>
+          </a:p>
+        </p:txBody>
+      </p:sp>
+      <p:sp>
+        <p:nvSpPr>
+          <p:cNvPr id="27" name="Arc 26">
+            <a:extLst>
+              <a:ext uri="{FF2B5EF4-FFF2-40B4-BE49-F238E27FC236}">
+                <a16:creationId xmlns:a16="http://schemas.microsoft.com/office/drawing/2014/main" id="{AAAC0B85-AE34-FA6A-52E7-C2410C65155B}"/>
+              </a:ext>
+            </a:extLst>
+          </p:cNvPr>
+          <p:cNvSpPr/>
+          <p:nvPr/>
+        </p:nvSpPr>
+        <p:spPr>
+          <a:xfrm rot="13294408">
+            <a:off x="1900637" y="3602717"/>
+            <a:ext cx="1392469" cy="1612984"/>
+          </a:xfrm>
+          <a:prstGeom prst="arc">
+            <a:avLst/>
+          </a:prstGeom>
+          <a:ln>
+            <a:solidFill>
               <a:schemeClr val="tx1"/>
-            </a:fontRef>
-          </p:style>
-          <p:txBody>
-            <a:bodyPr rtlCol="0" anchor="ctr"/>
-            <a:lstStyle/>
-            <a:p>
-              <a:pPr algn="ctr"/>
-              <a:endParaRPr lang="en-DK"/>
-            </a:p>
-          </p:txBody>
-        </p:sp>
-        <p:sp>
-          <p:nvSpPr>
-            <p:cNvPr id="27" name="Arc 26">
-              <a:extLst>
-                <a:ext uri="{FF2B5EF4-FFF2-40B4-BE49-F238E27FC236}">
-                  <a16:creationId xmlns:a16="http://schemas.microsoft.com/office/drawing/2014/main" id="{AAAC0B85-AE34-FA6A-52E7-C2410C65155B}"/>
-                </a:ext>
-              </a:extLst>
-            </p:cNvPr>
-            <p:cNvSpPr/>
-            <p:nvPr/>
-          </p:nvSpPr>
-          <p:spPr>
-            <a:xfrm rot="13294408">
-              <a:off x="2792097" y="3824922"/>
-              <a:ext cx="1444300" cy="1893221"/>
-            </a:xfrm>
-            <a:prstGeom prst="arc">
-              <a:avLst/>
-            </a:prstGeom>
-            <a:ln>
-              <a:solidFill>
-                <a:schemeClr val="tx1"/>
-              </a:solidFill>
-            </a:ln>
-          </p:spPr>
-          <p:style>
-            <a:lnRef idx="2">
-              <a:schemeClr val="accent1"/>
-            </a:lnRef>
-            <a:fillRef idx="0">
-              <a:schemeClr val="accent1"/>
-            </a:fillRef>
-            <a:effectRef idx="1">
-              <a:schemeClr val="accent1"/>
-            </a:effectRef>
-            <a:fontRef idx="minor">
+            </a:solidFill>
+          </a:ln>
+        </p:spPr>
+        <p:style>
+          <a:lnRef idx="2">
+            <a:schemeClr val="accent1"/>
+          </a:lnRef>
+          <a:fillRef idx="0">
+            <a:schemeClr val="accent1"/>
+          </a:fillRef>
+          <a:effectRef idx="1">
+            <a:schemeClr val="accent1"/>
+          </a:effectRef>
+          <a:fontRef idx="minor">
+            <a:schemeClr val="tx1"/>
+          </a:fontRef>
+        </p:style>
+        <p:txBody>
+          <a:bodyPr rtlCol="0" anchor="ctr"/>
+          <a:lstStyle/>
+          <a:p>
+            <a:pPr algn="ctr"/>
+            <a:endParaRPr lang="en-DK"/>
+          </a:p>
+        </p:txBody>
+      </p:sp>
+      <p:sp>
+        <p:nvSpPr>
+          <p:cNvPr id="28" name="Arc 27">
+            <a:extLst>
+              <a:ext uri="{FF2B5EF4-FFF2-40B4-BE49-F238E27FC236}">
+                <a16:creationId xmlns:a16="http://schemas.microsoft.com/office/drawing/2014/main" id="{98AC624A-B8F6-32FC-A3BA-A8DD7B77961E}"/>
+              </a:ext>
+            </a:extLst>
+          </p:cNvPr>
+          <p:cNvSpPr/>
+          <p:nvPr/>
+        </p:nvSpPr>
+        <p:spPr>
+          <a:xfrm rot="2405634">
+            <a:off x="1271265" y="2478050"/>
+            <a:ext cx="1392469" cy="1612984"/>
+          </a:xfrm>
+          <a:prstGeom prst="arc">
+            <a:avLst/>
+          </a:prstGeom>
+          <a:ln>
+            <a:solidFill>
               <a:schemeClr val="tx1"/>
-            </a:fontRef>
-          </p:style>
-          <p:txBody>
-            <a:bodyPr rtlCol="0" anchor="ctr"/>
-            <a:lstStyle/>
-            <a:p>
-              <a:pPr algn="ctr"/>
-              <a:endParaRPr lang="en-DK"/>
-            </a:p>
-          </p:txBody>
-        </p:sp>
-        <p:sp>
-          <p:nvSpPr>
-            <p:cNvPr id="28" name="Arc 27">
-              <a:extLst>
-                <a:ext uri="{FF2B5EF4-FFF2-40B4-BE49-F238E27FC236}">
-                  <a16:creationId xmlns:a16="http://schemas.microsoft.com/office/drawing/2014/main" id="{98AC624A-B8F6-32FC-A3BA-A8DD7B77961E}"/>
-                </a:ext>
-              </a:extLst>
-            </p:cNvPr>
-            <p:cNvSpPr/>
-            <p:nvPr/>
-          </p:nvSpPr>
-          <p:spPr>
-            <a:xfrm rot="2405634">
-              <a:off x="2139298" y="2504858"/>
-              <a:ext cx="1444300" cy="1893221"/>
-            </a:xfrm>
-            <a:prstGeom prst="arc">
-              <a:avLst/>
-            </a:prstGeom>
-            <a:ln>
-              <a:solidFill>
-                <a:schemeClr val="tx1"/>
-              </a:solidFill>
-            </a:ln>
-          </p:spPr>
-          <p:style>
-            <a:lnRef idx="2">
-              <a:schemeClr val="accent1"/>
-            </a:lnRef>
-            <a:fillRef idx="0">
-              <a:schemeClr val="accent1"/>
-            </a:fillRef>
-            <a:effectRef idx="1">
-              <a:schemeClr val="accent1"/>
-            </a:effectRef>
-            <a:fontRef idx="minor">
+            </a:solidFill>
+          </a:ln>
+        </p:spPr>
+        <p:style>
+          <a:lnRef idx="2">
+            <a:schemeClr val="accent1"/>
+          </a:lnRef>
+          <a:fillRef idx="0">
+            <a:schemeClr val="accent1"/>
+          </a:fillRef>
+          <a:effectRef idx="1">
+            <a:schemeClr val="accent1"/>
+          </a:effectRef>
+          <a:fontRef idx="minor">
+            <a:schemeClr val="tx1"/>
+          </a:fontRef>
+        </p:style>
+        <p:txBody>
+          <a:bodyPr rtlCol="0" anchor="ctr"/>
+          <a:lstStyle/>
+          <a:p>
+            <a:pPr algn="ctr"/>
+            <a:endParaRPr lang="en-DK"/>
+          </a:p>
+        </p:txBody>
+      </p:sp>
+      <p:sp>
+        <p:nvSpPr>
+          <p:cNvPr id="29" name="Arc 28">
+            <a:extLst>
+              <a:ext uri="{FF2B5EF4-FFF2-40B4-BE49-F238E27FC236}">
+                <a16:creationId xmlns:a16="http://schemas.microsoft.com/office/drawing/2014/main" id="{E78DD91E-E085-FEC7-BDA4-F8363007F0D3}"/>
+              </a:ext>
+            </a:extLst>
+          </p:cNvPr>
+          <p:cNvSpPr/>
+          <p:nvPr/>
+        </p:nvSpPr>
+        <p:spPr>
+          <a:xfrm rot="2405634">
+            <a:off x="1271266" y="3763180"/>
+            <a:ext cx="1392469" cy="1612984"/>
+          </a:xfrm>
+          <a:prstGeom prst="arc">
+            <a:avLst/>
+          </a:prstGeom>
+          <a:ln>
+            <a:solidFill>
               <a:schemeClr val="tx1"/>
-            </a:fontRef>
-          </p:style>
-          <p:txBody>
-            <a:bodyPr rtlCol="0" anchor="ctr"/>
-            <a:lstStyle/>
-            <a:p>
-              <a:pPr algn="ctr"/>
-              <a:endParaRPr lang="en-DK"/>
-            </a:p>
-          </p:txBody>
-        </p:sp>
-        <p:sp>
-          <p:nvSpPr>
-            <p:cNvPr id="29" name="Arc 28">
-              <a:extLst>
-                <a:ext uri="{FF2B5EF4-FFF2-40B4-BE49-F238E27FC236}">
-                  <a16:creationId xmlns:a16="http://schemas.microsoft.com/office/drawing/2014/main" id="{E78DD91E-E085-FEC7-BDA4-F8363007F0D3}"/>
-                </a:ext>
-              </a:extLst>
-            </p:cNvPr>
-            <p:cNvSpPr/>
-            <p:nvPr/>
-          </p:nvSpPr>
-          <p:spPr>
-            <a:xfrm rot="2405634">
-              <a:off x="2139299" y="4013264"/>
-              <a:ext cx="1444300" cy="1893221"/>
-            </a:xfrm>
-            <a:prstGeom prst="arc">
-              <a:avLst/>
-            </a:prstGeom>
-            <a:ln>
-              <a:solidFill>
-                <a:schemeClr val="tx1"/>
-              </a:solidFill>
-            </a:ln>
-          </p:spPr>
-          <p:style>
-            <a:lnRef idx="2">
-              <a:schemeClr val="accent1"/>
-            </a:lnRef>
-            <a:fillRef idx="0">
-              <a:schemeClr val="accent1"/>
-            </a:fillRef>
-            <a:effectRef idx="1">
-              <a:schemeClr val="accent1"/>
-            </a:effectRef>
-            <a:fontRef idx="minor">
+            </a:solidFill>
+          </a:ln>
+        </p:spPr>
+        <p:style>
+          <a:lnRef idx="2">
+            <a:schemeClr val="accent1"/>
+          </a:lnRef>
+          <a:fillRef idx="0">
+            <a:schemeClr val="accent1"/>
+          </a:fillRef>
+          <a:effectRef idx="1">
+            <a:schemeClr val="accent1"/>
+          </a:effectRef>
+          <a:fontRef idx="minor">
+            <a:schemeClr val="tx1"/>
+          </a:fontRef>
+        </p:style>
+        <p:txBody>
+          <a:bodyPr rtlCol="0" anchor="ctr"/>
+          <a:lstStyle/>
+          <a:p>
+            <a:pPr algn="ctr"/>
+            <a:endParaRPr lang="en-DK"/>
+          </a:p>
+        </p:txBody>
+      </p:sp>
+      <p:sp>
+        <p:nvSpPr>
+          <p:cNvPr id="30" name="Arc 29">
+            <a:extLst>
+              <a:ext uri="{FF2B5EF4-FFF2-40B4-BE49-F238E27FC236}">
+                <a16:creationId xmlns:a16="http://schemas.microsoft.com/office/drawing/2014/main" id="{54C8C18A-33BA-F08D-973F-D6327EA1E135}"/>
+              </a:ext>
+            </a:extLst>
+          </p:cNvPr>
+          <p:cNvSpPr/>
+          <p:nvPr/>
+        </p:nvSpPr>
+        <p:spPr>
+          <a:xfrm rot="13294408">
+            <a:off x="2639097" y="2317584"/>
+            <a:ext cx="1392469" cy="1612984"/>
+          </a:xfrm>
+          <a:prstGeom prst="arc">
+            <a:avLst/>
+          </a:prstGeom>
+          <a:ln>
+            <a:solidFill>
               <a:schemeClr val="tx1"/>
-            </a:fontRef>
-          </p:style>
-          <p:txBody>
-            <a:bodyPr rtlCol="0" anchor="ctr"/>
-            <a:lstStyle/>
-            <a:p>
-              <a:pPr algn="ctr"/>
-              <a:endParaRPr lang="en-DK"/>
-            </a:p>
-          </p:txBody>
-        </p:sp>
-        <p:sp>
-          <p:nvSpPr>
-            <p:cNvPr id="30" name="Arc 29">
-              <a:extLst>
-                <a:ext uri="{FF2B5EF4-FFF2-40B4-BE49-F238E27FC236}">
-                  <a16:creationId xmlns:a16="http://schemas.microsoft.com/office/drawing/2014/main" id="{54C8C18A-33BA-F08D-973F-D6327EA1E135}"/>
-                </a:ext>
-              </a:extLst>
-            </p:cNvPr>
-            <p:cNvSpPr/>
-            <p:nvPr/>
-          </p:nvSpPr>
-          <p:spPr>
-            <a:xfrm rot="13294408">
-              <a:off x="3558044" y="2316513"/>
-              <a:ext cx="1444300" cy="1893221"/>
-            </a:xfrm>
-            <a:prstGeom prst="arc">
-              <a:avLst/>
-            </a:prstGeom>
-            <a:ln>
-              <a:solidFill>
-                <a:schemeClr val="tx1"/>
-              </a:solidFill>
-            </a:ln>
-          </p:spPr>
-          <p:style>
-            <a:lnRef idx="2">
-              <a:schemeClr val="accent1"/>
-            </a:lnRef>
-            <a:fillRef idx="0">
-              <a:schemeClr val="accent1"/>
-            </a:fillRef>
-            <a:effectRef idx="1">
-              <a:schemeClr val="accent1"/>
-            </a:effectRef>
-            <a:fontRef idx="minor">
+            </a:solidFill>
+          </a:ln>
+        </p:spPr>
+        <p:style>
+          <a:lnRef idx="2">
+            <a:schemeClr val="accent1"/>
+          </a:lnRef>
+          <a:fillRef idx="0">
+            <a:schemeClr val="accent1"/>
+          </a:fillRef>
+          <a:effectRef idx="1">
+            <a:schemeClr val="accent1"/>
+          </a:effectRef>
+          <a:fontRef idx="minor">
+            <a:schemeClr val="tx1"/>
+          </a:fontRef>
+        </p:style>
+        <p:txBody>
+          <a:bodyPr rtlCol="0" anchor="ctr"/>
+          <a:lstStyle/>
+          <a:p>
+            <a:pPr algn="ctr"/>
+            <a:endParaRPr lang="en-DK"/>
+          </a:p>
+        </p:txBody>
+      </p:sp>
+      <p:sp>
+        <p:nvSpPr>
+          <p:cNvPr id="31" name="Arc 30">
+            <a:extLst>
+              <a:ext uri="{FF2B5EF4-FFF2-40B4-BE49-F238E27FC236}">
+                <a16:creationId xmlns:a16="http://schemas.microsoft.com/office/drawing/2014/main" id="{199FB5A6-3932-2A7F-73FC-1B05E72F379F}"/>
+              </a:ext>
+            </a:extLst>
+          </p:cNvPr>
+          <p:cNvSpPr/>
+          <p:nvPr/>
+        </p:nvSpPr>
+        <p:spPr>
+          <a:xfrm rot="13294408">
+            <a:off x="2639099" y="3602713"/>
+            <a:ext cx="1392469" cy="1612984"/>
+          </a:xfrm>
+          <a:prstGeom prst="arc">
+            <a:avLst/>
+          </a:prstGeom>
+          <a:ln>
+            <a:solidFill>
               <a:schemeClr val="tx1"/>
-            </a:fontRef>
-          </p:style>
-          <p:txBody>
-            <a:bodyPr rtlCol="0" anchor="ctr"/>
-            <a:lstStyle/>
-            <a:p>
-              <a:pPr algn="ctr"/>
-              <a:endParaRPr lang="en-DK"/>
-            </a:p>
-          </p:txBody>
-        </p:sp>
-        <p:sp>
-          <p:nvSpPr>
-            <p:cNvPr id="31" name="Arc 30">
-              <a:extLst>
-                <a:ext uri="{FF2B5EF4-FFF2-40B4-BE49-F238E27FC236}">
-                  <a16:creationId xmlns:a16="http://schemas.microsoft.com/office/drawing/2014/main" id="{199FB5A6-3932-2A7F-73FC-1B05E72F379F}"/>
-                </a:ext>
-              </a:extLst>
-            </p:cNvPr>
-            <p:cNvSpPr/>
-            <p:nvPr/>
-          </p:nvSpPr>
-          <p:spPr>
-            <a:xfrm rot="13294408">
-              <a:off x="3558046" y="3824918"/>
-              <a:ext cx="1444300" cy="1893221"/>
-            </a:xfrm>
-            <a:prstGeom prst="arc">
-              <a:avLst/>
-            </a:prstGeom>
-            <a:ln>
-              <a:solidFill>
-                <a:schemeClr val="tx1"/>
-              </a:solidFill>
-            </a:ln>
-          </p:spPr>
-          <p:style>
-            <a:lnRef idx="2">
-              <a:schemeClr val="accent1"/>
-            </a:lnRef>
-            <a:fillRef idx="0">
-              <a:schemeClr val="accent1"/>
-            </a:fillRef>
-            <a:effectRef idx="1">
-              <a:schemeClr val="accent1"/>
-            </a:effectRef>
-            <a:fontRef idx="minor">
+            </a:solidFill>
+          </a:ln>
+        </p:spPr>
+        <p:style>
+          <a:lnRef idx="2">
+            <a:schemeClr val="accent1"/>
+          </a:lnRef>
+          <a:fillRef idx="0">
+            <a:schemeClr val="accent1"/>
+          </a:fillRef>
+          <a:effectRef idx="1">
+            <a:schemeClr val="accent1"/>
+          </a:effectRef>
+          <a:fontRef idx="minor">
+            <a:schemeClr val="tx1"/>
+          </a:fontRef>
+        </p:style>
+        <p:txBody>
+          <a:bodyPr rtlCol="0" anchor="ctr"/>
+          <a:lstStyle/>
+          <a:p>
+            <a:pPr algn="ctr"/>
+            <a:endParaRPr lang="en-DK"/>
+          </a:p>
+        </p:txBody>
+      </p:sp>
+      <p:sp>
+        <p:nvSpPr>
+          <p:cNvPr id="32" name="Arc 31">
+            <a:extLst>
+              <a:ext uri="{FF2B5EF4-FFF2-40B4-BE49-F238E27FC236}">
+                <a16:creationId xmlns:a16="http://schemas.microsoft.com/office/drawing/2014/main" id="{99720FE6-D3D1-1ED4-6593-5A9006B74F01}"/>
+              </a:ext>
+            </a:extLst>
+          </p:cNvPr>
+          <p:cNvSpPr/>
+          <p:nvPr/>
+        </p:nvSpPr>
+        <p:spPr>
+          <a:xfrm rot="2405634">
+            <a:off x="2062084" y="2478049"/>
+            <a:ext cx="1392469" cy="1612984"/>
+          </a:xfrm>
+          <a:prstGeom prst="arc">
+            <a:avLst/>
+          </a:prstGeom>
+          <a:ln>
+            <a:solidFill>
               <a:schemeClr val="tx1"/>
-            </a:fontRef>
-          </p:style>
-          <p:txBody>
-            <a:bodyPr rtlCol="0" anchor="ctr"/>
-            <a:lstStyle/>
-            <a:p>
-              <a:pPr algn="ctr"/>
-              <a:endParaRPr lang="en-DK"/>
-            </a:p>
-          </p:txBody>
-        </p:sp>
-        <p:sp>
-          <p:nvSpPr>
-            <p:cNvPr id="32" name="Arc 31">
-              <a:extLst>
-                <a:ext uri="{FF2B5EF4-FFF2-40B4-BE49-F238E27FC236}">
-                  <a16:creationId xmlns:a16="http://schemas.microsoft.com/office/drawing/2014/main" id="{99720FE6-D3D1-1ED4-6593-5A9006B74F01}"/>
-                </a:ext>
-              </a:extLst>
-            </p:cNvPr>
-            <p:cNvSpPr/>
-            <p:nvPr/>
-          </p:nvSpPr>
-          <p:spPr>
-            <a:xfrm rot="2405634">
-              <a:off x="2959553" y="2504857"/>
-              <a:ext cx="1444300" cy="1893221"/>
-            </a:xfrm>
-            <a:prstGeom prst="arc">
-              <a:avLst/>
-            </a:prstGeom>
-            <a:ln>
-              <a:solidFill>
-                <a:schemeClr val="tx1"/>
-              </a:solidFill>
-            </a:ln>
-          </p:spPr>
-          <p:style>
-            <a:lnRef idx="2">
-              <a:schemeClr val="accent1"/>
-            </a:lnRef>
-            <a:fillRef idx="0">
-              <a:schemeClr val="accent1"/>
-            </a:fillRef>
-            <a:effectRef idx="1">
-              <a:schemeClr val="accent1"/>
-            </a:effectRef>
-            <a:fontRef idx="minor">
+            </a:solidFill>
+          </a:ln>
+        </p:spPr>
+        <p:style>
+          <a:lnRef idx="2">
+            <a:schemeClr val="accent1"/>
+          </a:lnRef>
+          <a:fillRef idx="0">
+            <a:schemeClr val="accent1"/>
+          </a:fillRef>
+          <a:effectRef idx="1">
+            <a:schemeClr val="accent1"/>
+          </a:effectRef>
+          <a:fontRef idx="minor">
+            <a:schemeClr val="tx1"/>
+          </a:fontRef>
+        </p:style>
+        <p:txBody>
+          <a:bodyPr rtlCol="0" anchor="ctr"/>
+          <a:lstStyle/>
+          <a:p>
+            <a:pPr algn="ctr"/>
+            <a:endParaRPr lang="en-DK"/>
+          </a:p>
+        </p:txBody>
+      </p:sp>
+      <p:sp>
+        <p:nvSpPr>
+          <p:cNvPr id="33" name="Arc 32">
+            <a:extLst>
+              <a:ext uri="{FF2B5EF4-FFF2-40B4-BE49-F238E27FC236}">
+                <a16:creationId xmlns:a16="http://schemas.microsoft.com/office/drawing/2014/main" id="{4FE3FE58-84B3-6C7F-3259-1E2E62182824}"/>
+              </a:ext>
+            </a:extLst>
+          </p:cNvPr>
+          <p:cNvSpPr/>
+          <p:nvPr/>
+        </p:nvSpPr>
+        <p:spPr>
+          <a:xfrm rot="2405634">
+            <a:off x="2062086" y="3763178"/>
+            <a:ext cx="1392469" cy="1612984"/>
+          </a:xfrm>
+          <a:prstGeom prst="arc">
+            <a:avLst/>
+          </a:prstGeom>
+          <a:ln>
+            <a:solidFill>
               <a:schemeClr val="tx1"/>
-            </a:fontRef>
-          </p:style>
-          <p:txBody>
-            <a:bodyPr rtlCol="0" anchor="ctr"/>
-            <a:lstStyle/>
-            <a:p>
-              <a:pPr algn="ctr"/>
-              <a:endParaRPr lang="en-DK"/>
-            </a:p>
-          </p:txBody>
-        </p:sp>
-        <p:sp>
-          <p:nvSpPr>
-            <p:cNvPr id="33" name="Arc 32">
-              <a:extLst>
-                <a:ext uri="{FF2B5EF4-FFF2-40B4-BE49-F238E27FC236}">
-                  <a16:creationId xmlns:a16="http://schemas.microsoft.com/office/drawing/2014/main" id="{4FE3FE58-84B3-6C7F-3259-1E2E62182824}"/>
-                </a:ext>
-              </a:extLst>
-            </p:cNvPr>
-            <p:cNvSpPr/>
-            <p:nvPr/>
-          </p:nvSpPr>
-          <p:spPr>
-            <a:xfrm rot="2405634">
-              <a:off x="2959555" y="4013262"/>
-              <a:ext cx="1444300" cy="1893221"/>
-            </a:xfrm>
-            <a:prstGeom prst="arc">
-              <a:avLst/>
-            </a:prstGeom>
-            <a:ln>
-              <a:solidFill>
-                <a:schemeClr val="tx1"/>
-              </a:solidFill>
-            </a:ln>
-          </p:spPr>
-          <p:style>
-            <a:lnRef idx="2">
-              <a:schemeClr val="accent1"/>
-            </a:lnRef>
-            <a:fillRef idx="0">
-              <a:schemeClr val="accent1"/>
-            </a:fillRef>
-            <a:effectRef idx="1">
-              <a:schemeClr val="accent1"/>
-            </a:effectRef>
-            <a:fontRef idx="minor">
+            </a:solidFill>
+          </a:ln>
+        </p:spPr>
+        <p:style>
+          <a:lnRef idx="2">
+            <a:schemeClr val="accent1"/>
+          </a:lnRef>
+          <a:fillRef idx="0">
+            <a:schemeClr val="accent1"/>
+          </a:fillRef>
+          <a:effectRef idx="1">
+            <a:schemeClr val="accent1"/>
+          </a:effectRef>
+          <a:fontRef idx="minor">
+            <a:schemeClr val="tx1"/>
+          </a:fontRef>
+        </p:style>
+        <p:txBody>
+          <a:bodyPr rtlCol="0" anchor="ctr"/>
+          <a:lstStyle/>
+          <a:p>
+            <a:pPr algn="ctr"/>
+            <a:endParaRPr lang="en-DK"/>
+          </a:p>
+        </p:txBody>
+      </p:sp>
+      <p:sp>
+        <p:nvSpPr>
+          <p:cNvPr id="34" name="Arc 33">
+            <a:extLst>
+              <a:ext uri="{FF2B5EF4-FFF2-40B4-BE49-F238E27FC236}">
+                <a16:creationId xmlns:a16="http://schemas.microsoft.com/office/drawing/2014/main" id="{62609F2A-7931-1FE5-A80B-8A26FCFC8305}"/>
+              </a:ext>
+            </a:extLst>
+          </p:cNvPr>
+          <p:cNvSpPr/>
+          <p:nvPr/>
+        </p:nvSpPr>
+        <p:spPr>
+          <a:xfrm rot="13294408">
+            <a:off x="3415498" y="2309790"/>
+            <a:ext cx="1392469" cy="1612984"/>
+          </a:xfrm>
+          <a:prstGeom prst="arc">
+            <a:avLst/>
+          </a:prstGeom>
+          <a:ln>
+            <a:solidFill>
               <a:schemeClr val="tx1"/>
-            </a:fontRef>
-          </p:style>
-          <p:txBody>
-            <a:bodyPr rtlCol="0" anchor="ctr"/>
-            <a:lstStyle/>
-            <a:p>
-              <a:pPr algn="ctr"/>
-              <a:endParaRPr lang="en-DK"/>
-            </a:p>
-          </p:txBody>
-        </p:sp>
-        <p:sp>
-          <p:nvSpPr>
-            <p:cNvPr id="34" name="Arc 33">
-              <a:extLst>
-                <a:ext uri="{FF2B5EF4-FFF2-40B4-BE49-F238E27FC236}">
-                  <a16:creationId xmlns:a16="http://schemas.microsoft.com/office/drawing/2014/main" id="{62609F2A-7931-1FE5-A80B-8A26FCFC8305}"/>
-                </a:ext>
-              </a:extLst>
-            </p:cNvPr>
-            <p:cNvSpPr/>
-            <p:nvPr/>
-          </p:nvSpPr>
-          <p:spPr>
-            <a:xfrm rot="13294408">
-              <a:off x="4378300" y="2316511"/>
-              <a:ext cx="1444300" cy="1893221"/>
-            </a:xfrm>
-            <a:prstGeom prst="arc">
-              <a:avLst/>
-            </a:prstGeom>
-            <a:ln>
-              <a:solidFill>
-                <a:schemeClr val="tx1"/>
-              </a:solidFill>
-            </a:ln>
-          </p:spPr>
-          <p:style>
-            <a:lnRef idx="2">
-              <a:schemeClr val="accent1"/>
-            </a:lnRef>
-            <a:fillRef idx="0">
-              <a:schemeClr val="accent1"/>
-            </a:fillRef>
-            <a:effectRef idx="1">
-              <a:schemeClr val="accent1"/>
-            </a:effectRef>
-            <a:fontRef idx="minor">
+            </a:solidFill>
+          </a:ln>
+        </p:spPr>
+        <p:style>
+          <a:lnRef idx="2">
+            <a:schemeClr val="accent1"/>
+          </a:lnRef>
+          <a:fillRef idx="0">
+            <a:schemeClr val="accent1"/>
+          </a:fillRef>
+          <a:effectRef idx="1">
+            <a:schemeClr val="accent1"/>
+          </a:effectRef>
+          <a:fontRef idx="minor">
+            <a:schemeClr val="tx1"/>
+          </a:fontRef>
+        </p:style>
+        <p:txBody>
+          <a:bodyPr rtlCol="0" anchor="ctr"/>
+          <a:lstStyle/>
+          <a:p>
+            <a:pPr algn="ctr"/>
+            <a:endParaRPr lang="en-DK"/>
+          </a:p>
+        </p:txBody>
+      </p:sp>
+      <p:sp>
+        <p:nvSpPr>
+          <p:cNvPr id="35" name="Arc 34">
+            <a:extLst>
+              <a:ext uri="{FF2B5EF4-FFF2-40B4-BE49-F238E27FC236}">
+                <a16:creationId xmlns:a16="http://schemas.microsoft.com/office/drawing/2014/main" id="{2D7C5663-D4CF-A7BB-3353-060262CBCFA2}"/>
+              </a:ext>
+            </a:extLst>
+          </p:cNvPr>
+          <p:cNvSpPr/>
+          <p:nvPr/>
+        </p:nvSpPr>
+        <p:spPr>
+          <a:xfrm rot="13294408">
+            <a:off x="3415499" y="3594919"/>
+            <a:ext cx="1392469" cy="1612984"/>
+          </a:xfrm>
+          <a:prstGeom prst="arc">
+            <a:avLst/>
+          </a:prstGeom>
+          <a:ln>
+            <a:solidFill>
               <a:schemeClr val="tx1"/>
-            </a:fontRef>
-          </p:style>
-          <p:txBody>
-            <a:bodyPr rtlCol="0" anchor="ctr"/>
-            <a:lstStyle/>
-            <a:p>
-              <a:pPr algn="ctr"/>
-              <a:endParaRPr lang="en-DK"/>
-            </a:p>
-          </p:txBody>
-        </p:sp>
-        <p:sp>
-          <p:nvSpPr>
-            <p:cNvPr id="35" name="Arc 34">
-              <a:extLst>
-                <a:ext uri="{FF2B5EF4-FFF2-40B4-BE49-F238E27FC236}">
-                  <a16:creationId xmlns:a16="http://schemas.microsoft.com/office/drawing/2014/main" id="{2D7C5663-D4CF-A7BB-3353-060262CBCFA2}"/>
-                </a:ext>
-              </a:extLst>
-            </p:cNvPr>
-            <p:cNvSpPr/>
-            <p:nvPr/>
-          </p:nvSpPr>
-          <p:spPr>
-            <a:xfrm rot="13294408">
-              <a:off x="4378301" y="3824916"/>
-              <a:ext cx="1444300" cy="1893221"/>
-            </a:xfrm>
-            <a:prstGeom prst="arc">
-              <a:avLst/>
-            </a:prstGeom>
-            <a:ln>
-              <a:solidFill>
-                <a:schemeClr val="tx1"/>
-              </a:solidFill>
-            </a:ln>
-          </p:spPr>
-          <p:style>
-            <a:lnRef idx="2">
-              <a:schemeClr val="accent1"/>
-            </a:lnRef>
-            <a:fillRef idx="0">
-              <a:schemeClr val="accent1"/>
-            </a:fillRef>
-            <a:effectRef idx="1">
-              <a:schemeClr val="accent1"/>
-            </a:effectRef>
-            <a:fontRef idx="minor">
+            </a:solidFill>
+          </a:ln>
+        </p:spPr>
+        <p:style>
+          <a:lnRef idx="2">
+            <a:schemeClr val="accent1"/>
+          </a:lnRef>
+          <a:fillRef idx="0">
+            <a:schemeClr val="accent1"/>
+          </a:fillRef>
+          <a:effectRef idx="1">
+            <a:schemeClr val="accent1"/>
+          </a:effectRef>
+          <a:fontRef idx="minor">
+            <a:schemeClr val="tx1"/>
+          </a:fontRef>
+        </p:style>
+        <p:txBody>
+          <a:bodyPr rtlCol="0" anchor="ctr"/>
+          <a:lstStyle/>
+          <a:p>
+            <a:pPr algn="ctr"/>
+            <a:endParaRPr lang="en-DK"/>
+          </a:p>
+        </p:txBody>
+      </p:sp>
+      <p:cxnSp>
+        <p:nvCxnSpPr>
+          <p:cNvPr id="37" name="Straight Connector 36">
+            <a:extLst>
+              <a:ext uri="{FF2B5EF4-FFF2-40B4-BE49-F238E27FC236}">
+                <a16:creationId xmlns:a16="http://schemas.microsoft.com/office/drawing/2014/main" id="{443DA90B-0825-2106-8DA7-3A28B2644A39}"/>
+              </a:ext>
+            </a:extLst>
+          </p:cNvPr>
+          <p:cNvCxnSpPr>
+            <a:cxnSpLocks/>
+          </p:cNvCxnSpPr>
+          <p:nvPr/>
+        </p:nvCxnSpPr>
+        <p:spPr>
+          <a:xfrm>
+            <a:off x="4497856" y="2241716"/>
+            <a:ext cx="0" cy="2869111"/>
+          </a:xfrm>
+          <a:prstGeom prst="line">
+            <a:avLst/>
+          </a:prstGeom>
+          <a:ln w="19050" cap="flat" cmpd="sng" algn="ctr">
+            <a:solidFill>
               <a:schemeClr val="tx1"/>
-            </a:fontRef>
-          </p:style>
-          <p:txBody>
-            <a:bodyPr rtlCol="0" anchor="ctr"/>
-            <a:lstStyle/>
-            <a:p>
-              <a:pPr algn="ctr"/>
-              <a:endParaRPr lang="en-DK"/>
-            </a:p>
-          </p:txBody>
-        </p:sp>
-        <p:cxnSp>
-          <p:nvCxnSpPr>
-            <p:cNvPr id="37" name="Straight Connector 36">
-              <a:extLst>
-                <a:ext uri="{FF2B5EF4-FFF2-40B4-BE49-F238E27FC236}">
-                  <a16:creationId xmlns:a16="http://schemas.microsoft.com/office/drawing/2014/main" id="{443DA90B-0825-2106-8DA7-3A28B2644A39}"/>
-                </a:ext>
-              </a:extLst>
-            </p:cNvPr>
-            <p:cNvCxnSpPr>
-              <a:cxnSpLocks/>
-            </p:cNvCxnSpPr>
-            <p:nvPr/>
-          </p:nvCxnSpPr>
-          <p:spPr>
-            <a:xfrm>
-              <a:off x="4861461" y="2195015"/>
-              <a:ext cx="0" cy="3367585"/>
-            </a:xfrm>
-            <a:prstGeom prst="line">
-              <a:avLst/>
-            </a:prstGeom>
-            <a:ln w="19050" cap="flat" cmpd="sng" algn="ctr">
-              <a:solidFill>
-                <a:schemeClr val="tx1"/>
-              </a:solidFill>
-              <a:prstDash val="dash"/>
-              <a:round/>
-              <a:headEnd type="none" w="med" len="med"/>
-              <a:tailEnd type="none" w="med" len="med"/>
-            </a:ln>
-          </p:spPr>
-          <p:style>
-            <a:lnRef idx="0">
-              <a:scrgbClr r="0" g="0" b="0"/>
-            </a:lnRef>
-            <a:fillRef idx="0">
-              <a:scrgbClr r="0" g="0" b="0"/>
-            </a:fillRef>
-            <a:effectRef idx="0">
-              <a:scrgbClr r="0" g="0" b="0"/>
-            </a:effectRef>
-            <a:fontRef idx="minor">
+            </a:solidFill>
+            <a:prstDash val="dash"/>
+            <a:round/>
+            <a:headEnd type="none" w="med" len="med"/>
+            <a:tailEnd type="none" w="med" len="med"/>
+          </a:ln>
+        </p:spPr>
+        <p:style>
+          <a:lnRef idx="0">
+            <a:scrgbClr r="0" g="0" b="0"/>
+          </a:lnRef>
+          <a:fillRef idx="0">
+            <a:scrgbClr r="0" g="0" b="0"/>
+          </a:fillRef>
+          <a:effectRef idx="0">
+            <a:scrgbClr r="0" g="0" b="0"/>
+          </a:effectRef>
+          <a:fontRef idx="minor">
+            <a:schemeClr val="tx1"/>
+          </a:fontRef>
+        </p:style>
+      </p:cxnSp>
+      <p:sp>
+        <p:nvSpPr>
+          <p:cNvPr id="40" name="Arc 39">
+            <a:extLst>
+              <a:ext uri="{FF2B5EF4-FFF2-40B4-BE49-F238E27FC236}">
+                <a16:creationId xmlns:a16="http://schemas.microsoft.com/office/drawing/2014/main" id="{2C1F085D-8C5C-3FCE-6C89-C218FF586237}"/>
+              </a:ext>
+            </a:extLst>
+          </p:cNvPr>
+          <p:cNvSpPr/>
+          <p:nvPr/>
+        </p:nvSpPr>
+        <p:spPr>
+          <a:xfrm rot="2405634">
+            <a:off x="4301553" y="2459927"/>
+            <a:ext cx="1392469" cy="1612984"/>
+          </a:xfrm>
+          <a:prstGeom prst="arc">
+            <a:avLst/>
+          </a:prstGeom>
+          <a:ln>
+            <a:solidFill>
               <a:schemeClr val="tx1"/>
-            </a:fontRef>
-          </p:style>
-        </p:cxnSp>
-        <p:sp>
-          <p:nvSpPr>
-            <p:cNvPr id="40" name="Arc 39">
-              <a:extLst>
-                <a:ext uri="{FF2B5EF4-FFF2-40B4-BE49-F238E27FC236}">
-                  <a16:creationId xmlns:a16="http://schemas.microsoft.com/office/drawing/2014/main" id="{2C1F085D-8C5C-3FCE-6C89-C218FF586237}"/>
-                </a:ext>
-              </a:extLst>
-            </p:cNvPr>
-            <p:cNvSpPr/>
-            <p:nvPr/>
-          </p:nvSpPr>
-          <p:spPr>
-            <a:xfrm rot="2405634">
-              <a:off x="3949472" y="2504857"/>
-              <a:ext cx="1444300" cy="1893221"/>
-            </a:xfrm>
-            <a:prstGeom prst="arc">
-              <a:avLst/>
-            </a:prstGeom>
-            <a:ln>
-              <a:solidFill>
-                <a:schemeClr val="tx1"/>
-              </a:solidFill>
-            </a:ln>
-          </p:spPr>
-          <p:style>
-            <a:lnRef idx="2">
-              <a:schemeClr val="accent1"/>
-            </a:lnRef>
-            <a:fillRef idx="0">
-              <a:schemeClr val="accent1"/>
-            </a:fillRef>
-            <a:effectRef idx="1">
-              <a:schemeClr val="accent1"/>
-            </a:effectRef>
-            <a:fontRef idx="minor">
+            </a:solidFill>
+          </a:ln>
+        </p:spPr>
+        <p:style>
+          <a:lnRef idx="2">
+            <a:schemeClr val="accent1"/>
+          </a:lnRef>
+          <a:fillRef idx="0">
+            <a:schemeClr val="accent1"/>
+          </a:fillRef>
+          <a:effectRef idx="1">
+            <a:schemeClr val="accent1"/>
+          </a:effectRef>
+          <a:fontRef idx="minor">
+            <a:schemeClr val="tx1"/>
+          </a:fontRef>
+        </p:style>
+        <p:txBody>
+          <a:bodyPr rtlCol="0" anchor="ctr"/>
+          <a:lstStyle/>
+          <a:p>
+            <a:pPr algn="ctr"/>
+            <a:endParaRPr lang="en-DK"/>
+          </a:p>
+        </p:txBody>
+      </p:sp>
+      <p:sp>
+        <p:nvSpPr>
+          <p:cNvPr id="41" name="Arc 40">
+            <a:extLst>
+              <a:ext uri="{FF2B5EF4-FFF2-40B4-BE49-F238E27FC236}">
+                <a16:creationId xmlns:a16="http://schemas.microsoft.com/office/drawing/2014/main" id="{8756ED37-CADD-FABB-45C9-B2EFEA2DCEC8}"/>
+              </a:ext>
+            </a:extLst>
+          </p:cNvPr>
+          <p:cNvSpPr/>
+          <p:nvPr/>
+        </p:nvSpPr>
+        <p:spPr>
+          <a:xfrm rot="2405634">
+            <a:off x="4289927" y="3750482"/>
+            <a:ext cx="1392469" cy="1612984"/>
+          </a:xfrm>
+          <a:prstGeom prst="arc">
+            <a:avLst/>
+          </a:prstGeom>
+          <a:ln>
+            <a:solidFill>
               <a:schemeClr val="tx1"/>
-            </a:fontRef>
-          </p:style>
-          <p:txBody>
-            <a:bodyPr rtlCol="0" anchor="ctr"/>
-            <a:lstStyle/>
-            <a:p>
-              <a:pPr algn="ctr"/>
-              <a:endParaRPr lang="en-DK"/>
-            </a:p>
-          </p:txBody>
-        </p:sp>
-        <p:sp>
-          <p:nvSpPr>
-            <p:cNvPr id="41" name="Arc 40">
-              <a:extLst>
-                <a:ext uri="{FF2B5EF4-FFF2-40B4-BE49-F238E27FC236}">
-                  <a16:creationId xmlns:a16="http://schemas.microsoft.com/office/drawing/2014/main" id="{8756ED37-CADD-FABB-45C9-B2EFEA2DCEC8}"/>
-                </a:ext>
-              </a:extLst>
-            </p:cNvPr>
-            <p:cNvSpPr/>
-            <p:nvPr/>
-          </p:nvSpPr>
-          <p:spPr>
-            <a:xfrm rot="2405634">
-              <a:off x="3949474" y="4013262"/>
-              <a:ext cx="1444300" cy="1893221"/>
-            </a:xfrm>
-            <a:prstGeom prst="arc">
-              <a:avLst/>
-            </a:prstGeom>
-            <a:ln>
-              <a:solidFill>
-                <a:schemeClr val="tx1"/>
-              </a:solidFill>
-            </a:ln>
-          </p:spPr>
-          <p:style>
-            <a:lnRef idx="2">
-              <a:schemeClr val="accent1"/>
-            </a:lnRef>
-            <a:fillRef idx="0">
-              <a:schemeClr val="accent1"/>
-            </a:fillRef>
-            <a:effectRef idx="1">
-              <a:schemeClr val="accent1"/>
-            </a:effectRef>
-            <a:fontRef idx="minor">
+            </a:solidFill>
+          </a:ln>
+        </p:spPr>
+        <p:style>
+          <a:lnRef idx="2">
+            <a:schemeClr val="accent1"/>
+          </a:lnRef>
+          <a:fillRef idx="0">
+            <a:schemeClr val="accent1"/>
+          </a:fillRef>
+          <a:effectRef idx="1">
+            <a:schemeClr val="accent1"/>
+          </a:effectRef>
+          <a:fontRef idx="minor">
+            <a:schemeClr val="tx1"/>
+          </a:fontRef>
+        </p:style>
+        <p:txBody>
+          <a:bodyPr rtlCol="0" anchor="ctr"/>
+          <a:lstStyle/>
+          <a:p>
+            <a:pPr algn="ctr"/>
+            <a:endParaRPr lang="en-DK"/>
+          </a:p>
+        </p:txBody>
+      </p:sp>
+      <p:sp>
+        <p:nvSpPr>
+          <p:cNvPr id="42" name="Arc 41">
+            <a:extLst>
+              <a:ext uri="{FF2B5EF4-FFF2-40B4-BE49-F238E27FC236}">
+                <a16:creationId xmlns:a16="http://schemas.microsoft.com/office/drawing/2014/main" id="{7B4E9ABC-085C-89C4-5D6C-F87DEDA89610}"/>
+              </a:ext>
+            </a:extLst>
+          </p:cNvPr>
+          <p:cNvSpPr/>
+          <p:nvPr/>
+        </p:nvSpPr>
+        <p:spPr>
+          <a:xfrm rot="2405634">
+            <a:off x="4951775" y="2478050"/>
+            <a:ext cx="1392469" cy="1612984"/>
+          </a:xfrm>
+          <a:prstGeom prst="arc">
+            <a:avLst/>
+          </a:prstGeom>
+          <a:ln>
+            <a:solidFill>
               <a:schemeClr val="tx1"/>
-            </a:fontRef>
-          </p:style>
-          <p:txBody>
-            <a:bodyPr rtlCol="0" anchor="ctr"/>
-            <a:lstStyle/>
-            <a:p>
-              <a:pPr algn="ctr"/>
-              <a:endParaRPr lang="en-DK"/>
-            </a:p>
-          </p:txBody>
-        </p:sp>
-        <p:sp>
-          <p:nvSpPr>
-            <p:cNvPr id="42" name="Arc 41">
-              <a:extLst>
-                <a:ext uri="{FF2B5EF4-FFF2-40B4-BE49-F238E27FC236}">
-                  <a16:creationId xmlns:a16="http://schemas.microsoft.com/office/drawing/2014/main" id="{7B4E9ABC-085C-89C4-5D6C-F87DEDA89610}"/>
-                </a:ext>
-              </a:extLst>
-            </p:cNvPr>
-            <p:cNvSpPr/>
-            <p:nvPr/>
-          </p:nvSpPr>
-          <p:spPr>
-            <a:xfrm rot="2405634">
-              <a:off x="4715418" y="2504858"/>
-              <a:ext cx="1444300" cy="1893221"/>
-            </a:xfrm>
-            <a:prstGeom prst="arc">
-              <a:avLst/>
-            </a:prstGeom>
-            <a:ln>
-              <a:solidFill>
-                <a:schemeClr val="tx1"/>
-              </a:solidFill>
-            </a:ln>
-          </p:spPr>
-          <p:style>
-            <a:lnRef idx="2">
-              <a:schemeClr val="accent1"/>
-            </a:lnRef>
-            <a:fillRef idx="0">
-              <a:schemeClr val="accent1"/>
-            </a:fillRef>
-            <a:effectRef idx="1">
-              <a:schemeClr val="accent1"/>
-            </a:effectRef>
-            <a:fontRef idx="minor">
+            </a:solidFill>
+          </a:ln>
+        </p:spPr>
+        <p:style>
+          <a:lnRef idx="2">
+            <a:schemeClr val="accent1"/>
+          </a:lnRef>
+          <a:fillRef idx="0">
+            <a:schemeClr val="accent1"/>
+          </a:fillRef>
+          <a:effectRef idx="1">
+            <a:schemeClr val="accent1"/>
+          </a:effectRef>
+          <a:fontRef idx="minor">
+            <a:schemeClr val="tx1"/>
+          </a:fontRef>
+        </p:style>
+        <p:txBody>
+          <a:bodyPr rtlCol="0" anchor="ctr"/>
+          <a:lstStyle/>
+          <a:p>
+            <a:pPr algn="ctr"/>
+            <a:endParaRPr lang="en-DK"/>
+          </a:p>
+        </p:txBody>
+      </p:sp>
+      <p:sp>
+        <p:nvSpPr>
+          <p:cNvPr id="43" name="Arc 42">
+            <a:extLst>
+              <a:ext uri="{FF2B5EF4-FFF2-40B4-BE49-F238E27FC236}">
+                <a16:creationId xmlns:a16="http://schemas.microsoft.com/office/drawing/2014/main" id="{C2C707DF-EE7D-7A86-C157-71AFB83FB85C}"/>
+              </a:ext>
+            </a:extLst>
+          </p:cNvPr>
+          <p:cNvSpPr/>
+          <p:nvPr/>
+        </p:nvSpPr>
+        <p:spPr>
+          <a:xfrm rot="2405634">
+            <a:off x="4951776" y="3763180"/>
+            <a:ext cx="1392469" cy="1612984"/>
+          </a:xfrm>
+          <a:prstGeom prst="arc">
+            <a:avLst/>
+          </a:prstGeom>
+          <a:ln>
+            <a:solidFill>
               <a:schemeClr val="tx1"/>
-            </a:fontRef>
-          </p:style>
-          <p:txBody>
-            <a:bodyPr rtlCol="0" anchor="ctr"/>
-            <a:lstStyle/>
-            <a:p>
-              <a:pPr algn="ctr"/>
-              <a:endParaRPr lang="en-DK"/>
-            </a:p>
-          </p:txBody>
-        </p:sp>
-        <p:sp>
-          <p:nvSpPr>
-            <p:cNvPr id="43" name="Arc 42">
-              <a:extLst>
-                <a:ext uri="{FF2B5EF4-FFF2-40B4-BE49-F238E27FC236}">
-                  <a16:creationId xmlns:a16="http://schemas.microsoft.com/office/drawing/2014/main" id="{C2C707DF-EE7D-7A86-C157-71AFB83FB85C}"/>
-                </a:ext>
-              </a:extLst>
-            </p:cNvPr>
-            <p:cNvSpPr/>
-            <p:nvPr/>
-          </p:nvSpPr>
-          <p:spPr>
-            <a:xfrm rot="2405634">
-              <a:off x="4715419" y="4013264"/>
-              <a:ext cx="1444300" cy="1893221"/>
-            </a:xfrm>
-            <a:prstGeom prst="arc">
-              <a:avLst/>
-            </a:prstGeom>
-            <a:ln>
-              <a:solidFill>
-                <a:schemeClr val="tx1"/>
-              </a:solidFill>
-            </a:ln>
-          </p:spPr>
-          <p:style>
-            <a:lnRef idx="2">
-              <a:schemeClr val="accent1"/>
-            </a:lnRef>
-            <a:fillRef idx="0">
-              <a:schemeClr val="accent1"/>
-            </a:fillRef>
-            <a:effectRef idx="1">
-              <a:schemeClr val="accent1"/>
-            </a:effectRef>
-            <a:fontRef idx="minor">
+            </a:solidFill>
+          </a:ln>
+        </p:spPr>
+        <p:style>
+          <a:lnRef idx="2">
+            <a:schemeClr val="accent1"/>
+          </a:lnRef>
+          <a:fillRef idx="0">
+            <a:schemeClr val="accent1"/>
+          </a:fillRef>
+          <a:effectRef idx="1">
+            <a:schemeClr val="accent1"/>
+          </a:effectRef>
+          <a:fontRef idx="minor">
+            <a:schemeClr val="tx1"/>
+          </a:fontRef>
+        </p:style>
+        <p:txBody>
+          <a:bodyPr rtlCol="0" anchor="ctr"/>
+          <a:lstStyle/>
+          <a:p>
+            <a:pPr algn="ctr"/>
+            <a:endParaRPr lang="en-DK"/>
+          </a:p>
+        </p:txBody>
+      </p:sp>
+      <p:sp>
+        <p:nvSpPr>
+          <p:cNvPr id="44" name="Arc 43">
+            <a:extLst>
+              <a:ext uri="{FF2B5EF4-FFF2-40B4-BE49-F238E27FC236}">
+                <a16:creationId xmlns:a16="http://schemas.microsoft.com/office/drawing/2014/main" id="{F834C4D3-15BE-9845-D048-17D003C466C5}"/>
+              </a:ext>
+            </a:extLst>
+          </p:cNvPr>
+          <p:cNvSpPr/>
+          <p:nvPr/>
+        </p:nvSpPr>
+        <p:spPr>
+          <a:xfrm rot="2405634">
+            <a:off x="5645827" y="2487281"/>
+            <a:ext cx="1392469" cy="1612984"/>
+          </a:xfrm>
+          <a:prstGeom prst="arc">
+            <a:avLst/>
+          </a:prstGeom>
+          <a:ln>
+            <a:solidFill>
               <a:schemeClr val="tx1"/>
-            </a:fontRef>
-          </p:style>
-          <p:txBody>
-            <a:bodyPr rtlCol="0" anchor="ctr"/>
-            <a:lstStyle/>
-            <a:p>
-              <a:pPr algn="ctr"/>
-              <a:endParaRPr lang="en-DK"/>
-            </a:p>
-          </p:txBody>
-        </p:sp>
-        <p:sp>
-          <p:nvSpPr>
-            <p:cNvPr id="44" name="Arc 43">
-              <a:extLst>
-                <a:ext uri="{FF2B5EF4-FFF2-40B4-BE49-F238E27FC236}">
-                  <a16:creationId xmlns:a16="http://schemas.microsoft.com/office/drawing/2014/main" id="{F834C4D3-15BE-9845-D048-17D003C466C5}"/>
-                </a:ext>
-              </a:extLst>
-            </p:cNvPr>
-            <p:cNvSpPr/>
-            <p:nvPr/>
-          </p:nvSpPr>
-          <p:spPr>
-            <a:xfrm rot="2405634">
-              <a:off x="5435305" y="2515692"/>
-              <a:ext cx="1444300" cy="1893221"/>
-            </a:xfrm>
-            <a:prstGeom prst="arc">
-              <a:avLst/>
-            </a:prstGeom>
-            <a:ln>
-              <a:solidFill>
-                <a:schemeClr val="tx1"/>
-              </a:solidFill>
-            </a:ln>
-          </p:spPr>
-          <p:style>
-            <a:lnRef idx="2">
-              <a:schemeClr val="accent1"/>
-            </a:lnRef>
-            <a:fillRef idx="0">
-              <a:schemeClr val="accent1"/>
-            </a:fillRef>
-            <a:effectRef idx="1">
-              <a:schemeClr val="accent1"/>
-            </a:effectRef>
-            <a:fontRef idx="minor">
+            </a:solidFill>
+          </a:ln>
+        </p:spPr>
+        <p:style>
+          <a:lnRef idx="2">
+            <a:schemeClr val="accent1"/>
+          </a:lnRef>
+          <a:fillRef idx="0">
+            <a:schemeClr val="accent1"/>
+          </a:fillRef>
+          <a:effectRef idx="1">
+            <a:schemeClr val="accent1"/>
+          </a:effectRef>
+          <a:fontRef idx="minor">
+            <a:schemeClr val="tx1"/>
+          </a:fontRef>
+        </p:style>
+        <p:txBody>
+          <a:bodyPr rtlCol="0" anchor="ctr"/>
+          <a:lstStyle/>
+          <a:p>
+            <a:pPr algn="ctr"/>
+            <a:endParaRPr lang="en-DK"/>
+          </a:p>
+        </p:txBody>
+      </p:sp>
+      <p:sp>
+        <p:nvSpPr>
+          <p:cNvPr id="45" name="Arc 44">
+            <a:extLst>
+              <a:ext uri="{FF2B5EF4-FFF2-40B4-BE49-F238E27FC236}">
+                <a16:creationId xmlns:a16="http://schemas.microsoft.com/office/drawing/2014/main" id="{E268A1E1-F48E-541E-C1CF-20DA05F2FF53}"/>
+              </a:ext>
+            </a:extLst>
+          </p:cNvPr>
+          <p:cNvSpPr/>
+          <p:nvPr/>
+        </p:nvSpPr>
+        <p:spPr>
+          <a:xfrm rot="2405634">
+            <a:off x="5645828" y="3772410"/>
+            <a:ext cx="1392469" cy="1612984"/>
+          </a:xfrm>
+          <a:prstGeom prst="arc">
+            <a:avLst/>
+          </a:prstGeom>
+          <a:ln>
+            <a:solidFill>
               <a:schemeClr val="tx1"/>
-            </a:fontRef>
-          </p:style>
-          <p:txBody>
-            <a:bodyPr rtlCol="0" anchor="ctr"/>
-            <a:lstStyle/>
-            <a:p>
-              <a:pPr algn="ctr"/>
-              <a:endParaRPr lang="en-DK"/>
-            </a:p>
-          </p:txBody>
-        </p:sp>
-        <p:sp>
-          <p:nvSpPr>
-            <p:cNvPr id="45" name="Arc 44">
-              <a:extLst>
-                <a:ext uri="{FF2B5EF4-FFF2-40B4-BE49-F238E27FC236}">
-                  <a16:creationId xmlns:a16="http://schemas.microsoft.com/office/drawing/2014/main" id="{E268A1E1-F48E-541E-C1CF-20DA05F2FF53}"/>
-                </a:ext>
-              </a:extLst>
-            </p:cNvPr>
-            <p:cNvSpPr/>
-            <p:nvPr/>
-          </p:nvSpPr>
-          <p:spPr>
-            <a:xfrm rot="2405634">
-              <a:off x="5435306" y="4024098"/>
-              <a:ext cx="1444300" cy="1893221"/>
-            </a:xfrm>
-            <a:prstGeom prst="arc">
-              <a:avLst/>
-            </a:prstGeom>
-            <a:ln>
-              <a:solidFill>
-                <a:schemeClr val="tx1"/>
-              </a:solidFill>
-            </a:ln>
-          </p:spPr>
-          <p:style>
-            <a:lnRef idx="2">
-              <a:schemeClr val="accent1"/>
-            </a:lnRef>
-            <a:fillRef idx="0">
-              <a:schemeClr val="accent1"/>
-            </a:fillRef>
-            <a:effectRef idx="1">
-              <a:schemeClr val="accent1"/>
-            </a:effectRef>
-            <a:fontRef idx="minor">
+            </a:solidFill>
+          </a:ln>
+        </p:spPr>
+        <p:style>
+          <a:lnRef idx="2">
+            <a:schemeClr val="accent1"/>
+          </a:lnRef>
+          <a:fillRef idx="0">
+            <a:schemeClr val="accent1"/>
+          </a:fillRef>
+          <a:effectRef idx="1">
+            <a:schemeClr val="accent1"/>
+          </a:effectRef>
+          <a:fontRef idx="minor">
+            <a:schemeClr val="tx1"/>
+          </a:fontRef>
+        </p:style>
+        <p:txBody>
+          <a:bodyPr rtlCol="0" anchor="ctr"/>
+          <a:lstStyle/>
+          <a:p>
+            <a:pPr algn="ctr"/>
+            <a:endParaRPr lang="en-DK"/>
+          </a:p>
+        </p:txBody>
+      </p:sp>
+      <p:sp>
+        <p:nvSpPr>
+          <p:cNvPr id="46" name="Arc 45">
+            <a:extLst>
+              <a:ext uri="{FF2B5EF4-FFF2-40B4-BE49-F238E27FC236}">
+                <a16:creationId xmlns:a16="http://schemas.microsoft.com/office/drawing/2014/main" id="{9CE1DABD-C3FC-57BC-983C-1F210AEF553C}"/>
+              </a:ext>
+            </a:extLst>
+          </p:cNvPr>
+          <p:cNvSpPr/>
+          <p:nvPr/>
+        </p:nvSpPr>
+        <p:spPr>
+          <a:xfrm rot="2405634">
+            <a:off x="6406238" y="2473693"/>
+            <a:ext cx="1392469" cy="1612984"/>
+          </a:xfrm>
+          <a:prstGeom prst="arc">
+            <a:avLst/>
+          </a:prstGeom>
+          <a:ln>
+            <a:solidFill>
               <a:schemeClr val="tx1"/>
-            </a:fontRef>
-          </p:style>
-          <p:txBody>
-            <a:bodyPr rtlCol="0" anchor="ctr"/>
-            <a:lstStyle/>
-            <a:p>
-              <a:pPr algn="ctr"/>
-              <a:endParaRPr lang="en-DK"/>
-            </a:p>
-          </p:txBody>
-        </p:sp>
-        <p:sp>
-          <p:nvSpPr>
-            <p:cNvPr id="46" name="Arc 45">
-              <a:extLst>
-                <a:ext uri="{FF2B5EF4-FFF2-40B4-BE49-F238E27FC236}">
-                  <a16:creationId xmlns:a16="http://schemas.microsoft.com/office/drawing/2014/main" id="{9CE1DABD-C3FC-57BC-983C-1F210AEF553C}"/>
-                </a:ext>
-              </a:extLst>
-            </p:cNvPr>
-            <p:cNvSpPr/>
-            <p:nvPr/>
-          </p:nvSpPr>
-          <p:spPr>
-            <a:xfrm rot="2405634">
-              <a:off x="6224020" y="2499744"/>
-              <a:ext cx="1444300" cy="1893221"/>
-            </a:xfrm>
-            <a:prstGeom prst="arc">
-              <a:avLst/>
-            </a:prstGeom>
-            <a:ln>
-              <a:solidFill>
-                <a:schemeClr val="tx1"/>
-              </a:solidFill>
-            </a:ln>
-          </p:spPr>
-          <p:style>
-            <a:lnRef idx="2">
-              <a:schemeClr val="accent1"/>
-            </a:lnRef>
-            <a:fillRef idx="0">
-              <a:schemeClr val="accent1"/>
-            </a:fillRef>
-            <a:effectRef idx="1">
-              <a:schemeClr val="accent1"/>
-            </a:effectRef>
-            <a:fontRef idx="minor">
+            </a:solidFill>
+          </a:ln>
+        </p:spPr>
+        <p:style>
+          <a:lnRef idx="2">
+            <a:schemeClr val="accent1"/>
+          </a:lnRef>
+          <a:fillRef idx="0">
+            <a:schemeClr val="accent1"/>
+          </a:fillRef>
+          <a:effectRef idx="1">
+            <a:schemeClr val="accent1"/>
+          </a:effectRef>
+          <a:fontRef idx="minor">
+            <a:schemeClr val="tx1"/>
+          </a:fontRef>
+        </p:style>
+        <p:txBody>
+          <a:bodyPr rtlCol="0" anchor="ctr"/>
+          <a:lstStyle/>
+          <a:p>
+            <a:pPr algn="ctr"/>
+            <a:endParaRPr lang="en-DK"/>
+          </a:p>
+        </p:txBody>
+      </p:sp>
+      <p:sp>
+        <p:nvSpPr>
+          <p:cNvPr id="47" name="Arc 46">
+            <a:extLst>
+              <a:ext uri="{FF2B5EF4-FFF2-40B4-BE49-F238E27FC236}">
+                <a16:creationId xmlns:a16="http://schemas.microsoft.com/office/drawing/2014/main" id="{B493907F-BBD9-DFBF-45B1-1FC34820C6C7}"/>
+              </a:ext>
+            </a:extLst>
+          </p:cNvPr>
+          <p:cNvSpPr/>
+          <p:nvPr/>
+        </p:nvSpPr>
+        <p:spPr>
+          <a:xfrm rot="2405634">
+            <a:off x="6406240" y="3758822"/>
+            <a:ext cx="1392469" cy="1612984"/>
+          </a:xfrm>
+          <a:prstGeom prst="arc">
+            <a:avLst/>
+          </a:prstGeom>
+          <a:ln>
+            <a:solidFill>
               <a:schemeClr val="tx1"/>
-            </a:fontRef>
-          </p:style>
-          <p:txBody>
-            <a:bodyPr rtlCol="0" anchor="ctr"/>
-            <a:lstStyle/>
-            <a:p>
-              <a:pPr algn="ctr"/>
-              <a:endParaRPr lang="en-DK"/>
-            </a:p>
-          </p:txBody>
-        </p:sp>
-        <p:sp>
-          <p:nvSpPr>
-            <p:cNvPr id="47" name="Arc 46">
-              <a:extLst>
-                <a:ext uri="{FF2B5EF4-FFF2-40B4-BE49-F238E27FC236}">
-                  <a16:creationId xmlns:a16="http://schemas.microsoft.com/office/drawing/2014/main" id="{B493907F-BBD9-DFBF-45B1-1FC34820C6C7}"/>
-                </a:ext>
-              </a:extLst>
-            </p:cNvPr>
-            <p:cNvSpPr/>
-            <p:nvPr/>
-          </p:nvSpPr>
-          <p:spPr>
-            <a:xfrm rot="2405634">
-              <a:off x="6224022" y="4008149"/>
-              <a:ext cx="1444300" cy="1893221"/>
-            </a:xfrm>
-            <a:prstGeom prst="arc">
-              <a:avLst/>
-            </a:prstGeom>
-            <a:ln>
-              <a:solidFill>
-                <a:schemeClr val="tx1"/>
-              </a:solidFill>
-            </a:ln>
-          </p:spPr>
-          <p:style>
-            <a:lnRef idx="2">
-              <a:schemeClr val="accent1"/>
-            </a:lnRef>
-            <a:fillRef idx="0">
-              <a:schemeClr val="accent1"/>
-            </a:fillRef>
-            <a:effectRef idx="1">
-              <a:schemeClr val="accent1"/>
-            </a:effectRef>
-            <a:fontRef idx="minor">
+            </a:solidFill>
+          </a:ln>
+        </p:spPr>
+        <p:style>
+          <a:lnRef idx="2">
+            <a:schemeClr val="accent1"/>
+          </a:lnRef>
+          <a:fillRef idx="0">
+            <a:schemeClr val="accent1"/>
+          </a:fillRef>
+          <a:effectRef idx="1">
+            <a:schemeClr val="accent1"/>
+          </a:effectRef>
+          <a:fontRef idx="minor">
+            <a:schemeClr val="tx1"/>
+          </a:fontRef>
+        </p:style>
+        <p:txBody>
+          <a:bodyPr rtlCol="0" anchor="ctr"/>
+          <a:lstStyle/>
+          <a:p>
+            <a:pPr algn="ctr"/>
+            <a:endParaRPr lang="en-DK"/>
+          </a:p>
+        </p:txBody>
+      </p:sp>
+      <p:sp>
+        <p:nvSpPr>
+          <p:cNvPr id="48" name="Arc 47">
+            <a:extLst>
+              <a:ext uri="{FF2B5EF4-FFF2-40B4-BE49-F238E27FC236}">
+                <a16:creationId xmlns:a16="http://schemas.microsoft.com/office/drawing/2014/main" id="{AD2ABCF9-D8AE-9410-5E46-E12F81F748F2}"/>
+              </a:ext>
+            </a:extLst>
+          </p:cNvPr>
+          <p:cNvSpPr/>
+          <p:nvPr/>
+        </p:nvSpPr>
+        <p:spPr>
+          <a:xfrm rot="13140701">
+            <a:off x="5829840" y="2986671"/>
+            <a:ext cx="1392469" cy="1612984"/>
+          </a:xfrm>
+          <a:prstGeom prst="arc">
+            <a:avLst/>
+          </a:prstGeom>
+          <a:ln>
+            <a:solidFill>
               <a:schemeClr val="tx1"/>
-            </a:fontRef>
-          </p:style>
-          <p:txBody>
-            <a:bodyPr rtlCol="0" anchor="ctr"/>
-            <a:lstStyle/>
-            <a:p>
-              <a:pPr algn="ctr"/>
-              <a:endParaRPr lang="en-DK"/>
-            </a:p>
-          </p:txBody>
-        </p:sp>
-        <p:sp>
-          <p:nvSpPr>
-            <p:cNvPr id="48" name="Arc 47">
-              <a:extLst>
-                <a:ext uri="{FF2B5EF4-FFF2-40B4-BE49-F238E27FC236}">
-                  <a16:creationId xmlns:a16="http://schemas.microsoft.com/office/drawing/2014/main" id="{AD2ABCF9-D8AE-9410-5E46-E12F81F748F2}"/>
-                </a:ext>
-              </a:extLst>
-            </p:cNvPr>
-            <p:cNvSpPr/>
-            <p:nvPr/>
-          </p:nvSpPr>
-          <p:spPr>
-            <a:xfrm rot="13140701">
-              <a:off x="5626167" y="3101845"/>
-              <a:ext cx="1444300" cy="1893221"/>
-            </a:xfrm>
-            <a:prstGeom prst="arc">
-              <a:avLst/>
-            </a:prstGeom>
-            <a:ln>
-              <a:solidFill>
-                <a:schemeClr val="tx1"/>
-              </a:solidFill>
-            </a:ln>
-          </p:spPr>
-          <p:style>
-            <a:lnRef idx="2">
-              <a:schemeClr val="accent1"/>
-            </a:lnRef>
-            <a:fillRef idx="0">
-              <a:schemeClr val="accent1"/>
-            </a:fillRef>
-            <a:effectRef idx="1">
-              <a:schemeClr val="accent1"/>
-            </a:effectRef>
-            <a:fontRef idx="minor">
+            </a:solidFill>
+          </a:ln>
+        </p:spPr>
+        <p:style>
+          <a:lnRef idx="2">
+            <a:schemeClr val="accent1"/>
+          </a:lnRef>
+          <a:fillRef idx="0">
+            <a:schemeClr val="accent1"/>
+          </a:fillRef>
+          <a:effectRef idx="1">
+            <a:schemeClr val="accent1"/>
+          </a:effectRef>
+          <a:fontRef idx="minor">
+            <a:schemeClr val="tx1"/>
+          </a:fontRef>
+        </p:style>
+        <p:txBody>
+          <a:bodyPr rtlCol="0" anchor="ctr"/>
+          <a:lstStyle/>
+          <a:p>
+            <a:pPr algn="ctr"/>
+            <a:endParaRPr lang="en-DK"/>
+          </a:p>
+        </p:txBody>
+      </p:sp>
+      <p:sp>
+        <p:nvSpPr>
+          <p:cNvPr id="49" name="Arc 48">
+            <a:extLst>
+              <a:ext uri="{FF2B5EF4-FFF2-40B4-BE49-F238E27FC236}">
+                <a16:creationId xmlns:a16="http://schemas.microsoft.com/office/drawing/2014/main" id="{BA8D334E-02A6-EB4E-17A5-7DBD900FC898}"/>
+              </a:ext>
+            </a:extLst>
+          </p:cNvPr>
+          <p:cNvSpPr/>
+          <p:nvPr/>
+        </p:nvSpPr>
+        <p:spPr>
+          <a:xfrm rot="13140701">
+            <a:off x="6596865" y="2986671"/>
+            <a:ext cx="1392469" cy="1612984"/>
+          </a:xfrm>
+          <a:prstGeom prst="arc">
+            <a:avLst/>
+          </a:prstGeom>
+          <a:ln>
+            <a:solidFill>
               <a:schemeClr val="tx1"/>
-            </a:fontRef>
-          </p:style>
-          <p:txBody>
-            <a:bodyPr rtlCol="0" anchor="ctr"/>
-            <a:lstStyle/>
-            <a:p>
-              <a:pPr algn="ctr"/>
-              <a:endParaRPr lang="en-DK"/>
-            </a:p>
-          </p:txBody>
-        </p:sp>
-        <p:sp>
-          <p:nvSpPr>
-            <p:cNvPr id="49" name="Arc 48">
-              <a:extLst>
-                <a:ext uri="{FF2B5EF4-FFF2-40B4-BE49-F238E27FC236}">
-                  <a16:creationId xmlns:a16="http://schemas.microsoft.com/office/drawing/2014/main" id="{BA8D334E-02A6-EB4E-17A5-7DBD900FC898}"/>
-                </a:ext>
-              </a:extLst>
-            </p:cNvPr>
-            <p:cNvSpPr/>
-            <p:nvPr/>
-          </p:nvSpPr>
-          <p:spPr>
-            <a:xfrm rot="13140701">
-              <a:off x="6421743" y="3101845"/>
-              <a:ext cx="1444300" cy="1893221"/>
-            </a:xfrm>
-            <a:prstGeom prst="arc">
-              <a:avLst/>
-            </a:prstGeom>
-            <a:ln>
-              <a:solidFill>
-                <a:schemeClr val="tx1"/>
-              </a:solidFill>
-            </a:ln>
-          </p:spPr>
-          <p:style>
-            <a:lnRef idx="2">
-              <a:schemeClr val="accent1"/>
-            </a:lnRef>
-            <a:fillRef idx="0">
-              <a:schemeClr val="accent1"/>
-            </a:fillRef>
-            <a:effectRef idx="1">
-              <a:schemeClr val="accent1"/>
-            </a:effectRef>
-            <a:fontRef idx="minor">
+            </a:solidFill>
+          </a:ln>
+        </p:spPr>
+        <p:style>
+          <a:lnRef idx="2">
+            <a:schemeClr val="accent1"/>
+          </a:lnRef>
+          <a:fillRef idx="0">
+            <a:schemeClr val="accent1"/>
+          </a:fillRef>
+          <a:effectRef idx="1">
+            <a:schemeClr val="accent1"/>
+          </a:effectRef>
+          <a:fontRef idx="minor">
+            <a:schemeClr val="tx1"/>
+          </a:fontRef>
+        </p:style>
+        <p:txBody>
+          <a:bodyPr rtlCol="0" anchor="ctr"/>
+          <a:lstStyle/>
+          <a:p>
+            <a:pPr algn="ctr"/>
+            <a:endParaRPr lang="en-DK"/>
+          </a:p>
+        </p:txBody>
+      </p:sp>
+      <p:sp>
+        <p:nvSpPr>
+          <p:cNvPr id="50" name="Arc 49">
+            <a:extLst>
+              <a:ext uri="{FF2B5EF4-FFF2-40B4-BE49-F238E27FC236}">
+                <a16:creationId xmlns:a16="http://schemas.microsoft.com/office/drawing/2014/main" id="{CFA8818D-AB38-7A59-D706-D1E580CC3E86}"/>
+              </a:ext>
+            </a:extLst>
+          </p:cNvPr>
+          <p:cNvSpPr/>
+          <p:nvPr/>
+        </p:nvSpPr>
+        <p:spPr>
+          <a:xfrm rot="13140701">
+            <a:off x="7299176" y="2995012"/>
+            <a:ext cx="1392469" cy="1612984"/>
+          </a:xfrm>
+          <a:prstGeom prst="arc">
+            <a:avLst/>
+          </a:prstGeom>
+          <a:ln>
+            <a:solidFill>
               <a:schemeClr val="tx1"/>
-            </a:fontRef>
-          </p:style>
-          <p:txBody>
-            <a:bodyPr rtlCol="0" anchor="ctr"/>
-            <a:lstStyle/>
-            <a:p>
-              <a:pPr algn="ctr"/>
-              <a:endParaRPr lang="en-DK"/>
-            </a:p>
-          </p:txBody>
-        </p:sp>
-        <p:sp>
-          <p:nvSpPr>
-            <p:cNvPr id="50" name="Arc 49">
-              <a:extLst>
-                <a:ext uri="{FF2B5EF4-FFF2-40B4-BE49-F238E27FC236}">
-                  <a16:creationId xmlns:a16="http://schemas.microsoft.com/office/drawing/2014/main" id="{CFA8818D-AB38-7A59-D706-D1E580CC3E86}"/>
-                </a:ext>
-              </a:extLst>
-            </p:cNvPr>
-            <p:cNvSpPr/>
-            <p:nvPr/>
-          </p:nvSpPr>
-          <p:spPr>
-            <a:xfrm rot="13140701">
-              <a:off x="7178996" y="3101845"/>
-              <a:ext cx="1444300" cy="1893221"/>
-            </a:xfrm>
-            <a:prstGeom prst="arc">
-              <a:avLst/>
-            </a:prstGeom>
-            <a:ln>
-              <a:solidFill>
-                <a:schemeClr val="tx1"/>
-              </a:solidFill>
-            </a:ln>
-          </p:spPr>
-          <p:style>
-            <a:lnRef idx="2">
-              <a:schemeClr val="accent1"/>
-            </a:lnRef>
-            <a:fillRef idx="0">
-              <a:schemeClr val="accent1"/>
-            </a:fillRef>
-            <a:effectRef idx="1">
-              <a:schemeClr val="accent1"/>
-            </a:effectRef>
-            <a:fontRef idx="minor">
+            </a:solidFill>
+          </a:ln>
+        </p:spPr>
+        <p:style>
+          <a:lnRef idx="2">
+            <a:schemeClr val="accent1"/>
+          </a:lnRef>
+          <a:fillRef idx="0">
+            <a:schemeClr val="accent1"/>
+          </a:fillRef>
+          <a:effectRef idx="1">
+            <a:schemeClr val="accent1"/>
+          </a:effectRef>
+          <a:fontRef idx="minor">
+            <a:schemeClr val="tx1"/>
+          </a:fontRef>
+        </p:style>
+        <p:txBody>
+          <a:bodyPr rtlCol="0" anchor="ctr"/>
+          <a:lstStyle/>
+          <a:p>
+            <a:pPr algn="ctr"/>
+            <a:endParaRPr lang="en-DK"/>
+          </a:p>
+        </p:txBody>
+      </p:sp>
+      <p:cxnSp>
+        <p:nvCxnSpPr>
+          <p:cNvPr id="58" name="Straight Connector 57">
+            <a:extLst>
+              <a:ext uri="{FF2B5EF4-FFF2-40B4-BE49-F238E27FC236}">
+                <a16:creationId xmlns:a16="http://schemas.microsoft.com/office/drawing/2014/main" id="{C4D171D6-6949-1705-A5E6-747689D5F3C2}"/>
+              </a:ext>
+            </a:extLst>
+          </p:cNvPr>
+          <p:cNvCxnSpPr>
+            <a:cxnSpLocks/>
+          </p:cNvCxnSpPr>
+          <p:nvPr/>
+        </p:nvCxnSpPr>
+        <p:spPr>
+          <a:xfrm flipH="1">
+            <a:off x="1087330" y="2214071"/>
+            <a:ext cx="2637082" cy="0"/>
+          </a:xfrm>
+          <a:prstGeom prst="line">
+            <a:avLst/>
+          </a:prstGeom>
+          <a:ln>
+            <a:solidFill>
               <a:schemeClr val="tx1"/>
-            </a:fontRef>
-          </p:style>
-          <p:txBody>
-            <a:bodyPr rtlCol="0" anchor="ctr"/>
-            <a:lstStyle/>
-            <a:p>
-              <a:pPr algn="ctr"/>
-              <a:endParaRPr lang="en-DK"/>
-            </a:p>
-          </p:txBody>
-        </p:sp>
-        <p:sp>
-          <p:nvSpPr>
-            <p:cNvPr id="54" name="Arc 53">
-              <a:extLst>
-                <a:ext uri="{FF2B5EF4-FFF2-40B4-BE49-F238E27FC236}">
-                  <a16:creationId xmlns:a16="http://schemas.microsoft.com/office/drawing/2014/main" id="{8EDD537F-2E69-ED7A-882B-BFB895C4C357}"/>
-                </a:ext>
-              </a:extLst>
-            </p:cNvPr>
-            <p:cNvSpPr/>
-            <p:nvPr/>
-          </p:nvSpPr>
-          <p:spPr>
-            <a:xfrm rot="2405634">
-              <a:off x="6255287" y="2555604"/>
-              <a:ext cx="2575264" cy="3371580"/>
-            </a:xfrm>
-            <a:prstGeom prst="arc">
-              <a:avLst/>
-            </a:prstGeom>
-            <a:ln>
-              <a:solidFill>
-                <a:schemeClr val="tx1"/>
-              </a:solidFill>
-            </a:ln>
-          </p:spPr>
-          <p:style>
-            <a:lnRef idx="2">
-              <a:schemeClr val="accent1"/>
-            </a:lnRef>
-            <a:fillRef idx="0">
-              <a:schemeClr val="accent1"/>
-            </a:fillRef>
-            <a:effectRef idx="1">
-              <a:schemeClr val="accent1"/>
-            </a:effectRef>
-            <a:fontRef idx="minor">
+            </a:solidFill>
+          </a:ln>
+        </p:spPr>
+        <p:style>
+          <a:lnRef idx="2">
+            <a:schemeClr val="accent1"/>
+          </a:lnRef>
+          <a:fillRef idx="0">
+            <a:schemeClr val="accent1"/>
+          </a:fillRef>
+          <a:effectRef idx="1">
+            <a:schemeClr val="accent1"/>
+          </a:effectRef>
+          <a:fontRef idx="minor">
+            <a:schemeClr val="tx1"/>
+          </a:fontRef>
+        </p:style>
+      </p:cxnSp>
+      <p:sp>
+        <p:nvSpPr>
+          <p:cNvPr id="59" name="TextBox 58">
+            <a:extLst>
+              <a:ext uri="{FF2B5EF4-FFF2-40B4-BE49-F238E27FC236}">
+                <a16:creationId xmlns:a16="http://schemas.microsoft.com/office/drawing/2014/main" id="{38EE5880-9407-2D28-6EA8-E3A405DED739}"/>
+              </a:ext>
+            </a:extLst>
+          </p:cNvPr>
+          <p:cNvSpPr txBox="1"/>
+          <p:nvPr/>
+        </p:nvSpPr>
+        <p:spPr>
+          <a:xfrm>
+            <a:off x="1806169" y="1914641"/>
+            <a:ext cx="2660583" cy="598271"/>
+          </a:xfrm>
+          <a:prstGeom prst="rect">
+            <a:avLst/>
+          </a:prstGeom>
+          <a:noFill/>
+          <a:ln>
+            <a:noFill/>
+          </a:ln>
+        </p:spPr>
+        <p:txBody>
+          <a:bodyPr wrap="square" rtlCol="0">
+            <a:spAutoFit/>
+          </a:bodyPr>
+          <a:lstStyle/>
+          <a:p>
+            <a:r>
+              <a:rPr lang="en-GB" dirty="0"/>
+              <a:t>Reactive </a:t>
+            </a:r>
+            <a:endParaRPr lang="en-DK" dirty="0"/>
+          </a:p>
+        </p:txBody>
+      </p:sp>
+      <p:cxnSp>
+        <p:nvCxnSpPr>
+          <p:cNvPr id="60" name="Straight Connector 59">
+            <a:extLst>
+              <a:ext uri="{FF2B5EF4-FFF2-40B4-BE49-F238E27FC236}">
+                <a16:creationId xmlns:a16="http://schemas.microsoft.com/office/drawing/2014/main" id="{DC00CBBF-B504-0FCF-2DC8-D1A02DCA97BD}"/>
+              </a:ext>
+            </a:extLst>
+          </p:cNvPr>
+          <p:cNvCxnSpPr>
+            <a:cxnSpLocks/>
+          </p:cNvCxnSpPr>
+          <p:nvPr/>
+        </p:nvCxnSpPr>
+        <p:spPr>
+          <a:xfrm flipH="1">
+            <a:off x="5322988" y="2215124"/>
+            <a:ext cx="2637082" cy="0"/>
+          </a:xfrm>
+          <a:prstGeom prst="line">
+            <a:avLst/>
+          </a:prstGeom>
+          <a:ln>
+            <a:solidFill>
               <a:schemeClr val="tx1"/>
-            </a:fontRef>
-          </p:style>
-          <p:txBody>
-            <a:bodyPr rtlCol="0" anchor="ctr"/>
-            <a:lstStyle/>
-            <a:p>
-              <a:pPr algn="ctr"/>
-              <a:endParaRPr lang="en-DK"/>
-            </a:p>
-          </p:txBody>
-        </p:sp>
-        <p:sp>
-          <p:nvSpPr>
-            <p:cNvPr id="55" name="Arc 54">
-              <a:extLst>
-                <a:ext uri="{FF2B5EF4-FFF2-40B4-BE49-F238E27FC236}">
-                  <a16:creationId xmlns:a16="http://schemas.microsoft.com/office/drawing/2014/main" id="{12AB2B52-0938-E6D5-CD3D-16E7C6AE32B8}"/>
-                </a:ext>
-              </a:extLst>
-            </p:cNvPr>
-            <p:cNvSpPr/>
-            <p:nvPr/>
-          </p:nvSpPr>
-          <p:spPr>
-            <a:xfrm rot="2405634">
-              <a:off x="6334401" y="2153761"/>
-              <a:ext cx="3358574" cy="3956869"/>
-            </a:xfrm>
-            <a:prstGeom prst="arc">
-              <a:avLst/>
-            </a:prstGeom>
-            <a:ln>
-              <a:solidFill>
-                <a:schemeClr val="tx1"/>
-              </a:solidFill>
-            </a:ln>
-          </p:spPr>
-          <p:style>
-            <a:lnRef idx="2">
-              <a:schemeClr val="accent1"/>
-            </a:lnRef>
-            <a:fillRef idx="0">
-              <a:schemeClr val="accent1"/>
-            </a:fillRef>
-            <a:effectRef idx="1">
-              <a:schemeClr val="accent1"/>
-            </a:effectRef>
-            <a:fontRef idx="minor">
+            </a:solidFill>
+          </a:ln>
+        </p:spPr>
+        <p:style>
+          <a:lnRef idx="2">
+            <a:schemeClr val="accent1"/>
+          </a:lnRef>
+          <a:fillRef idx="0">
+            <a:schemeClr val="accent1"/>
+          </a:fillRef>
+          <a:effectRef idx="1">
+            <a:schemeClr val="accent1"/>
+          </a:effectRef>
+          <a:fontRef idx="minor">
+            <a:schemeClr val="tx1"/>
+          </a:fontRef>
+        </p:style>
+      </p:cxnSp>
+      <p:sp>
+        <p:nvSpPr>
+          <p:cNvPr id="61" name="TextBox 60">
+            <a:extLst>
+              <a:ext uri="{FF2B5EF4-FFF2-40B4-BE49-F238E27FC236}">
+                <a16:creationId xmlns:a16="http://schemas.microsoft.com/office/drawing/2014/main" id="{58D10D5C-E9A9-AB0B-BE82-D0C8193FC545}"/>
+              </a:ext>
+            </a:extLst>
+          </p:cNvPr>
+          <p:cNvSpPr txBox="1"/>
+          <p:nvPr/>
+        </p:nvSpPr>
+        <p:spPr>
+          <a:xfrm>
+            <a:off x="5658987" y="1855814"/>
+            <a:ext cx="3268223" cy="598271"/>
+          </a:xfrm>
+          <a:prstGeom prst="rect">
+            <a:avLst/>
+          </a:prstGeom>
+          <a:noFill/>
+          <a:ln>
+            <a:noFill/>
+          </a:ln>
+        </p:spPr>
+        <p:txBody>
+          <a:bodyPr wrap="square" rtlCol="0">
+            <a:spAutoFit/>
+          </a:bodyPr>
+          <a:lstStyle/>
+          <a:p>
+            <a:r>
+              <a:rPr lang="en-GB" dirty="0"/>
+              <a:t>Radiated (Fresnel) </a:t>
+            </a:r>
+            <a:endParaRPr lang="en-DK" dirty="0"/>
+          </a:p>
+        </p:txBody>
+      </p:sp>
+      <p:cxnSp>
+        <p:nvCxnSpPr>
+          <p:cNvPr id="62" name="Straight Connector 61">
+            <a:extLst>
+              <a:ext uri="{FF2B5EF4-FFF2-40B4-BE49-F238E27FC236}">
+                <a16:creationId xmlns:a16="http://schemas.microsoft.com/office/drawing/2014/main" id="{FA06EBF4-DB2E-C38B-B454-CEB5A7F35FBE}"/>
+              </a:ext>
+            </a:extLst>
+          </p:cNvPr>
+          <p:cNvCxnSpPr>
+            <a:cxnSpLocks/>
+          </p:cNvCxnSpPr>
+          <p:nvPr/>
+        </p:nvCxnSpPr>
+        <p:spPr>
+          <a:xfrm flipH="1">
+            <a:off x="1087330" y="1035272"/>
+            <a:ext cx="7618730" cy="0"/>
+          </a:xfrm>
+          <a:prstGeom prst="line">
+            <a:avLst/>
+          </a:prstGeom>
+          <a:ln>
+            <a:solidFill>
               <a:schemeClr val="tx1"/>
-            </a:fontRef>
-          </p:style>
-          <p:txBody>
-            <a:bodyPr rtlCol="0" anchor="ctr"/>
-            <a:lstStyle/>
-            <a:p>
-              <a:pPr algn="ctr"/>
-              <a:endParaRPr lang="en-DK"/>
-            </a:p>
-          </p:txBody>
-        </p:sp>
-        <p:cxnSp>
-          <p:nvCxnSpPr>
-            <p:cNvPr id="58" name="Straight Connector 57">
-              <a:extLst>
-                <a:ext uri="{FF2B5EF4-FFF2-40B4-BE49-F238E27FC236}">
-                  <a16:creationId xmlns:a16="http://schemas.microsoft.com/office/drawing/2014/main" id="{C4D171D6-6949-1705-A5E6-747689D5F3C2}"/>
-                </a:ext>
-              </a:extLst>
-            </p:cNvPr>
-            <p:cNvCxnSpPr>
-              <a:cxnSpLocks/>
-            </p:cNvCxnSpPr>
-            <p:nvPr/>
-          </p:nvCxnSpPr>
-          <p:spPr>
-            <a:xfrm flipH="1">
-              <a:off x="1948516" y="2195015"/>
-              <a:ext cx="2735241" cy="0"/>
-            </a:xfrm>
-            <a:prstGeom prst="line">
-              <a:avLst/>
-            </a:prstGeom>
-            <a:ln>
-              <a:solidFill>
-                <a:schemeClr val="tx1"/>
-              </a:solidFill>
-            </a:ln>
-          </p:spPr>
-          <p:style>
-            <a:lnRef idx="2">
-              <a:schemeClr val="accent1"/>
-            </a:lnRef>
-            <a:fillRef idx="0">
-              <a:schemeClr val="accent1"/>
-            </a:fillRef>
-            <a:effectRef idx="1">
-              <a:schemeClr val="accent1"/>
-            </a:effectRef>
-            <a:fontRef idx="minor">
+            </a:solidFill>
+          </a:ln>
+        </p:spPr>
+        <p:style>
+          <a:lnRef idx="2">
+            <a:schemeClr val="accent1"/>
+          </a:lnRef>
+          <a:fillRef idx="0">
+            <a:schemeClr val="accent1"/>
+          </a:fillRef>
+          <a:effectRef idx="1">
+            <a:schemeClr val="accent1"/>
+          </a:effectRef>
+          <a:fontRef idx="minor">
+            <a:schemeClr val="tx1"/>
+          </a:fontRef>
+        </p:style>
+      </p:cxnSp>
+      <p:sp>
+        <p:nvSpPr>
+          <p:cNvPr id="64" name="TextBox 63">
+            <a:extLst>
+              <a:ext uri="{FF2B5EF4-FFF2-40B4-BE49-F238E27FC236}">
+                <a16:creationId xmlns:a16="http://schemas.microsoft.com/office/drawing/2014/main" id="{95FCFB0D-0000-96C2-7F91-DE409DFB5DAA}"/>
+              </a:ext>
+            </a:extLst>
+          </p:cNvPr>
+          <p:cNvSpPr txBox="1"/>
+          <p:nvPr/>
+        </p:nvSpPr>
+        <p:spPr>
+          <a:xfrm>
+            <a:off x="4269760" y="721067"/>
+            <a:ext cx="3268223" cy="598271"/>
+          </a:xfrm>
+          <a:prstGeom prst="rect">
+            <a:avLst/>
+          </a:prstGeom>
+          <a:noFill/>
+          <a:ln>
+            <a:noFill/>
+          </a:ln>
+        </p:spPr>
+        <p:txBody>
+          <a:bodyPr wrap="square" rtlCol="0">
+            <a:spAutoFit/>
+          </a:bodyPr>
+          <a:lstStyle/>
+          <a:p>
+            <a:r>
+              <a:rPr lang="en-GB" dirty="0"/>
+              <a:t>Near Field</a:t>
+            </a:r>
+            <a:endParaRPr lang="en-DK" dirty="0"/>
+          </a:p>
+        </p:txBody>
+      </p:sp>
+      <p:cxnSp>
+        <p:nvCxnSpPr>
+          <p:cNvPr id="66" name="Straight Connector 65">
+            <a:extLst>
+              <a:ext uri="{FF2B5EF4-FFF2-40B4-BE49-F238E27FC236}">
+                <a16:creationId xmlns:a16="http://schemas.microsoft.com/office/drawing/2014/main" id="{E916ED53-94A6-4488-6531-80AAAA091B8D}"/>
+              </a:ext>
+            </a:extLst>
+          </p:cNvPr>
+          <p:cNvCxnSpPr>
+            <a:cxnSpLocks/>
+          </p:cNvCxnSpPr>
+          <p:nvPr/>
+        </p:nvCxnSpPr>
+        <p:spPr>
+          <a:xfrm flipH="1">
+            <a:off x="9644332" y="1033341"/>
+            <a:ext cx="2331110" cy="0"/>
+          </a:xfrm>
+          <a:prstGeom prst="line">
+            <a:avLst/>
+          </a:prstGeom>
+          <a:ln>
+            <a:solidFill>
               <a:schemeClr val="tx1"/>
-            </a:fontRef>
-          </p:style>
-        </p:cxnSp>
-        <p:sp>
-          <p:nvSpPr>
-            <p:cNvPr id="59" name="TextBox 58">
-              <a:extLst>
-                <a:ext uri="{FF2B5EF4-FFF2-40B4-BE49-F238E27FC236}">
-                  <a16:creationId xmlns:a16="http://schemas.microsoft.com/office/drawing/2014/main" id="{38EE5880-9407-2D28-6EA8-E3A405DED739}"/>
-                </a:ext>
-              </a:extLst>
-            </p:cNvPr>
-            <p:cNvSpPr txBox="1"/>
-            <p:nvPr/>
-          </p:nvSpPr>
-          <p:spPr>
-            <a:xfrm>
-              <a:off x="2694112" y="1843563"/>
-              <a:ext cx="2759617" cy="702214"/>
-            </a:xfrm>
-            <a:prstGeom prst="rect">
-              <a:avLst/>
-            </a:prstGeom>
+            </a:solidFill>
+          </a:ln>
+        </p:spPr>
+        <p:style>
+          <a:lnRef idx="2">
+            <a:schemeClr val="accent1"/>
+          </a:lnRef>
+          <a:fillRef idx="0">
+            <a:schemeClr val="accent1"/>
+          </a:fillRef>
+          <a:effectRef idx="1">
+            <a:schemeClr val="accent1"/>
+          </a:effectRef>
+          <a:fontRef idx="minor">
+            <a:schemeClr val="tx1"/>
+          </a:fontRef>
+        </p:style>
+      </p:cxnSp>
+      <p:sp>
+        <p:nvSpPr>
+          <p:cNvPr id="68" name="TextBox 67">
+            <a:extLst>
+              <a:ext uri="{FF2B5EF4-FFF2-40B4-BE49-F238E27FC236}">
+                <a16:creationId xmlns:a16="http://schemas.microsoft.com/office/drawing/2014/main" id="{B269728A-3272-0D9B-F61C-5412DA42143B}"/>
+              </a:ext>
+            </a:extLst>
+          </p:cNvPr>
+          <p:cNvSpPr txBox="1"/>
+          <p:nvPr/>
+        </p:nvSpPr>
+        <p:spPr>
+          <a:xfrm>
+            <a:off x="9650535" y="724820"/>
+            <a:ext cx="2324907" cy="369332"/>
+          </a:xfrm>
+          <a:prstGeom prst="rect">
+            <a:avLst/>
+          </a:prstGeom>
+          <a:noFill/>
+          <a:ln>
             <a:noFill/>
-            <a:ln>
-              <a:noFill/>
-            </a:ln>
-          </p:spPr>
-          <p:txBody>
-            <a:bodyPr wrap="square" rtlCol="0">
-              <a:spAutoFit/>
-            </a:bodyPr>
-            <a:lstStyle/>
-            <a:p>
-              <a:r>
-                <a:rPr lang="en-GB" dirty="0"/>
-                <a:t>Reactive </a:t>
-              </a:r>
-              <a:endParaRPr lang="en-DK" dirty="0"/>
-            </a:p>
-          </p:txBody>
-        </p:sp>
-        <p:cxnSp>
-          <p:nvCxnSpPr>
-            <p:cNvPr id="60" name="Straight Connector 59">
-              <a:extLst>
-                <a:ext uri="{FF2B5EF4-FFF2-40B4-BE49-F238E27FC236}">
-                  <a16:creationId xmlns:a16="http://schemas.microsoft.com/office/drawing/2014/main" id="{DC00CBBF-B504-0FCF-2DC8-D1A02DCA97BD}"/>
-                </a:ext>
-              </a:extLst>
-            </p:cNvPr>
-            <p:cNvCxnSpPr>
-              <a:cxnSpLocks/>
-            </p:cNvCxnSpPr>
-            <p:nvPr/>
-          </p:nvCxnSpPr>
-          <p:spPr>
-            <a:xfrm flipH="1">
-              <a:off x="5100449" y="2196251"/>
-              <a:ext cx="2735241" cy="0"/>
-            </a:xfrm>
-            <a:prstGeom prst="line">
-              <a:avLst/>
-            </a:prstGeom>
-            <a:ln>
-              <a:solidFill>
-                <a:schemeClr val="tx1"/>
-              </a:solidFill>
-            </a:ln>
-          </p:spPr>
-          <p:style>
-            <a:lnRef idx="2">
-              <a:schemeClr val="accent1"/>
-            </a:lnRef>
-            <a:fillRef idx="0">
-              <a:schemeClr val="accent1"/>
-            </a:fillRef>
-            <a:effectRef idx="1">
-              <a:schemeClr val="accent1"/>
-            </a:effectRef>
-            <a:fontRef idx="minor">
+          </a:ln>
+        </p:spPr>
+        <p:txBody>
+          <a:bodyPr wrap="square" rtlCol="0">
+            <a:spAutoFit/>
+          </a:bodyPr>
+          <a:lstStyle/>
+          <a:p>
+            <a:r>
+              <a:rPr lang="en-GB" dirty="0"/>
+              <a:t>Far Field (Fraunhofer)</a:t>
+            </a:r>
+            <a:endParaRPr lang="en-DK" dirty="0"/>
+          </a:p>
+        </p:txBody>
+      </p:sp>
+      <p:cxnSp>
+        <p:nvCxnSpPr>
+          <p:cNvPr id="76" name="Straight Connector 75">
+            <a:extLst>
+              <a:ext uri="{FF2B5EF4-FFF2-40B4-BE49-F238E27FC236}">
+                <a16:creationId xmlns:a16="http://schemas.microsoft.com/office/drawing/2014/main" id="{C96ABAD9-1C8E-6313-CC29-C7AA6CFDB524}"/>
+              </a:ext>
+            </a:extLst>
+          </p:cNvPr>
+          <p:cNvCxnSpPr>
+            <a:cxnSpLocks/>
+          </p:cNvCxnSpPr>
+          <p:nvPr/>
+        </p:nvCxnSpPr>
+        <p:spPr>
+          <a:xfrm>
+            <a:off x="8706060" y="2241716"/>
+            <a:ext cx="0" cy="2849302"/>
+          </a:xfrm>
+          <a:prstGeom prst="line">
+            <a:avLst/>
+          </a:prstGeom>
+          <a:ln w="19050" cap="flat" cmpd="sng" algn="ctr">
+            <a:solidFill>
               <a:schemeClr val="tx1"/>
-            </a:fontRef>
-          </p:style>
-        </p:cxnSp>
-        <p:sp>
-          <p:nvSpPr>
-            <p:cNvPr id="61" name="TextBox 60">
-              <a:extLst>
-                <a:ext uri="{FF2B5EF4-FFF2-40B4-BE49-F238E27FC236}">
-                  <a16:creationId xmlns:a16="http://schemas.microsoft.com/office/drawing/2014/main" id="{58D10D5C-E9A9-AB0B-BE82-D0C8193FC545}"/>
-                </a:ext>
-              </a:extLst>
-            </p:cNvPr>
-            <p:cNvSpPr txBox="1"/>
-            <p:nvPr/>
-          </p:nvSpPr>
-          <p:spPr>
-            <a:xfrm>
-              <a:off x="5419088" y="1843563"/>
-              <a:ext cx="3389874" cy="702214"/>
-            </a:xfrm>
-            <a:prstGeom prst="rect">
-              <a:avLst/>
-            </a:prstGeom>
+            </a:solidFill>
+            <a:prstDash val="dash"/>
+            <a:round/>
+            <a:headEnd type="none" w="med" len="med"/>
+            <a:tailEnd type="none" w="med" len="med"/>
+          </a:ln>
+        </p:spPr>
+        <p:style>
+          <a:lnRef idx="0">
+            <a:scrgbClr r="0" g="0" b="0"/>
+          </a:lnRef>
+          <a:fillRef idx="0">
+            <a:scrgbClr r="0" g="0" b="0"/>
+          </a:fillRef>
+          <a:effectRef idx="0">
+            <a:scrgbClr r="0" g="0" b="0"/>
+          </a:effectRef>
+          <a:fontRef idx="minor">
+            <a:schemeClr val="tx1"/>
+          </a:fontRef>
+        </p:style>
+      </p:cxnSp>
+      <p:sp>
+        <p:nvSpPr>
+          <p:cNvPr id="77" name="TextBox 76">
+            <a:extLst>
+              <a:ext uri="{FF2B5EF4-FFF2-40B4-BE49-F238E27FC236}">
+                <a16:creationId xmlns:a16="http://schemas.microsoft.com/office/drawing/2014/main" id="{F9194DF2-B13C-BA84-2E3F-4497EE789F50}"/>
+              </a:ext>
+            </a:extLst>
+          </p:cNvPr>
+          <p:cNvSpPr txBox="1"/>
+          <p:nvPr/>
+        </p:nvSpPr>
+        <p:spPr>
+          <a:xfrm>
+            <a:off x="72294" y="2612829"/>
+            <a:ext cx="2660583" cy="598271"/>
+          </a:xfrm>
+          <a:prstGeom prst="rect">
+            <a:avLst/>
+          </a:prstGeom>
+          <a:noFill/>
+          <a:ln>
             <a:noFill/>
-            <a:ln>
-              <a:noFill/>
-            </a:ln>
-          </p:spPr>
-          <p:txBody>
-            <a:bodyPr wrap="square" rtlCol="0">
-              <a:spAutoFit/>
-            </a:bodyPr>
-            <a:lstStyle/>
-            <a:p>
-              <a:r>
-                <a:rPr lang="en-GB" dirty="0"/>
-                <a:t>Radiated (Fresnel) </a:t>
-              </a:r>
-              <a:endParaRPr lang="en-DK" dirty="0"/>
-            </a:p>
-          </p:txBody>
-        </p:sp>
-        <p:cxnSp>
-          <p:nvCxnSpPr>
-            <p:cNvPr id="62" name="Straight Connector 61">
-              <a:extLst>
-                <a:ext uri="{FF2B5EF4-FFF2-40B4-BE49-F238E27FC236}">
-                  <a16:creationId xmlns:a16="http://schemas.microsoft.com/office/drawing/2014/main" id="{FA06EBF4-DB2E-C38B-B454-CEB5A7F35FBE}"/>
-                </a:ext>
-              </a:extLst>
-            </p:cNvPr>
-            <p:cNvCxnSpPr>
-              <a:cxnSpLocks/>
-            </p:cNvCxnSpPr>
-            <p:nvPr/>
-          </p:nvCxnSpPr>
-          <p:spPr>
-            <a:xfrm flipH="1">
-              <a:off x="1948516" y="811414"/>
-              <a:ext cx="5952630" cy="0"/>
-            </a:xfrm>
-            <a:prstGeom prst="line">
-              <a:avLst/>
-            </a:prstGeom>
-            <a:ln>
-              <a:solidFill>
-                <a:schemeClr val="tx1"/>
-              </a:solidFill>
-            </a:ln>
-          </p:spPr>
-          <p:style>
-            <a:lnRef idx="2">
-              <a:schemeClr val="accent1"/>
-            </a:lnRef>
-            <a:fillRef idx="0">
-              <a:schemeClr val="accent1"/>
-            </a:fillRef>
-            <a:effectRef idx="1">
-              <a:schemeClr val="accent1"/>
-            </a:effectRef>
-            <a:fontRef idx="minor">
+          </a:ln>
+        </p:spPr>
+        <p:txBody>
+          <a:bodyPr wrap="square" rtlCol="0">
+            <a:spAutoFit/>
+          </a:bodyPr>
+          <a:lstStyle/>
+          <a:p>
+            <a:r>
+              <a:rPr lang="en-GB" dirty="0"/>
+              <a:t>Antenna </a:t>
+            </a:r>
+            <a:endParaRPr lang="en-DK" dirty="0"/>
+          </a:p>
+        </p:txBody>
+      </p:sp>
+      <p:sp>
+        <p:nvSpPr>
+          <p:cNvPr id="69" name="Arc 68">
+            <a:extLst>
+              <a:ext uri="{FF2B5EF4-FFF2-40B4-BE49-F238E27FC236}">
+                <a16:creationId xmlns:a16="http://schemas.microsoft.com/office/drawing/2014/main" id="{C77FCEA9-E586-325E-8EC9-D8A21F4F9788}"/>
+              </a:ext>
+            </a:extLst>
+          </p:cNvPr>
+          <p:cNvSpPr/>
+          <p:nvPr/>
+        </p:nvSpPr>
+        <p:spPr>
+          <a:xfrm rot="2405634">
+            <a:off x="8899796" y="2990546"/>
+            <a:ext cx="1392469" cy="1612984"/>
+          </a:xfrm>
+          <a:prstGeom prst="arc">
+            <a:avLst/>
+          </a:prstGeom>
+          <a:ln>
+            <a:solidFill>
               <a:schemeClr val="tx1"/>
-            </a:fontRef>
-          </p:style>
-        </p:cxnSp>
-        <p:sp>
-          <p:nvSpPr>
-            <p:cNvPr id="64" name="TextBox 63">
-              <a:extLst>
-                <a:ext uri="{FF2B5EF4-FFF2-40B4-BE49-F238E27FC236}">
-                  <a16:creationId xmlns:a16="http://schemas.microsoft.com/office/drawing/2014/main" id="{95FCFB0D-0000-96C2-7F91-DE409DFB5DAA}"/>
-                </a:ext>
-              </a:extLst>
-            </p:cNvPr>
-            <p:cNvSpPr txBox="1"/>
-            <p:nvPr/>
-          </p:nvSpPr>
-          <p:spPr>
-            <a:xfrm>
-              <a:off x="4291961" y="463782"/>
-              <a:ext cx="3389874" cy="702214"/>
-            </a:xfrm>
-            <a:prstGeom prst="rect">
-              <a:avLst/>
-            </a:prstGeom>
-            <a:noFill/>
-            <a:ln>
-              <a:noFill/>
-            </a:ln>
-          </p:spPr>
-          <p:txBody>
-            <a:bodyPr wrap="square" rtlCol="0">
-              <a:spAutoFit/>
-            </a:bodyPr>
-            <a:lstStyle/>
-            <a:p>
-              <a:r>
-                <a:rPr lang="en-GB" dirty="0"/>
-                <a:t>Near Field</a:t>
-              </a:r>
-              <a:endParaRPr lang="en-DK" dirty="0"/>
-            </a:p>
-          </p:txBody>
-        </p:sp>
-        <p:cxnSp>
-          <p:nvCxnSpPr>
-            <p:cNvPr id="66" name="Straight Connector 65">
-              <a:extLst>
-                <a:ext uri="{FF2B5EF4-FFF2-40B4-BE49-F238E27FC236}">
-                  <a16:creationId xmlns:a16="http://schemas.microsoft.com/office/drawing/2014/main" id="{E916ED53-94A6-4488-6531-80AAAA091B8D}"/>
-                </a:ext>
-              </a:extLst>
-            </p:cNvPr>
-            <p:cNvCxnSpPr>
-              <a:cxnSpLocks/>
-            </p:cNvCxnSpPr>
-            <p:nvPr/>
-          </p:nvCxnSpPr>
-          <p:spPr>
-            <a:xfrm flipH="1">
-              <a:off x="8230703" y="809149"/>
-              <a:ext cx="2694472" cy="0"/>
-            </a:xfrm>
-            <a:prstGeom prst="line">
-              <a:avLst/>
-            </a:prstGeom>
-            <a:ln>
-              <a:solidFill>
-                <a:schemeClr val="tx1"/>
-              </a:solidFill>
-            </a:ln>
-          </p:spPr>
-          <p:style>
-            <a:lnRef idx="2">
-              <a:schemeClr val="accent1"/>
-            </a:lnRef>
-            <a:fillRef idx="0">
-              <a:schemeClr val="accent1"/>
-            </a:fillRef>
-            <a:effectRef idx="1">
-              <a:schemeClr val="accent1"/>
-            </a:effectRef>
-            <a:fontRef idx="minor">
+            </a:solidFill>
+          </a:ln>
+        </p:spPr>
+        <p:style>
+          <a:lnRef idx="2">
+            <a:schemeClr val="accent1"/>
+          </a:lnRef>
+          <a:fillRef idx="0">
+            <a:schemeClr val="accent1"/>
+          </a:fillRef>
+          <a:effectRef idx="1">
+            <a:schemeClr val="accent1"/>
+          </a:effectRef>
+          <a:fontRef idx="minor">
+            <a:schemeClr val="tx1"/>
+          </a:fontRef>
+        </p:style>
+        <p:txBody>
+          <a:bodyPr rtlCol="0" anchor="ctr"/>
+          <a:lstStyle/>
+          <a:p>
+            <a:pPr algn="ctr"/>
+            <a:endParaRPr lang="en-DK"/>
+          </a:p>
+        </p:txBody>
+      </p:sp>
+      <p:sp>
+        <p:nvSpPr>
+          <p:cNvPr id="70" name="Arc 69">
+            <a:extLst>
+              <a:ext uri="{FF2B5EF4-FFF2-40B4-BE49-F238E27FC236}">
+                <a16:creationId xmlns:a16="http://schemas.microsoft.com/office/drawing/2014/main" id="{70F2A0A2-7D4A-592A-D45E-192C35CFB945}"/>
+              </a:ext>
+            </a:extLst>
+          </p:cNvPr>
+          <p:cNvSpPr/>
+          <p:nvPr/>
+        </p:nvSpPr>
+        <p:spPr>
+          <a:xfrm rot="2575157">
+            <a:off x="8823586" y="2773174"/>
+            <a:ext cx="1929280" cy="2072246"/>
+          </a:xfrm>
+          <a:prstGeom prst="arc">
+            <a:avLst/>
+          </a:prstGeom>
+          <a:ln>
+            <a:solidFill>
               <a:schemeClr val="tx1"/>
-            </a:fontRef>
-          </p:style>
-        </p:cxnSp>
-        <p:sp>
-          <p:nvSpPr>
-            <p:cNvPr id="68" name="TextBox 67">
-              <a:extLst>
-                <a:ext uri="{FF2B5EF4-FFF2-40B4-BE49-F238E27FC236}">
-                  <a16:creationId xmlns:a16="http://schemas.microsoft.com/office/drawing/2014/main" id="{B269728A-3272-0D9B-F61C-5412DA42143B}"/>
-                </a:ext>
-              </a:extLst>
-            </p:cNvPr>
-            <p:cNvSpPr txBox="1"/>
-            <p:nvPr/>
-          </p:nvSpPr>
-          <p:spPr>
-            <a:xfrm>
-              <a:off x="8513729" y="467627"/>
-              <a:ext cx="2411446" cy="433499"/>
-            </a:xfrm>
-            <a:prstGeom prst="rect">
-              <a:avLst/>
-            </a:prstGeom>
-            <a:noFill/>
-            <a:ln>
-              <a:noFill/>
-            </a:ln>
-          </p:spPr>
-          <p:txBody>
-            <a:bodyPr wrap="square" rtlCol="0">
-              <a:spAutoFit/>
-            </a:bodyPr>
-            <a:lstStyle/>
-            <a:p>
-              <a:r>
-                <a:rPr lang="en-GB" dirty="0"/>
-                <a:t>Far Field (Fraunhofer)</a:t>
-              </a:r>
-              <a:endParaRPr lang="en-DK" dirty="0"/>
-            </a:p>
-          </p:txBody>
-        </p:sp>
-        <p:cxnSp>
-          <p:nvCxnSpPr>
-            <p:cNvPr id="76" name="Straight Connector 75">
-              <a:extLst>
-                <a:ext uri="{FF2B5EF4-FFF2-40B4-BE49-F238E27FC236}">
-                  <a16:creationId xmlns:a16="http://schemas.microsoft.com/office/drawing/2014/main" id="{C96ABAD9-1C8E-6313-CC29-C7AA6CFDB524}"/>
-                </a:ext>
-              </a:extLst>
-            </p:cNvPr>
-            <p:cNvCxnSpPr>
-              <a:cxnSpLocks/>
-            </p:cNvCxnSpPr>
-            <p:nvPr/>
-          </p:nvCxnSpPr>
-          <p:spPr>
-            <a:xfrm>
-              <a:off x="8114352" y="2218265"/>
-              <a:ext cx="0" cy="3344335"/>
-            </a:xfrm>
-            <a:prstGeom prst="line">
-              <a:avLst/>
-            </a:prstGeom>
-            <a:ln w="19050" cap="flat" cmpd="sng" algn="ctr">
-              <a:solidFill>
-                <a:schemeClr val="tx1"/>
-              </a:solidFill>
-              <a:prstDash val="dash"/>
-              <a:round/>
-              <a:headEnd type="none" w="med" len="med"/>
-              <a:tailEnd type="none" w="med" len="med"/>
-            </a:ln>
-          </p:spPr>
-          <p:style>
-            <a:lnRef idx="0">
-              <a:scrgbClr r="0" g="0" b="0"/>
-            </a:lnRef>
-            <a:fillRef idx="0">
-              <a:scrgbClr r="0" g="0" b="0"/>
-            </a:fillRef>
-            <a:effectRef idx="0">
-              <a:scrgbClr r="0" g="0" b="0"/>
-            </a:effectRef>
-            <a:fontRef idx="minor">
+            </a:solidFill>
+          </a:ln>
+        </p:spPr>
+        <p:style>
+          <a:lnRef idx="2">
+            <a:schemeClr val="accent1"/>
+          </a:lnRef>
+          <a:fillRef idx="0">
+            <a:schemeClr val="accent1"/>
+          </a:fillRef>
+          <a:effectRef idx="1">
+            <a:schemeClr val="accent1"/>
+          </a:effectRef>
+          <a:fontRef idx="minor">
+            <a:schemeClr val="tx1"/>
+          </a:fontRef>
+        </p:style>
+        <p:txBody>
+          <a:bodyPr rtlCol="0" anchor="ctr"/>
+          <a:lstStyle/>
+          <a:p>
+            <a:pPr algn="ctr"/>
+            <a:endParaRPr lang="en-DK"/>
+          </a:p>
+        </p:txBody>
+      </p:sp>
+      <p:sp>
+        <p:nvSpPr>
+          <p:cNvPr id="71" name="Arc 70">
+            <a:extLst>
+              <a:ext uri="{FF2B5EF4-FFF2-40B4-BE49-F238E27FC236}">
+                <a16:creationId xmlns:a16="http://schemas.microsoft.com/office/drawing/2014/main" id="{5470007E-99B7-1346-FB02-420C664C6093}"/>
+              </a:ext>
+            </a:extLst>
+          </p:cNvPr>
+          <p:cNvSpPr/>
+          <p:nvPr/>
+        </p:nvSpPr>
+        <p:spPr>
+          <a:xfrm rot="2643055">
+            <a:off x="8761547" y="2558015"/>
+            <a:ext cx="2428095" cy="2445236"/>
+          </a:xfrm>
+          <a:prstGeom prst="arc">
+            <a:avLst/>
+          </a:prstGeom>
+          <a:ln>
+            <a:solidFill>
               <a:schemeClr val="tx1"/>
-            </a:fontRef>
-          </p:style>
-        </p:cxnSp>
-        <p:sp>
-          <p:nvSpPr>
-            <p:cNvPr id="77" name="TextBox 76">
-              <a:extLst>
-                <a:ext uri="{FF2B5EF4-FFF2-40B4-BE49-F238E27FC236}">
-                  <a16:creationId xmlns:a16="http://schemas.microsoft.com/office/drawing/2014/main" id="{F9194DF2-B13C-BA84-2E3F-4497EE789F50}"/>
-                </a:ext>
-              </a:extLst>
-            </p:cNvPr>
-            <p:cNvSpPr txBox="1"/>
-            <p:nvPr/>
-          </p:nvSpPr>
-          <p:spPr>
-            <a:xfrm>
-              <a:off x="314780" y="2665319"/>
-              <a:ext cx="2759617" cy="702214"/>
-            </a:xfrm>
-            <a:prstGeom prst="rect">
-              <a:avLst/>
-            </a:prstGeom>
-            <a:noFill/>
-            <a:ln>
-              <a:noFill/>
-            </a:ln>
-          </p:spPr>
-          <p:txBody>
-            <a:bodyPr wrap="square" rtlCol="0">
-              <a:spAutoFit/>
-            </a:bodyPr>
-            <a:lstStyle/>
-            <a:p>
-              <a:r>
-                <a:rPr lang="en-GB" dirty="0"/>
-                <a:t>Antenna </a:t>
-              </a:r>
-              <a:endParaRPr lang="en-DK" dirty="0"/>
-            </a:p>
-          </p:txBody>
-        </p:sp>
-      </p:grpSp>
+            </a:solidFill>
+          </a:ln>
+        </p:spPr>
+        <p:style>
+          <a:lnRef idx="2">
+            <a:schemeClr val="accent1"/>
+          </a:lnRef>
+          <a:fillRef idx="0">
+            <a:schemeClr val="accent1"/>
+          </a:fillRef>
+          <a:effectRef idx="1">
+            <a:schemeClr val="accent1"/>
+          </a:effectRef>
+          <a:fontRef idx="minor">
+            <a:schemeClr val="tx1"/>
+          </a:fontRef>
+        </p:style>
+        <p:txBody>
+          <a:bodyPr rtlCol="0" anchor="ctr"/>
+          <a:lstStyle/>
+          <a:p>
+            <a:pPr algn="ctr"/>
+            <a:endParaRPr lang="en-DK"/>
+          </a:p>
+        </p:txBody>
+      </p:sp>
+      <p:pic>
+        <p:nvPicPr>
+          <p:cNvPr id="78" name="Picture 77" descr="A black background with a black square&#10;&#10;Description automatically generated with medium confidence">
+            <a:extLst>
+              <a:ext uri="{FF2B5EF4-FFF2-40B4-BE49-F238E27FC236}">
+                <a16:creationId xmlns:a16="http://schemas.microsoft.com/office/drawing/2014/main" id="{5C1F6A40-05A2-DE67-7AAB-64443199729D}"/>
+              </a:ext>
+            </a:extLst>
+          </p:cNvPr>
+          <p:cNvPicPr>
+            <a:picLocks noChangeAspect="1"/>
+          </p:cNvPicPr>
+          <p:nvPr/>
+        </p:nvPicPr>
+        <p:blipFill>
+          <a:blip r:embed="rId2">
+            <a:extLst>
+              <a:ext uri="{28A0092B-C50C-407E-A947-70E740481C1C}">
+                <a14:useLocalDpi xmlns:a14="http://schemas.microsoft.com/office/drawing/2010/main" val="0"/>
+              </a:ext>
+            </a:extLst>
+          </a:blip>
+          <a:stretch>
+            <a:fillRect/>
+          </a:stretch>
+        </p:blipFill>
+        <p:spPr>
+          <a:xfrm>
+            <a:off x="7995410" y="1748600"/>
+            <a:ext cx="1695813" cy="462746"/>
+          </a:xfrm>
+          <a:prstGeom prst="rect">
+            <a:avLst/>
+          </a:prstGeom>
+        </p:spPr>
+      </p:pic>
+      <p:pic>
+        <p:nvPicPr>
+          <p:cNvPr id="80" name="Picture 79" descr="A black background with a black square&#10;&#10;Description automatically generated with medium confidence">
+            <a:extLst>
+              <a:ext uri="{FF2B5EF4-FFF2-40B4-BE49-F238E27FC236}">
+                <a16:creationId xmlns:a16="http://schemas.microsoft.com/office/drawing/2014/main" id="{E25082CC-AE1D-3F5A-5C29-E9C7DCC8BD86}"/>
+              </a:ext>
+            </a:extLst>
+          </p:cNvPr>
+          <p:cNvPicPr>
+            <a:picLocks noChangeAspect="1"/>
+          </p:cNvPicPr>
+          <p:nvPr/>
+        </p:nvPicPr>
+        <p:blipFill>
+          <a:blip r:embed="rId3">
+            <a:extLst>
+              <a:ext uri="{28A0092B-C50C-407E-A947-70E740481C1C}">
+                <a14:useLocalDpi xmlns:a14="http://schemas.microsoft.com/office/drawing/2010/main" val="0"/>
+              </a:ext>
+            </a:extLst>
+          </a:blip>
+          <a:stretch>
+            <a:fillRect/>
+          </a:stretch>
+        </p:blipFill>
+        <p:spPr>
+          <a:xfrm>
+            <a:off x="3204972" y="1699602"/>
+            <a:ext cx="2782020" cy="637315"/>
+          </a:xfrm>
+          <a:prstGeom prst="rect">
+            <a:avLst/>
+          </a:prstGeom>
+        </p:spPr>
+      </p:pic>
     </p:spTree>
     <p:extLst>
       <p:ext uri="{BB962C8B-B14F-4D97-AF65-F5344CB8AC3E}">

</xml_diff>

<commit_message>
nf ff regions figur opdateret igen
</commit_message>
<xml_diff>
--- a/Figures/TechnicalAnalysis/NFFF/nfFfRegions.pptx
+++ b/Figures/TechnicalAnalysis/NFFF/nfFfRegions.pptx
@@ -4943,45 +4943,6 @@
           </a:fontRef>
         </p:style>
       </p:cxnSp>
-      <p:sp>
-        <p:nvSpPr>
-          <p:cNvPr id="59" name="TextBox 58">
-            <a:extLst>
-              <a:ext uri="{FF2B5EF4-FFF2-40B4-BE49-F238E27FC236}">
-                <a16:creationId xmlns:a16="http://schemas.microsoft.com/office/drawing/2014/main" id="{38EE5880-9407-2D28-6EA8-E3A405DED739}"/>
-              </a:ext>
-            </a:extLst>
-          </p:cNvPr>
-          <p:cNvSpPr txBox="1"/>
-          <p:nvPr/>
-        </p:nvSpPr>
-        <p:spPr>
-          <a:xfrm>
-            <a:off x="1806169" y="1914641"/>
-            <a:ext cx="2660583" cy="598271"/>
-          </a:xfrm>
-          <a:prstGeom prst="rect">
-            <a:avLst/>
-          </a:prstGeom>
-          <a:noFill/>
-          <a:ln>
-            <a:noFill/>
-          </a:ln>
-        </p:spPr>
-        <p:txBody>
-          <a:bodyPr wrap="square" rtlCol="0">
-            <a:spAutoFit/>
-          </a:bodyPr>
-          <a:lstStyle/>
-          <a:p>
-            <a:r>
-              <a:rPr lang="en-GB" dirty="0"/>
-              <a:t>Reactive </a:t>
-            </a:r>
-            <a:endParaRPr lang="en-DK" dirty="0"/>
-          </a:p>
-        </p:txBody>
-      </p:sp>
       <p:cxnSp>
         <p:nvCxnSpPr>
           <p:cNvPr id="60" name="Straight Connector 59">
@@ -5025,45 +4986,6 @@
           </a:fontRef>
         </p:style>
       </p:cxnSp>
-      <p:sp>
-        <p:nvSpPr>
-          <p:cNvPr id="61" name="TextBox 60">
-            <a:extLst>
-              <a:ext uri="{FF2B5EF4-FFF2-40B4-BE49-F238E27FC236}">
-                <a16:creationId xmlns:a16="http://schemas.microsoft.com/office/drawing/2014/main" id="{58D10D5C-E9A9-AB0B-BE82-D0C8193FC545}"/>
-              </a:ext>
-            </a:extLst>
-          </p:cNvPr>
-          <p:cNvSpPr txBox="1"/>
-          <p:nvPr/>
-        </p:nvSpPr>
-        <p:spPr>
-          <a:xfrm>
-            <a:off x="5658987" y="1855814"/>
-            <a:ext cx="3268223" cy="598271"/>
-          </a:xfrm>
-          <a:prstGeom prst="rect">
-            <a:avLst/>
-          </a:prstGeom>
-          <a:noFill/>
-          <a:ln>
-            <a:noFill/>
-          </a:ln>
-        </p:spPr>
-        <p:txBody>
-          <a:bodyPr wrap="square" rtlCol="0">
-            <a:spAutoFit/>
-          </a:bodyPr>
-          <a:lstStyle/>
-          <a:p>
-            <a:r>
-              <a:rPr lang="en-GB" dirty="0"/>
-              <a:t>Radiated (Fresnel) </a:t>
-            </a:r>
-            <a:endParaRPr lang="en-DK" dirty="0"/>
-          </a:p>
-        </p:txBody>
-      </p:sp>
       <p:cxnSp>
         <p:nvCxnSpPr>
           <p:cNvPr id="62" name="Straight Connector 61">
@@ -5107,45 +5029,6 @@
           </a:fontRef>
         </p:style>
       </p:cxnSp>
-      <p:sp>
-        <p:nvSpPr>
-          <p:cNvPr id="64" name="TextBox 63">
-            <a:extLst>
-              <a:ext uri="{FF2B5EF4-FFF2-40B4-BE49-F238E27FC236}">
-                <a16:creationId xmlns:a16="http://schemas.microsoft.com/office/drawing/2014/main" id="{95FCFB0D-0000-96C2-7F91-DE409DFB5DAA}"/>
-              </a:ext>
-            </a:extLst>
-          </p:cNvPr>
-          <p:cNvSpPr txBox="1"/>
-          <p:nvPr/>
-        </p:nvSpPr>
-        <p:spPr>
-          <a:xfrm>
-            <a:off x="4269760" y="721067"/>
-            <a:ext cx="3268223" cy="598271"/>
-          </a:xfrm>
-          <a:prstGeom prst="rect">
-            <a:avLst/>
-          </a:prstGeom>
-          <a:noFill/>
-          <a:ln>
-            <a:noFill/>
-          </a:ln>
-        </p:spPr>
-        <p:txBody>
-          <a:bodyPr wrap="square" rtlCol="0">
-            <a:spAutoFit/>
-          </a:bodyPr>
-          <a:lstStyle/>
-          <a:p>
-            <a:r>
-              <a:rPr lang="en-GB" dirty="0"/>
-              <a:t>Near Field</a:t>
-            </a:r>
-            <a:endParaRPr lang="en-DK" dirty="0"/>
-          </a:p>
-        </p:txBody>
-      </p:sp>
       <p:cxnSp>
         <p:nvCxnSpPr>
           <p:cNvPr id="66" name="Straight Connector 65">
@@ -5189,45 +5072,6 @@
           </a:fontRef>
         </p:style>
       </p:cxnSp>
-      <p:sp>
-        <p:nvSpPr>
-          <p:cNvPr id="68" name="TextBox 67">
-            <a:extLst>
-              <a:ext uri="{FF2B5EF4-FFF2-40B4-BE49-F238E27FC236}">
-                <a16:creationId xmlns:a16="http://schemas.microsoft.com/office/drawing/2014/main" id="{B269728A-3272-0D9B-F61C-5412DA42143B}"/>
-              </a:ext>
-            </a:extLst>
-          </p:cNvPr>
-          <p:cNvSpPr txBox="1"/>
-          <p:nvPr/>
-        </p:nvSpPr>
-        <p:spPr>
-          <a:xfrm>
-            <a:off x="9650535" y="724820"/>
-            <a:ext cx="2324907" cy="369332"/>
-          </a:xfrm>
-          <a:prstGeom prst="rect">
-            <a:avLst/>
-          </a:prstGeom>
-          <a:noFill/>
-          <a:ln>
-            <a:noFill/>
-          </a:ln>
-        </p:spPr>
-        <p:txBody>
-          <a:bodyPr wrap="square" rtlCol="0">
-            <a:spAutoFit/>
-          </a:bodyPr>
-          <a:lstStyle/>
-          <a:p>
-            <a:r>
-              <a:rPr lang="en-GB" dirty="0"/>
-              <a:t>Far Field (Fraunhofer)</a:t>
-            </a:r>
-            <a:endParaRPr lang="en-DK" dirty="0"/>
-          </a:p>
-        </p:txBody>
-      </p:sp>
       <p:cxnSp>
         <p:nvCxnSpPr>
           <p:cNvPr id="76" name="Straight Connector 75">
@@ -5277,45 +5121,6 @@
       </p:cxnSp>
       <p:sp>
         <p:nvSpPr>
-          <p:cNvPr id="77" name="TextBox 76">
-            <a:extLst>
-              <a:ext uri="{FF2B5EF4-FFF2-40B4-BE49-F238E27FC236}">
-                <a16:creationId xmlns:a16="http://schemas.microsoft.com/office/drawing/2014/main" id="{F9194DF2-B13C-BA84-2E3F-4497EE789F50}"/>
-              </a:ext>
-            </a:extLst>
-          </p:cNvPr>
-          <p:cNvSpPr txBox="1"/>
-          <p:nvPr/>
-        </p:nvSpPr>
-        <p:spPr>
-          <a:xfrm>
-            <a:off x="72294" y="2612829"/>
-            <a:ext cx="2660583" cy="598271"/>
-          </a:xfrm>
-          <a:prstGeom prst="rect">
-            <a:avLst/>
-          </a:prstGeom>
-          <a:noFill/>
-          <a:ln>
-            <a:noFill/>
-          </a:ln>
-        </p:spPr>
-        <p:txBody>
-          <a:bodyPr wrap="square" rtlCol="0">
-            <a:spAutoFit/>
-          </a:bodyPr>
-          <a:lstStyle/>
-          <a:p>
-            <a:r>
-              <a:rPr lang="en-GB" dirty="0"/>
-              <a:t>Antenna </a:t>
-            </a:r>
-            <a:endParaRPr lang="en-DK" dirty="0"/>
-          </a:p>
-        </p:txBody>
-      </p:sp>
-      <p:sp>
-        <p:nvSpPr>
           <p:cNvPr id="69" name="Arc 68">
             <a:extLst>
               <a:ext uri="{FF2B5EF4-FFF2-40B4-BE49-F238E27FC236}">
@@ -5463,10 +5268,10 @@
       </p:sp>
       <p:pic>
         <p:nvPicPr>
-          <p:cNvPr id="78" name="Picture 77" descr="A black background with a black square&#10;&#10;Description automatically generated with medium confidence">
-            <a:extLst>
-              <a:ext uri="{FF2B5EF4-FFF2-40B4-BE49-F238E27FC236}">
-                <a16:creationId xmlns:a16="http://schemas.microsoft.com/office/drawing/2014/main" id="{5C1F6A40-05A2-DE67-7AAB-64443199729D}"/>
+          <p:cNvPr id="7" name="Picture 6" descr="A black background with a black square&#10;&#10;Description automatically generated with medium confidence">
+            <a:extLst>
+              <a:ext uri="{FF2B5EF4-FFF2-40B4-BE49-F238E27FC236}">
+                <a16:creationId xmlns:a16="http://schemas.microsoft.com/office/drawing/2014/main" id="{4F84509F-17EF-F5B5-4F2F-0779B70A522D}"/>
               </a:ext>
             </a:extLst>
           </p:cNvPr>
@@ -5489,8 +5294,8 @@
         </p:blipFill>
         <p:spPr>
           <a:xfrm>
-            <a:off x="7995410" y="1748600"/>
-            <a:ext cx="1695813" cy="462746"/>
+            <a:off x="3262297" y="1695063"/>
+            <a:ext cx="2782020" cy="637315"/>
           </a:xfrm>
           <a:prstGeom prst="rect">
             <a:avLst/>
@@ -5499,10 +5304,10 @@
       </p:pic>
       <p:pic>
         <p:nvPicPr>
-          <p:cNvPr id="80" name="Picture 79" descr="A black background with a black square&#10;&#10;Description automatically generated with medium confidence">
-            <a:extLst>
-              <a:ext uri="{FF2B5EF4-FFF2-40B4-BE49-F238E27FC236}">
-                <a16:creationId xmlns:a16="http://schemas.microsoft.com/office/drawing/2014/main" id="{E25082CC-AE1D-3F5A-5C29-E9C7DCC8BD86}"/>
+          <p:cNvPr id="11" name="Picture 10" descr="A black background with a black square&#10;&#10;Description automatically generated with medium confidence">
+            <a:extLst>
+              <a:ext uri="{FF2B5EF4-FFF2-40B4-BE49-F238E27FC236}">
+                <a16:creationId xmlns:a16="http://schemas.microsoft.com/office/drawing/2014/main" id="{3BEE0348-28C9-57B3-6992-EDC33166E696}"/>
               </a:ext>
             </a:extLst>
           </p:cNvPr>
@@ -5525,8 +5330,188 @@
         </p:blipFill>
         <p:spPr>
           <a:xfrm>
-            <a:off x="3204972" y="1699602"/>
-            <a:ext cx="2782020" cy="637315"/>
+            <a:off x="-7588" y="2623659"/>
+            <a:ext cx="2707204" cy="623461"/>
+          </a:xfrm>
+          <a:prstGeom prst="rect">
+            <a:avLst/>
+          </a:prstGeom>
+        </p:spPr>
+      </p:pic>
+      <p:pic>
+        <p:nvPicPr>
+          <p:cNvPr id="13" name="Picture 12" descr="A black background with a black square&#10;&#10;Description automatically generated with medium confidence">
+            <a:extLst>
+              <a:ext uri="{FF2B5EF4-FFF2-40B4-BE49-F238E27FC236}">
+                <a16:creationId xmlns:a16="http://schemas.microsoft.com/office/drawing/2014/main" id="{2080FCA2-D29D-1246-820B-57D37DD8C572}"/>
+              </a:ext>
+            </a:extLst>
+          </p:cNvPr>
+          <p:cNvPicPr>
+            <a:picLocks noChangeAspect="1"/>
+          </p:cNvPicPr>
+          <p:nvPr/>
+        </p:nvPicPr>
+        <p:blipFill>
+          <a:blip r:embed="rId4">
+            <a:extLst>
+              <a:ext uri="{28A0092B-C50C-407E-A947-70E740481C1C}">
+                <a14:useLocalDpi xmlns:a14="http://schemas.microsoft.com/office/drawing/2010/main" val="0"/>
+              </a:ext>
+            </a:extLst>
+          </a:blip>
+          <a:stretch>
+            <a:fillRect/>
+          </a:stretch>
+        </p:blipFill>
+        <p:spPr>
+          <a:xfrm>
+            <a:off x="1716260" y="1857184"/>
+            <a:ext cx="2707204" cy="623461"/>
+          </a:xfrm>
+          <a:prstGeom prst="rect">
+            <a:avLst/>
+          </a:prstGeom>
+        </p:spPr>
+      </p:pic>
+      <p:pic>
+        <p:nvPicPr>
+          <p:cNvPr id="17" name="Picture 16" descr="A black background with a black square&#10;&#10;Description automatically generated with medium confidence">
+            <a:extLst>
+              <a:ext uri="{FF2B5EF4-FFF2-40B4-BE49-F238E27FC236}">
+                <a16:creationId xmlns:a16="http://schemas.microsoft.com/office/drawing/2014/main" id="{72856777-DE7A-AA98-5822-4EFF1764FA1B}"/>
+              </a:ext>
+            </a:extLst>
+          </p:cNvPr>
+          <p:cNvPicPr>
+            <a:picLocks noChangeAspect="1"/>
+          </p:cNvPicPr>
+          <p:nvPr/>
+        </p:nvPicPr>
+        <p:blipFill>
+          <a:blip r:embed="rId5">
+            <a:extLst>
+              <a:ext uri="{28A0092B-C50C-407E-A947-70E740481C1C}">
+                <a14:useLocalDpi xmlns:a14="http://schemas.microsoft.com/office/drawing/2010/main" val="0"/>
+              </a:ext>
+            </a:extLst>
+          </a:blip>
+          <a:stretch>
+            <a:fillRect/>
+          </a:stretch>
+        </p:blipFill>
+        <p:spPr>
+          <a:xfrm>
+            <a:off x="5520493" y="1880831"/>
+            <a:ext cx="3316810" cy="623461"/>
+          </a:xfrm>
+          <a:prstGeom prst="rect">
+            <a:avLst/>
+          </a:prstGeom>
+        </p:spPr>
+      </p:pic>
+      <p:pic>
+        <p:nvPicPr>
+          <p:cNvPr id="19" name="Picture 18" descr="A black background with a black square&#10;&#10;Description automatically generated with medium confidence">
+            <a:extLst>
+              <a:ext uri="{FF2B5EF4-FFF2-40B4-BE49-F238E27FC236}">
+                <a16:creationId xmlns:a16="http://schemas.microsoft.com/office/drawing/2014/main" id="{C60699ED-6C50-3C27-4690-D0C45BC40C84}"/>
+              </a:ext>
+            </a:extLst>
+          </p:cNvPr>
+          <p:cNvPicPr>
+            <a:picLocks noChangeAspect="1"/>
+          </p:cNvPicPr>
+          <p:nvPr/>
+        </p:nvPicPr>
+        <p:blipFill>
+          <a:blip r:embed="rId6">
+            <a:extLst>
+              <a:ext uri="{28A0092B-C50C-407E-A947-70E740481C1C}">
+                <a14:useLocalDpi xmlns:a14="http://schemas.microsoft.com/office/drawing/2010/main" val="0"/>
+              </a:ext>
+            </a:extLst>
+          </a:blip>
+          <a:stretch>
+            <a:fillRect/>
+          </a:stretch>
+        </p:blipFill>
+        <p:spPr>
+          <a:xfrm>
+            <a:off x="7900217" y="1702282"/>
+            <a:ext cx="1695813" cy="462746"/>
+          </a:xfrm>
+          <a:prstGeom prst="rect">
+            <a:avLst/>
+          </a:prstGeom>
+        </p:spPr>
+      </p:pic>
+      <p:pic>
+        <p:nvPicPr>
+          <p:cNvPr id="21" name="Picture 20" descr="A black background with a black square&#10;&#10;Description automatically generated with medium confidence">
+            <a:extLst>
+              <a:ext uri="{FF2B5EF4-FFF2-40B4-BE49-F238E27FC236}">
+                <a16:creationId xmlns:a16="http://schemas.microsoft.com/office/drawing/2014/main" id="{641167B6-3FC8-EFA9-29C6-C3F31F816195}"/>
+              </a:ext>
+            </a:extLst>
+          </p:cNvPr>
+          <p:cNvPicPr>
+            <a:picLocks noChangeAspect="1"/>
+          </p:cNvPicPr>
+          <p:nvPr/>
+        </p:nvPicPr>
+        <p:blipFill>
+          <a:blip r:embed="rId7">
+            <a:extLst>
+              <a:ext uri="{28A0092B-C50C-407E-A947-70E740481C1C}">
+                <a14:useLocalDpi xmlns:a14="http://schemas.microsoft.com/office/drawing/2010/main" val="0"/>
+              </a:ext>
+            </a:extLst>
+          </a:blip>
+          <a:stretch>
+            <a:fillRect/>
+          </a:stretch>
+        </p:blipFill>
+        <p:spPr>
+          <a:xfrm>
+            <a:off x="3934134" y="675615"/>
+            <a:ext cx="3314039" cy="623461"/>
+          </a:xfrm>
+          <a:prstGeom prst="rect">
+            <a:avLst/>
+          </a:prstGeom>
+        </p:spPr>
+      </p:pic>
+      <p:pic>
+        <p:nvPicPr>
+          <p:cNvPr id="38" name="Picture 37" descr="A black background with a black square&#10;&#10;Description automatically generated with medium confidence">
+            <a:extLst>
+              <a:ext uri="{FF2B5EF4-FFF2-40B4-BE49-F238E27FC236}">
+                <a16:creationId xmlns:a16="http://schemas.microsoft.com/office/drawing/2014/main" id="{E343AAA8-66D9-2A15-7126-7FFCEBF99022}"/>
+              </a:ext>
+            </a:extLst>
+          </p:cNvPr>
+          <p:cNvPicPr>
+            <a:picLocks noChangeAspect="1"/>
+          </p:cNvPicPr>
+          <p:nvPr/>
+        </p:nvPicPr>
+        <p:blipFill>
+          <a:blip r:embed="rId8">
+            <a:extLst>
+              <a:ext uri="{28A0092B-C50C-407E-A947-70E740481C1C}">
+                <a14:useLocalDpi xmlns:a14="http://schemas.microsoft.com/office/drawing/2010/main" val="0"/>
+              </a:ext>
+            </a:extLst>
+          </a:blip>
+          <a:stretch>
+            <a:fillRect/>
+          </a:stretch>
+        </p:blipFill>
+        <p:spPr>
+          <a:xfrm>
+            <a:off x="9623926" y="686268"/>
+            <a:ext cx="2371921" cy="482143"/>
           </a:xfrm>
           <a:prstGeom prst="rect">
             <a:avLst/>

</xml_diff>

<commit_message>
nf ff regions figur opdateret igen igen
</commit_message>
<xml_diff>
--- a/Figures/TechnicalAnalysis/NFFF/nfFfRegions.pptx
+++ b/Figures/TechnicalAnalysis/NFFF/nfFfRegions.pptx
@@ -3360,10 +3360,10 @@
       </p:grpSpPr>
       <p:cxnSp>
         <p:nvCxnSpPr>
-          <p:cNvPr id="5" name="Straight Connector 4">
-            <a:extLst>
-              <a:ext uri="{FF2B5EF4-FFF2-40B4-BE49-F238E27FC236}">
-                <a16:creationId xmlns:a16="http://schemas.microsoft.com/office/drawing/2014/main" id="{B2F1B983-8386-5A53-ECC5-C24E086FF52F}"/>
+          <p:cNvPr id="66" name="Straight Connector 65">
+            <a:extLst>
+              <a:ext uri="{FF2B5EF4-FFF2-40B4-BE49-F238E27FC236}">
+                <a16:creationId xmlns:a16="http://schemas.microsoft.com/office/drawing/2014/main" id="{E916ED53-94A6-4488-6531-80AAAA091B8D}"/>
               </a:ext>
             </a:extLst>
           </p:cNvPr>
@@ -3373,8 +3373,417 @@
           <p:nvPr/>
         </p:nvCxnSpPr>
         <p:spPr>
+          <a:xfrm flipH="1">
+            <a:off x="9328216" y="1319288"/>
+            <a:ext cx="2277188" cy="595"/>
+          </a:xfrm>
+          <a:prstGeom prst="line">
+            <a:avLst/>
+          </a:prstGeom>
+          <a:ln>
+            <a:solidFill>
+              <a:schemeClr val="tx1"/>
+            </a:solidFill>
+          </a:ln>
+        </p:spPr>
+        <p:style>
+          <a:lnRef idx="2">
+            <a:schemeClr val="accent1"/>
+          </a:lnRef>
+          <a:fillRef idx="0">
+            <a:schemeClr val="accent1"/>
+          </a:fillRef>
+          <a:effectRef idx="1">
+            <a:schemeClr val="accent1"/>
+          </a:effectRef>
+          <a:fontRef idx="minor">
+            <a:schemeClr val="tx1"/>
+          </a:fontRef>
+        </p:style>
+      </p:cxnSp>
+      <p:sp>
+        <p:nvSpPr>
+          <p:cNvPr id="25" name="Arc 24">
+            <a:extLst>
+              <a:ext uri="{FF2B5EF4-FFF2-40B4-BE49-F238E27FC236}">
+                <a16:creationId xmlns:a16="http://schemas.microsoft.com/office/drawing/2014/main" id="{E482A656-A53E-87D9-998D-F635E7DD2DC3}"/>
+              </a:ext>
+            </a:extLst>
+          </p:cNvPr>
+          <p:cNvSpPr/>
+          <p:nvPr/>
+        </p:nvSpPr>
+        <p:spPr>
+          <a:xfrm rot="2405634">
+            <a:off x="544597" y="3772413"/>
+            <a:ext cx="1392468" cy="1612984"/>
+          </a:xfrm>
+          <a:prstGeom prst="arc">
+            <a:avLst/>
+          </a:prstGeom>
+          <a:ln>
+            <a:solidFill>
+              <a:schemeClr val="tx1"/>
+            </a:solidFill>
+          </a:ln>
+        </p:spPr>
+        <p:style>
+          <a:lnRef idx="2">
+            <a:schemeClr val="accent1"/>
+          </a:lnRef>
+          <a:fillRef idx="0">
+            <a:schemeClr val="accent1"/>
+          </a:fillRef>
+          <a:effectRef idx="1">
+            <a:schemeClr val="accent1"/>
+          </a:effectRef>
+          <a:fontRef idx="minor">
+            <a:schemeClr val="tx1"/>
+          </a:fontRef>
+        </p:style>
+        <p:txBody>
+          <a:bodyPr rtlCol="0" anchor="ctr"/>
+          <a:lstStyle/>
+          <a:p>
+            <a:pPr algn="ctr"/>
+            <a:endParaRPr lang="en-DK"/>
+          </a:p>
+        </p:txBody>
+      </p:sp>
+      <p:sp>
+        <p:nvSpPr>
+          <p:cNvPr id="15" name="Arc 14">
+            <a:extLst>
+              <a:ext uri="{FF2B5EF4-FFF2-40B4-BE49-F238E27FC236}">
+                <a16:creationId xmlns:a16="http://schemas.microsoft.com/office/drawing/2014/main" id="{10AC830A-C004-7540-2E1B-FB97FB53C2B7}"/>
+              </a:ext>
+            </a:extLst>
+          </p:cNvPr>
+          <p:cNvSpPr/>
+          <p:nvPr/>
+        </p:nvSpPr>
+        <p:spPr>
+          <a:xfrm rot="2405634">
+            <a:off x="-144952" y="2478052"/>
+            <a:ext cx="1392468" cy="1612984"/>
+          </a:xfrm>
+          <a:prstGeom prst="arc">
+            <a:avLst/>
+          </a:prstGeom>
+          <a:ln>
+            <a:solidFill>
+              <a:schemeClr val="tx1"/>
+            </a:solidFill>
+          </a:ln>
+        </p:spPr>
+        <p:style>
+          <a:lnRef idx="2">
+            <a:schemeClr val="accent1"/>
+          </a:lnRef>
+          <a:fillRef idx="0">
+            <a:schemeClr val="accent1"/>
+          </a:fillRef>
+          <a:effectRef idx="1">
+            <a:schemeClr val="accent1"/>
+          </a:effectRef>
+          <a:fontRef idx="minor">
+            <a:schemeClr val="tx1"/>
+          </a:fontRef>
+        </p:style>
+        <p:txBody>
+          <a:bodyPr rtlCol="0" anchor="ctr"/>
+          <a:lstStyle/>
+          <a:p>
+            <a:pPr algn="ctr"/>
+            <a:endParaRPr lang="en-DK"/>
+          </a:p>
+        </p:txBody>
+      </p:sp>
+      <p:sp>
+        <p:nvSpPr>
+          <p:cNvPr id="16" name="Arc 15">
+            <a:extLst>
+              <a:ext uri="{FF2B5EF4-FFF2-40B4-BE49-F238E27FC236}">
+                <a16:creationId xmlns:a16="http://schemas.microsoft.com/office/drawing/2014/main" id="{440D4BFA-2E8A-5A1C-5F11-EECC0D215557}"/>
+              </a:ext>
+            </a:extLst>
+          </p:cNvPr>
+          <p:cNvSpPr/>
+          <p:nvPr/>
+        </p:nvSpPr>
+        <p:spPr>
+          <a:xfrm rot="2405634">
+            <a:off x="-144950" y="3763183"/>
+            <a:ext cx="1392468" cy="1612984"/>
+          </a:xfrm>
+          <a:prstGeom prst="arc">
+            <a:avLst/>
+          </a:prstGeom>
+          <a:ln>
+            <a:solidFill>
+              <a:schemeClr val="tx1"/>
+            </a:solidFill>
+          </a:ln>
+        </p:spPr>
+        <p:style>
+          <a:lnRef idx="2">
+            <a:schemeClr val="accent1"/>
+          </a:lnRef>
+          <a:fillRef idx="0">
+            <a:schemeClr val="accent1"/>
+          </a:fillRef>
+          <a:effectRef idx="1">
+            <a:schemeClr val="accent1"/>
+          </a:effectRef>
+          <a:fontRef idx="minor">
+            <a:schemeClr val="tx1"/>
+          </a:fontRef>
+        </p:style>
+        <p:txBody>
+          <a:bodyPr rtlCol="0" anchor="ctr"/>
+          <a:lstStyle/>
+          <a:p>
+            <a:pPr algn="ctr"/>
+            <a:endParaRPr lang="en-DK"/>
+          </a:p>
+        </p:txBody>
+      </p:sp>
+      <p:sp>
+        <p:nvSpPr>
+          <p:cNvPr id="69" name="Arc 68">
+            <a:extLst>
+              <a:ext uri="{FF2B5EF4-FFF2-40B4-BE49-F238E27FC236}">
+                <a16:creationId xmlns:a16="http://schemas.microsoft.com/office/drawing/2014/main" id="{C77FCEA9-E586-325E-8EC9-D8A21F4F9788}"/>
+              </a:ext>
+            </a:extLst>
+          </p:cNvPr>
+          <p:cNvSpPr/>
+          <p:nvPr/>
+        </p:nvSpPr>
+        <p:spPr>
+          <a:xfrm rot="2405634">
+            <a:off x="8899796" y="2990546"/>
+            <a:ext cx="1392468" cy="1612984"/>
+          </a:xfrm>
+          <a:prstGeom prst="arc">
+            <a:avLst/>
+          </a:prstGeom>
+          <a:ln>
+            <a:solidFill>
+              <a:schemeClr val="tx1"/>
+            </a:solidFill>
+          </a:ln>
+        </p:spPr>
+        <p:style>
+          <a:lnRef idx="2">
+            <a:schemeClr val="accent1"/>
+          </a:lnRef>
+          <a:fillRef idx="0">
+            <a:schemeClr val="accent1"/>
+          </a:fillRef>
+          <a:effectRef idx="1">
+            <a:schemeClr val="accent1"/>
+          </a:effectRef>
+          <a:fontRef idx="minor">
+            <a:schemeClr val="tx1"/>
+          </a:fontRef>
+        </p:style>
+        <p:txBody>
+          <a:bodyPr rtlCol="0" anchor="ctr"/>
+          <a:lstStyle/>
+          <a:p>
+            <a:pPr algn="ctr"/>
+            <a:endParaRPr lang="en-DK"/>
+          </a:p>
+        </p:txBody>
+      </p:sp>
+      <p:sp>
+        <p:nvSpPr>
+          <p:cNvPr id="70" name="Arc 69">
+            <a:extLst>
+              <a:ext uri="{FF2B5EF4-FFF2-40B4-BE49-F238E27FC236}">
+                <a16:creationId xmlns:a16="http://schemas.microsoft.com/office/drawing/2014/main" id="{70F2A0A2-7D4A-592A-D45E-192C35CFB945}"/>
+              </a:ext>
+            </a:extLst>
+          </p:cNvPr>
+          <p:cNvSpPr/>
+          <p:nvPr/>
+        </p:nvSpPr>
+        <p:spPr>
+          <a:xfrm rot="2575157">
+            <a:off x="8823585" y="2773174"/>
+            <a:ext cx="1929280" cy="2072247"/>
+          </a:xfrm>
+          <a:prstGeom prst="arc">
+            <a:avLst/>
+          </a:prstGeom>
+          <a:ln>
+            <a:solidFill>
+              <a:schemeClr val="tx1"/>
+            </a:solidFill>
+          </a:ln>
+        </p:spPr>
+        <p:style>
+          <a:lnRef idx="2">
+            <a:schemeClr val="accent1"/>
+          </a:lnRef>
+          <a:fillRef idx="0">
+            <a:schemeClr val="accent1"/>
+          </a:fillRef>
+          <a:effectRef idx="1">
+            <a:schemeClr val="accent1"/>
+          </a:effectRef>
+          <a:fontRef idx="minor">
+            <a:schemeClr val="tx1"/>
+          </a:fontRef>
+        </p:style>
+        <p:txBody>
+          <a:bodyPr rtlCol="0" anchor="ctr"/>
+          <a:lstStyle/>
+          <a:p>
+            <a:pPr algn="ctr"/>
+            <a:endParaRPr lang="en-DK"/>
+          </a:p>
+        </p:txBody>
+      </p:sp>
+      <p:sp>
+        <p:nvSpPr>
+          <p:cNvPr id="71" name="Arc 70">
+            <a:extLst>
+              <a:ext uri="{FF2B5EF4-FFF2-40B4-BE49-F238E27FC236}">
+                <a16:creationId xmlns:a16="http://schemas.microsoft.com/office/drawing/2014/main" id="{5470007E-99B7-1346-FB02-420C664C6093}"/>
+              </a:ext>
+            </a:extLst>
+          </p:cNvPr>
+          <p:cNvSpPr/>
+          <p:nvPr/>
+        </p:nvSpPr>
+        <p:spPr>
+          <a:xfrm rot="2643055">
+            <a:off x="8761547" y="2558015"/>
+            <a:ext cx="2428095" cy="2445237"/>
+          </a:xfrm>
+          <a:prstGeom prst="arc">
+            <a:avLst/>
+          </a:prstGeom>
+          <a:ln>
+            <a:solidFill>
+              <a:schemeClr val="tx1"/>
+            </a:solidFill>
+          </a:ln>
+        </p:spPr>
+        <p:style>
+          <a:lnRef idx="2">
+            <a:schemeClr val="accent1"/>
+          </a:lnRef>
+          <a:fillRef idx="0">
+            <a:schemeClr val="accent1"/>
+          </a:fillRef>
+          <a:effectRef idx="1">
+            <a:schemeClr val="accent1"/>
+          </a:effectRef>
+          <a:fontRef idx="minor">
+            <a:schemeClr val="tx1"/>
+          </a:fontRef>
+        </p:style>
+        <p:txBody>
+          <a:bodyPr rtlCol="0" anchor="ctr"/>
+          <a:lstStyle/>
+          <a:p>
+            <a:pPr algn="ctr"/>
+            <a:endParaRPr lang="en-DK"/>
+          </a:p>
+        </p:txBody>
+      </p:sp>
+      <p:pic>
+        <p:nvPicPr>
+          <p:cNvPr id="11" name="Picture 10" descr="A black background with a black square&#10;&#10;Description automatically generated with medium confidence">
+            <a:extLst>
+              <a:ext uri="{FF2B5EF4-FFF2-40B4-BE49-F238E27FC236}">
+                <a16:creationId xmlns:a16="http://schemas.microsoft.com/office/drawing/2014/main" id="{3BEE0348-28C9-57B3-6992-EDC33166E696}"/>
+              </a:ext>
+            </a:extLst>
+          </p:cNvPr>
+          <p:cNvPicPr>
+            <a:picLocks noChangeAspect="1"/>
+          </p:cNvPicPr>
+          <p:nvPr/>
+        </p:nvPicPr>
+        <p:blipFill>
+          <a:blip r:embed="rId2">
+            <a:extLst>
+              <a:ext uri="{28A0092B-C50C-407E-A947-70E740481C1C}">
+                <a14:useLocalDpi xmlns:a14="http://schemas.microsoft.com/office/drawing/2010/main" val="0"/>
+              </a:ext>
+            </a:extLst>
+          </a:blip>
+          <a:stretch>
+            <a:fillRect/>
+          </a:stretch>
+        </p:blipFill>
+        <p:spPr>
           <a:xfrm>
-            <a:off x="514916" y="3316043"/>
+            <a:off x="-131208" y="2595191"/>
+            <a:ext cx="2830823" cy="651930"/>
+          </a:xfrm>
+          <a:prstGeom prst="rect">
+            <a:avLst/>
+          </a:prstGeom>
+        </p:spPr>
+      </p:pic>
+      <p:pic>
+        <p:nvPicPr>
+          <p:cNvPr id="38" name="Picture 37" descr="A black background with a black square&#10;&#10;Description automatically generated with medium confidence">
+            <a:extLst>
+              <a:ext uri="{FF2B5EF4-FFF2-40B4-BE49-F238E27FC236}">
+                <a16:creationId xmlns:a16="http://schemas.microsoft.com/office/drawing/2014/main" id="{E343AAA8-66D9-2A15-7126-7FFCEBF99022}"/>
+              </a:ext>
+            </a:extLst>
+          </p:cNvPr>
+          <p:cNvPicPr>
+            <a:picLocks noChangeAspect="1"/>
+          </p:cNvPicPr>
+          <p:nvPr/>
+        </p:nvPicPr>
+        <p:blipFill>
+          <a:blip r:embed="rId3">
+            <a:extLst>
+              <a:ext uri="{28A0092B-C50C-407E-A947-70E740481C1C}">
+                <a14:useLocalDpi xmlns:a14="http://schemas.microsoft.com/office/drawing/2010/main" val="0"/>
+              </a:ext>
+            </a:extLst>
+          </a:blip>
+          <a:stretch>
+            <a:fillRect/>
+          </a:stretch>
+        </p:blipFill>
+        <p:spPr>
+          <a:xfrm>
+            <a:off x="9307811" y="972810"/>
+            <a:ext cx="2390430" cy="482143"/>
+          </a:xfrm>
+          <a:prstGeom prst="rect">
+            <a:avLst/>
+          </a:prstGeom>
+        </p:spPr>
+      </p:pic>
+      <p:cxnSp>
+        <p:nvCxnSpPr>
+          <p:cNvPr id="5" name="Straight Connector 4">
+            <a:extLst>
+              <a:ext uri="{FF2B5EF4-FFF2-40B4-BE49-F238E27FC236}">
+                <a16:creationId xmlns:a16="http://schemas.microsoft.com/office/drawing/2014/main" id="{B2F1B983-8386-5A53-ECC5-C24E086FF52F}"/>
+              </a:ext>
+            </a:extLst>
+          </p:cNvPr>
+          <p:cNvCxnSpPr>
+            <a:cxnSpLocks/>
+          </p:cNvCxnSpPr>
+          <p:nvPr/>
+        </p:nvCxnSpPr>
+        <p:spPr>
+          <a:xfrm>
+            <a:off x="514915" y="3316045"/>
             <a:ext cx="0" cy="1239002"/>
           </a:xfrm>
           <a:prstGeom prst="line">
@@ -3417,7 +3826,7 @@
         </p:nvCxnSpPr>
         <p:spPr>
           <a:xfrm>
-            <a:off x="189656" y="3050905"/>
+            <a:off x="189655" y="3050905"/>
             <a:ext cx="325261" cy="287795"/>
           </a:xfrm>
           <a:prstGeom prst="line">
@@ -3460,7 +3869,7 @@
         </p:nvCxnSpPr>
         <p:spPr>
           <a:xfrm flipH="1">
-            <a:off x="514915" y="3050907"/>
+            <a:off x="514914" y="3050907"/>
             <a:ext cx="325269" cy="287792"/>
           </a:xfrm>
           <a:prstGeom prst="line">
@@ -3503,8 +3912,8 @@
         </p:nvCxnSpPr>
         <p:spPr>
           <a:xfrm>
-            <a:off x="514915" y="3012843"/>
-            <a:ext cx="10" cy="325857"/>
+            <a:off x="514914" y="3012843"/>
+            <a:ext cx="11" cy="325857"/>
           </a:xfrm>
           <a:prstGeom prst="line">
             <a:avLst/>
@@ -3532,10 +3941,10 @@
       </p:cxnSp>
       <p:sp>
         <p:nvSpPr>
-          <p:cNvPr id="15" name="Arc 14">
-            <a:extLst>
-              <a:ext uri="{FF2B5EF4-FFF2-40B4-BE49-F238E27FC236}">
-                <a16:creationId xmlns:a16="http://schemas.microsoft.com/office/drawing/2014/main" id="{10AC830A-C004-7540-2E1B-FB97FB53C2B7}"/>
+          <p:cNvPr id="22" name="Arc 21">
+            <a:extLst>
+              <a:ext uri="{FF2B5EF4-FFF2-40B4-BE49-F238E27FC236}">
+                <a16:creationId xmlns:a16="http://schemas.microsoft.com/office/drawing/2014/main" id="{5FC36D34-789E-D2C1-6AD7-396EC10669DD}"/>
               </a:ext>
             </a:extLst>
           </p:cNvPr>
@@ -3543,9 +3952,9 @@
           <p:nvPr/>
         </p:nvSpPr>
         <p:spPr>
-          <a:xfrm rot="2405634">
-            <a:off x="-144952" y="2478052"/>
-            <a:ext cx="1392469" cy="1612984"/>
+          <a:xfrm rot="13294408">
+            <a:off x="1222881" y="2317586"/>
+            <a:ext cx="1392468" cy="1612984"/>
           </a:xfrm>
           <a:prstGeom prst="arc">
             <a:avLst/>
@@ -3581,10 +3990,10 @@
       </p:sp>
       <p:sp>
         <p:nvSpPr>
-          <p:cNvPr id="16" name="Arc 15">
-            <a:extLst>
-              <a:ext uri="{FF2B5EF4-FFF2-40B4-BE49-F238E27FC236}">
-                <a16:creationId xmlns:a16="http://schemas.microsoft.com/office/drawing/2014/main" id="{440D4BFA-2E8A-5A1C-5F11-EECC0D215557}"/>
+          <p:cNvPr id="23" name="Arc 22">
+            <a:extLst>
+              <a:ext uri="{FF2B5EF4-FFF2-40B4-BE49-F238E27FC236}">
+                <a16:creationId xmlns:a16="http://schemas.microsoft.com/office/drawing/2014/main" id="{83568669-0066-4A9D-44FF-3B6C2C2E2647}"/>
               </a:ext>
             </a:extLst>
           </p:cNvPr>
@@ -3592,9 +4001,9 @@
           <p:nvPr/>
         </p:nvSpPr>
         <p:spPr>
-          <a:xfrm rot="2405634">
-            <a:off x="-144950" y="3763182"/>
-            <a:ext cx="1392469" cy="1612984"/>
+          <a:xfrm rot="13294408">
+            <a:off x="1222882" y="3602717"/>
+            <a:ext cx="1392468" cy="1612984"/>
           </a:xfrm>
           <a:prstGeom prst="arc">
             <a:avLst/>
@@ -3630,10 +4039,10 @@
       </p:sp>
       <p:sp>
         <p:nvSpPr>
-          <p:cNvPr id="22" name="Arc 21">
-            <a:extLst>
-              <a:ext uri="{FF2B5EF4-FFF2-40B4-BE49-F238E27FC236}">
-                <a16:creationId xmlns:a16="http://schemas.microsoft.com/office/drawing/2014/main" id="{5FC36D34-789E-D2C1-6AD7-396EC10669DD}"/>
+          <p:cNvPr id="24" name="Arc 23">
+            <a:extLst>
+              <a:ext uri="{FF2B5EF4-FFF2-40B4-BE49-F238E27FC236}">
+                <a16:creationId xmlns:a16="http://schemas.microsoft.com/office/drawing/2014/main" id="{F4994089-2EAE-A04F-0C6F-141770861363}"/>
               </a:ext>
             </a:extLst>
           </p:cNvPr>
@@ -3641,9 +4050,9 @@
           <p:nvPr/>
         </p:nvSpPr>
         <p:spPr>
-          <a:xfrm rot="13294408">
-            <a:off x="1222881" y="2317586"/>
-            <a:ext cx="1392469" cy="1612984"/>
+          <a:xfrm rot="2405634">
+            <a:off x="532801" y="2487281"/>
+            <a:ext cx="1392468" cy="1612984"/>
           </a:xfrm>
           <a:prstGeom prst="arc">
             <a:avLst/>
@@ -3679,10 +4088,10 @@
       </p:sp>
       <p:sp>
         <p:nvSpPr>
-          <p:cNvPr id="23" name="Arc 22">
-            <a:extLst>
-              <a:ext uri="{FF2B5EF4-FFF2-40B4-BE49-F238E27FC236}">
-                <a16:creationId xmlns:a16="http://schemas.microsoft.com/office/drawing/2014/main" id="{83568669-0066-4A9D-44FF-3B6C2C2E2647}"/>
+          <p:cNvPr id="26" name="Arc 25">
+            <a:extLst>
+              <a:ext uri="{FF2B5EF4-FFF2-40B4-BE49-F238E27FC236}">
+                <a16:creationId xmlns:a16="http://schemas.microsoft.com/office/drawing/2014/main" id="{6DA7E47E-817B-E0A5-9C63-BAC316CC52FB}"/>
               </a:ext>
             </a:extLst>
           </p:cNvPr>
@@ -3691,8 +4100,8 @@
         </p:nvSpPr>
         <p:spPr>
           <a:xfrm rot="13294408">
-            <a:off x="1222882" y="3602715"/>
-            <a:ext cx="1392469" cy="1612984"/>
+            <a:off x="1900635" y="2317589"/>
+            <a:ext cx="1392468" cy="1612984"/>
           </a:xfrm>
           <a:prstGeom prst="arc">
             <a:avLst/>
@@ -3728,10 +4137,10 @@
       </p:sp>
       <p:sp>
         <p:nvSpPr>
-          <p:cNvPr id="24" name="Arc 23">
-            <a:extLst>
-              <a:ext uri="{FF2B5EF4-FFF2-40B4-BE49-F238E27FC236}">
-                <a16:creationId xmlns:a16="http://schemas.microsoft.com/office/drawing/2014/main" id="{F4994089-2EAE-A04F-0C6F-141770861363}"/>
+          <p:cNvPr id="27" name="Arc 26">
+            <a:extLst>
+              <a:ext uri="{FF2B5EF4-FFF2-40B4-BE49-F238E27FC236}">
+                <a16:creationId xmlns:a16="http://schemas.microsoft.com/office/drawing/2014/main" id="{AAAC0B85-AE34-FA6A-52E7-C2410C65155B}"/>
               </a:ext>
             </a:extLst>
           </p:cNvPr>
@@ -3739,9 +4148,9 @@
           <p:nvPr/>
         </p:nvSpPr>
         <p:spPr>
-          <a:xfrm rot="2405634">
-            <a:off x="532801" y="2487281"/>
-            <a:ext cx="1392469" cy="1612984"/>
+          <a:xfrm rot="13294408">
+            <a:off x="1900637" y="3602718"/>
+            <a:ext cx="1392468" cy="1612984"/>
           </a:xfrm>
           <a:prstGeom prst="arc">
             <a:avLst/>
@@ -3777,10 +4186,10 @@
       </p:sp>
       <p:sp>
         <p:nvSpPr>
-          <p:cNvPr id="25" name="Arc 24">
-            <a:extLst>
-              <a:ext uri="{FF2B5EF4-FFF2-40B4-BE49-F238E27FC236}">
-                <a16:creationId xmlns:a16="http://schemas.microsoft.com/office/drawing/2014/main" id="{E482A656-A53E-87D9-998D-F635E7DD2DC3}"/>
+          <p:cNvPr id="28" name="Arc 27">
+            <a:extLst>
+              <a:ext uri="{FF2B5EF4-FFF2-40B4-BE49-F238E27FC236}">
+                <a16:creationId xmlns:a16="http://schemas.microsoft.com/office/drawing/2014/main" id="{98AC624A-B8F6-32FC-A3BA-A8DD7B77961E}"/>
               </a:ext>
             </a:extLst>
           </p:cNvPr>
@@ -3789,8 +4198,8 @@
         </p:nvSpPr>
         <p:spPr>
           <a:xfrm rot="2405634">
-            <a:off x="544598" y="3772411"/>
-            <a:ext cx="1392469" cy="1612984"/>
+            <a:off x="1271264" y="2478050"/>
+            <a:ext cx="1392468" cy="1612984"/>
           </a:xfrm>
           <a:prstGeom prst="arc">
             <a:avLst/>
@@ -3826,10 +4235,10 @@
       </p:sp>
       <p:sp>
         <p:nvSpPr>
-          <p:cNvPr id="26" name="Arc 25">
-            <a:extLst>
-              <a:ext uri="{FF2B5EF4-FFF2-40B4-BE49-F238E27FC236}">
-                <a16:creationId xmlns:a16="http://schemas.microsoft.com/office/drawing/2014/main" id="{6DA7E47E-817B-E0A5-9C63-BAC316CC52FB}"/>
+          <p:cNvPr id="29" name="Arc 28">
+            <a:extLst>
+              <a:ext uri="{FF2B5EF4-FFF2-40B4-BE49-F238E27FC236}">
+                <a16:creationId xmlns:a16="http://schemas.microsoft.com/office/drawing/2014/main" id="{E78DD91E-E085-FEC7-BDA4-F8363007F0D3}"/>
               </a:ext>
             </a:extLst>
           </p:cNvPr>
@@ -3837,9 +4246,9 @@
           <p:nvPr/>
         </p:nvSpPr>
         <p:spPr>
-          <a:xfrm rot="13294408">
-            <a:off x="1900635" y="2317588"/>
-            <a:ext cx="1392469" cy="1612984"/>
+          <a:xfrm rot="2405634">
+            <a:off x="1271266" y="3763181"/>
+            <a:ext cx="1392468" cy="1612984"/>
           </a:xfrm>
           <a:prstGeom prst="arc">
             <a:avLst/>
@@ -3875,10 +4284,10 @@
       </p:sp>
       <p:sp>
         <p:nvSpPr>
-          <p:cNvPr id="27" name="Arc 26">
-            <a:extLst>
-              <a:ext uri="{FF2B5EF4-FFF2-40B4-BE49-F238E27FC236}">
-                <a16:creationId xmlns:a16="http://schemas.microsoft.com/office/drawing/2014/main" id="{AAAC0B85-AE34-FA6A-52E7-C2410C65155B}"/>
+          <p:cNvPr id="30" name="Arc 29">
+            <a:extLst>
+              <a:ext uri="{FF2B5EF4-FFF2-40B4-BE49-F238E27FC236}">
+                <a16:creationId xmlns:a16="http://schemas.microsoft.com/office/drawing/2014/main" id="{54C8C18A-33BA-F08D-973F-D6327EA1E135}"/>
               </a:ext>
             </a:extLst>
           </p:cNvPr>
@@ -3887,8 +4296,8 @@
         </p:nvSpPr>
         <p:spPr>
           <a:xfrm rot="13294408">
-            <a:off x="1900637" y="3602717"/>
-            <a:ext cx="1392469" cy="1612984"/>
+            <a:off x="2639097" y="2317584"/>
+            <a:ext cx="1392468" cy="1612984"/>
           </a:xfrm>
           <a:prstGeom prst="arc">
             <a:avLst/>
@@ -3924,10 +4333,10 @@
       </p:sp>
       <p:sp>
         <p:nvSpPr>
-          <p:cNvPr id="28" name="Arc 27">
-            <a:extLst>
-              <a:ext uri="{FF2B5EF4-FFF2-40B4-BE49-F238E27FC236}">
-                <a16:creationId xmlns:a16="http://schemas.microsoft.com/office/drawing/2014/main" id="{98AC624A-B8F6-32FC-A3BA-A8DD7B77961E}"/>
+          <p:cNvPr id="31" name="Arc 30">
+            <a:extLst>
+              <a:ext uri="{FF2B5EF4-FFF2-40B4-BE49-F238E27FC236}">
+                <a16:creationId xmlns:a16="http://schemas.microsoft.com/office/drawing/2014/main" id="{199FB5A6-3932-2A7F-73FC-1B05E72F379F}"/>
               </a:ext>
             </a:extLst>
           </p:cNvPr>
@@ -3935,9 +4344,9 @@
           <p:nvPr/>
         </p:nvSpPr>
         <p:spPr>
-          <a:xfrm rot="2405634">
-            <a:off x="1271265" y="2478050"/>
-            <a:ext cx="1392469" cy="1612984"/>
+          <a:xfrm rot="13294408">
+            <a:off x="2639098" y="3602714"/>
+            <a:ext cx="1392468" cy="1612984"/>
           </a:xfrm>
           <a:prstGeom prst="arc">
             <a:avLst/>
@@ -3973,10 +4382,10 @@
       </p:sp>
       <p:sp>
         <p:nvSpPr>
-          <p:cNvPr id="29" name="Arc 28">
-            <a:extLst>
-              <a:ext uri="{FF2B5EF4-FFF2-40B4-BE49-F238E27FC236}">
-                <a16:creationId xmlns:a16="http://schemas.microsoft.com/office/drawing/2014/main" id="{E78DD91E-E085-FEC7-BDA4-F8363007F0D3}"/>
+          <p:cNvPr id="32" name="Arc 31">
+            <a:extLst>
+              <a:ext uri="{FF2B5EF4-FFF2-40B4-BE49-F238E27FC236}">
+                <a16:creationId xmlns:a16="http://schemas.microsoft.com/office/drawing/2014/main" id="{99720FE6-D3D1-1ED4-6593-5A9006B74F01}"/>
               </a:ext>
             </a:extLst>
           </p:cNvPr>
@@ -3985,8 +4394,8 @@
         </p:nvSpPr>
         <p:spPr>
           <a:xfrm rot="2405634">
-            <a:off x="1271266" y="3763180"/>
-            <a:ext cx="1392469" cy="1612984"/>
+            <a:off x="2062084" y="2478050"/>
+            <a:ext cx="1392468" cy="1612984"/>
           </a:xfrm>
           <a:prstGeom prst="arc">
             <a:avLst/>
@@ -4022,10 +4431,10 @@
       </p:sp>
       <p:sp>
         <p:nvSpPr>
-          <p:cNvPr id="30" name="Arc 29">
-            <a:extLst>
-              <a:ext uri="{FF2B5EF4-FFF2-40B4-BE49-F238E27FC236}">
-                <a16:creationId xmlns:a16="http://schemas.microsoft.com/office/drawing/2014/main" id="{54C8C18A-33BA-F08D-973F-D6327EA1E135}"/>
+          <p:cNvPr id="33" name="Arc 32">
+            <a:extLst>
+              <a:ext uri="{FF2B5EF4-FFF2-40B4-BE49-F238E27FC236}">
+                <a16:creationId xmlns:a16="http://schemas.microsoft.com/office/drawing/2014/main" id="{4FE3FE58-84B3-6C7F-3259-1E2E62182824}"/>
               </a:ext>
             </a:extLst>
           </p:cNvPr>
@@ -4033,9 +4442,9 @@
           <p:nvPr/>
         </p:nvSpPr>
         <p:spPr>
-          <a:xfrm rot="13294408">
-            <a:off x="2639097" y="2317584"/>
-            <a:ext cx="1392469" cy="1612984"/>
+          <a:xfrm rot="2405634">
+            <a:off x="2062086" y="3763179"/>
+            <a:ext cx="1392468" cy="1612984"/>
           </a:xfrm>
           <a:prstGeom prst="arc">
             <a:avLst/>
@@ -4071,10 +4480,10 @@
       </p:sp>
       <p:sp>
         <p:nvSpPr>
-          <p:cNvPr id="31" name="Arc 30">
-            <a:extLst>
-              <a:ext uri="{FF2B5EF4-FFF2-40B4-BE49-F238E27FC236}">
-                <a16:creationId xmlns:a16="http://schemas.microsoft.com/office/drawing/2014/main" id="{199FB5A6-3932-2A7F-73FC-1B05E72F379F}"/>
+          <p:cNvPr id="34" name="Arc 33">
+            <a:extLst>
+              <a:ext uri="{FF2B5EF4-FFF2-40B4-BE49-F238E27FC236}">
+                <a16:creationId xmlns:a16="http://schemas.microsoft.com/office/drawing/2014/main" id="{62609F2A-7931-1FE5-A80B-8A26FCFC8305}"/>
               </a:ext>
             </a:extLst>
           </p:cNvPr>
@@ -4083,8 +4492,8 @@
         </p:nvSpPr>
         <p:spPr>
           <a:xfrm rot="13294408">
-            <a:off x="2639099" y="3602713"/>
-            <a:ext cx="1392469" cy="1612984"/>
+            <a:off x="3415498" y="2309791"/>
+            <a:ext cx="1392468" cy="1612984"/>
           </a:xfrm>
           <a:prstGeom prst="arc">
             <a:avLst/>
@@ -4120,10 +4529,10 @@
       </p:sp>
       <p:sp>
         <p:nvSpPr>
-          <p:cNvPr id="32" name="Arc 31">
-            <a:extLst>
-              <a:ext uri="{FF2B5EF4-FFF2-40B4-BE49-F238E27FC236}">
-                <a16:creationId xmlns:a16="http://schemas.microsoft.com/office/drawing/2014/main" id="{99720FE6-D3D1-1ED4-6593-5A9006B74F01}"/>
+          <p:cNvPr id="35" name="Arc 34">
+            <a:extLst>
+              <a:ext uri="{FF2B5EF4-FFF2-40B4-BE49-F238E27FC236}">
+                <a16:creationId xmlns:a16="http://schemas.microsoft.com/office/drawing/2014/main" id="{2D7C5663-D4CF-A7BB-3353-060262CBCFA2}"/>
               </a:ext>
             </a:extLst>
           </p:cNvPr>
@@ -4131,9 +4540,9 @@
           <p:nvPr/>
         </p:nvSpPr>
         <p:spPr>
-          <a:xfrm rot="2405634">
-            <a:off x="2062084" y="2478049"/>
-            <a:ext cx="1392469" cy="1612984"/>
+          <a:xfrm rot="13294408">
+            <a:off x="3415499" y="3594920"/>
+            <a:ext cx="1392468" cy="1612984"/>
           </a:xfrm>
           <a:prstGeom prst="arc">
             <a:avLst/>
@@ -4167,153 +4576,6 @@
           </a:p>
         </p:txBody>
       </p:sp>
-      <p:sp>
-        <p:nvSpPr>
-          <p:cNvPr id="33" name="Arc 32">
-            <a:extLst>
-              <a:ext uri="{FF2B5EF4-FFF2-40B4-BE49-F238E27FC236}">
-                <a16:creationId xmlns:a16="http://schemas.microsoft.com/office/drawing/2014/main" id="{4FE3FE58-84B3-6C7F-3259-1E2E62182824}"/>
-              </a:ext>
-            </a:extLst>
-          </p:cNvPr>
-          <p:cNvSpPr/>
-          <p:nvPr/>
-        </p:nvSpPr>
-        <p:spPr>
-          <a:xfrm rot="2405634">
-            <a:off x="2062086" y="3763178"/>
-            <a:ext cx="1392469" cy="1612984"/>
-          </a:xfrm>
-          <a:prstGeom prst="arc">
-            <a:avLst/>
-          </a:prstGeom>
-          <a:ln>
-            <a:solidFill>
-              <a:schemeClr val="tx1"/>
-            </a:solidFill>
-          </a:ln>
-        </p:spPr>
-        <p:style>
-          <a:lnRef idx="2">
-            <a:schemeClr val="accent1"/>
-          </a:lnRef>
-          <a:fillRef idx="0">
-            <a:schemeClr val="accent1"/>
-          </a:fillRef>
-          <a:effectRef idx="1">
-            <a:schemeClr val="accent1"/>
-          </a:effectRef>
-          <a:fontRef idx="minor">
-            <a:schemeClr val="tx1"/>
-          </a:fontRef>
-        </p:style>
-        <p:txBody>
-          <a:bodyPr rtlCol="0" anchor="ctr"/>
-          <a:lstStyle/>
-          <a:p>
-            <a:pPr algn="ctr"/>
-            <a:endParaRPr lang="en-DK"/>
-          </a:p>
-        </p:txBody>
-      </p:sp>
-      <p:sp>
-        <p:nvSpPr>
-          <p:cNvPr id="34" name="Arc 33">
-            <a:extLst>
-              <a:ext uri="{FF2B5EF4-FFF2-40B4-BE49-F238E27FC236}">
-                <a16:creationId xmlns:a16="http://schemas.microsoft.com/office/drawing/2014/main" id="{62609F2A-7931-1FE5-A80B-8A26FCFC8305}"/>
-              </a:ext>
-            </a:extLst>
-          </p:cNvPr>
-          <p:cNvSpPr/>
-          <p:nvPr/>
-        </p:nvSpPr>
-        <p:spPr>
-          <a:xfrm rot="13294408">
-            <a:off x="3415498" y="2309790"/>
-            <a:ext cx="1392469" cy="1612984"/>
-          </a:xfrm>
-          <a:prstGeom prst="arc">
-            <a:avLst/>
-          </a:prstGeom>
-          <a:ln>
-            <a:solidFill>
-              <a:schemeClr val="tx1"/>
-            </a:solidFill>
-          </a:ln>
-        </p:spPr>
-        <p:style>
-          <a:lnRef idx="2">
-            <a:schemeClr val="accent1"/>
-          </a:lnRef>
-          <a:fillRef idx="0">
-            <a:schemeClr val="accent1"/>
-          </a:fillRef>
-          <a:effectRef idx="1">
-            <a:schemeClr val="accent1"/>
-          </a:effectRef>
-          <a:fontRef idx="minor">
-            <a:schemeClr val="tx1"/>
-          </a:fontRef>
-        </p:style>
-        <p:txBody>
-          <a:bodyPr rtlCol="0" anchor="ctr"/>
-          <a:lstStyle/>
-          <a:p>
-            <a:pPr algn="ctr"/>
-            <a:endParaRPr lang="en-DK"/>
-          </a:p>
-        </p:txBody>
-      </p:sp>
-      <p:sp>
-        <p:nvSpPr>
-          <p:cNvPr id="35" name="Arc 34">
-            <a:extLst>
-              <a:ext uri="{FF2B5EF4-FFF2-40B4-BE49-F238E27FC236}">
-                <a16:creationId xmlns:a16="http://schemas.microsoft.com/office/drawing/2014/main" id="{2D7C5663-D4CF-A7BB-3353-060262CBCFA2}"/>
-              </a:ext>
-            </a:extLst>
-          </p:cNvPr>
-          <p:cNvSpPr/>
-          <p:nvPr/>
-        </p:nvSpPr>
-        <p:spPr>
-          <a:xfrm rot="13294408">
-            <a:off x="3415499" y="3594919"/>
-            <a:ext cx="1392469" cy="1612984"/>
-          </a:xfrm>
-          <a:prstGeom prst="arc">
-            <a:avLst/>
-          </a:prstGeom>
-          <a:ln>
-            <a:solidFill>
-              <a:schemeClr val="tx1"/>
-            </a:solidFill>
-          </a:ln>
-        </p:spPr>
-        <p:style>
-          <a:lnRef idx="2">
-            <a:schemeClr val="accent1"/>
-          </a:lnRef>
-          <a:fillRef idx="0">
-            <a:schemeClr val="accent1"/>
-          </a:fillRef>
-          <a:effectRef idx="1">
-            <a:schemeClr val="accent1"/>
-          </a:effectRef>
-          <a:fontRef idx="minor">
-            <a:schemeClr val="tx1"/>
-          </a:fontRef>
-        </p:style>
-        <p:txBody>
-          <a:bodyPr rtlCol="0" anchor="ctr"/>
-          <a:lstStyle/>
-          <a:p>
-            <a:pPr algn="ctr"/>
-            <a:endParaRPr lang="en-DK"/>
-          </a:p>
-        </p:txBody>
-      </p:sp>
       <p:cxnSp>
         <p:nvCxnSpPr>
           <p:cNvPr id="37" name="Straight Connector 36">
@@ -4330,8 +4592,8 @@
         </p:nvCxnSpPr>
         <p:spPr>
           <a:xfrm>
-            <a:off x="4497856" y="2241716"/>
-            <a:ext cx="0" cy="2869111"/>
+            <a:off x="4497857" y="2241716"/>
+            <a:ext cx="0" cy="2869112"/>
           </a:xfrm>
           <a:prstGeom prst="line">
             <a:avLst/>
@@ -4375,8 +4637,8 @@
         </p:nvSpPr>
         <p:spPr>
           <a:xfrm rot="2405634">
-            <a:off x="4301553" y="2459927"/>
-            <a:ext cx="1392469" cy="1612984"/>
+            <a:off x="4789226" y="2483495"/>
+            <a:ext cx="1392468" cy="1612984"/>
           </a:xfrm>
           <a:prstGeom prst="arc">
             <a:avLst/>
@@ -4424,8 +4686,8 @@
         </p:nvSpPr>
         <p:spPr>
           <a:xfrm rot="2405634">
-            <a:off x="4289927" y="3750482"/>
-            <a:ext cx="1392469" cy="1612984"/>
+            <a:off x="4777600" y="3774051"/>
+            <a:ext cx="1392468" cy="1612984"/>
           </a:xfrm>
           <a:prstGeom prst="arc">
             <a:avLst/>
@@ -4473,8 +4735,8 @@
         </p:nvSpPr>
         <p:spPr>
           <a:xfrm rot="2405634">
-            <a:off x="4951775" y="2478050"/>
-            <a:ext cx="1392469" cy="1612984"/>
+            <a:off x="5439448" y="2501618"/>
+            <a:ext cx="1392468" cy="1612984"/>
           </a:xfrm>
           <a:prstGeom prst="arc">
             <a:avLst/>
@@ -4522,8 +4784,8 @@
         </p:nvSpPr>
         <p:spPr>
           <a:xfrm rot="2405634">
-            <a:off x="4951776" y="3763180"/>
-            <a:ext cx="1392469" cy="1612984"/>
+            <a:off x="5439448" y="3786749"/>
+            <a:ext cx="1392468" cy="1612983"/>
           </a:xfrm>
           <a:prstGeom prst="arc">
             <a:avLst/>
@@ -4571,8 +4833,8 @@
         </p:nvSpPr>
         <p:spPr>
           <a:xfrm rot="2405634">
-            <a:off x="5645827" y="2487281"/>
-            <a:ext cx="1392469" cy="1612984"/>
+            <a:off x="5979314" y="2488701"/>
+            <a:ext cx="1392468" cy="1612983"/>
           </a:xfrm>
           <a:prstGeom prst="arc">
             <a:avLst/>
@@ -4620,8 +4882,8 @@
         </p:nvSpPr>
         <p:spPr>
           <a:xfrm rot="2405634">
-            <a:off x="5645828" y="3772410"/>
-            <a:ext cx="1392469" cy="1612984"/>
+            <a:off x="5989547" y="3784711"/>
+            <a:ext cx="1392468" cy="1612984"/>
           </a:xfrm>
           <a:prstGeom prst="arc">
             <a:avLst/>
@@ -4669,8 +4931,8 @@
         </p:nvSpPr>
         <p:spPr>
           <a:xfrm rot="2405634">
-            <a:off x="6406238" y="2473693"/>
-            <a:ext cx="1392469" cy="1612984"/>
+            <a:off x="6502006" y="2486522"/>
+            <a:ext cx="1392468" cy="1612984"/>
           </a:xfrm>
           <a:prstGeom prst="arc">
             <a:avLst/>
@@ -4718,8 +4980,8 @@
         </p:nvSpPr>
         <p:spPr>
           <a:xfrm rot="2405634">
-            <a:off x="6406240" y="3758822"/>
-            <a:ext cx="1392469" cy="1612984"/>
+            <a:off x="6502008" y="3771652"/>
+            <a:ext cx="1392468" cy="1612983"/>
           </a:xfrm>
           <a:prstGeom prst="arc">
             <a:avLst/>
@@ -4767,8 +5029,8 @@
         </p:nvSpPr>
         <p:spPr>
           <a:xfrm rot="13140701">
-            <a:off x="5829840" y="2986671"/>
-            <a:ext cx="1392469" cy="1612984"/>
+            <a:off x="6317512" y="3010239"/>
+            <a:ext cx="1392468" cy="1612983"/>
           </a:xfrm>
           <a:prstGeom prst="arc">
             <a:avLst/>
@@ -4816,8 +5078,8 @@
         </p:nvSpPr>
         <p:spPr>
           <a:xfrm rot="13140701">
-            <a:off x="6596865" y="2986671"/>
-            <a:ext cx="1392469" cy="1612984"/>
+            <a:off x="7006100" y="2999501"/>
+            <a:ext cx="1392468" cy="1612983"/>
           </a:xfrm>
           <a:prstGeom prst="arc">
             <a:avLst/>
@@ -4865,8 +5127,8 @@
         </p:nvSpPr>
         <p:spPr>
           <a:xfrm rot="13140701">
-            <a:off x="7299176" y="2995012"/>
-            <a:ext cx="1392469" cy="1612984"/>
+            <a:off x="7540730" y="2974502"/>
+            <a:ext cx="1392468" cy="1612983"/>
           </a:xfrm>
           <a:prstGeom prst="arc">
             <a:avLst/>
@@ -4916,7 +5178,7 @@
         </p:nvCxnSpPr>
         <p:spPr>
           <a:xfrm flipH="1">
-            <a:off x="1087330" y="2214071"/>
+            <a:off x="1087329" y="2214071"/>
             <a:ext cx="2637082" cy="0"/>
           </a:xfrm>
           <a:prstGeom prst="line">
@@ -4959,7 +5221,7 @@
         </p:nvCxnSpPr>
         <p:spPr>
           <a:xfrm flipH="1">
-            <a:off x="5322988" y="2215124"/>
+            <a:off x="5783930" y="2254229"/>
             <a:ext cx="2637082" cy="0"/>
           </a:xfrm>
           <a:prstGeom prst="line">
@@ -5002,51 +5264,8 @@
         </p:nvCxnSpPr>
         <p:spPr>
           <a:xfrm flipH="1">
-            <a:off x="1087330" y="1035272"/>
-            <a:ext cx="7618730" cy="0"/>
-          </a:xfrm>
-          <a:prstGeom prst="line">
-            <a:avLst/>
-          </a:prstGeom>
-          <a:ln>
-            <a:solidFill>
-              <a:schemeClr val="tx1"/>
-            </a:solidFill>
-          </a:ln>
-        </p:spPr>
-        <p:style>
-          <a:lnRef idx="2">
-            <a:schemeClr val="accent1"/>
-          </a:lnRef>
-          <a:fillRef idx="0">
-            <a:schemeClr val="accent1"/>
-          </a:fillRef>
-          <a:effectRef idx="1">
-            <a:schemeClr val="accent1"/>
-          </a:effectRef>
-          <a:fontRef idx="minor">
-            <a:schemeClr val="tx1"/>
-          </a:fontRef>
-        </p:style>
-      </p:cxnSp>
-      <p:cxnSp>
-        <p:nvCxnSpPr>
-          <p:cNvPr id="66" name="Straight Connector 65">
-            <a:extLst>
-              <a:ext uri="{FF2B5EF4-FFF2-40B4-BE49-F238E27FC236}">
-                <a16:creationId xmlns:a16="http://schemas.microsoft.com/office/drawing/2014/main" id="{E916ED53-94A6-4488-6531-80AAAA091B8D}"/>
-              </a:ext>
-            </a:extLst>
-          </p:cNvPr>
-          <p:cNvCxnSpPr>
-            <a:cxnSpLocks/>
-          </p:cNvCxnSpPr>
-          <p:nvPr/>
-        </p:nvCxnSpPr>
-        <p:spPr>
-          <a:xfrm flipH="1">
-            <a:off x="9644332" y="1033341"/>
-            <a:ext cx="2331110" cy="0"/>
+            <a:off x="1087329" y="1319288"/>
+            <a:ext cx="7618731" cy="0"/>
           </a:xfrm>
           <a:prstGeom prst="line">
             <a:avLst/>
@@ -5088,8 +5307,8 @@
         </p:nvCxnSpPr>
         <p:spPr>
           <a:xfrm>
-            <a:off x="8706060" y="2241716"/>
-            <a:ext cx="0" cy="2849302"/>
+            <a:off x="8979938" y="2229345"/>
+            <a:ext cx="0" cy="2849303"/>
           </a:xfrm>
           <a:prstGeom prst="line">
             <a:avLst/>
@@ -5119,225 +5338,6 @@
           </a:fontRef>
         </p:style>
       </p:cxnSp>
-      <p:sp>
-        <p:nvSpPr>
-          <p:cNvPr id="69" name="Arc 68">
-            <a:extLst>
-              <a:ext uri="{FF2B5EF4-FFF2-40B4-BE49-F238E27FC236}">
-                <a16:creationId xmlns:a16="http://schemas.microsoft.com/office/drawing/2014/main" id="{C77FCEA9-E586-325E-8EC9-D8A21F4F9788}"/>
-              </a:ext>
-            </a:extLst>
-          </p:cNvPr>
-          <p:cNvSpPr/>
-          <p:nvPr/>
-        </p:nvSpPr>
-        <p:spPr>
-          <a:xfrm rot="2405634">
-            <a:off x="8899796" y="2990546"/>
-            <a:ext cx="1392469" cy="1612984"/>
-          </a:xfrm>
-          <a:prstGeom prst="arc">
-            <a:avLst/>
-          </a:prstGeom>
-          <a:ln>
-            <a:solidFill>
-              <a:schemeClr val="tx1"/>
-            </a:solidFill>
-          </a:ln>
-        </p:spPr>
-        <p:style>
-          <a:lnRef idx="2">
-            <a:schemeClr val="accent1"/>
-          </a:lnRef>
-          <a:fillRef idx="0">
-            <a:schemeClr val="accent1"/>
-          </a:fillRef>
-          <a:effectRef idx="1">
-            <a:schemeClr val="accent1"/>
-          </a:effectRef>
-          <a:fontRef idx="minor">
-            <a:schemeClr val="tx1"/>
-          </a:fontRef>
-        </p:style>
-        <p:txBody>
-          <a:bodyPr rtlCol="0" anchor="ctr"/>
-          <a:lstStyle/>
-          <a:p>
-            <a:pPr algn="ctr"/>
-            <a:endParaRPr lang="en-DK"/>
-          </a:p>
-        </p:txBody>
-      </p:sp>
-      <p:sp>
-        <p:nvSpPr>
-          <p:cNvPr id="70" name="Arc 69">
-            <a:extLst>
-              <a:ext uri="{FF2B5EF4-FFF2-40B4-BE49-F238E27FC236}">
-                <a16:creationId xmlns:a16="http://schemas.microsoft.com/office/drawing/2014/main" id="{70F2A0A2-7D4A-592A-D45E-192C35CFB945}"/>
-              </a:ext>
-            </a:extLst>
-          </p:cNvPr>
-          <p:cNvSpPr/>
-          <p:nvPr/>
-        </p:nvSpPr>
-        <p:spPr>
-          <a:xfrm rot="2575157">
-            <a:off x="8823586" y="2773174"/>
-            <a:ext cx="1929280" cy="2072246"/>
-          </a:xfrm>
-          <a:prstGeom prst="arc">
-            <a:avLst/>
-          </a:prstGeom>
-          <a:ln>
-            <a:solidFill>
-              <a:schemeClr val="tx1"/>
-            </a:solidFill>
-          </a:ln>
-        </p:spPr>
-        <p:style>
-          <a:lnRef idx="2">
-            <a:schemeClr val="accent1"/>
-          </a:lnRef>
-          <a:fillRef idx="0">
-            <a:schemeClr val="accent1"/>
-          </a:fillRef>
-          <a:effectRef idx="1">
-            <a:schemeClr val="accent1"/>
-          </a:effectRef>
-          <a:fontRef idx="minor">
-            <a:schemeClr val="tx1"/>
-          </a:fontRef>
-        </p:style>
-        <p:txBody>
-          <a:bodyPr rtlCol="0" anchor="ctr"/>
-          <a:lstStyle/>
-          <a:p>
-            <a:pPr algn="ctr"/>
-            <a:endParaRPr lang="en-DK"/>
-          </a:p>
-        </p:txBody>
-      </p:sp>
-      <p:sp>
-        <p:nvSpPr>
-          <p:cNvPr id="71" name="Arc 70">
-            <a:extLst>
-              <a:ext uri="{FF2B5EF4-FFF2-40B4-BE49-F238E27FC236}">
-                <a16:creationId xmlns:a16="http://schemas.microsoft.com/office/drawing/2014/main" id="{5470007E-99B7-1346-FB02-420C664C6093}"/>
-              </a:ext>
-            </a:extLst>
-          </p:cNvPr>
-          <p:cNvSpPr/>
-          <p:nvPr/>
-        </p:nvSpPr>
-        <p:spPr>
-          <a:xfrm rot="2643055">
-            <a:off x="8761547" y="2558015"/>
-            <a:ext cx="2428095" cy="2445236"/>
-          </a:xfrm>
-          <a:prstGeom prst="arc">
-            <a:avLst/>
-          </a:prstGeom>
-          <a:ln>
-            <a:solidFill>
-              <a:schemeClr val="tx1"/>
-            </a:solidFill>
-          </a:ln>
-        </p:spPr>
-        <p:style>
-          <a:lnRef idx="2">
-            <a:schemeClr val="accent1"/>
-          </a:lnRef>
-          <a:fillRef idx="0">
-            <a:schemeClr val="accent1"/>
-          </a:fillRef>
-          <a:effectRef idx="1">
-            <a:schemeClr val="accent1"/>
-          </a:effectRef>
-          <a:fontRef idx="minor">
-            <a:schemeClr val="tx1"/>
-          </a:fontRef>
-        </p:style>
-        <p:txBody>
-          <a:bodyPr rtlCol="0" anchor="ctr"/>
-          <a:lstStyle/>
-          <a:p>
-            <a:pPr algn="ctr"/>
-            <a:endParaRPr lang="en-DK"/>
-          </a:p>
-        </p:txBody>
-      </p:sp>
-      <p:pic>
-        <p:nvPicPr>
-          <p:cNvPr id="7" name="Picture 6" descr="A black background with a black square&#10;&#10;Description automatically generated with medium confidence">
-            <a:extLst>
-              <a:ext uri="{FF2B5EF4-FFF2-40B4-BE49-F238E27FC236}">
-                <a16:creationId xmlns:a16="http://schemas.microsoft.com/office/drawing/2014/main" id="{4F84509F-17EF-F5B5-4F2F-0779B70A522D}"/>
-              </a:ext>
-            </a:extLst>
-          </p:cNvPr>
-          <p:cNvPicPr>
-            <a:picLocks noChangeAspect="1"/>
-          </p:cNvPicPr>
-          <p:nvPr/>
-        </p:nvPicPr>
-        <p:blipFill>
-          <a:blip r:embed="rId2">
-            <a:extLst>
-              <a:ext uri="{28A0092B-C50C-407E-A947-70E740481C1C}">
-                <a14:useLocalDpi xmlns:a14="http://schemas.microsoft.com/office/drawing/2010/main" val="0"/>
-              </a:ext>
-            </a:extLst>
-          </a:blip>
-          <a:stretch>
-            <a:fillRect/>
-          </a:stretch>
-        </p:blipFill>
-        <p:spPr>
-          <a:xfrm>
-            <a:off x="3262297" y="1695063"/>
-            <a:ext cx="2782020" cy="637315"/>
-          </a:xfrm>
-          <a:prstGeom prst="rect">
-            <a:avLst/>
-          </a:prstGeom>
-        </p:spPr>
-      </p:pic>
-      <p:pic>
-        <p:nvPicPr>
-          <p:cNvPr id="11" name="Picture 10" descr="A black background with a black square&#10;&#10;Description automatically generated with medium confidence">
-            <a:extLst>
-              <a:ext uri="{FF2B5EF4-FFF2-40B4-BE49-F238E27FC236}">
-                <a16:creationId xmlns:a16="http://schemas.microsoft.com/office/drawing/2014/main" id="{3BEE0348-28C9-57B3-6992-EDC33166E696}"/>
-              </a:ext>
-            </a:extLst>
-          </p:cNvPr>
-          <p:cNvPicPr>
-            <a:picLocks noChangeAspect="1"/>
-          </p:cNvPicPr>
-          <p:nvPr/>
-        </p:nvPicPr>
-        <p:blipFill>
-          <a:blip r:embed="rId3">
-            <a:extLst>
-              <a:ext uri="{28A0092B-C50C-407E-A947-70E740481C1C}">
-                <a14:useLocalDpi xmlns:a14="http://schemas.microsoft.com/office/drawing/2010/main" val="0"/>
-              </a:ext>
-            </a:extLst>
-          </a:blip>
-          <a:stretch>
-            <a:fillRect/>
-          </a:stretch>
-        </p:blipFill>
-        <p:spPr>
-          <a:xfrm>
-            <a:off x="-7588" y="2623659"/>
-            <a:ext cx="2707204" cy="623461"/>
-          </a:xfrm>
-          <a:prstGeom prst="rect">
-            <a:avLst/>
-          </a:prstGeom>
-        </p:spPr>
-      </p:pic>
       <p:pic>
         <p:nvPicPr>
           <p:cNvPr id="13" name="Picture 12" descr="A black background with a black square&#10;&#10;Description automatically generated with medium confidence">
@@ -5402,7 +5402,7 @@
         </p:blipFill>
         <p:spPr>
           <a:xfrm>
-            <a:off x="5520493" y="1880831"/>
+            <a:off x="5976374" y="1875559"/>
             <a:ext cx="3316810" cy="623461"/>
           </a:xfrm>
           <a:prstGeom prst="rect">
@@ -5412,10 +5412,10 @@
       </p:pic>
       <p:pic>
         <p:nvPicPr>
-          <p:cNvPr id="19" name="Picture 18" descr="A black background with a black square&#10;&#10;Description automatically generated with medium confidence">
-            <a:extLst>
-              <a:ext uri="{FF2B5EF4-FFF2-40B4-BE49-F238E27FC236}">
-                <a16:creationId xmlns:a16="http://schemas.microsoft.com/office/drawing/2014/main" id="{C60699ED-6C50-3C27-4690-D0C45BC40C84}"/>
+          <p:cNvPr id="21" name="Picture 20" descr="A black background with a black square&#10;&#10;Description automatically generated with medium confidence">
+            <a:extLst>
+              <a:ext uri="{FF2B5EF4-FFF2-40B4-BE49-F238E27FC236}">
+                <a16:creationId xmlns:a16="http://schemas.microsoft.com/office/drawing/2014/main" id="{641167B6-3FC8-EFA9-29C6-C3F31F816195}"/>
               </a:ext>
             </a:extLst>
           </p:cNvPr>
@@ -5438,8 +5438,8 @@
         </p:blipFill>
         <p:spPr>
           <a:xfrm>
-            <a:off x="7900217" y="1702282"/>
-            <a:ext cx="1695813" cy="462746"/>
+            <a:off x="3934133" y="959631"/>
+            <a:ext cx="3314040" cy="623461"/>
           </a:xfrm>
           <a:prstGeom prst="rect">
             <a:avLst/>
@@ -5448,10 +5448,10 @@
       </p:pic>
       <p:pic>
         <p:nvPicPr>
-          <p:cNvPr id="21" name="Picture 20" descr="A black background with a black square&#10;&#10;Description automatically generated with medium confidence">
-            <a:extLst>
-              <a:ext uri="{FF2B5EF4-FFF2-40B4-BE49-F238E27FC236}">
-                <a16:creationId xmlns:a16="http://schemas.microsoft.com/office/drawing/2014/main" id="{641167B6-3FC8-EFA9-29C6-C3F31F816195}"/>
+          <p:cNvPr id="53" name="Picture 52" descr="A black background with a black square&#10;&#10;Description automatically generated with medium confidence">
+            <a:extLst>
+              <a:ext uri="{FF2B5EF4-FFF2-40B4-BE49-F238E27FC236}">
+                <a16:creationId xmlns:a16="http://schemas.microsoft.com/office/drawing/2014/main" id="{DE894582-E3DB-2B80-A464-D25EBB833905}"/>
               </a:ext>
             </a:extLst>
           </p:cNvPr>
@@ -5474,8 +5474,8 @@
         </p:blipFill>
         <p:spPr>
           <a:xfrm>
-            <a:off x="3934134" y="675615"/>
-            <a:ext cx="3314039" cy="623461"/>
+            <a:off x="8317181" y="1611756"/>
+            <a:ext cx="2158559" cy="648399"/>
           </a:xfrm>
           <a:prstGeom prst="rect">
             <a:avLst/>
@@ -5484,10 +5484,10 @@
       </p:pic>
       <p:pic>
         <p:nvPicPr>
-          <p:cNvPr id="38" name="Picture 37" descr="A black background with a black square&#10;&#10;Description automatically generated with medium confidence">
-            <a:extLst>
-              <a:ext uri="{FF2B5EF4-FFF2-40B4-BE49-F238E27FC236}">
-                <a16:creationId xmlns:a16="http://schemas.microsoft.com/office/drawing/2014/main" id="{E343AAA8-66D9-2A15-7126-7FFCEBF99022}"/>
+          <p:cNvPr id="55" name="Picture 54" descr="A black background with a black square&#10;&#10;Description automatically generated with medium confidence">
+            <a:extLst>
+              <a:ext uri="{FF2B5EF4-FFF2-40B4-BE49-F238E27FC236}">
+                <a16:creationId xmlns:a16="http://schemas.microsoft.com/office/drawing/2014/main" id="{87B27784-2B6E-7C36-C908-86D20C16D2AA}"/>
               </a:ext>
             </a:extLst>
           </p:cNvPr>
@@ -5510,8 +5510,8 @@
         </p:blipFill>
         <p:spPr>
           <a:xfrm>
-            <a:off x="9623926" y="686268"/>
-            <a:ext cx="2371921" cy="482143"/>
+            <a:off x="3638450" y="1405408"/>
+            <a:ext cx="2183498" cy="911638"/>
           </a:xfrm>
           <a:prstGeom prst="rect">
             <a:avLst/>

</xml_diff>

<commit_message>
nf ff regions figur opdateret igen x2
</commit_message>
<xml_diff>
--- a/Figures/TechnicalAnalysis/NFFF/nfFfRegions.pptx
+++ b/Figures/TechnicalAnalysis/NFFF/nfFfRegions.pptx
@@ -5221,7 +5221,7 @@
         </p:nvCxnSpPr>
         <p:spPr>
           <a:xfrm flipH="1">
-            <a:off x="5783930" y="2254229"/>
+            <a:off x="5776366" y="2138301"/>
             <a:ext cx="2637082" cy="0"/>
           </a:xfrm>
           <a:prstGeom prst="line">
@@ -5402,7 +5402,7 @@
         </p:blipFill>
         <p:spPr>
           <a:xfrm>
-            <a:off x="5976374" y="1875559"/>
+            <a:off x="5968810" y="1759631"/>
             <a:ext cx="3316810" cy="623461"/>
           </a:xfrm>
           <a:prstGeom prst="rect">

</xml_diff>

<commit_message>
nf ff regions figur opdateret igen x3
</commit_message>
<xml_diff>
--- a/Figures/TechnicalAnalysis/NFFF/nfFfRegions.pptx
+++ b/Figures/TechnicalAnalysis/NFFF/nfFfRegions.pptx
@@ -3374,7 +3374,7 @@
         </p:nvCxnSpPr>
         <p:spPr>
           <a:xfrm flipH="1">
-            <a:off x="9328216" y="1319288"/>
+            <a:off x="9328216" y="1288380"/>
             <a:ext cx="2277188" cy="595"/>
           </a:xfrm>
           <a:prstGeom prst="line">
@@ -3759,7 +3759,7 @@
         </p:blipFill>
         <p:spPr>
           <a:xfrm>
-            <a:off x="9307811" y="972810"/>
+            <a:off x="9281478" y="950166"/>
             <a:ext cx="2390430" cy="482143"/>
           </a:xfrm>
           <a:prstGeom prst="rect">
@@ -5178,7 +5178,7 @@
         </p:nvCxnSpPr>
         <p:spPr>
           <a:xfrm flipH="1">
-            <a:off x="1087329" y="2214071"/>
+            <a:off x="1087329" y="2160000"/>
             <a:ext cx="2637082" cy="0"/>
           </a:xfrm>
           <a:prstGeom prst="line">
@@ -5221,8 +5221,8 @@
         </p:nvCxnSpPr>
         <p:spPr>
           <a:xfrm flipH="1">
-            <a:off x="5776366" y="2138301"/>
-            <a:ext cx="2637082" cy="0"/>
+            <a:off x="5776366" y="2160000"/>
+            <a:ext cx="2628000" cy="0"/>
           </a:xfrm>
           <a:prstGeom prst="line">
             <a:avLst/>
@@ -5264,7 +5264,7 @@
         </p:nvCxnSpPr>
         <p:spPr>
           <a:xfrm flipH="1">
-            <a:off x="1087329" y="1319288"/>
+            <a:off x="1080000" y="1281188"/>
             <a:ext cx="7618731" cy="0"/>
           </a:xfrm>
           <a:prstGeom prst="line">
@@ -5366,7 +5366,7 @@
         </p:blipFill>
         <p:spPr>
           <a:xfrm>
-            <a:off x="1716260" y="1857184"/>
+            <a:off x="1719316" y="1827223"/>
             <a:ext cx="2707204" cy="623461"/>
           </a:xfrm>
           <a:prstGeom prst="rect">
@@ -5402,7 +5402,7 @@
         </p:blipFill>
         <p:spPr>
           <a:xfrm>
-            <a:off x="5968810" y="1759631"/>
+            <a:off x="5970031" y="1827430"/>
             <a:ext cx="3316810" cy="623461"/>
           </a:xfrm>
           <a:prstGeom prst="rect">
@@ -5438,7 +5438,7 @@
         </p:blipFill>
         <p:spPr>
           <a:xfrm>
-            <a:off x="3934133" y="959631"/>
+            <a:off x="3934133" y="948589"/>
             <a:ext cx="3314040" cy="623461"/>
           </a:xfrm>
           <a:prstGeom prst="rect">

</xml_diff>

<commit_message>
nf ff regions figur opdateret igen x5
</commit_message>
<xml_diff>
--- a/Figures/TechnicalAnalysis/NFFF/nfFfRegions.pptx
+++ b/Figures/TechnicalAnalysis/NFFF/nfFfRegions.pptx
@@ -3358,2166 +3358,2187 @@
           <a:chExt cx="0" cy="0"/>
         </a:xfrm>
       </p:grpSpPr>
-      <p:cxnSp>
-        <p:nvCxnSpPr>
-          <p:cNvPr id="66" name="Straight Connector 65">
-            <a:extLst>
-              <a:ext uri="{FF2B5EF4-FFF2-40B4-BE49-F238E27FC236}">
-                <a16:creationId xmlns:a16="http://schemas.microsoft.com/office/drawing/2014/main" id="{E916ED53-94A6-4488-6531-80AAAA091B8D}"/>
-              </a:ext>
-            </a:extLst>
-          </p:cNvPr>
-          <p:cNvCxnSpPr>
-            <a:cxnSpLocks/>
-          </p:cNvCxnSpPr>
+      <p:grpSp>
+        <p:nvGrpSpPr>
+          <p:cNvPr id="2" name="Group 1">
+            <a:extLst>
+              <a:ext uri="{FF2B5EF4-FFF2-40B4-BE49-F238E27FC236}">
+                <a16:creationId xmlns:a16="http://schemas.microsoft.com/office/drawing/2014/main" id="{B856FF0D-DB64-2960-FF05-98487CE7E557}"/>
+              </a:ext>
+            </a:extLst>
+          </p:cNvPr>
+          <p:cNvGrpSpPr/>
           <p:nvPr/>
-        </p:nvCxnSpPr>
-        <p:spPr>
-          <a:xfrm flipH="1">
-            <a:off x="9328216" y="1288380"/>
-            <a:ext cx="2277188" cy="595"/>
+        </p:nvGrpSpPr>
+        <p:grpSpPr>
+          <a:xfrm>
+            <a:off x="-144952" y="2616375"/>
+            <a:ext cx="11816860" cy="4451143"/>
+            <a:chOff x="-144952" y="948589"/>
+            <a:chExt cx="11816860" cy="4451143"/>
           </a:xfrm>
-          <a:prstGeom prst="line">
-            <a:avLst/>
-          </a:prstGeom>
-          <a:ln>
-            <a:solidFill>
+        </p:grpSpPr>
+        <p:cxnSp>
+          <p:nvCxnSpPr>
+            <p:cNvPr id="66" name="Straight Connector 65">
+              <a:extLst>
+                <a:ext uri="{FF2B5EF4-FFF2-40B4-BE49-F238E27FC236}">
+                  <a16:creationId xmlns:a16="http://schemas.microsoft.com/office/drawing/2014/main" id="{E916ED53-94A6-4488-6531-80AAAA091B8D}"/>
+                </a:ext>
+              </a:extLst>
+            </p:cNvPr>
+            <p:cNvCxnSpPr>
+              <a:cxnSpLocks/>
+            </p:cNvCxnSpPr>
+            <p:nvPr/>
+          </p:nvCxnSpPr>
+          <p:spPr>
+            <a:xfrm flipH="1">
+              <a:off x="9328216" y="1288380"/>
+              <a:ext cx="2277188" cy="595"/>
+            </a:xfrm>
+            <a:prstGeom prst="line">
+              <a:avLst/>
+            </a:prstGeom>
+            <a:ln>
+              <a:solidFill>
+                <a:schemeClr val="tx1"/>
+              </a:solidFill>
+            </a:ln>
+          </p:spPr>
+          <p:style>
+            <a:lnRef idx="2">
+              <a:schemeClr val="accent1"/>
+            </a:lnRef>
+            <a:fillRef idx="0">
+              <a:schemeClr val="accent1"/>
+            </a:fillRef>
+            <a:effectRef idx="1">
+              <a:schemeClr val="accent1"/>
+            </a:effectRef>
+            <a:fontRef idx="minor">
               <a:schemeClr val="tx1"/>
-            </a:solidFill>
-          </a:ln>
-        </p:spPr>
-        <p:style>
-          <a:lnRef idx="2">
-            <a:schemeClr val="accent1"/>
-          </a:lnRef>
-          <a:fillRef idx="0">
-            <a:schemeClr val="accent1"/>
-          </a:fillRef>
-          <a:effectRef idx="1">
-            <a:schemeClr val="accent1"/>
-          </a:effectRef>
-          <a:fontRef idx="minor">
-            <a:schemeClr val="tx1"/>
-          </a:fontRef>
-        </p:style>
-      </p:cxnSp>
-      <p:sp>
-        <p:nvSpPr>
-          <p:cNvPr id="25" name="Arc 24">
-            <a:extLst>
-              <a:ext uri="{FF2B5EF4-FFF2-40B4-BE49-F238E27FC236}">
-                <a16:creationId xmlns:a16="http://schemas.microsoft.com/office/drawing/2014/main" id="{E482A656-A53E-87D9-998D-F635E7DD2DC3}"/>
-              </a:ext>
-            </a:extLst>
-          </p:cNvPr>
-          <p:cNvSpPr/>
-          <p:nvPr/>
-        </p:nvSpPr>
-        <p:spPr>
-          <a:xfrm rot="2405634">
-            <a:off x="544597" y="3772413"/>
-            <a:ext cx="1392468" cy="1612984"/>
-          </a:xfrm>
-          <a:prstGeom prst="arc">
-            <a:avLst/>
-          </a:prstGeom>
-          <a:ln>
-            <a:solidFill>
+            </a:fontRef>
+          </p:style>
+        </p:cxnSp>
+        <p:sp>
+          <p:nvSpPr>
+            <p:cNvPr id="25" name="Arc 24">
+              <a:extLst>
+                <a:ext uri="{FF2B5EF4-FFF2-40B4-BE49-F238E27FC236}">
+                  <a16:creationId xmlns:a16="http://schemas.microsoft.com/office/drawing/2014/main" id="{E482A656-A53E-87D9-998D-F635E7DD2DC3}"/>
+                </a:ext>
+              </a:extLst>
+            </p:cNvPr>
+            <p:cNvSpPr/>
+            <p:nvPr/>
+          </p:nvSpPr>
+          <p:spPr>
+            <a:xfrm rot="2405634">
+              <a:off x="544597" y="3772413"/>
+              <a:ext cx="1392468" cy="1612984"/>
+            </a:xfrm>
+            <a:prstGeom prst="arc">
+              <a:avLst/>
+            </a:prstGeom>
+            <a:ln>
+              <a:solidFill>
+                <a:schemeClr val="tx1"/>
+              </a:solidFill>
+            </a:ln>
+          </p:spPr>
+          <p:style>
+            <a:lnRef idx="2">
+              <a:schemeClr val="accent1"/>
+            </a:lnRef>
+            <a:fillRef idx="0">
+              <a:schemeClr val="accent1"/>
+            </a:fillRef>
+            <a:effectRef idx="1">
+              <a:schemeClr val="accent1"/>
+            </a:effectRef>
+            <a:fontRef idx="minor">
               <a:schemeClr val="tx1"/>
-            </a:solidFill>
-          </a:ln>
-        </p:spPr>
-        <p:style>
-          <a:lnRef idx="2">
-            <a:schemeClr val="accent1"/>
-          </a:lnRef>
-          <a:fillRef idx="0">
-            <a:schemeClr val="accent1"/>
-          </a:fillRef>
-          <a:effectRef idx="1">
-            <a:schemeClr val="accent1"/>
-          </a:effectRef>
-          <a:fontRef idx="minor">
-            <a:schemeClr val="tx1"/>
-          </a:fontRef>
-        </p:style>
-        <p:txBody>
-          <a:bodyPr rtlCol="0" anchor="ctr"/>
-          <a:lstStyle/>
-          <a:p>
-            <a:pPr algn="ctr"/>
-            <a:endParaRPr lang="en-DK"/>
-          </a:p>
-        </p:txBody>
-      </p:sp>
-      <p:sp>
-        <p:nvSpPr>
-          <p:cNvPr id="15" name="Arc 14">
-            <a:extLst>
-              <a:ext uri="{FF2B5EF4-FFF2-40B4-BE49-F238E27FC236}">
-                <a16:creationId xmlns:a16="http://schemas.microsoft.com/office/drawing/2014/main" id="{10AC830A-C004-7540-2E1B-FB97FB53C2B7}"/>
-              </a:ext>
-            </a:extLst>
-          </p:cNvPr>
-          <p:cNvSpPr/>
-          <p:nvPr/>
-        </p:nvSpPr>
-        <p:spPr>
-          <a:xfrm rot="2405634">
-            <a:off x="-144952" y="2478052"/>
-            <a:ext cx="1392468" cy="1612984"/>
-          </a:xfrm>
-          <a:prstGeom prst="arc">
-            <a:avLst/>
-          </a:prstGeom>
-          <a:ln>
-            <a:solidFill>
+            </a:fontRef>
+          </p:style>
+          <p:txBody>
+            <a:bodyPr rtlCol="0" anchor="ctr"/>
+            <a:lstStyle/>
+            <a:p>
+              <a:pPr algn="ctr"/>
+              <a:endParaRPr lang="en-DK"/>
+            </a:p>
+          </p:txBody>
+        </p:sp>
+        <p:sp>
+          <p:nvSpPr>
+            <p:cNvPr id="15" name="Arc 14">
+              <a:extLst>
+                <a:ext uri="{FF2B5EF4-FFF2-40B4-BE49-F238E27FC236}">
+                  <a16:creationId xmlns:a16="http://schemas.microsoft.com/office/drawing/2014/main" id="{10AC830A-C004-7540-2E1B-FB97FB53C2B7}"/>
+                </a:ext>
+              </a:extLst>
+            </p:cNvPr>
+            <p:cNvSpPr/>
+            <p:nvPr/>
+          </p:nvSpPr>
+          <p:spPr>
+            <a:xfrm rot="2405634">
+              <a:off x="-144952" y="2478052"/>
+              <a:ext cx="1392468" cy="1612984"/>
+            </a:xfrm>
+            <a:prstGeom prst="arc">
+              <a:avLst/>
+            </a:prstGeom>
+            <a:ln>
+              <a:solidFill>
+                <a:schemeClr val="tx1"/>
+              </a:solidFill>
+            </a:ln>
+          </p:spPr>
+          <p:style>
+            <a:lnRef idx="2">
+              <a:schemeClr val="accent1"/>
+            </a:lnRef>
+            <a:fillRef idx="0">
+              <a:schemeClr val="accent1"/>
+            </a:fillRef>
+            <a:effectRef idx="1">
+              <a:schemeClr val="accent1"/>
+            </a:effectRef>
+            <a:fontRef idx="minor">
               <a:schemeClr val="tx1"/>
-            </a:solidFill>
-          </a:ln>
-        </p:spPr>
-        <p:style>
-          <a:lnRef idx="2">
-            <a:schemeClr val="accent1"/>
-          </a:lnRef>
-          <a:fillRef idx="0">
-            <a:schemeClr val="accent1"/>
-          </a:fillRef>
-          <a:effectRef idx="1">
-            <a:schemeClr val="accent1"/>
-          </a:effectRef>
-          <a:fontRef idx="minor">
-            <a:schemeClr val="tx1"/>
-          </a:fontRef>
-        </p:style>
-        <p:txBody>
-          <a:bodyPr rtlCol="0" anchor="ctr"/>
-          <a:lstStyle/>
-          <a:p>
-            <a:pPr algn="ctr"/>
-            <a:endParaRPr lang="en-DK"/>
-          </a:p>
-        </p:txBody>
-      </p:sp>
-      <p:sp>
-        <p:nvSpPr>
-          <p:cNvPr id="16" name="Arc 15">
-            <a:extLst>
-              <a:ext uri="{FF2B5EF4-FFF2-40B4-BE49-F238E27FC236}">
-                <a16:creationId xmlns:a16="http://schemas.microsoft.com/office/drawing/2014/main" id="{440D4BFA-2E8A-5A1C-5F11-EECC0D215557}"/>
-              </a:ext>
-            </a:extLst>
-          </p:cNvPr>
-          <p:cNvSpPr/>
-          <p:nvPr/>
-        </p:nvSpPr>
-        <p:spPr>
-          <a:xfrm rot="2405634">
-            <a:off x="-144950" y="3763183"/>
-            <a:ext cx="1392468" cy="1612984"/>
-          </a:xfrm>
-          <a:prstGeom prst="arc">
-            <a:avLst/>
-          </a:prstGeom>
-          <a:ln>
-            <a:solidFill>
+            </a:fontRef>
+          </p:style>
+          <p:txBody>
+            <a:bodyPr rtlCol="0" anchor="ctr"/>
+            <a:lstStyle/>
+            <a:p>
+              <a:pPr algn="ctr"/>
+              <a:endParaRPr lang="en-DK"/>
+            </a:p>
+          </p:txBody>
+        </p:sp>
+        <p:sp>
+          <p:nvSpPr>
+            <p:cNvPr id="16" name="Arc 15">
+              <a:extLst>
+                <a:ext uri="{FF2B5EF4-FFF2-40B4-BE49-F238E27FC236}">
+                  <a16:creationId xmlns:a16="http://schemas.microsoft.com/office/drawing/2014/main" id="{440D4BFA-2E8A-5A1C-5F11-EECC0D215557}"/>
+                </a:ext>
+              </a:extLst>
+            </p:cNvPr>
+            <p:cNvSpPr/>
+            <p:nvPr/>
+          </p:nvSpPr>
+          <p:spPr>
+            <a:xfrm rot="2405634">
+              <a:off x="-144950" y="3763183"/>
+              <a:ext cx="1392468" cy="1612984"/>
+            </a:xfrm>
+            <a:prstGeom prst="arc">
+              <a:avLst/>
+            </a:prstGeom>
+            <a:ln>
+              <a:solidFill>
+                <a:schemeClr val="tx1"/>
+              </a:solidFill>
+            </a:ln>
+          </p:spPr>
+          <p:style>
+            <a:lnRef idx="2">
+              <a:schemeClr val="accent1"/>
+            </a:lnRef>
+            <a:fillRef idx="0">
+              <a:schemeClr val="accent1"/>
+            </a:fillRef>
+            <a:effectRef idx="1">
+              <a:schemeClr val="accent1"/>
+            </a:effectRef>
+            <a:fontRef idx="minor">
               <a:schemeClr val="tx1"/>
-            </a:solidFill>
-          </a:ln>
-        </p:spPr>
-        <p:style>
-          <a:lnRef idx="2">
-            <a:schemeClr val="accent1"/>
-          </a:lnRef>
-          <a:fillRef idx="0">
-            <a:schemeClr val="accent1"/>
-          </a:fillRef>
-          <a:effectRef idx="1">
-            <a:schemeClr val="accent1"/>
-          </a:effectRef>
-          <a:fontRef idx="minor">
-            <a:schemeClr val="tx1"/>
-          </a:fontRef>
-        </p:style>
-        <p:txBody>
-          <a:bodyPr rtlCol="0" anchor="ctr"/>
-          <a:lstStyle/>
-          <a:p>
-            <a:pPr algn="ctr"/>
-            <a:endParaRPr lang="en-DK"/>
-          </a:p>
-        </p:txBody>
-      </p:sp>
-      <p:sp>
-        <p:nvSpPr>
-          <p:cNvPr id="69" name="Arc 68">
-            <a:extLst>
-              <a:ext uri="{FF2B5EF4-FFF2-40B4-BE49-F238E27FC236}">
-                <a16:creationId xmlns:a16="http://schemas.microsoft.com/office/drawing/2014/main" id="{C77FCEA9-E586-325E-8EC9-D8A21F4F9788}"/>
-              </a:ext>
-            </a:extLst>
-          </p:cNvPr>
-          <p:cNvSpPr/>
-          <p:nvPr/>
-        </p:nvSpPr>
-        <p:spPr>
-          <a:xfrm rot="2405634">
-            <a:off x="8899796" y="2990546"/>
-            <a:ext cx="1392468" cy="1612984"/>
-          </a:xfrm>
-          <a:prstGeom prst="arc">
-            <a:avLst/>
-          </a:prstGeom>
-          <a:ln>
-            <a:solidFill>
+            </a:fontRef>
+          </p:style>
+          <p:txBody>
+            <a:bodyPr rtlCol="0" anchor="ctr"/>
+            <a:lstStyle/>
+            <a:p>
+              <a:pPr algn="ctr"/>
+              <a:endParaRPr lang="en-DK"/>
+            </a:p>
+          </p:txBody>
+        </p:sp>
+        <p:sp>
+          <p:nvSpPr>
+            <p:cNvPr id="69" name="Arc 68">
+              <a:extLst>
+                <a:ext uri="{FF2B5EF4-FFF2-40B4-BE49-F238E27FC236}">
+                  <a16:creationId xmlns:a16="http://schemas.microsoft.com/office/drawing/2014/main" id="{C77FCEA9-E586-325E-8EC9-D8A21F4F9788}"/>
+                </a:ext>
+              </a:extLst>
+            </p:cNvPr>
+            <p:cNvSpPr/>
+            <p:nvPr/>
+          </p:nvSpPr>
+          <p:spPr>
+            <a:xfrm rot="2405634">
+              <a:off x="8899796" y="2990546"/>
+              <a:ext cx="1392468" cy="1612984"/>
+            </a:xfrm>
+            <a:prstGeom prst="arc">
+              <a:avLst/>
+            </a:prstGeom>
+            <a:ln>
+              <a:solidFill>
+                <a:schemeClr val="tx1"/>
+              </a:solidFill>
+            </a:ln>
+          </p:spPr>
+          <p:style>
+            <a:lnRef idx="2">
+              <a:schemeClr val="accent1"/>
+            </a:lnRef>
+            <a:fillRef idx="0">
+              <a:schemeClr val="accent1"/>
+            </a:fillRef>
+            <a:effectRef idx="1">
+              <a:schemeClr val="accent1"/>
+            </a:effectRef>
+            <a:fontRef idx="minor">
               <a:schemeClr val="tx1"/>
-            </a:solidFill>
-          </a:ln>
-        </p:spPr>
-        <p:style>
-          <a:lnRef idx="2">
-            <a:schemeClr val="accent1"/>
-          </a:lnRef>
-          <a:fillRef idx="0">
-            <a:schemeClr val="accent1"/>
-          </a:fillRef>
-          <a:effectRef idx="1">
-            <a:schemeClr val="accent1"/>
-          </a:effectRef>
-          <a:fontRef idx="minor">
-            <a:schemeClr val="tx1"/>
-          </a:fontRef>
-        </p:style>
-        <p:txBody>
-          <a:bodyPr rtlCol="0" anchor="ctr"/>
-          <a:lstStyle/>
-          <a:p>
-            <a:pPr algn="ctr"/>
-            <a:endParaRPr lang="en-DK"/>
-          </a:p>
-        </p:txBody>
-      </p:sp>
-      <p:sp>
-        <p:nvSpPr>
-          <p:cNvPr id="70" name="Arc 69">
-            <a:extLst>
-              <a:ext uri="{FF2B5EF4-FFF2-40B4-BE49-F238E27FC236}">
-                <a16:creationId xmlns:a16="http://schemas.microsoft.com/office/drawing/2014/main" id="{70F2A0A2-7D4A-592A-D45E-192C35CFB945}"/>
-              </a:ext>
-            </a:extLst>
-          </p:cNvPr>
-          <p:cNvSpPr/>
-          <p:nvPr/>
-        </p:nvSpPr>
-        <p:spPr>
-          <a:xfrm rot="2575157">
-            <a:off x="8823585" y="2773174"/>
-            <a:ext cx="1929280" cy="2072247"/>
-          </a:xfrm>
-          <a:prstGeom prst="arc">
-            <a:avLst/>
-          </a:prstGeom>
-          <a:ln>
-            <a:solidFill>
+            </a:fontRef>
+          </p:style>
+          <p:txBody>
+            <a:bodyPr rtlCol="0" anchor="ctr"/>
+            <a:lstStyle/>
+            <a:p>
+              <a:pPr algn="ctr"/>
+              <a:endParaRPr lang="en-DK"/>
+            </a:p>
+          </p:txBody>
+        </p:sp>
+        <p:sp>
+          <p:nvSpPr>
+            <p:cNvPr id="70" name="Arc 69">
+              <a:extLst>
+                <a:ext uri="{FF2B5EF4-FFF2-40B4-BE49-F238E27FC236}">
+                  <a16:creationId xmlns:a16="http://schemas.microsoft.com/office/drawing/2014/main" id="{70F2A0A2-7D4A-592A-D45E-192C35CFB945}"/>
+                </a:ext>
+              </a:extLst>
+            </p:cNvPr>
+            <p:cNvSpPr/>
+            <p:nvPr/>
+          </p:nvSpPr>
+          <p:spPr>
+            <a:xfrm rot="2575157">
+              <a:off x="8823585" y="2773174"/>
+              <a:ext cx="1929280" cy="2072247"/>
+            </a:xfrm>
+            <a:prstGeom prst="arc">
+              <a:avLst/>
+            </a:prstGeom>
+            <a:ln>
+              <a:solidFill>
+                <a:schemeClr val="tx1"/>
+              </a:solidFill>
+            </a:ln>
+          </p:spPr>
+          <p:style>
+            <a:lnRef idx="2">
+              <a:schemeClr val="accent1"/>
+            </a:lnRef>
+            <a:fillRef idx="0">
+              <a:schemeClr val="accent1"/>
+            </a:fillRef>
+            <a:effectRef idx="1">
+              <a:schemeClr val="accent1"/>
+            </a:effectRef>
+            <a:fontRef idx="minor">
               <a:schemeClr val="tx1"/>
-            </a:solidFill>
-          </a:ln>
-        </p:spPr>
-        <p:style>
-          <a:lnRef idx="2">
-            <a:schemeClr val="accent1"/>
-          </a:lnRef>
-          <a:fillRef idx="0">
-            <a:schemeClr val="accent1"/>
-          </a:fillRef>
-          <a:effectRef idx="1">
-            <a:schemeClr val="accent1"/>
-          </a:effectRef>
-          <a:fontRef idx="minor">
-            <a:schemeClr val="tx1"/>
-          </a:fontRef>
-        </p:style>
-        <p:txBody>
-          <a:bodyPr rtlCol="0" anchor="ctr"/>
-          <a:lstStyle/>
-          <a:p>
-            <a:pPr algn="ctr"/>
-            <a:endParaRPr lang="en-DK"/>
-          </a:p>
-        </p:txBody>
-      </p:sp>
-      <p:sp>
-        <p:nvSpPr>
-          <p:cNvPr id="71" name="Arc 70">
-            <a:extLst>
-              <a:ext uri="{FF2B5EF4-FFF2-40B4-BE49-F238E27FC236}">
-                <a16:creationId xmlns:a16="http://schemas.microsoft.com/office/drawing/2014/main" id="{5470007E-99B7-1346-FB02-420C664C6093}"/>
-              </a:ext>
-            </a:extLst>
-          </p:cNvPr>
-          <p:cNvSpPr/>
-          <p:nvPr/>
-        </p:nvSpPr>
-        <p:spPr>
-          <a:xfrm rot="2643055">
-            <a:off x="8761547" y="2558015"/>
-            <a:ext cx="2428095" cy="2445237"/>
-          </a:xfrm>
-          <a:prstGeom prst="arc">
-            <a:avLst/>
-          </a:prstGeom>
-          <a:ln>
-            <a:solidFill>
+            </a:fontRef>
+          </p:style>
+          <p:txBody>
+            <a:bodyPr rtlCol="0" anchor="ctr"/>
+            <a:lstStyle/>
+            <a:p>
+              <a:pPr algn="ctr"/>
+              <a:endParaRPr lang="en-DK"/>
+            </a:p>
+          </p:txBody>
+        </p:sp>
+        <p:sp>
+          <p:nvSpPr>
+            <p:cNvPr id="71" name="Arc 70">
+              <a:extLst>
+                <a:ext uri="{FF2B5EF4-FFF2-40B4-BE49-F238E27FC236}">
+                  <a16:creationId xmlns:a16="http://schemas.microsoft.com/office/drawing/2014/main" id="{5470007E-99B7-1346-FB02-420C664C6093}"/>
+                </a:ext>
+              </a:extLst>
+            </p:cNvPr>
+            <p:cNvSpPr/>
+            <p:nvPr/>
+          </p:nvSpPr>
+          <p:spPr>
+            <a:xfrm rot="2643055">
+              <a:off x="8761547" y="2558015"/>
+              <a:ext cx="2428095" cy="2445237"/>
+            </a:xfrm>
+            <a:prstGeom prst="arc">
+              <a:avLst/>
+            </a:prstGeom>
+            <a:ln>
+              <a:solidFill>
+                <a:schemeClr val="tx1"/>
+              </a:solidFill>
+            </a:ln>
+          </p:spPr>
+          <p:style>
+            <a:lnRef idx="2">
+              <a:schemeClr val="accent1"/>
+            </a:lnRef>
+            <a:fillRef idx="0">
+              <a:schemeClr val="accent1"/>
+            </a:fillRef>
+            <a:effectRef idx="1">
+              <a:schemeClr val="accent1"/>
+            </a:effectRef>
+            <a:fontRef idx="minor">
               <a:schemeClr val="tx1"/>
-            </a:solidFill>
-          </a:ln>
-        </p:spPr>
-        <p:style>
-          <a:lnRef idx="2">
-            <a:schemeClr val="accent1"/>
-          </a:lnRef>
-          <a:fillRef idx="0">
-            <a:schemeClr val="accent1"/>
-          </a:fillRef>
-          <a:effectRef idx="1">
-            <a:schemeClr val="accent1"/>
-          </a:effectRef>
-          <a:fontRef idx="minor">
-            <a:schemeClr val="tx1"/>
-          </a:fontRef>
-        </p:style>
-        <p:txBody>
-          <a:bodyPr rtlCol="0" anchor="ctr"/>
-          <a:lstStyle/>
-          <a:p>
-            <a:pPr algn="ctr"/>
-            <a:endParaRPr lang="en-DK"/>
-          </a:p>
-        </p:txBody>
-      </p:sp>
-      <p:pic>
-        <p:nvPicPr>
-          <p:cNvPr id="11" name="Picture 10" descr="A black background with a black square&#10;&#10;Description automatically generated with medium confidence">
-            <a:extLst>
-              <a:ext uri="{FF2B5EF4-FFF2-40B4-BE49-F238E27FC236}">
-                <a16:creationId xmlns:a16="http://schemas.microsoft.com/office/drawing/2014/main" id="{3BEE0348-28C9-57B3-6992-EDC33166E696}"/>
-              </a:ext>
-            </a:extLst>
-          </p:cNvPr>
-          <p:cNvPicPr>
-            <a:picLocks noChangeAspect="1"/>
-          </p:cNvPicPr>
-          <p:nvPr/>
-        </p:nvPicPr>
-        <p:blipFill>
-          <a:blip r:embed="rId2">
-            <a:extLst>
-              <a:ext uri="{28A0092B-C50C-407E-A947-70E740481C1C}">
-                <a14:useLocalDpi xmlns:a14="http://schemas.microsoft.com/office/drawing/2010/main" val="0"/>
-              </a:ext>
-            </a:extLst>
-          </a:blip>
-          <a:stretch>
-            <a:fillRect/>
-          </a:stretch>
-        </p:blipFill>
-        <p:spPr>
-          <a:xfrm>
-            <a:off x="-131208" y="2595191"/>
-            <a:ext cx="2830823" cy="651930"/>
-          </a:xfrm>
-          <a:prstGeom prst="rect">
-            <a:avLst/>
-          </a:prstGeom>
-        </p:spPr>
-      </p:pic>
-      <p:pic>
-        <p:nvPicPr>
-          <p:cNvPr id="38" name="Picture 37" descr="A black background with a black square&#10;&#10;Description automatically generated with medium confidence">
-            <a:extLst>
-              <a:ext uri="{FF2B5EF4-FFF2-40B4-BE49-F238E27FC236}">
-                <a16:creationId xmlns:a16="http://schemas.microsoft.com/office/drawing/2014/main" id="{E343AAA8-66D9-2A15-7126-7FFCEBF99022}"/>
-              </a:ext>
-            </a:extLst>
-          </p:cNvPr>
-          <p:cNvPicPr>
-            <a:picLocks noChangeAspect="1"/>
-          </p:cNvPicPr>
-          <p:nvPr/>
-        </p:nvPicPr>
-        <p:blipFill>
-          <a:blip r:embed="rId3">
-            <a:extLst>
-              <a:ext uri="{28A0092B-C50C-407E-A947-70E740481C1C}">
-                <a14:useLocalDpi xmlns:a14="http://schemas.microsoft.com/office/drawing/2010/main" val="0"/>
-              </a:ext>
-            </a:extLst>
-          </a:blip>
-          <a:stretch>
-            <a:fillRect/>
-          </a:stretch>
-        </p:blipFill>
-        <p:spPr>
-          <a:xfrm>
-            <a:off x="9281478" y="950166"/>
-            <a:ext cx="2390430" cy="482143"/>
-          </a:xfrm>
-          <a:prstGeom prst="rect">
-            <a:avLst/>
-          </a:prstGeom>
-        </p:spPr>
-      </p:pic>
-      <p:cxnSp>
-        <p:nvCxnSpPr>
-          <p:cNvPr id="5" name="Straight Connector 4">
-            <a:extLst>
-              <a:ext uri="{FF2B5EF4-FFF2-40B4-BE49-F238E27FC236}">
-                <a16:creationId xmlns:a16="http://schemas.microsoft.com/office/drawing/2014/main" id="{B2F1B983-8386-5A53-ECC5-C24E086FF52F}"/>
-              </a:ext>
-            </a:extLst>
-          </p:cNvPr>
-          <p:cNvCxnSpPr>
-            <a:cxnSpLocks/>
-          </p:cNvCxnSpPr>
-          <p:nvPr/>
-        </p:nvCxnSpPr>
-        <p:spPr>
-          <a:xfrm>
-            <a:off x="514915" y="3316045"/>
-            <a:ext cx="0" cy="1239002"/>
-          </a:xfrm>
-          <a:prstGeom prst="line">
-            <a:avLst/>
-          </a:prstGeom>
-          <a:ln>
-            <a:solidFill>
+            </a:fontRef>
+          </p:style>
+          <p:txBody>
+            <a:bodyPr rtlCol="0" anchor="ctr"/>
+            <a:lstStyle/>
+            <a:p>
+              <a:pPr algn="ctr"/>
+              <a:endParaRPr lang="en-DK"/>
+            </a:p>
+          </p:txBody>
+        </p:sp>
+        <p:pic>
+          <p:nvPicPr>
+            <p:cNvPr id="11" name="Picture 10" descr="A black background with a black square&#10;&#10;Description automatically generated with medium confidence">
+              <a:extLst>
+                <a:ext uri="{FF2B5EF4-FFF2-40B4-BE49-F238E27FC236}">
+                  <a16:creationId xmlns:a16="http://schemas.microsoft.com/office/drawing/2014/main" id="{3BEE0348-28C9-57B3-6992-EDC33166E696}"/>
+                </a:ext>
+              </a:extLst>
+            </p:cNvPr>
+            <p:cNvPicPr>
+              <a:picLocks noChangeAspect="1"/>
+            </p:cNvPicPr>
+            <p:nvPr/>
+          </p:nvPicPr>
+          <p:blipFill>
+            <a:blip r:embed="rId2">
+              <a:extLst>
+                <a:ext uri="{28A0092B-C50C-407E-A947-70E740481C1C}">
+                  <a14:useLocalDpi xmlns:a14="http://schemas.microsoft.com/office/drawing/2010/main" val="0"/>
+                </a:ext>
+              </a:extLst>
+            </a:blip>
+            <a:stretch>
+              <a:fillRect/>
+            </a:stretch>
+          </p:blipFill>
+          <p:spPr>
+            <a:xfrm>
+              <a:off x="-131208" y="2595191"/>
+              <a:ext cx="2830823" cy="651930"/>
+            </a:xfrm>
+            <a:prstGeom prst="rect">
+              <a:avLst/>
+            </a:prstGeom>
+          </p:spPr>
+        </p:pic>
+        <p:pic>
+          <p:nvPicPr>
+            <p:cNvPr id="38" name="Picture 37" descr="A black background with a black square&#10;&#10;Description automatically generated with medium confidence">
+              <a:extLst>
+                <a:ext uri="{FF2B5EF4-FFF2-40B4-BE49-F238E27FC236}">
+                  <a16:creationId xmlns:a16="http://schemas.microsoft.com/office/drawing/2014/main" id="{E343AAA8-66D9-2A15-7126-7FFCEBF99022}"/>
+                </a:ext>
+              </a:extLst>
+            </p:cNvPr>
+            <p:cNvPicPr>
+              <a:picLocks noChangeAspect="1"/>
+            </p:cNvPicPr>
+            <p:nvPr/>
+          </p:nvPicPr>
+          <p:blipFill>
+            <a:blip r:embed="rId3">
+              <a:extLst>
+                <a:ext uri="{28A0092B-C50C-407E-A947-70E740481C1C}">
+                  <a14:useLocalDpi xmlns:a14="http://schemas.microsoft.com/office/drawing/2010/main" val="0"/>
+                </a:ext>
+              </a:extLst>
+            </a:blip>
+            <a:stretch>
+              <a:fillRect/>
+            </a:stretch>
+          </p:blipFill>
+          <p:spPr>
+            <a:xfrm>
+              <a:off x="9281478" y="950166"/>
+              <a:ext cx="2390430" cy="482143"/>
+            </a:xfrm>
+            <a:prstGeom prst="rect">
+              <a:avLst/>
+            </a:prstGeom>
+          </p:spPr>
+        </p:pic>
+        <p:cxnSp>
+          <p:nvCxnSpPr>
+            <p:cNvPr id="5" name="Straight Connector 4">
+              <a:extLst>
+                <a:ext uri="{FF2B5EF4-FFF2-40B4-BE49-F238E27FC236}">
+                  <a16:creationId xmlns:a16="http://schemas.microsoft.com/office/drawing/2014/main" id="{B2F1B983-8386-5A53-ECC5-C24E086FF52F}"/>
+                </a:ext>
+              </a:extLst>
+            </p:cNvPr>
+            <p:cNvCxnSpPr>
+              <a:cxnSpLocks/>
+            </p:cNvCxnSpPr>
+            <p:nvPr/>
+          </p:nvCxnSpPr>
+          <p:spPr>
+            <a:xfrm>
+              <a:off x="514915" y="3316045"/>
+              <a:ext cx="0" cy="1239002"/>
+            </a:xfrm>
+            <a:prstGeom prst="line">
+              <a:avLst/>
+            </a:prstGeom>
+            <a:ln>
+              <a:solidFill>
+                <a:schemeClr val="tx1"/>
+              </a:solidFill>
+            </a:ln>
+          </p:spPr>
+          <p:style>
+            <a:lnRef idx="2">
+              <a:schemeClr val="accent1"/>
+            </a:lnRef>
+            <a:fillRef idx="0">
+              <a:schemeClr val="accent1"/>
+            </a:fillRef>
+            <a:effectRef idx="1">
+              <a:schemeClr val="accent1"/>
+            </a:effectRef>
+            <a:fontRef idx="minor">
               <a:schemeClr val="tx1"/>
-            </a:solidFill>
-          </a:ln>
-        </p:spPr>
-        <p:style>
-          <a:lnRef idx="2">
-            <a:schemeClr val="accent1"/>
-          </a:lnRef>
-          <a:fillRef idx="0">
-            <a:schemeClr val="accent1"/>
-          </a:fillRef>
-          <a:effectRef idx="1">
-            <a:schemeClr val="accent1"/>
-          </a:effectRef>
-          <a:fontRef idx="minor">
-            <a:schemeClr val="tx1"/>
-          </a:fontRef>
-        </p:style>
-      </p:cxnSp>
-      <p:cxnSp>
-        <p:nvCxnSpPr>
-          <p:cNvPr id="6" name="Straight Connector 5">
-            <a:extLst>
-              <a:ext uri="{FF2B5EF4-FFF2-40B4-BE49-F238E27FC236}">
-                <a16:creationId xmlns:a16="http://schemas.microsoft.com/office/drawing/2014/main" id="{8AD556DB-C6E7-0637-2956-76E39E6A1DC6}"/>
-              </a:ext>
-            </a:extLst>
-          </p:cNvPr>
-          <p:cNvCxnSpPr>
-            <a:cxnSpLocks/>
-          </p:cNvCxnSpPr>
-          <p:nvPr/>
-        </p:nvCxnSpPr>
-        <p:spPr>
-          <a:xfrm>
-            <a:off x="189655" y="3050905"/>
-            <a:ext cx="325261" cy="287795"/>
-          </a:xfrm>
-          <a:prstGeom prst="line">
-            <a:avLst/>
-          </a:prstGeom>
-          <a:ln>
-            <a:solidFill>
+            </a:fontRef>
+          </p:style>
+        </p:cxnSp>
+        <p:cxnSp>
+          <p:nvCxnSpPr>
+            <p:cNvPr id="6" name="Straight Connector 5">
+              <a:extLst>
+                <a:ext uri="{FF2B5EF4-FFF2-40B4-BE49-F238E27FC236}">
+                  <a16:creationId xmlns:a16="http://schemas.microsoft.com/office/drawing/2014/main" id="{8AD556DB-C6E7-0637-2956-76E39E6A1DC6}"/>
+                </a:ext>
+              </a:extLst>
+            </p:cNvPr>
+            <p:cNvCxnSpPr>
+              <a:cxnSpLocks/>
+            </p:cNvCxnSpPr>
+            <p:nvPr/>
+          </p:nvCxnSpPr>
+          <p:spPr>
+            <a:xfrm>
+              <a:off x="189655" y="3050905"/>
+              <a:ext cx="325261" cy="287795"/>
+            </a:xfrm>
+            <a:prstGeom prst="line">
+              <a:avLst/>
+            </a:prstGeom>
+            <a:ln>
+              <a:solidFill>
+                <a:schemeClr val="tx1"/>
+              </a:solidFill>
+            </a:ln>
+          </p:spPr>
+          <p:style>
+            <a:lnRef idx="2">
+              <a:schemeClr val="accent1"/>
+            </a:lnRef>
+            <a:fillRef idx="0">
+              <a:schemeClr val="accent1"/>
+            </a:fillRef>
+            <a:effectRef idx="1">
+              <a:schemeClr val="accent1"/>
+            </a:effectRef>
+            <a:fontRef idx="minor">
               <a:schemeClr val="tx1"/>
-            </a:solidFill>
-          </a:ln>
-        </p:spPr>
-        <p:style>
-          <a:lnRef idx="2">
-            <a:schemeClr val="accent1"/>
-          </a:lnRef>
-          <a:fillRef idx="0">
-            <a:schemeClr val="accent1"/>
-          </a:fillRef>
-          <a:effectRef idx="1">
-            <a:schemeClr val="accent1"/>
-          </a:effectRef>
-          <a:fontRef idx="minor">
-            <a:schemeClr val="tx1"/>
-          </a:fontRef>
-        </p:style>
-      </p:cxnSp>
-      <p:cxnSp>
-        <p:nvCxnSpPr>
-          <p:cNvPr id="8" name="Straight Connector 7">
-            <a:extLst>
-              <a:ext uri="{FF2B5EF4-FFF2-40B4-BE49-F238E27FC236}">
-                <a16:creationId xmlns:a16="http://schemas.microsoft.com/office/drawing/2014/main" id="{A9B7FD76-1232-62CF-C696-8DE1A19EA93E}"/>
-              </a:ext>
-            </a:extLst>
-          </p:cNvPr>
-          <p:cNvCxnSpPr>
-            <a:cxnSpLocks/>
-          </p:cNvCxnSpPr>
-          <p:nvPr/>
-        </p:nvCxnSpPr>
-        <p:spPr>
-          <a:xfrm flipH="1">
-            <a:off x="514914" y="3050907"/>
-            <a:ext cx="325269" cy="287792"/>
-          </a:xfrm>
-          <a:prstGeom prst="line">
-            <a:avLst/>
-          </a:prstGeom>
-          <a:ln>
-            <a:solidFill>
+            </a:fontRef>
+          </p:style>
+        </p:cxnSp>
+        <p:cxnSp>
+          <p:nvCxnSpPr>
+            <p:cNvPr id="8" name="Straight Connector 7">
+              <a:extLst>
+                <a:ext uri="{FF2B5EF4-FFF2-40B4-BE49-F238E27FC236}">
+                  <a16:creationId xmlns:a16="http://schemas.microsoft.com/office/drawing/2014/main" id="{A9B7FD76-1232-62CF-C696-8DE1A19EA93E}"/>
+                </a:ext>
+              </a:extLst>
+            </p:cNvPr>
+            <p:cNvCxnSpPr>
+              <a:cxnSpLocks/>
+            </p:cNvCxnSpPr>
+            <p:nvPr/>
+          </p:nvCxnSpPr>
+          <p:spPr>
+            <a:xfrm flipH="1">
+              <a:off x="514914" y="3050907"/>
+              <a:ext cx="325269" cy="287792"/>
+            </a:xfrm>
+            <a:prstGeom prst="line">
+              <a:avLst/>
+            </a:prstGeom>
+            <a:ln>
+              <a:solidFill>
+                <a:schemeClr val="tx1"/>
+              </a:solidFill>
+            </a:ln>
+          </p:spPr>
+          <p:style>
+            <a:lnRef idx="2">
+              <a:schemeClr val="accent1"/>
+            </a:lnRef>
+            <a:fillRef idx="0">
+              <a:schemeClr val="accent1"/>
+            </a:fillRef>
+            <a:effectRef idx="1">
+              <a:schemeClr val="accent1"/>
+            </a:effectRef>
+            <a:fontRef idx="minor">
               <a:schemeClr val="tx1"/>
-            </a:solidFill>
-          </a:ln>
-        </p:spPr>
-        <p:style>
-          <a:lnRef idx="2">
-            <a:schemeClr val="accent1"/>
-          </a:lnRef>
-          <a:fillRef idx="0">
-            <a:schemeClr val="accent1"/>
-          </a:fillRef>
-          <a:effectRef idx="1">
-            <a:schemeClr val="accent1"/>
-          </a:effectRef>
-          <a:fontRef idx="minor">
-            <a:schemeClr val="tx1"/>
-          </a:fontRef>
-        </p:style>
-      </p:cxnSp>
-      <p:cxnSp>
-        <p:nvCxnSpPr>
-          <p:cNvPr id="10" name="Straight Connector 9">
-            <a:extLst>
-              <a:ext uri="{FF2B5EF4-FFF2-40B4-BE49-F238E27FC236}">
-                <a16:creationId xmlns:a16="http://schemas.microsoft.com/office/drawing/2014/main" id="{5283AC98-9BBA-AE52-B169-230B59E86ABC}"/>
-              </a:ext>
-            </a:extLst>
-          </p:cNvPr>
-          <p:cNvCxnSpPr>
-            <a:cxnSpLocks/>
-          </p:cNvCxnSpPr>
-          <p:nvPr/>
-        </p:nvCxnSpPr>
-        <p:spPr>
-          <a:xfrm>
-            <a:off x="514914" y="3012843"/>
-            <a:ext cx="11" cy="325857"/>
-          </a:xfrm>
-          <a:prstGeom prst="line">
-            <a:avLst/>
-          </a:prstGeom>
-          <a:ln>
-            <a:solidFill>
+            </a:fontRef>
+          </p:style>
+        </p:cxnSp>
+        <p:cxnSp>
+          <p:nvCxnSpPr>
+            <p:cNvPr id="10" name="Straight Connector 9">
+              <a:extLst>
+                <a:ext uri="{FF2B5EF4-FFF2-40B4-BE49-F238E27FC236}">
+                  <a16:creationId xmlns:a16="http://schemas.microsoft.com/office/drawing/2014/main" id="{5283AC98-9BBA-AE52-B169-230B59E86ABC}"/>
+                </a:ext>
+              </a:extLst>
+            </p:cNvPr>
+            <p:cNvCxnSpPr>
+              <a:cxnSpLocks/>
+            </p:cNvCxnSpPr>
+            <p:nvPr/>
+          </p:nvCxnSpPr>
+          <p:spPr>
+            <a:xfrm>
+              <a:off x="514914" y="3012843"/>
+              <a:ext cx="11" cy="325857"/>
+            </a:xfrm>
+            <a:prstGeom prst="line">
+              <a:avLst/>
+            </a:prstGeom>
+            <a:ln>
+              <a:solidFill>
+                <a:schemeClr val="tx1"/>
+              </a:solidFill>
+            </a:ln>
+          </p:spPr>
+          <p:style>
+            <a:lnRef idx="2">
+              <a:schemeClr val="accent1"/>
+            </a:lnRef>
+            <a:fillRef idx="0">
+              <a:schemeClr val="accent1"/>
+            </a:fillRef>
+            <a:effectRef idx="1">
+              <a:schemeClr val="accent1"/>
+            </a:effectRef>
+            <a:fontRef idx="minor">
               <a:schemeClr val="tx1"/>
-            </a:solidFill>
-          </a:ln>
-        </p:spPr>
-        <p:style>
-          <a:lnRef idx="2">
-            <a:schemeClr val="accent1"/>
-          </a:lnRef>
-          <a:fillRef idx="0">
-            <a:schemeClr val="accent1"/>
-          </a:fillRef>
-          <a:effectRef idx="1">
-            <a:schemeClr val="accent1"/>
-          </a:effectRef>
-          <a:fontRef idx="minor">
-            <a:schemeClr val="tx1"/>
-          </a:fontRef>
-        </p:style>
-      </p:cxnSp>
-      <p:sp>
-        <p:nvSpPr>
-          <p:cNvPr id="22" name="Arc 21">
-            <a:extLst>
-              <a:ext uri="{FF2B5EF4-FFF2-40B4-BE49-F238E27FC236}">
-                <a16:creationId xmlns:a16="http://schemas.microsoft.com/office/drawing/2014/main" id="{5FC36D34-789E-D2C1-6AD7-396EC10669DD}"/>
-              </a:ext>
-            </a:extLst>
-          </p:cNvPr>
-          <p:cNvSpPr/>
-          <p:nvPr/>
-        </p:nvSpPr>
-        <p:spPr>
-          <a:xfrm rot="13294408">
-            <a:off x="1222881" y="2317586"/>
-            <a:ext cx="1392468" cy="1612984"/>
-          </a:xfrm>
-          <a:prstGeom prst="arc">
-            <a:avLst/>
-          </a:prstGeom>
-          <a:ln>
-            <a:solidFill>
+            </a:fontRef>
+          </p:style>
+        </p:cxnSp>
+        <p:sp>
+          <p:nvSpPr>
+            <p:cNvPr id="22" name="Arc 21">
+              <a:extLst>
+                <a:ext uri="{FF2B5EF4-FFF2-40B4-BE49-F238E27FC236}">
+                  <a16:creationId xmlns:a16="http://schemas.microsoft.com/office/drawing/2014/main" id="{5FC36D34-789E-D2C1-6AD7-396EC10669DD}"/>
+                </a:ext>
+              </a:extLst>
+            </p:cNvPr>
+            <p:cNvSpPr/>
+            <p:nvPr/>
+          </p:nvSpPr>
+          <p:spPr>
+            <a:xfrm rot="13294408">
+              <a:off x="1222881" y="2317586"/>
+              <a:ext cx="1392468" cy="1612984"/>
+            </a:xfrm>
+            <a:prstGeom prst="arc">
+              <a:avLst/>
+            </a:prstGeom>
+            <a:ln>
+              <a:solidFill>
+                <a:schemeClr val="tx1"/>
+              </a:solidFill>
+            </a:ln>
+          </p:spPr>
+          <p:style>
+            <a:lnRef idx="2">
+              <a:schemeClr val="accent1"/>
+            </a:lnRef>
+            <a:fillRef idx="0">
+              <a:schemeClr val="accent1"/>
+            </a:fillRef>
+            <a:effectRef idx="1">
+              <a:schemeClr val="accent1"/>
+            </a:effectRef>
+            <a:fontRef idx="minor">
               <a:schemeClr val="tx1"/>
-            </a:solidFill>
-          </a:ln>
-        </p:spPr>
-        <p:style>
-          <a:lnRef idx="2">
-            <a:schemeClr val="accent1"/>
-          </a:lnRef>
-          <a:fillRef idx="0">
-            <a:schemeClr val="accent1"/>
-          </a:fillRef>
-          <a:effectRef idx="1">
-            <a:schemeClr val="accent1"/>
-          </a:effectRef>
-          <a:fontRef idx="minor">
-            <a:schemeClr val="tx1"/>
-          </a:fontRef>
-        </p:style>
-        <p:txBody>
-          <a:bodyPr rtlCol="0" anchor="ctr"/>
-          <a:lstStyle/>
-          <a:p>
-            <a:pPr algn="ctr"/>
-            <a:endParaRPr lang="en-DK"/>
-          </a:p>
-        </p:txBody>
-      </p:sp>
-      <p:sp>
-        <p:nvSpPr>
-          <p:cNvPr id="23" name="Arc 22">
-            <a:extLst>
-              <a:ext uri="{FF2B5EF4-FFF2-40B4-BE49-F238E27FC236}">
-                <a16:creationId xmlns:a16="http://schemas.microsoft.com/office/drawing/2014/main" id="{83568669-0066-4A9D-44FF-3B6C2C2E2647}"/>
-              </a:ext>
-            </a:extLst>
-          </p:cNvPr>
-          <p:cNvSpPr/>
-          <p:nvPr/>
-        </p:nvSpPr>
-        <p:spPr>
-          <a:xfrm rot="13294408">
-            <a:off x="1222882" y="3602717"/>
-            <a:ext cx="1392468" cy="1612984"/>
-          </a:xfrm>
-          <a:prstGeom prst="arc">
-            <a:avLst/>
-          </a:prstGeom>
-          <a:ln>
-            <a:solidFill>
+            </a:fontRef>
+          </p:style>
+          <p:txBody>
+            <a:bodyPr rtlCol="0" anchor="ctr"/>
+            <a:lstStyle/>
+            <a:p>
+              <a:pPr algn="ctr"/>
+              <a:endParaRPr lang="en-DK"/>
+            </a:p>
+          </p:txBody>
+        </p:sp>
+        <p:sp>
+          <p:nvSpPr>
+            <p:cNvPr id="23" name="Arc 22">
+              <a:extLst>
+                <a:ext uri="{FF2B5EF4-FFF2-40B4-BE49-F238E27FC236}">
+                  <a16:creationId xmlns:a16="http://schemas.microsoft.com/office/drawing/2014/main" id="{83568669-0066-4A9D-44FF-3B6C2C2E2647}"/>
+                </a:ext>
+              </a:extLst>
+            </p:cNvPr>
+            <p:cNvSpPr/>
+            <p:nvPr/>
+          </p:nvSpPr>
+          <p:spPr>
+            <a:xfrm rot="13294408">
+              <a:off x="1222882" y="3602717"/>
+              <a:ext cx="1392468" cy="1612984"/>
+            </a:xfrm>
+            <a:prstGeom prst="arc">
+              <a:avLst/>
+            </a:prstGeom>
+            <a:ln>
+              <a:solidFill>
+                <a:schemeClr val="tx1"/>
+              </a:solidFill>
+            </a:ln>
+          </p:spPr>
+          <p:style>
+            <a:lnRef idx="2">
+              <a:schemeClr val="accent1"/>
+            </a:lnRef>
+            <a:fillRef idx="0">
+              <a:schemeClr val="accent1"/>
+            </a:fillRef>
+            <a:effectRef idx="1">
+              <a:schemeClr val="accent1"/>
+            </a:effectRef>
+            <a:fontRef idx="minor">
               <a:schemeClr val="tx1"/>
-            </a:solidFill>
-          </a:ln>
-        </p:spPr>
-        <p:style>
-          <a:lnRef idx="2">
-            <a:schemeClr val="accent1"/>
-          </a:lnRef>
-          <a:fillRef idx="0">
-            <a:schemeClr val="accent1"/>
-          </a:fillRef>
-          <a:effectRef idx="1">
-            <a:schemeClr val="accent1"/>
-          </a:effectRef>
-          <a:fontRef idx="minor">
-            <a:schemeClr val="tx1"/>
-          </a:fontRef>
-        </p:style>
-        <p:txBody>
-          <a:bodyPr rtlCol="0" anchor="ctr"/>
-          <a:lstStyle/>
-          <a:p>
-            <a:pPr algn="ctr"/>
-            <a:endParaRPr lang="en-DK"/>
-          </a:p>
-        </p:txBody>
-      </p:sp>
-      <p:sp>
-        <p:nvSpPr>
-          <p:cNvPr id="24" name="Arc 23">
-            <a:extLst>
-              <a:ext uri="{FF2B5EF4-FFF2-40B4-BE49-F238E27FC236}">
-                <a16:creationId xmlns:a16="http://schemas.microsoft.com/office/drawing/2014/main" id="{F4994089-2EAE-A04F-0C6F-141770861363}"/>
-              </a:ext>
-            </a:extLst>
-          </p:cNvPr>
-          <p:cNvSpPr/>
-          <p:nvPr/>
-        </p:nvSpPr>
-        <p:spPr>
-          <a:xfrm rot="2405634">
-            <a:off x="532801" y="2487281"/>
-            <a:ext cx="1392468" cy="1612984"/>
-          </a:xfrm>
-          <a:prstGeom prst="arc">
-            <a:avLst/>
-          </a:prstGeom>
-          <a:ln>
-            <a:solidFill>
+            </a:fontRef>
+          </p:style>
+          <p:txBody>
+            <a:bodyPr rtlCol="0" anchor="ctr"/>
+            <a:lstStyle/>
+            <a:p>
+              <a:pPr algn="ctr"/>
+              <a:endParaRPr lang="en-DK"/>
+            </a:p>
+          </p:txBody>
+        </p:sp>
+        <p:sp>
+          <p:nvSpPr>
+            <p:cNvPr id="24" name="Arc 23">
+              <a:extLst>
+                <a:ext uri="{FF2B5EF4-FFF2-40B4-BE49-F238E27FC236}">
+                  <a16:creationId xmlns:a16="http://schemas.microsoft.com/office/drawing/2014/main" id="{F4994089-2EAE-A04F-0C6F-141770861363}"/>
+                </a:ext>
+              </a:extLst>
+            </p:cNvPr>
+            <p:cNvSpPr/>
+            <p:nvPr/>
+          </p:nvSpPr>
+          <p:spPr>
+            <a:xfrm rot="2405634">
+              <a:off x="532801" y="2487281"/>
+              <a:ext cx="1392468" cy="1612984"/>
+            </a:xfrm>
+            <a:prstGeom prst="arc">
+              <a:avLst/>
+            </a:prstGeom>
+            <a:ln>
+              <a:solidFill>
+                <a:schemeClr val="tx1"/>
+              </a:solidFill>
+            </a:ln>
+          </p:spPr>
+          <p:style>
+            <a:lnRef idx="2">
+              <a:schemeClr val="accent1"/>
+            </a:lnRef>
+            <a:fillRef idx="0">
+              <a:schemeClr val="accent1"/>
+            </a:fillRef>
+            <a:effectRef idx="1">
+              <a:schemeClr val="accent1"/>
+            </a:effectRef>
+            <a:fontRef idx="minor">
               <a:schemeClr val="tx1"/>
-            </a:solidFill>
-          </a:ln>
-        </p:spPr>
-        <p:style>
-          <a:lnRef idx="2">
-            <a:schemeClr val="accent1"/>
-          </a:lnRef>
-          <a:fillRef idx="0">
-            <a:schemeClr val="accent1"/>
-          </a:fillRef>
-          <a:effectRef idx="1">
-            <a:schemeClr val="accent1"/>
-          </a:effectRef>
-          <a:fontRef idx="minor">
-            <a:schemeClr val="tx1"/>
-          </a:fontRef>
-        </p:style>
-        <p:txBody>
-          <a:bodyPr rtlCol="0" anchor="ctr"/>
-          <a:lstStyle/>
-          <a:p>
-            <a:pPr algn="ctr"/>
-            <a:endParaRPr lang="en-DK"/>
-          </a:p>
-        </p:txBody>
-      </p:sp>
-      <p:sp>
-        <p:nvSpPr>
-          <p:cNvPr id="26" name="Arc 25">
-            <a:extLst>
-              <a:ext uri="{FF2B5EF4-FFF2-40B4-BE49-F238E27FC236}">
-                <a16:creationId xmlns:a16="http://schemas.microsoft.com/office/drawing/2014/main" id="{6DA7E47E-817B-E0A5-9C63-BAC316CC52FB}"/>
-              </a:ext>
-            </a:extLst>
-          </p:cNvPr>
-          <p:cNvSpPr/>
-          <p:nvPr/>
-        </p:nvSpPr>
-        <p:spPr>
-          <a:xfrm rot="13294408">
-            <a:off x="1900635" y="2317589"/>
-            <a:ext cx="1392468" cy="1612984"/>
-          </a:xfrm>
-          <a:prstGeom prst="arc">
-            <a:avLst/>
-          </a:prstGeom>
-          <a:ln>
-            <a:solidFill>
+            </a:fontRef>
+          </p:style>
+          <p:txBody>
+            <a:bodyPr rtlCol="0" anchor="ctr"/>
+            <a:lstStyle/>
+            <a:p>
+              <a:pPr algn="ctr"/>
+              <a:endParaRPr lang="en-DK"/>
+            </a:p>
+          </p:txBody>
+        </p:sp>
+        <p:sp>
+          <p:nvSpPr>
+            <p:cNvPr id="26" name="Arc 25">
+              <a:extLst>
+                <a:ext uri="{FF2B5EF4-FFF2-40B4-BE49-F238E27FC236}">
+                  <a16:creationId xmlns:a16="http://schemas.microsoft.com/office/drawing/2014/main" id="{6DA7E47E-817B-E0A5-9C63-BAC316CC52FB}"/>
+                </a:ext>
+              </a:extLst>
+            </p:cNvPr>
+            <p:cNvSpPr/>
+            <p:nvPr/>
+          </p:nvSpPr>
+          <p:spPr>
+            <a:xfrm rot="13294408">
+              <a:off x="1900635" y="2317589"/>
+              <a:ext cx="1392468" cy="1612984"/>
+            </a:xfrm>
+            <a:prstGeom prst="arc">
+              <a:avLst/>
+            </a:prstGeom>
+            <a:ln>
+              <a:solidFill>
+                <a:schemeClr val="tx1"/>
+              </a:solidFill>
+            </a:ln>
+          </p:spPr>
+          <p:style>
+            <a:lnRef idx="2">
+              <a:schemeClr val="accent1"/>
+            </a:lnRef>
+            <a:fillRef idx="0">
+              <a:schemeClr val="accent1"/>
+            </a:fillRef>
+            <a:effectRef idx="1">
+              <a:schemeClr val="accent1"/>
+            </a:effectRef>
+            <a:fontRef idx="minor">
               <a:schemeClr val="tx1"/>
-            </a:solidFill>
-          </a:ln>
-        </p:spPr>
-        <p:style>
-          <a:lnRef idx="2">
-            <a:schemeClr val="accent1"/>
-          </a:lnRef>
-          <a:fillRef idx="0">
-            <a:schemeClr val="accent1"/>
-          </a:fillRef>
-          <a:effectRef idx="1">
-            <a:schemeClr val="accent1"/>
-          </a:effectRef>
-          <a:fontRef idx="minor">
-            <a:schemeClr val="tx1"/>
-          </a:fontRef>
-        </p:style>
-        <p:txBody>
-          <a:bodyPr rtlCol="0" anchor="ctr"/>
-          <a:lstStyle/>
-          <a:p>
-            <a:pPr algn="ctr"/>
-            <a:endParaRPr lang="en-DK"/>
-          </a:p>
-        </p:txBody>
-      </p:sp>
-      <p:sp>
-        <p:nvSpPr>
-          <p:cNvPr id="27" name="Arc 26">
-            <a:extLst>
-              <a:ext uri="{FF2B5EF4-FFF2-40B4-BE49-F238E27FC236}">
-                <a16:creationId xmlns:a16="http://schemas.microsoft.com/office/drawing/2014/main" id="{AAAC0B85-AE34-FA6A-52E7-C2410C65155B}"/>
-              </a:ext>
-            </a:extLst>
-          </p:cNvPr>
-          <p:cNvSpPr/>
-          <p:nvPr/>
-        </p:nvSpPr>
-        <p:spPr>
-          <a:xfrm rot="13294408">
-            <a:off x="1900637" y="3602718"/>
-            <a:ext cx="1392468" cy="1612984"/>
-          </a:xfrm>
-          <a:prstGeom prst="arc">
-            <a:avLst/>
-          </a:prstGeom>
-          <a:ln>
-            <a:solidFill>
+            </a:fontRef>
+          </p:style>
+          <p:txBody>
+            <a:bodyPr rtlCol="0" anchor="ctr"/>
+            <a:lstStyle/>
+            <a:p>
+              <a:pPr algn="ctr"/>
+              <a:endParaRPr lang="en-DK"/>
+            </a:p>
+          </p:txBody>
+        </p:sp>
+        <p:sp>
+          <p:nvSpPr>
+            <p:cNvPr id="27" name="Arc 26">
+              <a:extLst>
+                <a:ext uri="{FF2B5EF4-FFF2-40B4-BE49-F238E27FC236}">
+                  <a16:creationId xmlns:a16="http://schemas.microsoft.com/office/drawing/2014/main" id="{AAAC0B85-AE34-FA6A-52E7-C2410C65155B}"/>
+                </a:ext>
+              </a:extLst>
+            </p:cNvPr>
+            <p:cNvSpPr/>
+            <p:nvPr/>
+          </p:nvSpPr>
+          <p:spPr>
+            <a:xfrm rot="13294408">
+              <a:off x="1900637" y="3602718"/>
+              <a:ext cx="1392468" cy="1612984"/>
+            </a:xfrm>
+            <a:prstGeom prst="arc">
+              <a:avLst/>
+            </a:prstGeom>
+            <a:ln>
+              <a:solidFill>
+                <a:schemeClr val="tx1"/>
+              </a:solidFill>
+            </a:ln>
+          </p:spPr>
+          <p:style>
+            <a:lnRef idx="2">
+              <a:schemeClr val="accent1"/>
+            </a:lnRef>
+            <a:fillRef idx="0">
+              <a:schemeClr val="accent1"/>
+            </a:fillRef>
+            <a:effectRef idx="1">
+              <a:schemeClr val="accent1"/>
+            </a:effectRef>
+            <a:fontRef idx="minor">
               <a:schemeClr val="tx1"/>
-            </a:solidFill>
-          </a:ln>
-        </p:spPr>
-        <p:style>
-          <a:lnRef idx="2">
-            <a:schemeClr val="accent1"/>
-          </a:lnRef>
-          <a:fillRef idx="0">
-            <a:schemeClr val="accent1"/>
-          </a:fillRef>
-          <a:effectRef idx="1">
-            <a:schemeClr val="accent1"/>
-          </a:effectRef>
-          <a:fontRef idx="minor">
-            <a:schemeClr val="tx1"/>
-          </a:fontRef>
-        </p:style>
-        <p:txBody>
-          <a:bodyPr rtlCol="0" anchor="ctr"/>
-          <a:lstStyle/>
-          <a:p>
-            <a:pPr algn="ctr"/>
-            <a:endParaRPr lang="en-DK"/>
-          </a:p>
-        </p:txBody>
-      </p:sp>
-      <p:sp>
-        <p:nvSpPr>
-          <p:cNvPr id="28" name="Arc 27">
-            <a:extLst>
-              <a:ext uri="{FF2B5EF4-FFF2-40B4-BE49-F238E27FC236}">
-                <a16:creationId xmlns:a16="http://schemas.microsoft.com/office/drawing/2014/main" id="{98AC624A-B8F6-32FC-A3BA-A8DD7B77961E}"/>
-              </a:ext>
-            </a:extLst>
-          </p:cNvPr>
-          <p:cNvSpPr/>
-          <p:nvPr/>
-        </p:nvSpPr>
-        <p:spPr>
-          <a:xfrm rot="2405634">
-            <a:off x="1271264" y="2478050"/>
-            <a:ext cx="1392468" cy="1612984"/>
-          </a:xfrm>
-          <a:prstGeom prst="arc">
-            <a:avLst/>
-          </a:prstGeom>
-          <a:ln>
-            <a:solidFill>
+            </a:fontRef>
+          </p:style>
+          <p:txBody>
+            <a:bodyPr rtlCol="0" anchor="ctr"/>
+            <a:lstStyle/>
+            <a:p>
+              <a:pPr algn="ctr"/>
+              <a:endParaRPr lang="en-DK"/>
+            </a:p>
+          </p:txBody>
+        </p:sp>
+        <p:sp>
+          <p:nvSpPr>
+            <p:cNvPr id="28" name="Arc 27">
+              <a:extLst>
+                <a:ext uri="{FF2B5EF4-FFF2-40B4-BE49-F238E27FC236}">
+                  <a16:creationId xmlns:a16="http://schemas.microsoft.com/office/drawing/2014/main" id="{98AC624A-B8F6-32FC-A3BA-A8DD7B77961E}"/>
+                </a:ext>
+              </a:extLst>
+            </p:cNvPr>
+            <p:cNvSpPr/>
+            <p:nvPr/>
+          </p:nvSpPr>
+          <p:spPr>
+            <a:xfrm rot="2405634">
+              <a:off x="1271264" y="2478050"/>
+              <a:ext cx="1392468" cy="1612984"/>
+            </a:xfrm>
+            <a:prstGeom prst="arc">
+              <a:avLst/>
+            </a:prstGeom>
+            <a:ln>
+              <a:solidFill>
+                <a:schemeClr val="tx1"/>
+              </a:solidFill>
+            </a:ln>
+          </p:spPr>
+          <p:style>
+            <a:lnRef idx="2">
+              <a:schemeClr val="accent1"/>
+            </a:lnRef>
+            <a:fillRef idx="0">
+              <a:schemeClr val="accent1"/>
+            </a:fillRef>
+            <a:effectRef idx="1">
+              <a:schemeClr val="accent1"/>
+            </a:effectRef>
+            <a:fontRef idx="minor">
               <a:schemeClr val="tx1"/>
-            </a:solidFill>
-          </a:ln>
-        </p:spPr>
-        <p:style>
-          <a:lnRef idx="2">
-            <a:schemeClr val="accent1"/>
-          </a:lnRef>
-          <a:fillRef idx="0">
-            <a:schemeClr val="accent1"/>
-          </a:fillRef>
-          <a:effectRef idx="1">
-            <a:schemeClr val="accent1"/>
-          </a:effectRef>
-          <a:fontRef idx="minor">
-            <a:schemeClr val="tx1"/>
-          </a:fontRef>
-        </p:style>
-        <p:txBody>
-          <a:bodyPr rtlCol="0" anchor="ctr"/>
-          <a:lstStyle/>
-          <a:p>
-            <a:pPr algn="ctr"/>
-            <a:endParaRPr lang="en-DK"/>
-          </a:p>
-        </p:txBody>
-      </p:sp>
-      <p:sp>
-        <p:nvSpPr>
-          <p:cNvPr id="29" name="Arc 28">
-            <a:extLst>
-              <a:ext uri="{FF2B5EF4-FFF2-40B4-BE49-F238E27FC236}">
-                <a16:creationId xmlns:a16="http://schemas.microsoft.com/office/drawing/2014/main" id="{E78DD91E-E085-FEC7-BDA4-F8363007F0D3}"/>
-              </a:ext>
-            </a:extLst>
-          </p:cNvPr>
-          <p:cNvSpPr/>
-          <p:nvPr/>
-        </p:nvSpPr>
-        <p:spPr>
-          <a:xfrm rot="2405634">
-            <a:off x="1271266" y="3763181"/>
-            <a:ext cx="1392468" cy="1612984"/>
-          </a:xfrm>
-          <a:prstGeom prst="arc">
-            <a:avLst/>
-          </a:prstGeom>
-          <a:ln>
-            <a:solidFill>
+            </a:fontRef>
+          </p:style>
+          <p:txBody>
+            <a:bodyPr rtlCol="0" anchor="ctr"/>
+            <a:lstStyle/>
+            <a:p>
+              <a:pPr algn="ctr"/>
+              <a:endParaRPr lang="en-DK"/>
+            </a:p>
+          </p:txBody>
+        </p:sp>
+        <p:sp>
+          <p:nvSpPr>
+            <p:cNvPr id="29" name="Arc 28">
+              <a:extLst>
+                <a:ext uri="{FF2B5EF4-FFF2-40B4-BE49-F238E27FC236}">
+                  <a16:creationId xmlns:a16="http://schemas.microsoft.com/office/drawing/2014/main" id="{E78DD91E-E085-FEC7-BDA4-F8363007F0D3}"/>
+                </a:ext>
+              </a:extLst>
+            </p:cNvPr>
+            <p:cNvSpPr/>
+            <p:nvPr/>
+          </p:nvSpPr>
+          <p:spPr>
+            <a:xfrm rot="2405634">
+              <a:off x="1271266" y="3763181"/>
+              <a:ext cx="1392468" cy="1612984"/>
+            </a:xfrm>
+            <a:prstGeom prst="arc">
+              <a:avLst/>
+            </a:prstGeom>
+            <a:ln>
+              <a:solidFill>
+                <a:schemeClr val="tx1"/>
+              </a:solidFill>
+            </a:ln>
+          </p:spPr>
+          <p:style>
+            <a:lnRef idx="2">
+              <a:schemeClr val="accent1"/>
+            </a:lnRef>
+            <a:fillRef idx="0">
+              <a:schemeClr val="accent1"/>
+            </a:fillRef>
+            <a:effectRef idx="1">
+              <a:schemeClr val="accent1"/>
+            </a:effectRef>
+            <a:fontRef idx="minor">
               <a:schemeClr val="tx1"/>
-            </a:solidFill>
-          </a:ln>
-        </p:spPr>
-        <p:style>
-          <a:lnRef idx="2">
-            <a:schemeClr val="accent1"/>
-          </a:lnRef>
-          <a:fillRef idx="0">
-            <a:schemeClr val="accent1"/>
-          </a:fillRef>
-          <a:effectRef idx="1">
-            <a:schemeClr val="accent1"/>
-          </a:effectRef>
-          <a:fontRef idx="minor">
-            <a:schemeClr val="tx1"/>
-          </a:fontRef>
-        </p:style>
-        <p:txBody>
-          <a:bodyPr rtlCol="0" anchor="ctr"/>
-          <a:lstStyle/>
-          <a:p>
-            <a:pPr algn="ctr"/>
-            <a:endParaRPr lang="en-DK"/>
-          </a:p>
-        </p:txBody>
-      </p:sp>
-      <p:sp>
-        <p:nvSpPr>
-          <p:cNvPr id="30" name="Arc 29">
-            <a:extLst>
-              <a:ext uri="{FF2B5EF4-FFF2-40B4-BE49-F238E27FC236}">
-                <a16:creationId xmlns:a16="http://schemas.microsoft.com/office/drawing/2014/main" id="{54C8C18A-33BA-F08D-973F-D6327EA1E135}"/>
-              </a:ext>
-            </a:extLst>
-          </p:cNvPr>
-          <p:cNvSpPr/>
-          <p:nvPr/>
-        </p:nvSpPr>
-        <p:spPr>
-          <a:xfrm rot="13294408">
-            <a:off x="2639097" y="2317584"/>
-            <a:ext cx="1392468" cy="1612984"/>
-          </a:xfrm>
-          <a:prstGeom prst="arc">
-            <a:avLst/>
-          </a:prstGeom>
-          <a:ln>
-            <a:solidFill>
+            </a:fontRef>
+          </p:style>
+          <p:txBody>
+            <a:bodyPr rtlCol="0" anchor="ctr"/>
+            <a:lstStyle/>
+            <a:p>
+              <a:pPr algn="ctr"/>
+              <a:endParaRPr lang="en-DK"/>
+            </a:p>
+          </p:txBody>
+        </p:sp>
+        <p:sp>
+          <p:nvSpPr>
+            <p:cNvPr id="30" name="Arc 29">
+              <a:extLst>
+                <a:ext uri="{FF2B5EF4-FFF2-40B4-BE49-F238E27FC236}">
+                  <a16:creationId xmlns:a16="http://schemas.microsoft.com/office/drawing/2014/main" id="{54C8C18A-33BA-F08D-973F-D6327EA1E135}"/>
+                </a:ext>
+              </a:extLst>
+            </p:cNvPr>
+            <p:cNvSpPr/>
+            <p:nvPr/>
+          </p:nvSpPr>
+          <p:spPr>
+            <a:xfrm rot="13294408">
+              <a:off x="2639097" y="2317584"/>
+              <a:ext cx="1392468" cy="1612984"/>
+            </a:xfrm>
+            <a:prstGeom prst="arc">
+              <a:avLst/>
+            </a:prstGeom>
+            <a:ln>
+              <a:solidFill>
+                <a:schemeClr val="tx1"/>
+              </a:solidFill>
+            </a:ln>
+          </p:spPr>
+          <p:style>
+            <a:lnRef idx="2">
+              <a:schemeClr val="accent1"/>
+            </a:lnRef>
+            <a:fillRef idx="0">
+              <a:schemeClr val="accent1"/>
+            </a:fillRef>
+            <a:effectRef idx="1">
+              <a:schemeClr val="accent1"/>
+            </a:effectRef>
+            <a:fontRef idx="minor">
               <a:schemeClr val="tx1"/>
-            </a:solidFill>
-          </a:ln>
-        </p:spPr>
-        <p:style>
-          <a:lnRef idx="2">
-            <a:schemeClr val="accent1"/>
-          </a:lnRef>
-          <a:fillRef idx="0">
-            <a:schemeClr val="accent1"/>
-          </a:fillRef>
-          <a:effectRef idx="1">
-            <a:schemeClr val="accent1"/>
-          </a:effectRef>
-          <a:fontRef idx="minor">
-            <a:schemeClr val="tx1"/>
-          </a:fontRef>
-        </p:style>
-        <p:txBody>
-          <a:bodyPr rtlCol="0" anchor="ctr"/>
-          <a:lstStyle/>
-          <a:p>
-            <a:pPr algn="ctr"/>
-            <a:endParaRPr lang="en-DK"/>
-          </a:p>
-        </p:txBody>
-      </p:sp>
-      <p:sp>
-        <p:nvSpPr>
-          <p:cNvPr id="31" name="Arc 30">
-            <a:extLst>
-              <a:ext uri="{FF2B5EF4-FFF2-40B4-BE49-F238E27FC236}">
-                <a16:creationId xmlns:a16="http://schemas.microsoft.com/office/drawing/2014/main" id="{199FB5A6-3932-2A7F-73FC-1B05E72F379F}"/>
-              </a:ext>
-            </a:extLst>
-          </p:cNvPr>
-          <p:cNvSpPr/>
-          <p:nvPr/>
-        </p:nvSpPr>
-        <p:spPr>
-          <a:xfrm rot="13294408">
-            <a:off x="2639098" y="3602714"/>
-            <a:ext cx="1392468" cy="1612984"/>
-          </a:xfrm>
-          <a:prstGeom prst="arc">
-            <a:avLst/>
-          </a:prstGeom>
-          <a:ln>
-            <a:solidFill>
+            </a:fontRef>
+          </p:style>
+          <p:txBody>
+            <a:bodyPr rtlCol="0" anchor="ctr"/>
+            <a:lstStyle/>
+            <a:p>
+              <a:pPr algn="ctr"/>
+              <a:endParaRPr lang="en-DK"/>
+            </a:p>
+          </p:txBody>
+        </p:sp>
+        <p:sp>
+          <p:nvSpPr>
+            <p:cNvPr id="31" name="Arc 30">
+              <a:extLst>
+                <a:ext uri="{FF2B5EF4-FFF2-40B4-BE49-F238E27FC236}">
+                  <a16:creationId xmlns:a16="http://schemas.microsoft.com/office/drawing/2014/main" id="{199FB5A6-3932-2A7F-73FC-1B05E72F379F}"/>
+                </a:ext>
+              </a:extLst>
+            </p:cNvPr>
+            <p:cNvSpPr/>
+            <p:nvPr/>
+          </p:nvSpPr>
+          <p:spPr>
+            <a:xfrm rot="13294408">
+              <a:off x="2639098" y="3602714"/>
+              <a:ext cx="1392468" cy="1612984"/>
+            </a:xfrm>
+            <a:prstGeom prst="arc">
+              <a:avLst/>
+            </a:prstGeom>
+            <a:ln>
+              <a:solidFill>
+                <a:schemeClr val="tx1"/>
+              </a:solidFill>
+            </a:ln>
+          </p:spPr>
+          <p:style>
+            <a:lnRef idx="2">
+              <a:schemeClr val="accent1"/>
+            </a:lnRef>
+            <a:fillRef idx="0">
+              <a:schemeClr val="accent1"/>
+            </a:fillRef>
+            <a:effectRef idx="1">
+              <a:schemeClr val="accent1"/>
+            </a:effectRef>
+            <a:fontRef idx="minor">
               <a:schemeClr val="tx1"/>
-            </a:solidFill>
-          </a:ln>
-        </p:spPr>
-        <p:style>
-          <a:lnRef idx="2">
-            <a:schemeClr val="accent1"/>
-          </a:lnRef>
-          <a:fillRef idx="0">
-            <a:schemeClr val="accent1"/>
-          </a:fillRef>
-          <a:effectRef idx="1">
-            <a:schemeClr val="accent1"/>
-          </a:effectRef>
-          <a:fontRef idx="minor">
-            <a:schemeClr val="tx1"/>
-          </a:fontRef>
-        </p:style>
-        <p:txBody>
-          <a:bodyPr rtlCol="0" anchor="ctr"/>
-          <a:lstStyle/>
-          <a:p>
-            <a:pPr algn="ctr"/>
-            <a:endParaRPr lang="en-DK"/>
-          </a:p>
-        </p:txBody>
-      </p:sp>
-      <p:sp>
-        <p:nvSpPr>
-          <p:cNvPr id="32" name="Arc 31">
-            <a:extLst>
-              <a:ext uri="{FF2B5EF4-FFF2-40B4-BE49-F238E27FC236}">
-                <a16:creationId xmlns:a16="http://schemas.microsoft.com/office/drawing/2014/main" id="{99720FE6-D3D1-1ED4-6593-5A9006B74F01}"/>
-              </a:ext>
-            </a:extLst>
-          </p:cNvPr>
-          <p:cNvSpPr/>
-          <p:nvPr/>
-        </p:nvSpPr>
-        <p:spPr>
-          <a:xfrm rot="2405634">
-            <a:off x="2062084" y="2478050"/>
-            <a:ext cx="1392468" cy="1612984"/>
-          </a:xfrm>
-          <a:prstGeom prst="arc">
-            <a:avLst/>
-          </a:prstGeom>
-          <a:ln>
-            <a:solidFill>
+            </a:fontRef>
+          </p:style>
+          <p:txBody>
+            <a:bodyPr rtlCol="0" anchor="ctr"/>
+            <a:lstStyle/>
+            <a:p>
+              <a:pPr algn="ctr"/>
+              <a:endParaRPr lang="en-DK"/>
+            </a:p>
+          </p:txBody>
+        </p:sp>
+        <p:sp>
+          <p:nvSpPr>
+            <p:cNvPr id="32" name="Arc 31">
+              <a:extLst>
+                <a:ext uri="{FF2B5EF4-FFF2-40B4-BE49-F238E27FC236}">
+                  <a16:creationId xmlns:a16="http://schemas.microsoft.com/office/drawing/2014/main" id="{99720FE6-D3D1-1ED4-6593-5A9006B74F01}"/>
+                </a:ext>
+              </a:extLst>
+            </p:cNvPr>
+            <p:cNvSpPr/>
+            <p:nvPr/>
+          </p:nvSpPr>
+          <p:spPr>
+            <a:xfrm rot="2405634">
+              <a:off x="2062084" y="2478050"/>
+              <a:ext cx="1392468" cy="1612984"/>
+            </a:xfrm>
+            <a:prstGeom prst="arc">
+              <a:avLst/>
+            </a:prstGeom>
+            <a:ln>
+              <a:solidFill>
+                <a:schemeClr val="tx1"/>
+              </a:solidFill>
+            </a:ln>
+          </p:spPr>
+          <p:style>
+            <a:lnRef idx="2">
+              <a:schemeClr val="accent1"/>
+            </a:lnRef>
+            <a:fillRef idx="0">
+              <a:schemeClr val="accent1"/>
+            </a:fillRef>
+            <a:effectRef idx="1">
+              <a:schemeClr val="accent1"/>
+            </a:effectRef>
+            <a:fontRef idx="minor">
               <a:schemeClr val="tx1"/>
-            </a:solidFill>
-          </a:ln>
-        </p:spPr>
-        <p:style>
-          <a:lnRef idx="2">
-            <a:schemeClr val="accent1"/>
-          </a:lnRef>
-          <a:fillRef idx="0">
-            <a:schemeClr val="accent1"/>
-          </a:fillRef>
-          <a:effectRef idx="1">
-            <a:schemeClr val="accent1"/>
-          </a:effectRef>
-          <a:fontRef idx="minor">
-            <a:schemeClr val="tx1"/>
-          </a:fontRef>
-        </p:style>
-        <p:txBody>
-          <a:bodyPr rtlCol="0" anchor="ctr"/>
-          <a:lstStyle/>
-          <a:p>
-            <a:pPr algn="ctr"/>
-            <a:endParaRPr lang="en-DK"/>
-          </a:p>
-        </p:txBody>
-      </p:sp>
-      <p:sp>
-        <p:nvSpPr>
-          <p:cNvPr id="33" name="Arc 32">
-            <a:extLst>
-              <a:ext uri="{FF2B5EF4-FFF2-40B4-BE49-F238E27FC236}">
-                <a16:creationId xmlns:a16="http://schemas.microsoft.com/office/drawing/2014/main" id="{4FE3FE58-84B3-6C7F-3259-1E2E62182824}"/>
-              </a:ext>
-            </a:extLst>
-          </p:cNvPr>
-          <p:cNvSpPr/>
-          <p:nvPr/>
-        </p:nvSpPr>
-        <p:spPr>
-          <a:xfrm rot="2405634">
-            <a:off x="2062086" y="3763179"/>
-            <a:ext cx="1392468" cy="1612984"/>
-          </a:xfrm>
-          <a:prstGeom prst="arc">
-            <a:avLst/>
-          </a:prstGeom>
-          <a:ln>
-            <a:solidFill>
+            </a:fontRef>
+          </p:style>
+          <p:txBody>
+            <a:bodyPr rtlCol="0" anchor="ctr"/>
+            <a:lstStyle/>
+            <a:p>
+              <a:pPr algn="ctr"/>
+              <a:endParaRPr lang="en-DK"/>
+            </a:p>
+          </p:txBody>
+        </p:sp>
+        <p:sp>
+          <p:nvSpPr>
+            <p:cNvPr id="33" name="Arc 32">
+              <a:extLst>
+                <a:ext uri="{FF2B5EF4-FFF2-40B4-BE49-F238E27FC236}">
+                  <a16:creationId xmlns:a16="http://schemas.microsoft.com/office/drawing/2014/main" id="{4FE3FE58-84B3-6C7F-3259-1E2E62182824}"/>
+                </a:ext>
+              </a:extLst>
+            </p:cNvPr>
+            <p:cNvSpPr/>
+            <p:nvPr/>
+          </p:nvSpPr>
+          <p:spPr>
+            <a:xfrm rot="2405634">
+              <a:off x="2062086" y="3763179"/>
+              <a:ext cx="1392468" cy="1612984"/>
+            </a:xfrm>
+            <a:prstGeom prst="arc">
+              <a:avLst/>
+            </a:prstGeom>
+            <a:ln>
+              <a:solidFill>
+                <a:schemeClr val="tx1"/>
+              </a:solidFill>
+            </a:ln>
+          </p:spPr>
+          <p:style>
+            <a:lnRef idx="2">
+              <a:schemeClr val="accent1"/>
+            </a:lnRef>
+            <a:fillRef idx="0">
+              <a:schemeClr val="accent1"/>
+            </a:fillRef>
+            <a:effectRef idx="1">
+              <a:schemeClr val="accent1"/>
+            </a:effectRef>
+            <a:fontRef idx="minor">
               <a:schemeClr val="tx1"/>
-            </a:solidFill>
-          </a:ln>
-        </p:spPr>
-        <p:style>
-          <a:lnRef idx="2">
-            <a:schemeClr val="accent1"/>
-          </a:lnRef>
-          <a:fillRef idx="0">
-            <a:schemeClr val="accent1"/>
-          </a:fillRef>
-          <a:effectRef idx="1">
-            <a:schemeClr val="accent1"/>
-          </a:effectRef>
-          <a:fontRef idx="minor">
-            <a:schemeClr val="tx1"/>
-          </a:fontRef>
-        </p:style>
-        <p:txBody>
-          <a:bodyPr rtlCol="0" anchor="ctr"/>
-          <a:lstStyle/>
-          <a:p>
-            <a:pPr algn="ctr"/>
-            <a:endParaRPr lang="en-DK"/>
-          </a:p>
-        </p:txBody>
-      </p:sp>
-      <p:sp>
-        <p:nvSpPr>
-          <p:cNvPr id="34" name="Arc 33">
-            <a:extLst>
-              <a:ext uri="{FF2B5EF4-FFF2-40B4-BE49-F238E27FC236}">
-                <a16:creationId xmlns:a16="http://schemas.microsoft.com/office/drawing/2014/main" id="{62609F2A-7931-1FE5-A80B-8A26FCFC8305}"/>
-              </a:ext>
-            </a:extLst>
-          </p:cNvPr>
-          <p:cNvSpPr/>
-          <p:nvPr/>
-        </p:nvSpPr>
-        <p:spPr>
-          <a:xfrm rot="13294408">
-            <a:off x="3415498" y="2309791"/>
-            <a:ext cx="1392468" cy="1612984"/>
-          </a:xfrm>
-          <a:prstGeom prst="arc">
-            <a:avLst/>
-          </a:prstGeom>
-          <a:ln>
-            <a:solidFill>
+            </a:fontRef>
+          </p:style>
+          <p:txBody>
+            <a:bodyPr rtlCol="0" anchor="ctr"/>
+            <a:lstStyle/>
+            <a:p>
+              <a:pPr algn="ctr"/>
+              <a:endParaRPr lang="en-DK"/>
+            </a:p>
+          </p:txBody>
+        </p:sp>
+        <p:sp>
+          <p:nvSpPr>
+            <p:cNvPr id="34" name="Arc 33">
+              <a:extLst>
+                <a:ext uri="{FF2B5EF4-FFF2-40B4-BE49-F238E27FC236}">
+                  <a16:creationId xmlns:a16="http://schemas.microsoft.com/office/drawing/2014/main" id="{62609F2A-7931-1FE5-A80B-8A26FCFC8305}"/>
+                </a:ext>
+              </a:extLst>
+            </p:cNvPr>
+            <p:cNvSpPr/>
+            <p:nvPr/>
+          </p:nvSpPr>
+          <p:spPr>
+            <a:xfrm rot="13294408">
+              <a:off x="3415498" y="2309791"/>
+              <a:ext cx="1392468" cy="1612984"/>
+            </a:xfrm>
+            <a:prstGeom prst="arc">
+              <a:avLst/>
+            </a:prstGeom>
+            <a:ln>
+              <a:solidFill>
+                <a:schemeClr val="tx1"/>
+              </a:solidFill>
+            </a:ln>
+          </p:spPr>
+          <p:style>
+            <a:lnRef idx="2">
+              <a:schemeClr val="accent1"/>
+            </a:lnRef>
+            <a:fillRef idx="0">
+              <a:schemeClr val="accent1"/>
+            </a:fillRef>
+            <a:effectRef idx="1">
+              <a:schemeClr val="accent1"/>
+            </a:effectRef>
+            <a:fontRef idx="minor">
               <a:schemeClr val="tx1"/>
-            </a:solidFill>
-          </a:ln>
-        </p:spPr>
-        <p:style>
-          <a:lnRef idx="2">
-            <a:schemeClr val="accent1"/>
-          </a:lnRef>
-          <a:fillRef idx="0">
-            <a:schemeClr val="accent1"/>
-          </a:fillRef>
-          <a:effectRef idx="1">
-            <a:schemeClr val="accent1"/>
-          </a:effectRef>
-          <a:fontRef idx="minor">
-            <a:schemeClr val="tx1"/>
-          </a:fontRef>
-        </p:style>
-        <p:txBody>
-          <a:bodyPr rtlCol="0" anchor="ctr"/>
-          <a:lstStyle/>
-          <a:p>
-            <a:pPr algn="ctr"/>
-            <a:endParaRPr lang="en-DK"/>
-          </a:p>
-        </p:txBody>
-      </p:sp>
-      <p:sp>
-        <p:nvSpPr>
-          <p:cNvPr id="35" name="Arc 34">
-            <a:extLst>
-              <a:ext uri="{FF2B5EF4-FFF2-40B4-BE49-F238E27FC236}">
-                <a16:creationId xmlns:a16="http://schemas.microsoft.com/office/drawing/2014/main" id="{2D7C5663-D4CF-A7BB-3353-060262CBCFA2}"/>
-              </a:ext>
-            </a:extLst>
-          </p:cNvPr>
-          <p:cNvSpPr/>
-          <p:nvPr/>
-        </p:nvSpPr>
-        <p:spPr>
-          <a:xfrm rot="13294408">
-            <a:off x="3415499" y="3594920"/>
-            <a:ext cx="1392468" cy="1612984"/>
-          </a:xfrm>
-          <a:prstGeom prst="arc">
-            <a:avLst/>
-          </a:prstGeom>
-          <a:ln>
-            <a:solidFill>
+            </a:fontRef>
+          </p:style>
+          <p:txBody>
+            <a:bodyPr rtlCol="0" anchor="ctr"/>
+            <a:lstStyle/>
+            <a:p>
+              <a:pPr algn="ctr"/>
+              <a:endParaRPr lang="en-DK"/>
+            </a:p>
+          </p:txBody>
+        </p:sp>
+        <p:sp>
+          <p:nvSpPr>
+            <p:cNvPr id="35" name="Arc 34">
+              <a:extLst>
+                <a:ext uri="{FF2B5EF4-FFF2-40B4-BE49-F238E27FC236}">
+                  <a16:creationId xmlns:a16="http://schemas.microsoft.com/office/drawing/2014/main" id="{2D7C5663-D4CF-A7BB-3353-060262CBCFA2}"/>
+                </a:ext>
+              </a:extLst>
+            </p:cNvPr>
+            <p:cNvSpPr/>
+            <p:nvPr/>
+          </p:nvSpPr>
+          <p:spPr>
+            <a:xfrm rot="13294408">
+              <a:off x="3415499" y="3594920"/>
+              <a:ext cx="1392468" cy="1612984"/>
+            </a:xfrm>
+            <a:prstGeom prst="arc">
+              <a:avLst/>
+            </a:prstGeom>
+            <a:ln>
+              <a:solidFill>
+                <a:schemeClr val="tx1"/>
+              </a:solidFill>
+            </a:ln>
+          </p:spPr>
+          <p:style>
+            <a:lnRef idx="2">
+              <a:schemeClr val="accent1"/>
+            </a:lnRef>
+            <a:fillRef idx="0">
+              <a:schemeClr val="accent1"/>
+            </a:fillRef>
+            <a:effectRef idx="1">
+              <a:schemeClr val="accent1"/>
+            </a:effectRef>
+            <a:fontRef idx="minor">
               <a:schemeClr val="tx1"/>
-            </a:solidFill>
-          </a:ln>
-        </p:spPr>
-        <p:style>
-          <a:lnRef idx="2">
-            <a:schemeClr val="accent1"/>
-          </a:lnRef>
-          <a:fillRef idx="0">
-            <a:schemeClr val="accent1"/>
-          </a:fillRef>
-          <a:effectRef idx="1">
-            <a:schemeClr val="accent1"/>
-          </a:effectRef>
-          <a:fontRef idx="minor">
-            <a:schemeClr val="tx1"/>
-          </a:fontRef>
-        </p:style>
-        <p:txBody>
-          <a:bodyPr rtlCol="0" anchor="ctr"/>
-          <a:lstStyle/>
-          <a:p>
-            <a:pPr algn="ctr"/>
-            <a:endParaRPr lang="en-DK"/>
-          </a:p>
-        </p:txBody>
-      </p:sp>
-      <p:cxnSp>
-        <p:nvCxnSpPr>
-          <p:cNvPr id="37" name="Straight Connector 36">
-            <a:extLst>
-              <a:ext uri="{FF2B5EF4-FFF2-40B4-BE49-F238E27FC236}">
-                <a16:creationId xmlns:a16="http://schemas.microsoft.com/office/drawing/2014/main" id="{443DA90B-0825-2106-8DA7-3A28B2644A39}"/>
-              </a:ext>
-            </a:extLst>
-          </p:cNvPr>
-          <p:cNvCxnSpPr>
-            <a:cxnSpLocks/>
-          </p:cNvCxnSpPr>
-          <p:nvPr/>
-        </p:nvCxnSpPr>
-        <p:spPr>
-          <a:xfrm>
-            <a:off x="4497857" y="2241716"/>
-            <a:ext cx="0" cy="2869112"/>
-          </a:xfrm>
-          <a:prstGeom prst="line">
-            <a:avLst/>
-          </a:prstGeom>
-          <a:ln w="19050" cap="flat" cmpd="sng" algn="ctr">
-            <a:solidFill>
+            </a:fontRef>
+          </p:style>
+          <p:txBody>
+            <a:bodyPr rtlCol="0" anchor="ctr"/>
+            <a:lstStyle/>
+            <a:p>
+              <a:pPr algn="ctr"/>
+              <a:endParaRPr lang="en-DK"/>
+            </a:p>
+          </p:txBody>
+        </p:sp>
+        <p:cxnSp>
+          <p:nvCxnSpPr>
+            <p:cNvPr id="37" name="Straight Connector 36">
+              <a:extLst>
+                <a:ext uri="{FF2B5EF4-FFF2-40B4-BE49-F238E27FC236}">
+                  <a16:creationId xmlns:a16="http://schemas.microsoft.com/office/drawing/2014/main" id="{443DA90B-0825-2106-8DA7-3A28B2644A39}"/>
+                </a:ext>
+              </a:extLst>
+            </p:cNvPr>
+            <p:cNvCxnSpPr>
+              <a:cxnSpLocks/>
+            </p:cNvCxnSpPr>
+            <p:nvPr/>
+          </p:nvCxnSpPr>
+          <p:spPr>
+            <a:xfrm>
+              <a:off x="4497857" y="2241716"/>
+              <a:ext cx="0" cy="2869112"/>
+            </a:xfrm>
+            <a:prstGeom prst="line">
+              <a:avLst/>
+            </a:prstGeom>
+            <a:ln w="19050" cap="flat" cmpd="sng" algn="ctr">
+              <a:solidFill>
+                <a:schemeClr val="tx1"/>
+              </a:solidFill>
+              <a:prstDash val="dash"/>
+              <a:round/>
+              <a:headEnd type="none" w="med" len="med"/>
+              <a:tailEnd type="none" w="med" len="med"/>
+            </a:ln>
+          </p:spPr>
+          <p:style>
+            <a:lnRef idx="0">
+              <a:scrgbClr r="0" g="0" b="0"/>
+            </a:lnRef>
+            <a:fillRef idx="0">
+              <a:scrgbClr r="0" g="0" b="0"/>
+            </a:fillRef>
+            <a:effectRef idx="0">
+              <a:scrgbClr r="0" g="0" b="0"/>
+            </a:effectRef>
+            <a:fontRef idx="minor">
               <a:schemeClr val="tx1"/>
-            </a:solidFill>
-            <a:prstDash val="dash"/>
-            <a:round/>
-            <a:headEnd type="none" w="med" len="med"/>
-            <a:tailEnd type="none" w="med" len="med"/>
-          </a:ln>
-        </p:spPr>
-        <p:style>
-          <a:lnRef idx="0">
-            <a:scrgbClr r="0" g="0" b="0"/>
-          </a:lnRef>
-          <a:fillRef idx="0">
-            <a:scrgbClr r="0" g="0" b="0"/>
-          </a:fillRef>
-          <a:effectRef idx="0">
-            <a:scrgbClr r="0" g="0" b="0"/>
-          </a:effectRef>
-          <a:fontRef idx="minor">
-            <a:schemeClr val="tx1"/>
-          </a:fontRef>
-        </p:style>
-      </p:cxnSp>
-      <p:sp>
-        <p:nvSpPr>
-          <p:cNvPr id="40" name="Arc 39">
-            <a:extLst>
-              <a:ext uri="{FF2B5EF4-FFF2-40B4-BE49-F238E27FC236}">
-                <a16:creationId xmlns:a16="http://schemas.microsoft.com/office/drawing/2014/main" id="{2C1F085D-8C5C-3FCE-6C89-C218FF586237}"/>
-              </a:ext>
-            </a:extLst>
-          </p:cNvPr>
-          <p:cNvSpPr/>
-          <p:nvPr/>
-        </p:nvSpPr>
-        <p:spPr>
-          <a:xfrm rot="2405634">
-            <a:off x="4789226" y="2483495"/>
-            <a:ext cx="1392468" cy="1612984"/>
-          </a:xfrm>
-          <a:prstGeom prst="arc">
-            <a:avLst/>
-          </a:prstGeom>
-          <a:ln>
-            <a:solidFill>
+            </a:fontRef>
+          </p:style>
+        </p:cxnSp>
+        <p:sp>
+          <p:nvSpPr>
+            <p:cNvPr id="40" name="Arc 39">
+              <a:extLst>
+                <a:ext uri="{FF2B5EF4-FFF2-40B4-BE49-F238E27FC236}">
+                  <a16:creationId xmlns:a16="http://schemas.microsoft.com/office/drawing/2014/main" id="{2C1F085D-8C5C-3FCE-6C89-C218FF586237}"/>
+                </a:ext>
+              </a:extLst>
+            </p:cNvPr>
+            <p:cNvSpPr/>
+            <p:nvPr/>
+          </p:nvSpPr>
+          <p:spPr>
+            <a:xfrm rot="2405634">
+              <a:off x="4789226" y="2483495"/>
+              <a:ext cx="1392468" cy="1612984"/>
+            </a:xfrm>
+            <a:prstGeom prst="arc">
+              <a:avLst/>
+            </a:prstGeom>
+            <a:ln>
+              <a:solidFill>
+                <a:schemeClr val="tx1"/>
+              </a:solidFill>
+            </a:ln>
+          </p:spPr>
+          <p:style>
+            <a:lnRef idx="2">
+              <a:schemeClr val="accent1"/>
+            </a:lnRef>
+            <a:fillRef idx="0">
+              <a:schemeClr val="accent1"/>
+            </a:fillRef>
+            <a:effectRef idx="1">
+              <a:schemeClr val="accent1"/>
+            </a:effectRef>
+            <a:fontRef idx="minor">
               <a:schemeClr val="tx1"/>
-            </a:solidFill>
-          </a:ln>
-        </p:spPr>
-        <p:style>
-          <a:lnRef idx="2">
-            <a:schemeClr val="accent1"/>
-          </a:lnRef>
-          <a:fillRef idx="0">
-            <a:schemeClr val="accent1"/>
-          </a:fillRef>
-          <a:effectRef idx="1">
-            <a:schemeClr val="accent1"/>
-          </a:effectRef>
-          <a:fontRef idx="minor">
-            <a:schemeClr val="tx1"/>
-          </a:fontRef>
-        </p:style>
-        <p:txBody>
-          <a:bodyPr rtlCol="0" anchor="ctr"/>
-          <a:lstStyle/>
-          <a:p>
-            <a:pPr algn="ctr"/>
-            <a:endParaRPr lang="en-DK"/>
-          </a:p>
-        </p:txBody>
-      </p:sp>
-      <p:sp>
-        <p:nvSpPr>
-          <p:cNvPr id="41" name="Arc 40">
-            <a:extLst>
-              <a:ext uri="{FF2B5EF4-FFF2-40B4-BE49-F238E27FC236}">
-                <a16:creationId xmlns:a16="http://schemas.microsoft.com/office/drawing/2014/main" id="{8756ED37-CADD-FABB-45C9-B2EFEA2DCEC8}"/>
-              </a:ext>
-            </a:extLst>
-          </p:cNvPr>
-          <p:cNvSpPr/>
-          <p:nvPr/>
-        </p:nvSpPr>
-        <p:spPr>
-          <a:xfrm rot="2405634">
-            <a:off x="4777600" y="3774051"/>
-            <a:ext cx="1392468" cy="1612984"/>
-          </a:xfrm>
-          <a:prstGeom prst="arc">
-            <a:avLst/>
-          </a:prstGeom>
-          <a:ln>
-            <a:solidFill>
+            </a:fontRef>
+          </p:style>
+          <p:txBody>
+            <a:bodyPr rtlCol="0" anchor="ctr"/>
+            <a:lstStyle/>
+            <a:p>
+              <a:pPr algn="ctr"/>
+              <a:endParaRPr lang="en-DK"/>
+            </a:p>
+          </p:txBody>
+        </p:sp>
+        <p:sp>
+          <p:nvSpPr>
+            <p:cNvPr id="41" name="Arc 40">
+              <a:extLst>
+                <a:ext uri="{FF2B5EF4-FFF2-40B4-BE49-F238E27FC236}">
+                  <a16:creationId xmlns:a16="http://schemas.microsoft.com/office/drawing/2014/main" id="{8756ED37-CADD-FABB-45C9-B2EFEA2DCEC8}"/>
+                </a:ext>
+              </a:extLst>
+            </p:cNvPr>
+            <p:cNvSpPr/>
+            <p:nvPr/>
+          </p:nvSpPr>
+          <p:spPr>
+            <a:xfrm rot="2405634">
+              <a:off x="4777600" y="3774051"/>
+              <a:ext cx="1392468" cy="1612984"/>
+            </a:xfrm>
+            <a:prstGeom prst="arc">
+              <a:avLst/>
+            </a:prstGeom>
+            <a:ln>
+              <a:solidFill>
+                <a:schemeClr val="tx1"/>
+              </a:solidFill>
+            </a:ln>
+          </p:spPr>
+          <p:style>
+            <a:lnRef idx="2">
+              <a:schemeClr val="accent1"/>
+            </a:lnRef>
+            <a:fillRef idx="0">
+              <a:schemeClr val="accent1"/>
+            </a:fillRef>
+            <a:effectRef idx="1">
+              <a:schemeClr val="accent1"/>
+            </a:effectRef>
+            <a:fontRef idx="minor">
               <a:schemeClr val="tx1"/>
-            </a:solidFill>
-          </a:ln>
-        </p:spPr>
-        <p:style>
-          <a:lnRef idx="2">
-            <a:schemeClr val="accent1"/>
-          </a:lnRef>
-          <a:fillRef idx="0">
-            <a:schemeClr val="accent1"/>
-          </a:fillRef>
-          <a:effectRef idx="1">
-            <a:schemeClr val="accent1"/>
-          </a:effectRef>
-          <a:fontRef idx="minor">
-            <a:schemeClr val="tx1"/>
-          </a:fontRef>
-        </p:style>
-        <p:txBody>
-          <a:bodyPr rtlCol="0" anchor="ctr"/>
-          <a:lstStyle/>
-          <a:p>
-            <a:pPr algn="ctr"/>
-            <a:endParaRPr lang="en-DK"/>
-          </a:p>
-        </p:txBody>
-      </p:sp>
-      <p:sp>
-        <p:nvSpPr>
-          <p:cNvPr id="42" name="Arc 41">
-            <a:extLst>
-              <a:ext uri="{FF2B5EF4-FFF2-40B4-BE49-F238E27FC236}">
-                <a16:creationId xmlns:a16="http://schemas.microsoft.com/office/drawing/2014/main" id="{7B4E9ABC-085C-89C4-5D6C-F87DEDA89610}"/>
-              </a:ext>
-            </a:extLst>
-          </p:cNvPr>
-          <p:cNvSpPr/>
-          <p:nvPr/>
-        </p:nvSpPr>
-        <p:spPr>
-          <a:xfrm rot="2405634">
-            <a:off x="5439448" y="2501618"/>
-            <a:ext cx="1392468" cy="1612984"/>
-          </a:xfrm>
-          <a:prstGeom prst="arc">
-            <a:avLst/>
-          </a:prstGeom>
-          <a:ln>
-            <a:solidFill>
+            </a:fontRef>
+          </p:style>
+          <p:txBody>
+            <a:bodyPr rtlCol="0" anchor="ctr"/>
+            <a:lstStyle/>
+            <a:p>
+              <a:pPr algn="ctr"/>
+              <a:endParaRPr lang="en-DK"/>
+            </a:p>
+          </p:txBody>
+        </p:sp>
+        <p:sp>
+          <p:nvSpPr>
+            <p:cNvPr id="42" name="Arc 41">
+              <a:extLst>
+                <a:ext uri="{FF2B5EF4-FFF2-40B4-BE49-F238E27FC236}">
+                  <a16:creationId xmlns:a16="http://schemas.microsoft.com/office/drawing/2014/main" id="{7B4E9ABC-085C-89C4-5D6C-F87DEDA89610}"/>
+                </a:ext>
+              </a:extLst>
+            </p:cNvPr>
+            <p:cNvSpPr/>
+            <p:nvPr/>
+          </p:nvSpPr>
+          <p:spPr>
+            <a:xfrm rot="2405634">
+              <a:off x="5439448" y="2501618"/>
+              <a:ext cx="1392468" cy="1612984"/>
+            </a:xfrm>
+            <a:prstGeom prst="arc">
+              <a:avLst/>
+            </a:prstGeom>
+            <a:ln>
+              <a:solidFill>
+                <a:schemeClr val="tx1"/>
+              </a:solidFill>
+            </a:ln>
+          </p:spPr>
+          <p:style>
+            <a:lnRef idx="2">
+              <a:schemeClr val="accent1"/>
+            </a:lnRef>
+            <a:fillRef idx="0">
+              <a:schemeClr val="accent1"/>
+            </a:fillRef>
+            <a:effectRef idx="1">
+              <a:schemeClr val="accent1"/>
+            </a:effectRef>
+            <a:fontRef idx="minor">
               <a:schemeClr val="tx1"/>
-            </a:solidFill>
-          </a:ln>
-        </p:spPr>
-        <p:style>
-          <a:lnRef idx="2">
-            <a:schemeClr val="accent1"/>
-          </a:lnRef>
-          <a:fillRef idx="0">
-            <a:schemeClr val="accent1"/>
-          </a:fillRef>
-          <a:effectRef idx="1">
-            <a:schemeClr val="accent1"/>
-          </a:effectRef>
-          <a:fontRef idx="minor">
-            <a:schemeClr val="tx1"/>
-          </a:fontRef>
-        </p:style>
-        <p:txBody>
-          <a:bodyPr rtlCol="0" anchor="ctr"/>
-          <a:lstStyle/>
-          <a:p>
-            <a:pPr algn="ctr"/>
-            <a:endParaRPr lang="en-DK"/>
-          </a:p>
-        </p:txBody>
-      </p:sp>
-      <p:sp>
-        <p:nvSpPr>
-          <p:cNvPr id="43" name="Arc 42">
-            <a:extLst>
-              <a:ext uri="{FF2B5EF4-FFF2-40B4-BE49-F238E27FC236}">
-                <a16:creationId xmlns:a16="http://schemas.microsoft.com/office/drawing/2014/main" id="{C2C707DF-EE7D-7A86-C157-71AFB83FB85C}"/>
-              </a:ext>
-            </a:extLst>
-          </p:cNvPr>
-          <p:cNvSpPr/>
-          <p:nvPr/>
-        </p:nvSpPr>
-        <p:spPr>
-          <a:xfrm rot="2405634">
-            <a:off x="5439448" y="3786749"/>
-            <a:ext cx="1392468" cy="1612983"/>
-          </a:xfrm>
-          <a:prstGeom prst="arc">
-            <a:avLst/>
-          </a:prstGeom>
-          <a:ln>
-            <a:solidFill>
+            </a:fontRef>
+          </p:style>
+          <p:txBody>
+            <a:bodyPr rtlCol="0" anchor="ctr"/>
+            <a:lstStyle/>
+            <a:p>
+              <a:pPr algn="ctr"/>
+              <a:endParaRPr lang="en-DK"/>
+            </a:p>
+          </p:txBody>
+        </p:sp>
+        <p:sp>
+          <p:nvSpPr>
+            <p:cNvPr id="43" name="Arc 42">
+              <a:extLst>
+                <a:ext uri="{FF2B5EF4-FFF2-40B4-BE49-F238E27FC236}">
+                  <a16:creationId xmlns:a16="http://schemas.microsoft.com/office/drawing/2014/main" id="{C2C707DF-EE7D-7A86-C157-71AFB83FB85C}"/>
+                </a:ext>
+              </a:extLst>
+            </p:cNvPr>
+            <p:cNvSpPr/>
+            <p:nvPr/>
+          </p:nvSpPr>
+          <p:spPr>
+            <a:xfrm rot="2405634">
+              <a:off x="5439448" y="3786749"/>
+              <a:ext cx="1392468" cy="1612983"/>
+            </a:xfrm>
+            <a:prstGeom prst="arc">
+              <a:avLst/>
+            </a:prstGeom>
+            <a:ln>
+              <a:solidFill>
+                <a:schemeClr val="tx1"/>
+              </a:solidFill>
+            </a:ln>
+          </p:spPr>
+          <p:style>
+            <a:lnRef idx="2">
+              <a:schemeClr val="accent1"/>
+            </a:lnRef>
+            <a:fillRef idx="0">
+              <a:schemeClr val="accent1"/>
+            </a:fillRef>
+            <a:effectRef idx="1">
+              <a:schemeClr val="accent1"/>
+            </a:effectRef>
+            <a:fontRef idx="minor">
               <a:schemeClr val="tx1"/>
-            </a:solidFill>
-          </a:ln>
-        </p:spPr>
-        <p:style>
-          <a:lnRef idx="2">
-            <a:schemeClr val="accent1"/>
-          </a:lnRef>
-          <a:fillRef idx="0">
-            <a:schemeClr val="accent1"/>
-          </a:fillRef>
-          <a:effectRef idx="1">
-            <a:schemeClr val="accent1"/>
-          </a:effectRef>
-          <a:fontRef idx="minor">
-            <a:schemeClr val="tx1"/>
-          </a:fontRef>
-        </p:style>
-        <p:txBody>
-          <a:bodyPr rtlCol="0" anchor="ctr"/>
-          <a:lstStyle/>
-          <a:p>
-            <a:pPr algn="ctr"/>
-            <a:endParaRPr lang="en-DK"/>
-          </a:p>
-        </p:txBody>
-      </p:sp>
-      <p:sp>
-        <p:nvSpPr>
-          <p:cNvPr id="44" name="Arc 43">
-            <a:extLst>
-              <a:ext uri="{FF2B5EF4-FFF2-40B4-BE49-F238E27FC236}">
-                <a16:creationId xmlns:a16="http://schemas.microsoft.com/office/drawing/2014/main" id="{F834C4D3-15BE-9845-D048-17D003C466C5}"/>
-              </a:ext>
-            </a:extLst>
-          </p:cNvPr>
-          <p:cNvSpPr/>
-          <p:nvPr/>
-        </p:nvSpPr>
-        <p:spPr>
-          <a:xfrm rot="2405634">
-            <a:off x="5979314" y="2488701"/>
-            <a:ext cx="1392468" cy="1612983"/>
-          </a:xfrm>
-          <a:prstGeom prst="arc">
-            <a:avLst/>
-          </a:prstGeom>
-          <a:ln>
-            <a:solidFill>
+            </a:fontRef>
+          </p:style>
+          <p:txBody>
+            <a:bodyPr rtlCol="0" anchor="ctr"/>
+            <a:lstStyle/>
+            <a:p>
+              <a:pPr algn="ctr"/>
+              <a:endParaRPr lang="en-DK"/>
+            </a:p>
+          </p:txBody>
+        </p:sp>
+        <p:sp>
+          <p:nvSpPr>
+            <p:cNvPr id="44" name="Arc 43">
+              <a:extLst>
+                <a:ext uri="{FF2B5EF4-FFF2-40B4-BE49-F238E27FC236}">
+                  <a16:creationId xmlns:a16="http://schemas.microsoft.com/office/drawing/2014/main" id="{F834C4D3-15BE-9845-D048-17D003C466C5}"/>
+                </a:ext>
+              </a:extLst>
+            </p:cNvPr>
+            <p:cNvSpPr/>
+            <p:nvPr/>
+          </p:nvSpPr>
+          <p:spPr>
+            <a:xfrm rot="2405634">
+              <a:off x="5979314" y="2488701"/>
+              <a:ext cx="1392468" cy="1612983"/>
+            </a:xfrm>
+            <a:prstGeom prst="arc">
+              <a:avLst/>
+            </a:prstGeom>
+            <a:ln>
+              <a:solidFill>
+                <a:schemeClr val="tx1"/>
+              </a:solidFill>
+            </a:ln>
+          </p:spPr>
+          <p:style>
+            <a:lnRef idx="2">
+              <a:schemeClr val="accent1"/>
+            </a:lnRef>
+            <a:fillRef idx="0">
+              <a:schemeClr val="accent1"/>
+            </a:fillRef>
+            <a:effectRef idx="1">
+              <a:schemeClr val="accent1"/>
+            </a:effectRef>
+            <a:fontRef idx="minor">
               <a:schemeClr val="tx1"/>
-            </a:solidFill>
-          </a:ln>
-        </p:spPr>
-        <p:style>
-          <a:lnRef idx="2">
-            <a:schemeClr val="accent1"/>
-          </a:lnRef>
-          <a:fillRef idx="0">
-            <a:schemeClr val="accent1"/>
-          </a:fillRef>
-          <a:effectRef idx="1">
-            <a:schemeClr val="accent1"/>
-          </a:effectRef>
-          <a:fontRef idx="minor">
-            <a:schemeClr val="tx1"/>
-          </a:fontRef>
-        </p:style>
-        <p:txBody>
-          <a:bodyPr rtlCol="0" anchor="ctr"/>
-          <a:lstStyle/>
-          <a:p>
-            <a:pPr algn="ctr"/>
-            <a:endParaRPr lang="en-DK"/>
-          </a:p>
-        </p:txBody>
-      </p:sp>
-      <p:sp>
-        <p:nvSpPr>
-          <p:cNvPr id="45" name="Arc 44">
-            <a:extLst>
-              <a:ext uri="{FF2B5EF4-FFF2-40B4-BE49-F238E27FC236}">
-                <a16:creationId xmlns:a16="http://schemas.microsoft.com/office/drawing/2014/main" id="{E268A1E1-F48E-541E-C1CF-20DA05F2FF53}"/>
-              </a:ext>
-            </a:extLst>
-          </p:cNvPr>
-          <p:cNvSpPr/>
-          <p:nvPr/>
-        </p:nvSpPr>
-        <p:spPr>
-          <a:xfrm rot="2405634">
-            <a:off x="5989547" y="3784711"/>
-            <a:ext cx="1392468" cy="1612984"/>
-          </a:xfrm>
-          <a:prstGeom prst="arc">
-            <a:avLst/>
-          </a:prstGeom>
-          <a:ln>
-            <a:solidFill>
+            </a:fontRef>
+          </p:style>
+          <p:txBody>
+            <a:bodyPr rtlCol="0" anchor="ctr"/>
+            <a:lstStyle/>
+            <a:p>
+              <a:pPr algn="ctr"/>
+              <a:endParaRPr lang="en-DK"/>
+            </a:p>
+          </p:txBody>
+        </p:sp>
+        <p:sp>
+          <p:nvSpPr>
+            <p:cNvPr id="45" name="Arc 44">
+              <a:extLst>
+                <a:ext uri="{FF2B5EF4-FFF2-40B4-BE49-F238E27FC236}">
+                  <a16:creationId xmlns:a16="http://schemas.microsoft.com/office/drawing/2014/main" id="{E268A1E1-F48E-541E-C1CF-20DA05F2FF53}"/>
+                </a:ext>
+              </a:extLst>
+            </p:cNvPr>
+            <p:cNvSpPr/>
+            <p:nvPr/>
+          </p:nvSpPr>
+          <p:spPr>
+            <a:xfrm rot="2405634">
+              <a:off x="5989547" y="3784711"/>
+              <a:ext cx="1392468" cy="1612984"/>
+            </a:xfrm>
+            <a:prstGeom prst="arc">
+              <a:avLst/>
+            </a:prstGeom>
+            <a:ln>
+              <a:solidFill>
+                <a:schemeClr val="tx1"/>
+              </a:solidFill>
+            </a:ln>
+          </p:spPr>
+          <p:style>
+            <a:lnRef idx="2">
+              <a:schemeClr val="accent1"/>
+            </a:lnRef>
+            <a:fillRef idx="0">
+              <a:schemeClr val="accent1"/>
+            </a:fillRef>
+            <a:effectRef idx="1">
+              <a:schemeClr val="accent1"/>
+            </a:effectRef>
+            <a:fontRef idx="minor">
               <a:schemeClr val="tx1"/>
-            </a:solidFill>
-          </a:ln>
-        </p:spPr>
-        <p:style>
-          <a:lnRef idx="2">
-            <a:schemeClr val="accent1"/>
-          </a:lnRef>
-          <a:fillRef idx="0">
-            <a:schemeClr val="accent1"/>
-          </a:fillRef>
-          <a:effectRef idx="1">
-            <a:schemeClr val="accent1"/>
-          </a:effectRef>
-          <a:fontRef idx="minor">
-            <a:schemeClr val="tx1"/>
-          </a:fontRef>
-        </p:style>
-        <p:txBody>
-          <a:bodyPr rtlCol="0" anchor="ctr"/>
-          <a:lstStyle/>
-          <a:p>
-            <a:pPr algn="ctr"/>
-            <a:endParaRPr lang="en-DK"/>
-          </a:p>
-        </p:txBody>
-      </p:sp>
-      <p:sp>
-        <p:nvSpPr>
-          <p:cNvPr id="46" name="Arc 45">
-            <a:extLst>
-              <a:ext uri="{FF2B5EF4-FFF2-40B4-BE49-F238E27FC236}">
-                <a16:creationId xmlns:a16="http://schemas.microsoft.com/office/drawing/2014/main" id="{9CE1DABD-C3FC-57BC-983C-1F210AEF553C}"/>
-              </a:ext>
-            </a:extLst>
-          </p:cNvPr>
-          <p:cNvSpPr/>
-          <p:nvPr/>
-        </p:nvSpPr>
-        <p:spPr>
-          <a:xfrm rot="2405634">
-            <a:off x="6502006" y="2486522"/>
-            <a:ext cx="1392468" cy="1612984"/>
-          </a:xfrm>
-          <a:prstGeom prst="arc">
-            <a:avLst/>
-          </a:prstGeom>
-          <a:ln>
-            <a:solidFill>
+            </a:fontRef>
+          </p:style>
+          <p:txBody>
+            <a:bodyPr rtlCol="0" anchor="ctr"/>
+            <a:lstStyle/>
+            <a:p>
+              <a:pPr algn="ctr"/>
+              <a:endParaRPr lang="en-DK"/>
+            </a:p>
+          </p:txBody>
+        </p:sp>
+        <p:sp>
+          <p:nvSpPr>
+            <p:cNvPr id="46" name="Arc 45">
+              <a:extLst>
+                <a:ext uri="{FF2B5EF4-FFF2-40B4-BE49-F238E27FC236}">
+                  <a16:creationId xmlns:a16="http://schemas.microsoft.com/office/drawing/2014/main" id="{9CE1DABD-C3FC-57BC-983C-1F210AEF553C}"/>
+                </a:ext>
+              </a:extLst>
+            </p:cNvPr>
+            <p:cNvSpPr/>
+            <p:nvPr/>
+          </p:nvSpPr>
+          <p:spPr>
+            <a:xfrm rot="2405634">
+              <a:off x="6502006" y="2486522"/>
+              <a:ext cx="1392468" cy="1612984"/>
+            </a:xfrm>
+            <a:prstGeom prst="arc">
+              <a:avLst/>
+            </a:prstGeom>
+            <a:ln>
+              <a:solidFill>
+                <a:schemeClr val="tx1"/>
+              </a:solidFill>
+            </a:ln>
+          </p:spPr>
+          <p:style>
+            <a:lnRef idx="2">
+              <a:schemeClr val="accent1"/>
+            </a:lnRef>
+            <a:fillRef idx="0">
+              <a:schemeClr val="accent1"/>
+            </a:fillRef>
+            <a:effectRef idx="1">
+              <a:schemeClr val="accent1"/>
+            </a:effectRef>
+            <a:fontRef idx="minor">
               <a:schemeClr val="tx1"/>
-            </a:solidFill>
-          </a:ln>
-        </p:spPr>
-        <p:style>
-          <a:lnRef idx="2">
-            <a:schemeClr val="accent1"/>
-          </a:lnRef>
-          <a:fillRef idx="0">
-            <a:schemeClr val="accent1"/>
-          </a:fillRef>
-          <a:effectRef idx="1">
-            <a:schemeClr val="accent1"/>
-          </a:effectRef>
-          <a:fontRef idx="minor">
-            <a:schemeClr val="tx1"/>
-          </a:fontRef>
-        </p:style>
-        <p:txBody>
-          <a:bodyPr rtlCol="0" anchor="ctr"/>
-          <a:lstStyle/>
-          <a:p>
-            <a:pPr algn="ctr"/>
-            <a:endParaRPr lang="en-DK"/>
-          </a:p>
-        </p:txBody>
-      </p:sp>
-      <p:sp>
-        <p:nvSpPr>
-          <p:cNvPr id="47" name="Arc 46">
-            <a:extLst>
-              <a:ext uri="{FF2B5EF4-FFF2-40B4-BE49-F238E27FC236}">
-                <a16:creationId xmlns:a16="http://schemas.microsoft.com/office/drawing/2014/main" id="{B493907F-BBD9-DFBF-45B1-1FC34820C6C7}"/>
-              </a:ext>
-            </a:extLst>
-          </p:cNvPr>
-          <p:cNvSpPr/>
-          <p:nvPr/>
-        </p:nvSpPr>
-        <p:spPr>
-          <a:xfrm rot="2405634">
-            <a:off x="6502008" y="3771652"/>
-            <a:ext cx="1392468" cy="1612983"/>
-          </a:xfrm>
-          <a:prstGeom prst="arc">
-            <a:avLst/>
-          </a:prstGeom>
-          <a:ln>
-            <a:solidFill>
+            </a:fontRef>
+          </p:style>
+          <p:txBody>
+            <a:bodyPr rtlCol="0" anchor="ctr"/>
+            <a:lstStyle/>
+            <a:p>
+              <a:pPr algn="ctr"/>
+              <a:endParaRPr lang="en-DK"/>
+            </a:p>
+          </p:txBody>
+        </p:sp>
+        <p:sp>
+          <p:nvSpPr>
+            <p:cNvPr id="47" name="Arc 46">
+              <a:extLst>
+                <a:ext uri="{FF2B5EF4-FFF2-40B4-BE49-F238E27FC236}">
+                  <a16:creationId xmlns:a16="http://schemas.microsoft.com/office/drawing/2014/main" id="{B493907F-BBD9-DFBF-45B1-1FC34820C6C7}"/>
+                </a:ext>
+              </a:extLst>
+            </p:cNvPr>
+            <p:cNvSpPr/>
+            <p:nvPr/>
+          </p:nvSpPr>
+          <p:spPr>
+            <a:xfrm rot="2405634">
+              <a:off x="6502008" y="3771652"/>
+              <a:ext cx="1392468" cy="1612983"/>
+            </a:xfrm>
+            <a:prstGeom prst="arc">
+              <a:avLst/>
+            </a:prstGeom>
+            <a:ln>
+              <a:solidFill>
+                <a:schemeClr val="tx1"/>
+              </a:solidFill>
+            </a:ln>
+          </p:spPr>
+          <p:style>
+            <a:lnRef idx="2">
+              <a:schemeClr val="accent1"/>
+            </a:lnRef>
+            <a:fillRef idx="0">
+              <a:schemeClr val="accent1"/>
+            </a:fillRef>
+            <a:effectRef idx="1">
+              <a:schemeClr val="accent1"/>
+            </a:effectRef>
+            <a:fontRef idx="minor">
               <a:schemeClr val="tx1"/>
-            </a:solidFill>
-          </a:ln>
-        </p:spPr>
-        <p:style>
-          <a:lnRef idx="2">
-            <a:schemeClr val="accent1"/>
-          </a:lnRef>
-          <a:fillRef idx="0">
-            <a:schemeClr val="accent1"/>
-          </a:fillRef>
-          <a:effectRef idx="1">
-            <a:schemeClr val="accent1"/>
-          </a:effectRef>
-          <a:fontRef idx="minor">
-            <a:schemeClr val="tx1"/>
-          </a:fontRef>
-        </p:style>
-        <p:txBody>
-          <a:bodyPr rtlCol="0" anchor="ctr"/>
-          <a:lstStyle/>
-          <a:p>
-            <a:pPr algn="ctr"/>
-            <a:endParaRPr lang="en-DK"/>
-          </a:p>
-        </p:txBody>
-      </p:sp>
-      <p:sp>
-        <p:nvSpPr>
-          <p:cNvPr id="48" name="Arc 47">
-            <a:extLst>
-              <a:ext uri="{FF2B5EF4-FFF2-40B4-BE49-F238E27FC236}">
-                <a16:creationId xmlns:a16="http://schemas.microsoft.com/office/drawing/2014/main" id="{AD2ABCF9-D8AE-9410-5E46-E12F81F748F2}"/>
-              </a:ext>
-            </a:extLst>
-          </p:cNvPr>
-          <p:cNvSpPr/>
-          <p:nvPr/>
-        </p:nvSpPr>
-        <p:spPr>
-          <a:xfrm rot="13140701">
-            <a:off x="6317512" y="3010239"/>
-            <a:ext cx="1392468" cy="1612983"/>
-          </a:xfrm>
-          <a:prstGeom prst="arc">
-            <a:avLst/>
-          </a:prstGeom>
-          <a:ln>
-            <a:solidFill>
+            </a:fontRef>
+          </p:style>
+          <p:txBody>
+            <a:bodyPr rtlCol="0" anchor="ctr"/>
+            <a:lstStyle/>
+            <a:p>
+              <a:pPr algn="ctr"/>
+              <a:endParaRPr lang="en-DK"/>
+            </a:p>
+          </p:txBody>
+        </p:sp>
+        <p:sp>
+          <p:nvSpPr>
+            <p:cNvPr id="48" name="Arc 47">
+              <a:extLst>
+                <a:ext uri="{FF2B5EF4-FFF2-40B4-BE49-F238E27FC236}">
+                  <a16:creationId xmlns:a16="http://schemas.microsoft.com/office/drawing/2014/main" id="{AD2ABCF9-D8AE-9410-5E46-E12F81F748F2}"/>
+                </a:ext>
+              </a:extLst>
+            </p:cNvPr>
+            <p:cNvSpPr/>
+            <p:nvPr/>
+          </p:nvSpPr>
+          <p:spPr>
+            <a:xfrm rot="13140701">
+              <a:off x="6317512" y="3010239"/>
+              <a:ext cx="1392468" cy="1612983"/>
+            </a:xfrm>
+            <a:prstGeom prst="arc">
+              <a:avLst/>
+            </a:prstGeom>
+            <a:ln>
+              <a:solidFill>
+                <a:schemeClr val="tx1"/>
+              </a:solidFill>
+            </a:ln>
+          </p:spPr>
+          <p:style>
+            <a:lnRef idx="2">
+              <a:schemeClr val="accent1"/>
+            </a:lnRef>
+            <a:fillRef idx="0">
+              <a:schemeClr val="accent1"/>
+            </a:fillRef>
+            <a:effectRef idx="1">
+              <a:schemeClr val="accent1"/>
+            </a:effectRef>
+            <a:fontRef idx="minor">
               <a:schemeClr val="tx1"/>
-            </a:solidFill>
-          </a:ln>
-        </p:spPr>
-        <p:style>
-          <a:lnRef idx="2">
-            <a:schemeClr val="accent1"/>
-          </a:lnRef>
-          <a:fillRef idx="0">
-            <a:schemeClr val="accent1"/>
-          </a:fillRef>
-          <a:effectRef idx="1">
-            <a:schemeClr val="accent1"/>
-          </a:effectRef>
-          <a:fontRef idx="minor">
-            <a:schemeClr val="tx1"/>
-          </a:fontRef>
-        </p:style>
-        <p:txBody>
-          <a:bodyPr rtlCol="0" anchor="ctr"/>
-          <a:lstStyle/>
-          <a:p>
-            <a:pPr algn="ctr"/>
-            <a:endParaRPr lang="en-DK"/>
-          </a:p>
-        </p:txBody>
-      </p:sp>
-      <p:sp>
-        <p:nvSpPr>
-          <p:cNvPr id="49" name="Arc 48">
-            <a:extLst>
-              <a:ext uri="{FF2B5EF4-FFF2-40B4-BE49-F238E27FC236}">
-                <a16:creationId xmlns:a16="http://schemas.microsoft.com/office/drawing/2014/main" id="{BA8D334E-02A6-EB4E-17A5-7DBD900FC898}"/>
-              </a:ext>
-            </a:extLst>
-          </p:cNvPr>
-          <p:cNvSpPr/>
-          <p:nvPr/>
-        </p:nvSpPr>
-        <p:spPr>
-          <a:xfrm rot="13140701">
-            <a:off x="7006100" y="2999501"/>
-            <a:ext cx="1392468" cy="1612983"/>
-          </a:xfrm>
-          <a:prstGeom prst="arc">
-            <a:avLst/>
-          </a:prstGeom>
-          <a:ln>
-            <a:solidFill>
+            </a:fontRef>
+          </p:style>
+          <p:txBody>
+            <a:bodyPr rtlCol="0" anchor="ctr"/>
+            <a:lstStyle/>
+            <a:p>
+              <a:pPr algn="ctr"/>
+              <a:endParaRPr lang="en-DK"/>
+            </a:p>
+          </p:txBody>
+        </p:sp>
+        <p:sp>
+          <p:nvSpPr>
+            <p:cNvPr id="49" name="Arc 48">
+              <a:extLst>
+                <a:ext uri="{FF2B5EF4-FFF2-40B4-BE49-F238E27FC236}">
+                  <a16:creationId xmlns:a16="http://schemas.microsoft.com/office/drawing/2014/main" id="{BA8D334E-02A6-EB4E-17A5-7DBD900FC898}"/>
+                </a:ext>
+              </a:extLst>
+            </p:cNvPr>
+            <p:cNvSpPr/>
+            <p:nvPr/>
+          </p:nvSpPr>
+          <p:spPr>
+            <a:xfrm rot="13140701">
+              <a:off x="7006100" y="2999501"/>
+              <a:ext cx="1392468" cy="1612983"/>
+            </a:xfrm>
+            <a:prstGeom prst="arc">
+              <a:avLst/>
+            </a:prstGeom>
+            <a:ln>
+              <a:solidFill>
+                <a:schemeClr val="tx1"/>
+              </a:solidFill>
+            </a:ln>
+          </p:spPr>
+          <p:style>
+            <a:lnRef idx="2">
+              <a:schemeClr val="accent1"/>
+            </a:lnRef>
+            <a:fillRef idx="0">
+              <a:schemeClr val="accent1"/>
+            </a:fillRef>
+            <a:effectRef idx="1">
+              <a:schemeClr val="accent1"/>
+            </a:effectRef>
+            <a:fontRef idx="minor">
               <a:schemeClr val="tx1"/>
-            </a:solidFill>
-          </a:ln>
-        </p:spPr>
-        <p:style>
-          <a:lnRef idx="2">
-            <a:schemeClr val="accent1"/>
-          </a:lnRef>
-          <a:fillRef idx="0">
-            <a:schemeClr val="accent1"/>
-          </a:fillRef>
-          <a:effectRef idx="1">
-            <a:schemeClr val="accent1"/>
-          </a:effectRef>
-          <a:fontRef idx="minor">
-            <a:schemeClr val="tx1"/>
-          </a:fontRef>
-        </p:style>
-        <p:txBody>
-          <a:bodyPr rtlCol="0" anchor="ctr"/>
-          <a:lstStyle/>
-          <a:p>
-            <a:pPr algn="ctr"/>
-            <a:endParaRPr lang="en-DK"/>
-          </a:p>
-        </p:txBody>
-      </p:sp>
-      <p:sp>
-        <p:nvSpPr>
-          <p:cNvPr id="50" name="Arc 49">
-            <a:extLst>
-              <a:ext uri="{FF2B5EF4-FFF2-40B4-BE49-F238E27FC236}">
-                <a16:creationId xmlns:a16="http://schemas.microsoft.com/office/drawing/2014/main" id="{CFA8818D-AB38-7A59-D706-D1E580CC3E86}"/>
-              </a:ext>
-            </a:extLst>
-          </p:cNvPr>
-          <p:cNvSpPr/>
-          <p:nvPr/>
-        </p:nvSpPr>
-        <p:spPr>
-          <a:xfrm rot="13140701">
-            <a:off x="7540730" y="2974502"/>
-            <a:ext cx="1392468" cy="1612983"/>
-          </a:xfrm>
-          <a:prstGeom prst="arc">
-            <a:avLst/>
-          </a:prstGeom>
-          <a:ln>
-            <a:solidFill>
+            </a:fontRef>
+          </p:style>
+          <p:txBody>
+            <a:bodyPr rtlCol="0" anchor="ctr"/>
+            <a:lstStyle/>
+            <a:p>
+              <a:pPr algn="ctr"/>
+              <a:endParaRPr lang="en-DK"/>
+            </a:p>
+          </p:txBody>
+        </p:sp>
+        <p:sp>
+          <p:nvSpPr>
+            <p:cNvPr id="50" name="Arc 49">
+              <a:extLst>
+                <a:ext uri="{FF2B5EF4-FFF2-40B4-BE49-F238E27FC236}">
+                  <a16:creationId xmlns:a16="http://schemas.microsoft.com/office/drawing/2014/main" id="{CFA8818D-AB38-7A59-D706-D1E580CC3E86}"/>
+                </a:ext>
+              </a:extLst>
+            </p:cNvPr>
+            <p:cNvSpPr/>
+            <p:nvPr/>
+          </p:nvSpPr>
+          <p:spPr>
+            <a:xfrm rot="13140701">
+              <a:off x="7540730" y="2974502"/>
+              <a:ext cx="1392468" cy="1612983"/>
+            </a:xfrm>
+            <a:prstGeom prst="arc">
+              <a:avLst/>
+            </a:prstGeom>
+            <a:ln>
+              <a:solidFill>
+                <a:schemeClr val="tx1"/>
+              </a:solidFill>
+            </a:ln>
+          </p:spPr>
+          <p:style>
+            <a:lnRef idx="2">
+              <a:schemeClr val="accent1"/>
+            </a:lnRef>
+            <a:fillRef idx="0">
+              <a:schemeClr val="accent1"/>
+            </a:fillRef>
+            <a:effectRef idx="1">
+              <a:schemeClr val="accent1"/>
+            </a:effectRef>
+            <a:fontRef idx="minor">
               <a:schemeClr val="tx1"/>
-            </a:solidFill>
-          </a:ln>
-        </p:spPr>
-        <p:style>
-          <a:lnRef idx="2">
-            <a:schemeClr val="accent1"/>
-          </a:lnRef>
-          <a:fillRef idx="0">
-            <a:schemeClr val="accent1"/>
-          </a:fillRef>
-          <a:effectRef idx="1">
-            <a:schemeClr val="accent1"/>
-          </a:effectRef>
-          <a:fontRef idx="minor">
-            <a:schemeClr val="tx1"/>
-          </a:fontRef>
-        </p:style>
-        <p:txBody>
-          <a:bodyPr rtlCol="0" anchor="ctr"/>
-          <a:lstStyle/>
-          <a:p>
-            <a:pPr algn="ctr"/>
-            <a:endParaRPr lang="en-DK"/>
-          </a:p>
-        </p:txBody>
-      </p:sp>
-      <p:cxnSp>
-        <p:nvCxnSpPr>
-          <p:cNvPr id="58" name="Straight Connector 57">
-            <a:extLst>
-              <a:ext uri="{FF2B5EF4-FFF2-40B4-BE49-F238E27FC236}">
-                <a16:creationId xmlns:a16="http://schemas.microsoft.com/office/drawing/2014/main" id="{C4D171D6-6949-1705-A5E6-747689D5F3C2}"/>
-              </a:ext>
-            </a:extLst>
-          </p:cNvPr>
-          <p:cNvCxnSpPr>
-            <a:cxnSpLocks/>
-          </p:cNvCxnSpPr>
-          <p:nvPr/>
-        </p:nvCxnSpPr>
-        <p:spPr>
-          <a:xfrm flipH="1">
-            <a:off x="1087329" y="2160000"/>
-            <a:ext cx="2637082" cy="0"/>
-          </a:xfrm>
-          <a:prstGeom prst="line">
-            <a:avLst/>
-          </a:prstGeom>
-          <a:ln>
-            <a:solidFill>
+            </a:fontRef>
+          </p:style>
+          <p:txBody>
+            <a:bodyPr rtlCol="0" anchor="ctr"/>
+            <a:lstStyle/>
+            <a:p>
+              <a:pPr algn="ctr"/>
+              <a:endParaRPr lang="en-DK"/>
+            </a:p>
+          </p:txBody>
+        </p:sp>
+        <p:cxnSp>
+          <p:nvCxnSpPr>
+            <p:cNvPr id="58" name="Straight Connector 57">
+              <a:extLst>
+                <a:ext uri="{FF2B5EF4-FFF2-40B4-BE49-F238E27FC236}">
+                  <a16:creationId xmlns:a16="http://schemas.microsoft.com/office/drawing/2014/main" id="{C4D171D6-6949-1705-A5E6-747689D5F3C2}"/>
+                </a:ext>
+              </a:extLst>
+            </p:cNvPr>
+            <p:cNvCxnSpPr>
+              <a:cxnSpLocks/>
+            </p:cNvCxnSpPr>
+            <p:nvPr/>
+          </p:nvCxnSpPr>
+          <p:spPr>
+            <a:xfrm flipH="1">
+              <a:off x="1087329" y="2160000"/>
+              <a:ext cx="2637082" cy="0"/>
+            </a:xfrm>
+            <a:prstGeom prst="line">
+              <a:avLst/>
+            </a:prstGeom>
+            <a:ln>
+              <a:solidFill>
+                <a:schemeClr val="tx1"/>
+              </a:solidFill>
+            </a:ln>
+          </p:spPr>
+          <p:style>
+            <a:lnRef idx="2">
+              <a:schemeClr val="accent1"/>
+            </a:lnRef>
+            <a:fillRef idx="0">
+              <a:schemeClr val="accent1"/>
+            </a:fillRef>
+            <a:effectRef idx="1">
+              <a:schemeClr val="accent1"/>
+            </a:effectRef>
+            <a:fontRef idx="minor">
               <a:schemeClr val="tx1"/>
-            </a:solidFill>
-          </a:ln>
-        </p:spPr>
-        <p:style>
-          <a:lnRef idx="2">
-            <a:schemeClr val="accent1"/>
-          </a:lnRef>
-          <a:fillRef idx="0">
-            <a:schemeClr val="accent1"/>
-          </a:fillRef>
-          <a:effectRef idx="1">
-            <a:schemeClr val="accent1"/>
-          </a:effectRef>
-          <a:fontRef idx="minor">
-            <a:schemeClr val="tx1"/>
-          </a:fontRef>
-        </p:style>
-      </p:cxnSp>
-      <p:cxnSp>
-        <p:nvCxnSpPr>
-          <p:cNvPr id="60" name="Straight Connector 59">
-            <a:extLst>
-              <a:ext uri="{FF2B5EF4-FFF2-40B4-BE49-F238E27FC236}">
-                <a16:creationId xmlns:a16="http://schemas.microsoft.com/office/drawing/2014/main" id="{DC00CBBF-B504-0FCF-2DC8-D1A02DCA97BD}"/>
-              </a:ext>
-            </a:extLst>
-          </p:cNvPr>
-          <p:cNvCxnSpPr>
-            <a:cxnSpLocks/>
-          </p:cNvCxnSpPr>
-          <p:nvPr/>
-        </p:nvCxnSpPr>
-        <p:spPr>
-          <a:xfrm flipH="1">
-            <a:off x="5776366" y="2160000"/>
-            <a:ext cx="2628000" cy="0"/>
-          </a:xfrm>
-          <a:prstGeom prst="line">
-            <a:avLst/>
-          </a:prstGeom>
-          <a:ln>
-            <a:solidFill>
+            </a:fontRef>
+          </p:style>
+        </p:cxnSp>
+        <p:cxnSp>
+          <p:nvCxnSpPr>
+            <p:cNvPr id="60" name="Straight Connector 59">
+              <a:extLst>
+                <a:ext uri="{FF2B5EF4-FFF2-40B4-BE49-F238E27FC236}">
+                  <a16:creationId xmlns:a16="http://schemas.microsoft.com/office/drawing/2014/main" id="{DC00CBBF-B504-0FCF-2DC8-D1A02DCA97BD}"/>
+                </a:ext>
+              </a:extLst>
+            </p:cNvPr>
+            <p:cNvCxnSpPr>
+              <a:cxnSpLocks/>
+            </p:cNvCxnSpPr>
+            <p:nvPr/>
+          </p:nvCxnSpPr>
+          <p:spPr>
+            <a:xfrm flipH="1">
+              <a:off x="5776366" y="2160000"/>
+              <a:ext cx="2628000" cy="0"/>
+            </a:xfrm>
+            <a:prstGeom prst="line">
+              <a:avLst/>
+            </a:prstGeom>
+            <a:ln>
+              <a:solidFill>
+                <a:schemeClr val="tx1"/>
+              </a:solidFill>
+            </a:ln>
+          </p:spPr>
+          <p:style>
+            <a:lnRef idx="2">
+              <a:schemeClr val="accent1"/>
+            </a:lnRef>
+            <a:fillRef idx="0">
+              <a:schemeClr val="accent1"/>
+            </a:fillRef>
+            <a:effectRef idx="1">
+              <a:schemeClr val="accent1"/>
+            </a:effectRef>
+            <a:fontRef idx="minor">
               <a:schemeClr val="tx1"/>
-            </a:solidFill>
-          </a:ln>
-        </p:spPr>
-        <p:style>
-          <a:lnRef idx="2">
-            <a:schemeClr val="accent1"/>
-          </a:lnRef>
-          <a:fillRef idx="0">
-            <a:schemeClr val="accent1"/>
-          </a:fillRef>
-          <a:effectRef idx="1">
-            <a:schemeClr val="accent1"/>
-          </a:effectRef>
-          <a:fontRef idx="minor">
-            <a:schemeClr val="tx1"/>
-          </a:fontRef>
-        </p:style>
-      </p:cxnSp>
-      <p:cxnSp>
-        <p:nvCxnSpPr>
-          <p:cNvPr id="62" name="Straight Connector 61">
-            <a:extLst>
-              <a:ext uri="{FF2B5EF4-FFF2-40B4-BE49-F238E27FC236}">
-                <a16:creationId xmlns:a16="http://schemas.microsoft.com/office/drawing/2014/main" id="{FA06EBF4-DB2E-C38B-B454-CEB5A7F35FBE}"/>
-              </a:ext>
-            </a:extLst>
-          </p:cNvPr>
-          <p:cNvCxnSpPr>
-            <a:cxnSpLocks/>
-          </p:cNvCxnSpPr>
-          <p:nvPr/>
-        </p:nvCxnSpPr>
-        <p:spPr>
-          <a:xfrm flipH="1">
-            <a:off x="1080000" y="1281188"/>
-            <a:ext cx="7618731" cy="0"/>
-          </a:xfrm>
-          <a:prstGeom prst="line">
-            <a:avLst/>
-          </a:prstGeom>
-          <a:ln>
-            <a:solidFill>
+            </a:fontRef>
+          </p:style>
+        </p:cxnSp>
+        <p:cxnSp>
+          <p:nvCxnSpPr>
+            <p:cNvPr id="62" name="Straight Connector 61">
+              <a:extLst>
+                <a:ext uri="{FF2B5EF4-FFF2-40B4-BE49-F238E27FC236}">
+                  <a16:creationId xmlns:a16="http://schemas.microsoft.com/office/drawing/2014/main" id="{FA06EBF4-DB2E-C38B-B454-CEB5A7F35FBE}"/>
+                </a:ext>
+              </a:extLst>
+            </p:cNvPr>
+            <p:cNvCxnSpPr>
+              <a:cxnSpLocks/>
+            </p:cNvCxnSpPr>
+            <p:nvPr/>
+          </p:nvCxnSpPr>
+          <p:spPr>
+            <a:xfrm flipH="1">
+              <a:off x="1080000" y="1281188"/>
+              <a:ext cx="7618731" cy="0"/>
+            </a:xfrm>
+            <a:prstGeom prst="line">
+              <a:avLst/>
+            </a:prstGeom>
+            <a:ln>
+              <a:solidFill>
+                <a:schemeClr val="tx1"/>
+              </a:solidFill>
+            </a:ln>
+          </p:spPr>
+          <p:style>
+            <a:lnRef idx="2">
+              <a:schemeClr val="accent1"/>
+            </a:lnRef>
+            <a:fillRef idx="0">
+              <a:schemeClr val="accent1"/>
+            </a:fillRef>
+            <a:effectRef idx="1">
+              <a:schemeClr val="accent1"/>
+            </a:effectRef>
+            <a:fontRef idx="minor">
               <a:schemeClr val="tx1"/>
-            </a:solidFill>
-          </a:ln>
-        </p:spPr>
-        <p:style>
-          <a:lnRef idx="2">
-            <a:schemeClr val="accent1"/>
-          </a:lnRef>
-          <a:fillRef idx="0">
-            <a:schemeClr val="accent1"/>
-          </a:fillRef>
-          <a:effectRef idx="1">
-            <a:schemeClr val="accent1"/>
-          </a:effectRef>
-          <a:fontRef idx="minor">
-            <a:schemeClr val="tx1"/>
-          </a:fontRef>
-        </p:style>
-      </p:cxnSp>
-      <p:cxnSp>
-        <p:nvCxnSpPr>
-          <p:cNvPr id="76" name="Straight Connector 75">
-            <a:extLst>
-              <a:ext uri="{FF2B5EF4-FFF2-40B4-BE49-F238E27FC236}">
-                <a16:creationId xmlns:a16="http://schemas.microsoft.com/office/drawing/2014/main" id="{C96ABAD9-1C8E-6313-CC29-C7AA6CFDB524}"/>
-              </a:ext>
-            </a:extLst>
-          </p:cNvPr>
-          <p:cNvCxnSpPr>
-            <a:cxnSpLocks/>
-          </p:cNvCxnSpPr>
-          <p:nvPr/>
-        </p:nvCxnSpPr>
-        <p:spPr>
-          <a:xfrm>
-            <a:off x="8979938" y="2229345"/>
-            <a:ext cx="0" cy="2849303"/>
-          </a:xfrm>
-          <a:prstGeom prst="line">
-            <a:avLst/>
-          </a:prstGeom>
-          <a:ln w="19050" cap="flat" cmpd="sng" algn="ctr">
-            <a:solidFill>
+            </a:fontRef>
+          </p:style>
+        </p:cxnSp>
+        <p:cxnSp>
+          <p:nvCxnSpPr>
+            <p:cNvPr id="76" name="Straight Connector 75">
+              <a:extLst>
+                <a:ext uri="{FF2B5EF4-FFF2-40B4-BE49-F238E27FC236}">
+                  <a16:creationId xmlns:a16="http://schemas.microsoft.com/office/drawing/2014/main" id="{C96ABAD9-1C8E-6313-CC29-C7AA6CFDB524}"/>
+                </a:ext>
+              </a:extLst>
+            </p:cNvPr>
+            <p:cNvCxnSpPr>
+              <a:cxnSpLocks/>
+            </p:cNvCxnSpPr>
+            <p:nvPr/>
+          </p:nvCxnSpPr>
+          <p:spPr>
+            <a:xfrm>
+              <a:off x="8979938" y="2229345"/>
+              <a:ext cx="0" cy="2849303"/>
+            </a:xfrm>
+            <a:prstGeom prst="line">
+              <a:avLst/>
+            </a:prstGeom>
+            <a:ln w="19050" cap="flat" cmpd="sng" algn="ctr">
+              <a:solidFill>
+                <a:schemeClr val="tx1"/>
+              </a:solidFill>
+              <a:prstDash val="dash"/>
+              <a:round/>
+              <a:headEnd type="none" w="med" len="med"/>
+              <a:tailEnd type="none" w="med" len="med"/>
+            </a:ln>
+          </p:spPr>
+          <p:style>
+            <a:lnRef idx="0">
+              <a:scrgbClr r="0" g="0" b="0"/>
+            </a:lnRef>
+            <a:fillRef idx="0">
+              <a:scrgbClr r="0" g="0" b="0"/>
+            </a:fillRef>
+            <a:effectRef idx="0">
+              <a:scrgbClr r="0" g="0" b="0"/>
+            </a:effectRef>
+            <a:fontRef idx="minor">
               <a:schemeClr val="tx1"/>
-            </a:solidFill>
-            <a:prstDash val="dash"/>
-            <a:round/>
-            <a:headEnd type="none" w="med" len="med"/>
-            <a:tailEnd type="none" w="med" len="med"/>
-          </a:ln>
-        </p:spPr>
-        <p:style>
-          <a:lnRef idx="0">
-            <a:scrgbClr r="0" g="0" b="0"/>
-          </a:lnRef>
-          <a:fillRef idx="0">
-            <a:scrgbClr r="0" g="0" b="0"/>
-          </a:fillRef>
-          <a:effectRef idx="0">
-            <a:scrgbClr r="0" g="0" b="0"/>
-          </a:effectRef>
-          <a:fontRef idx="minor">
-            <a:schemeClr val="tx1"/>
-          </a:fontRef>
-        </p:style>
-      </p:cxnSp>
-      <p:pic>
-        <p:nvPicPr>
-          <p:cNvPr id="13" name="Picture 12" descr="A black background with a black square&#10;&#10;Description automatically generated with medium confidence">
-            <a:extLst>
-              <a:ext uri="{FF2B5EF4-FFF2-40B4-BE49-F238E27FC236}">
-                <a16:creationId xmlns:a16="http://schemas.microsoft.com/office/drawing/2014/main" id="{2080FCA2-D29D-1246-820B-57D37DD8C572}"/>
-              </a:ext>
-            </a:extLst>
-          </p:cNvPr>
-          <p:cNvPicPr>
-            <a:picLocks noChangeAspect="1"/>
-          </p:cNvPicPr>
-          <p:nvPr/>
-        </p:nvPicPr>
-        <p:blipFill>
-          <a:blip r:embed="rId4">
-            <a:extLst>
-              <a:ext uri="{28A0092B-C50C-407E-A947-70E740481C1C}">
-                <a14:useLocalDpi xmlns:a14="http://schemas.microsoft.com/office/drawing/2010/main" val="0"/>
-              </a:ext>
-            </a:extLst>
-          </a:blip>
-          <a:stretch>
-            <a:fillRect/>
-          </a:stretch>
-        </p:blipFill>
-        <p:spPr>
-          <a:xfrm>
-            <a:off x="1719316" y="1827223"/>
-            <a:ext cx="2707204" cy="623461"/>
-          </a:xfrm>
-          <a:prstGeom prst="rect">
-            <a:avLst/>
-          </a:prstGeom>
-        </p:spPr>
-      </p:pic>
-      <p:pic>
-        <p:nvPicPr>
-          <p:cNvPr id="17" name="Picture 16" descr="A black background with a black square&#10;&#10;Description automatically generated with medium confidence">
-            <a:extLst>
-              <a:ext uri="{FF2B5EF4-FFF2-40B4-BE49-F238E27FC236}">
-                <a16:creationId xmlns:a16="http://schemas.microsoft.com/office/drawing/2014/main" id="{72856777-DE7A-AA98-5822-4EFF1764FA1B}"/>
-              </a:ext>
-            </a:extLst>
-          </p:cNvPr>
-          <p:cNvPicPr>
-            <a:picLocks noChangeAspect="1"/>
-          </p:cNvPicPr>
-          <p:nvPr/>
-        </p:nvPicPr>
-        <p:blipFill>
-          <a:blip r:embed="rId5">
-            <a:extLst>
-              <a:ext uri="{28A0092B-C50C-407E-A947-70E740481C1C}">
-                <a14:useLocalDpi xmlns:a14="http://schemas.microsoft.com/office/drawing/2010/main" val="0"/>
-              </a:ext>
-            </a:extLst>
-          </a:blip>
-          <a:stretch>
-            <a:fillRect/>
-          </a:stretch>
-        </p:blipFill>
-        <p:spPr>
-          <a:xfrm>
-            <a:off x="5970031" y="1827430"/>
-            <a:ext cx="3316810" cy="623461"/>
-          </a:xfrm>
-          <a:prstGeom prst="rect">
-            <a:avLst/>
-          </a:prstGeom>
-        </p:spPr>
-      </p:pic>
-      <p:pic>
-        <p:nvPicPr>
-          <p:cNvPr id="21" name="Picture 20" descr="A black background with a black square&#10;&#10;Description automatically generated with medium confidence">
-            <a:extLst>
-              <a:ext uri="{FF2B5EF4-FFF2-40B4-BE49-F238E27FC236}">
-                <a16:creationId xmlns:a16="http://schemas.microsoft.com/office/drawing/2014/main" id="{641167B6-3FC8-EFA9-29C6-C3F31F816195}"/>
-              </a:ext>
-            </a:extLst>
-          </p:cNvPr>
-          <p:cNvPicPr>
-            <a:picLocks noChangeAspect="1"/>
-          </p:cNvPicPr>
-          <p:nvPr/>
-        </p:nvPicPr>
-        <p:blipFill>
-          <a:blip r:embed="rId6">
-            <a:extLst>
-              <a:ext uri="{28A0092B-C50C-407E-A947-70E740481C1C}">
-                <a14:useLocalDpi xmlns:a14="http://schemas.microsoft.com/office/drawing/2010/main" val="0"/>
-              </a:ext>
-            </a:extLst>
-          </a:blip>
-          <a:stretch>
-            <a:fillRect/>
-          </a:stretch>
-        </p:blipFill>
-        <p:spPr>
-          <a:xfrm>
-            <a:off x="3934133" y="948589"/>
-            <a:ext cx="3314040" cy="623461"/>
-          </a:xfrm>
-          <a:prstGeom prst="rect">
-            <a:avLst/>
-          </a:prstGeom>
-        </p:spPr>
-      </p:pic>
-      <p:pic>
-        <p:nvPicPr>
-          <p:cNvPr id="53" name="Picture 52" descr="A black background with a black square&#10;&#10;Description automatically generated with medium confidence">
-            <a:extLst>
-              <a:ext uri="{FF2B5EF4-FFF2-40B4-BE49-F238E27FC236}">
-                <a16:creationId xmlns:a16="http://schemas.microsoft.com/office/drawing/2014/main" id="{DE894582-E3DB-2B80-A464-D25EBB833905}"/>
-              </a:ext>
-            </a:extLst>
-          </p:cNvPr>
-          <p:cNvPicPr>
-            <a:picLocks noChangeAspect="1"/>
-          </p:cNvPicPr>
-          <p:nvPr/>
-        </p:nvPicPr>
-        <p:blipFill>
-          <a:blip r:embed="rId7">
-            <a:extLst>
-              <a:ext uri="{28A0092B-C50C-407E-A947-70E740481C1C}">
-                <a14:useLocalDpi xmlns:a14="http://schemas.microsoft.com/office/drawing/2010/main" val="0"/>
-              </a:ext>
-            </a:extLst>
-          </a:blip>
-          <a:stretch>
-            <a:fillRect/>
-          </a:stretch>
-        </p:blipFill>
-        <p:spPr>
-          <a:xfrm>
-            <a:off x="8317181" y="1611756"/>
-            <a:ext cx="2158559" cy="648399"/>
-          </a:xfrm>
-          <a:prstGeom prst="rect">
-            <a:avLst/>
-          </a:prstGeom>
-        </p:spPr>
-      </p:pic>
-      <p:pic>
-        <p:nvPicPr>
-          <p:cNvPr id="55" name="Picture 54" descr="A black background with a black square&#10;&#10;Description automatically generated with medium confidence">
-            <a:extLst>
-              <a:ext uri="{FF2B5EF4-FFF2-40B4-BE49-F238E27FC236}">
-                <a16:creationId xmlns:a16="http://schemas.microsoft.com/office/drawing/2014/main" id="{87B27784-2B6E-7C36-C908-86D20C16D2AA}"/>
-              </a:ext>
-            </a:extLst>
-          </p:cNvPr>
-          <p:cNvPicPr>
-            <a:picLocks noChangeAspect="1"/>
-          </p:cNvPicPr>
-          <p:nvPr/>
-        </p:nvPicPr>
-        <p:blipFill>
-          <a:blip r:embed="rId8">
-            <a:extLst>
-              <a:ext uri="{28A0092B-C50C-407E-A947-70E740481C1C}">
-                <a14:useLocalDpi xmlns:a14="http://schemas.microsoft.com/office/drawing/2010/main" val="0"/>
-              </a:ext>
-            </a:extLst>
-          </a:blip>
-          <a:stretch>
-            <a:fillRect/>
-          </a:stretch>
-        </p:blipFill>
-        <p:spPr>
-          <a:xfrm>
-            <a:off x="3638450" y="1405408"/>
-            <a:ext cx="2183498" cy="911638"/>
-          </a:xfrm>
-          <a:prstGeom prst="rect">
-            <a:avLst/>
-          </a:prstGeom>
-        </p:spPr>
-      </p:pic>
+            </a:fontRef>
+          </p:style>
+        </p:cxnSp>
+        <p:pic>
+          <p:nvPicPr>
+            <p:cNvPr id="13" name="Picture 12" descr="A black background with a black square&#10;&#10;Description automatically generated with medium confidence">
+              <a:extLst>
+                <a:ext uri="{FF2B5EF4-FFF2-40B4-BE49-F238E27FC236}">
+                  <a16:creationId xmlns:a16="http://schemas.microsoft.com/office/drawing/2014/main" id="{2080FCA2-D29D-1246-820B-57D37DD8C572}"/>
+                </a:ext>
+              </a:extLst>
+            </p:cNvPr>
+            <p:cNvPicPr>
+              <a:picLocks noChangeAspect="1"/>
+            </p:cNvPicPr>
+            <p:nvPr/>
+          </p:nvPicPr>
+          <p:blipFill>
+            <a:blip r:embed="rId4">
+              <a:extLst>
+                <a:ext uri="{28A0092B-C50C-407E-A947-70E740481C1C}">
+                  <a14:useLocalDpi xmlns:a14="http://schemas.microsoft.com/office/drawing/2010/main" val="0"/>
+                </a:ext>
+              </a:extLst>
+            </a:blip>
+            <a:stretch>
+              <a:fillRect/>
+            </a:stretch>
+          </p:blipFill>
+          <p:spPr>
+            <a:xfrm>
+              <a:off x="1719316" y="1827223"/>
+              <a:ext cx="2707204" cy="623461"/>
+            </a:xfrm>
+            <a:prstGeom prst="rect">
+              <a:avLst/>
+            </a:prstGeom>
+          </p:spPr>
+        </p:pic>
+        <p:pic>
+          <p:nvPicPr>
+            <p:cNvPr id="17" name="Picture 16" descr="A black background with a black square&#10;&#10;Description automatically generated with medium confidence">
+              <a:extLst>
+                <a:ext uri="{FF2B5EF4-FFF2-40B4-BE49-F238E27FC236}">
+                  <a16:creationId xmlns:a16="http://schemas.microsoft.com/office/drawing/2014/main" id="{72856777-DE7A-AA98-5822-4EFF1764FA1B}"/>
+                </a:ext>
+              </a:extLst>
+            </p:cNvPr>
+            <p:cNvPicPr>
+              <a:picLocks noChangeAspect="1"/>
+            </p:cNvPicPr>
+            <p:nvPr/>
+          </p:nvPicPr>
+          <p:blipFill>
+            <a:blip r:embed="rId5">
+              <a:extLst>
+                <a:ext uri="{28A0092B-C50C-407E-A947-70E740481C1C}">
+                  <a14:useLocalDpi xmlns:a14="http://schemas.microsoft.com/office/drawing/2010/main" val="0"/>
+                </a:ext>
+              </a:extLst>
+            </a:blip>
+            <a:stretch>
+              <a:fillRect/>
+            </a:stretch>
+          </p:blipFill>
+          <p:spPr>
+            <a:xfrm>
+              <a:off x="5970031" y="1827430"/>
+              <a:ext cx="3316810" cy="623461"/>
+            </a:xfrm>
+            <a:prstGeom prst="rect">
+              <a:avLst/>
+            </a:prstGeom>
+          </p:spPr>
+        </p:pic>
+        <p:pic>
+          <p:nvPicPr>
+            <p:cNvPr id="21" name="Picture 20" descr="A black background with a black square&#10;&#10;Description automatically generated with medium confidence">
+              <a:extLst>
+                <a:ext uri="{FF2B5EF4-FFF2-40B4-BE49-F238E27FC236}">
+                  <a16:creationId xmlns:a16="http://schemas.microsoft.com/office/drawing/2014/main" id="{641167B6-3FC8-EFA9-29C6-C3F31F816195}"/>
+                </a:ext>
+              </a:extLst>
+            </p:cNvPr>
+            <p:cNvPicPr>
+              <a:picLocks noChangeAspect="1"/>
+            </p:cNvPicPr>
+            <p:nvPr/>
+          </p:nvPicPr>
+          <p:blipFill>
+            <a:blip r:embed="rId6">
+              <a:extLst>
+                <a:ext uri="{28A0092B-C50C-407E-A947-70E740481C1C}">
+                  <a14:useLocalDpi xmlns:a14="http://schemas.microsoft.com/office/drawing/2010/main" val="0"/>
+                </a:ext>
+              </a:extLst>
+            </a:blip>
+            <a:stretch>
+              <a:fillRect/>
+            </a:stretch>
+          </p:blipFill>
+          <p:spPr>
+            <a:xfrm>
+              <a:off x="3934133" y="948589"/>
+              <a:ext cx="3314040" cy="623461"/>
+            </a:xfrm>
+            <a:prstGeom prst="rect">
+              <a:avLst/>
+            </a:prstGeom>
+          </p:spPr>
+        </p:pic>
+        <p:pic>
+          <p:nvPicPr>
+            <p:cNvPr id="53" name="Picture 52" descr="A black background with a black square&#10;&#10;Description automatically generated with medium confidence">
+              <a:extLst>
+                <a:ext uri="{FF2B5EF4-FFF2-40B4-BE49-F238E27FC236}">
+                  <a16:creationId xmlns:a16="http://schemas.microsoft.com/office/drawing/2014/main" id="{DE894582-E3DB-2B80-A464-D25EBB833905}"/>
+                </a:ext>
+              </a:extLst>
+            </p:cNvPr>
+            <p:cNvPicPr>
+              <a:picLocks noChangeAspect="1"/>
+            </p:cNvPicPr>
+            <p:nvPr/>
+          </p:nvPicPr>
+          <p:blipFill>
+            <a:blip r:embed="rId7">
+              <a:extLst>
+                <a:ext uri="{28A0092B-C50C-407E-A947-70E740481C1C}">
+                  <a14:useLocalDpi xmlns:a14="http://schemas.microsoft.com/office/drawing/2010/main" val="0"/>
+                </a:ext>
+              </a:extLst>
+            </a:blip>
+            <a:stretch>
+              <a:fillRect/>
+            </a:stretch>
+          </p:blipFill>
+          <p:spPr>
+            <a:xfrm>
+              <a:off x="8317181" y="1611756"/>
+              <a:ext cx="2158559" cy="648399"/>
+            </a:xfrm>
+            <a:prstGeom prst="rect">
+              <a:avLst/>
+            </a:prstGeom>
+          </p:spPr>
+        </p:pic>
+        <p:pic>
+          <p:nvPicPr>
+            <p:cNvPr id="55" name="Picture 54" descr="A black background with a black square&#10;&#10;Description automatically generated with medium confidence">
+              <a:extLst>
+                <a:ext uri="{FF2B5EF4-FFF2-40B4-BE49-F238E27FC236}">
+                  <a16:creationId xmlns:a16="http://schemas.microsoft.com/office/drawing/2014/main" id="{87B27784-2B6E-7C36-C908-86D20C16D2AA}"/>
+                </a:ext>
+              </a:extLst>
+            </p:cNvPr>
+            <p:cNvPicPr>
+              <a:picLocks noChangeAspect="1"/>
+            </p:cNvPicPr>
+            <p:nvPr/>
+          </p:nvPicPr>
+          <p:blipFill>
+            <a:blip r:embed="rId8">
+              <a:extLst>
+                <a:ext uri="{28A0092B-C50C-407E-A947-70E740481C1C}">
+                  <a14:useLocalDpi xmlns:a14="http://schemas.microsoft.com/office/drawing/2010/main" val="0"/>
+                </a:ext>
+              </a:extLst>
+            </a:blip>
+            <a:stretch>
+              <a:fillRect/>
+            </a:stretch>
+          </p:blipFill>
+          <p:spPr>
+            <a:xfrm>
+              <a:off x="3638450" y="1405408"/>
+              <a:ext cx="2183498" cy="911638"/>
+            </a:xfrm>
+            <a:prstGeom prst="rect">
+              <a:avLst/>
+            </a:prstGeom>
+          </p:spPr>
+        </p:pic>
+      </p:grpSp>
     </p:spTree>
     <p:extLst>
       <p:ext uri="{BB962C8B-B14F-4D97-AF65-F5344CB8AC3E}">

</xml_diff>